<commit_message>
Marge 05 (not complete)
</commit_message>
<xml_diff>
--- a/p42-jacobson_ja/p42-jacobson_ja.pptx
+++ b/p42-jacobson_ja/p42-jacobson_ja.pptx
@@ -295,7 +295,7 @@
           <a:p>
             <a:fld id="{0250A163-ACDB-304E-8C8E-D7913C06F9E0}" type="datetimeFigureOut">
               <a:rPr lang="en-US" smtClean="0"/>
-              <a:t>4/8/13</a:t>
+              <a:t>4/10/13</a:t>
             </a:fld>
             <a:endParaRPr lang="en-US"/>
           </a:p>
@@ -465,7 +465,7 @@
           <a:p>
             <a:fld id="{0250A163-ACDB-304E-8C8E-D7913C06F9E0}" type="datetimeFigureOut">
               <a:rPr lang="en-US" smtClean="0"/>
-              <a:t>4/8/13</a:t>
+              <a:t>4/10/13</a:t>
             </a:fld>
             <a:endParaRPr lang="en-US"/>
           </a:p>
@@ -645,7 +645,7 @@
           <a:p>
             <a:fld id="{0250A163-ACDB-304E-8C8E-D7913C06F9E0}" type="datetimeFigureOut">
               <a:rPr lang="en-US" smtClean="0"/>
-              <a:t>4/8/13</a:t>
+              <a:t>4/10/13</a:t>
             </a:fld>
             <a:endParaRPr lang="en-US"/>
           </a:p>
@@ -815,7 +815,7 @@
           <a:p>
             <a:fld id="{0250A163-ACDB-304E-8C8E-D7913C06F9E0}" type="datetimeFigureOut">
               <a:rPr lang="en-US" smtClean="0"/>
-              <a:t>4/8/13</a:t>
+              <a:t>4/10/13</a:t>
             </a:fld>
             <a:endParaRPr lang="en-US"/>
           </a:p>
@@ -1061,7 +1061,7 @@
           <a:p>
             <a:fld id="{0250A163-ACDB-304E-8C8E-D7913C06F9E0}" type="datetimeFigureOut">
               <a:rPr lang="en-US" smtClean="0"/>
-              <a:t>4/8/13</a:t>
+              <a:t>4/10/13</a:t>
             </a:fld>
             <a:endParaRPr lang="en-US"/>
           </a:p>
@@ -1349,7 +1349,7 @@
           <a:p>
             <a:fld id="{0250A163-ACDB-304E-8C8E-D7913C06F9E0}" type="datetimeFigureOut">
               <a:rPr lang="en-US" smtClean="0"/>
-              <a:t>4/8/13</a:t>
+              <a:t>4/10/13</a:t>
             </a:fld>
             <a:endParaRPr lang="en-US"/>
           </a:p>
@@ -1776,7 +1776,7 @@
           <a:p>
             <a:fld id="{0250A163-ACDB-304E-8C8E-D7913C06F9E0}" type="datetimeFigureOut">
               <a:rPr lang="en-US" smtClean="0"/>
-              <a:t>4/8/13</a:t>
+              <a:t>4/10/13</a:t>
             </a:fld>
             <a:endParaRPr lang="en-US"/>
           </a:p>
@@ -1894,7 +1894,7 @@
           <a:p>
             <a:fld id="{0250A163-ACDB-304E-8C8E-D7913C06F9E0}" type="datetimeFigureOut">
               <a:rPr lang="en-US" smtClean="0"/>
-              <a:t>4/8/13</a:t>
+              <a:t>4/10/13</a:t>
             </a:fld>
             <a:endParaRPr lang="en-US"/>
           </a:p>
@@ -1989,7 +1989,7 @@
           <a:p>
             <a:fld id="{0250A163-ACDB-304E-8C8E-D7913C06F9E0}" type="datetimeFigureOut">
               <a:rPr lang="en-US" smtClean="0"/>
-              <a:t>4/8/13</a:t>
+              <a:t>4/10/13</a:t>
             </a:fld>
             <a:endParaRPr lang="en-US"/>
           </a:p>
@@ -2266,7 +2266,7 @@
           <a:p>
             <a:fld id="{0250A163-ACDB-304E-8C8E-D7913C06F9E0}" type="datetimeFigureOut">
               <a:rPr lang="en-US" smtClean="0"/>
-              <a:t>4/8/13</a:t>
+              <a:t>4/10/13</a:t>
             </a:fld>
             <a:endParaRPr lang="en-US"/>
           </a:p>
@@ -2519,7 +2519,7 @@
           <a:p>
             <a:fld id="{0250A163-ACDB-304E-8C8E-D7913C06F9E0}" type="datetimeFigureOut">
               <a:rPr lang="en-US" smtClean="0"/>
-              <a:t>4/8/13</a:t>
+              <a:t>4/10/13</a:t>
             </a:fld>
             <a:endParaRPr lang="en-US"/>
           </a:p>
@@ -2732,7 +2732,7 @@
           <a:p>
             <a:fld id="{0250A163-ACDB-304E-8C8E-D7913C06F9E0}" type="datetimeFigureOut">
               <a:rPr lang="en-US" smtClean="0"/>
-              <a:t>4/8/13</a:t>
+              <a:t>4/10/13</a:t>
             </a:fld>
             <a:endParaRPr lang="en-US"/>
           </a:p>
@@ -3225,11 +3225,6 @@
               </a:rPr>
               <a:t>) 記事</a:t>
             </a:r>
-            <a:endParaRPr lang="en-US" sz="1050" dirty="0">
-              <a:latin typeface="ヒラギノ角ゴ Pro W3"/>
-              <a:ea typeface="ヒラギノ角ゴ Pro W3"/>
-              <a:cs typeface="ヒラギノ角ゴ Pro W3"/>
-            </a:endParaRPr>
           </a:p>
         </p:txBody>
       </p:sp>
@@ -3828,23 +3823,7 @@
                 <a:ea typeface="ヒラギノ角ゴ Pro W3"/>
                 <a:cs typeface="ヒラギノ角ゴ Pro W3"/>
               </a:rPr>
-              <a:t>なら</a:t>
-            </a:r>
-            <a:r>
-              <a:rPr lang="ja-JP" altLang="en-US" sz="1200" dirty="0" smtClean="0">
-                <a:latin typeface="ヒラギノ角ゴ Pro W3"/>
-                <a:ea typeface="ヒラギノ角ゴ Pro W3"/>
-                <a:cs typeface="ヒラギノ角ゴ Pro W3"/>
-              </a:rPr>
-              <a:t>な</a:t>
-            </a:r>
-            <a:r>
-              <a:rPr lang="ja-JP" altLang="en-US" sz="1200" dirty="0" smtClean="0">
-                <a:latin typeface="ヒラギノ角ゴ Pro W3"/>
-                <a:ea typeface="ヒラギノ角ゴ Pro W3"/>
-                <a:cs typeface="ヒラギノ角ゴ Pro W3"/>
-              </a:rPr>
-              <a:t>い</a:t>
+              <a:t>ならない</a:t>
             </a:r>
             <a:r>
               <a:rPr lang="ja-JP" altLang="en-US" sz="1200" dirty="0">
@@ -4401,15 +4380,7 @@
                 <a:ea typeface="ヒラギノ角ゴ Pro W3"/>
                 <a:cs typeface="ヒラギノ角ゴ Pro W3"/>
               </a:rPr>
-              <a:t>だ</a:t>
-            </a:r>
-            <a:r>
-              <a:rPr lang="ja-JP" altLang="en-US" sz="900" dirty="0" smtClean="0">
-                <a:latin typeface="ヒラギノ角ゴ Pro W3"/>
-                <a:ea typeface="ヒラギノ角ゴ Pro W3"/>
-                <a:cs typeface="ヒラギノ角ゴ Pro W3"/>
-              </a:rPr>
-              <a:t>。</a:t>
+              <a:t>だ。</a:t>
             </a:r>
             <a:endParaRPr lang="en-US" sz="900" dirty="0" smtClean="0">
               <a:latin typeface="ヒラギノ角ゴ Pro W3"/>
@@ -5559,23 +5530,7 @@
                 <a:ea typeface="ヒラギノ角ゴ Pro W3"/>
                 <a:cs typeface="ヒラギノ角ゴ Pro W3"/>
               </a:rPr>
-              <a:t>合わせた</a:t>
-            </a:r>
-            <a:r>
-              <a:rPr lang="ja-JP" altLang="en-US" sz="900" dirty="0" smtClean="0">
-                <a:latin typeface="ヒラギノ角ゴ Pro W3"/>
-                <a:ea typeface="ヒラギノ角ゴ Pro W3"/>
-                <a:cs typeface="ヒラギノ角ゴ Pro W3"/>
-              </a:rPr>
-              <a:t>：</a:t>
-            </a:r>
-            <a:r>
-              <a:rPr lang="ja-JP" altLang="en-US" sz="900" dirty="0" smtClean="0">
-                <a:latin typeface="ヒラギノ角ゴ Pro W3"/>
-                <a:ea typeface="ヒラギノ角ゴ Pro W3"/>
-                <a:cs typeface="ヒラギノ角ゴ Pro W3"/>
-              </a:rPr>
-              <a:t>広く</a:t>
+              <a:t>合わせた：広く</a:t>
             </a:r>
             <a:r>
               <a:rPr lang="ja-JP" altLang="en-US" sz="900" dirty="0">
@@ -5952,15 +5907,7 @@
                 <a:ea typeface="ヒラギノ角ゴ Pro W3"/>
                 <a:cs typeface="ヒラギノ角ゴ Pro W3"/>
               </a:rPr>
-              <a:t>する</a:t>
-            </a:r>
-            <a:r>
-              <a:rPr lang="ja-JP" altLang="en-US" sz="900" dirty="0" smtClean="0">
-                <a:latin typeface="ヒラギノ角ゴ Pro W3"/>
-                <a:ea typeface="ヒラギノ角ゴ Pro W3"/>
-                <a:cs typeface="ヒラギノ角ゴ Pro W3"/>
-              </a:rPr>
-              <a:t>。</a:t>
+              <a:t>する。</a:t>
             </a:r>
             <a:r>
               <a:rPr lang="en-US" altLang="ja-JP" sz="900" dirty="0" smtClean="0">
@@ -6653,18 +6600,7 @@
                 <a:ea typeface="ヒラギノ角ゴ Pro W3"/>
                 <a:cs typeface="ヒラギノ角ゴ Pro W3"/>
               </a:rPr>
-              <a:t>ある</a:t>
-            </a:r>
-            <a:r>
-              <a:rPr lang="ja-JP" altLang="en-US" sz="1050" b="1" dirty="0" smtClean="0">
-                <a:solidFill>
-                  <a:srgbClr val="1A1818"/>
-                </a:solidFill>
-                <a:latin typeface="ヒラギノ角ゴ Pro W3"/>
-                <a:ea typeface="ヒラギノ角ゴ Pro W3"/>
-                <a:cs typeface="ヒラギノ角ゴ Pro W3"/>
-              </a:rPr>
-              <a:t>。</a:t>
+              <a:t>ある。</a:t>
             </a:r>
             <a:endParaRPr lang="en-US" altLang="ja-JP" sz="1050" b="1" dirty="0" smtClean="0">
               <a:solidFill>
@@ -7613,15 +7549,7 @@
                 <a:ea typeface="ヒラギノ角ゴ Pro W3"/>
                 <a:cs typeface="ヒラギノ角ゴ Pro W3"/>
               </a:rPr>
-              <a:t>挙げられる</a:t>
-            </a:r>
-            <a:r>
-              <a:rPr lang="ja-JP" altLang="en-US" sz="900" dirty="0" smtClean="0">
-                <a:latin typeface="ヒラギノ角ゴ Pro W3"/>
-                <a:ea typeface="ヒラギノ角ゴ Pro W3"/>
-                <a:cs typeface="ヒラギノ角ゴ Pro W3"/>
-              </a:rPr>
-              <a:t>。</a:t>
+              <a:t>挙げられる。</a:t>
             </a:r>
             <a:endParaRPr lang="en-US" altLang="ja-JP" sz="900" dirty="0" smtClean="0">
               <a:latin typeface="ヒラギノ角ゴ Pro W3"/>
@@ -8746,7 +8674,7 @@
         <p:spPr>
           <a:xfrm>
             <a:off x="255507" y="3417951"/>
-            <a:ext cx="2021756" cy="7478966"/>
+            <a:ext cx="2021756" cy="6532555"/>
           </a:xfrm>
           <a:prstGeom prst="rect">
             <a:avLst/>
@@ -8882,8 +8810,23 @@
                 <a:ea typeface="ヒラギノ角ゴ Pro W3"/>
                 <a:cs typeface="ヒラギノ角ゴ Pro W3"/>
               </a:rPr>
-              <a:t>の状態のチェックリストは、イテレーションにおいてすべき事柄のヒントを与える。同チェックリストにより、達成した事柄を明確として、本来達成すべきと意図した事柄との比較を通じて現在の進展を特定しやすくなる。</a:t>
-            </a:r>
+              <a:t>の状態のチェックリストは、イテレーションにおいてすべき事柄のヒントを与える。同チェックリストにより、達成した事柄を明確として、本来達成すべきと意図した事柄との比較を通じて現在の進展を特定しやすくなる</a:t>
+            </a:r>
+            <a:r>
+              <a:rPr lang="ja-JP" altLang="en-US" sz="900" dirty="0" smtClean="0">
+                <a:latin typeface="ヒラギノ角ゴ Pro W3"/>
+                <a:ea typeface="ヒラギノ角ゴ Pro W3"/>
+                <a:cs typeface="ヒラギノ角ゴ Pro W3"/>
+              </a:rPr>
+              <a:t>。</a:t>
+            </a:r>
+            <a:endParaRPr lang="en-US" altLang="ja-JP" sz="900" dirty="0" smtClean="0">
+              <a:latin typeface="ヒラギノ角ゴ Pro W3"/>
+              <a:ea typeface="ヒラギノ角ゴ Pro W3"/>
+              <a:cs typeface="ヒラギノ角ゴ Pro W3"/>
+            </a:endParaRPr>
+          </a:p>
+          <a:p>
             <a:endParaRPr lang="en-US" sz="900" dirty="0">
               <a:latin typeface="ヒラギノ角ゴ Pro W3"/>
               <a:ea typeface="ヒラギノ角ゴ Pro W3"/>
@@ -8892,65 +8835,82 @@
           </a:p>
           <a:p>
             <a:r>
-              <a:rPr lang="en-US" sz="900" smtClean="0">
-                <a:latin typeface="ヒラギノ角ゴ Pro W3"/>
-                <a:ea typeface="ヒラギノ角ゴ Pro W3"/>
-                <a:cs typeface="ヒラギノ角ゴ Pro W3"/>
-              </a:rPr>
-              <a:t>the </a:t>
-            </a:r>
-            <a:r>
-              <a:rPr lang="en-US" sz="900" dirty="0">
-                <a:latin typeface="ヒラギノ角ゴ Pro W3"/>
-                <a:ea typeface="ヒラギノ角ゴ Pro W3"/>
-                <a:cs typeface="ヒラギノ角ゴ Pro W3"/>
-              </a:rPr>
-              <a:t>Kernel in the Real World</a:t>
-            </a:r>
-          </a:p>
-          <a:p>
-            <a:r>
-              <a:rPr lang="en-US" sz="900" dirty="0">
-                <a:latin typeface="ヒラギノ角ゴ Pro W3"/>
-                <a:ea typeface="ヒラギノ角ゴ Pro W3"/>
-                <a:cs typeface="ヒラギノ角ゴ Pro W3"/>
-              </a:rPr>
-              <a:t>Although the ideas presented here will be new to many of you, they have al- ready been successfully applied in the real world by both industry and </a:t>
-            </a:r>
-            <a:r>
-              <a:rPr lang="en-US" sz="900" dirty="0" err="1">
-                <a:latin typeface="ヒラギノ角ゴ Pro W3"/>
-                <a:ea typeface="ヒラギノ角ゴ Pro W3"/>
-                <a:cs typeface="ヒラギノ角ゴ Pro W3"/>
-              </a:rPr>
-              <a:t>aca</a:t>
-            </a:r>
-            <a:r>
-              <a:rPr lang="en-US" sz="900" dirty="0">
-                <a:latin typeface="ヒラギノ角ゴ Pro W3"/>
-                <a:ea typeface="ヒラギノ角ゴ Pro W3"/>
-                <a:cs typeface="ヒラギノ角ゴ Pro W3"/>
-              </a:rPr>
-              <a:t>- </a:t>
-            </a:r>
-            <a:r>
-              <a:rPr lang="en-US" sz="900" dirty="0" err="1">
-                <a:latin typeface="ヒラギノ角ゴ Pro W3"/>
-                <a:ea typeface="ヒラギノ角ゴ Pro W3"/>
-                <a:cs typeface="ヒラギノ角ゴ Pro W3"/>
-              </a:rPr>
-              <a:t>demia</a:t>
-            </a:r>
-            <a:r>
-              <a:rPr lang="en-US" sz="900" dirty="0">
-                <a:latin typeface="ヒラギノ角ゴ Pro W3"/>
-                <a:ea typeface="ヒラギノ角ゴ Pro W3"/>
-                <a:cs typeface="ヒラギノ角ゴ Pro W3"/>
-              </a:rPr>
-              <a:t>. In all cases they used the kernel and practices developed by </a:t>
-            </a:r>
-            <a:r>
-              <a:rPr lang="en-US" sz="900" dirty="0" err="1">
+              <a:rPr lang="ja-JP" altLang="en-US" sz="1050" b="1" dirty="0">
+                <a:latin typeface="ヒラギノ角ゴ Pro W3"/>
+                <a:ea typeface="ヒラギノ角ゴ Pro W3"/>
+                <a:cs typeface="ヒラギノ角ゴ Pro W3"/>
+              </a:rPr>
+              <a:t>実世界におけるカーネル</a:t>
+            </a:r>
+            <a:endParaRPr lang="en-US" sz="1050" b="1" dirty="0">
+              <a:latin typeface="ヒラギノ角ゴ Pro W3"/>
+              <a:ea typeface="ヒラギノ角ゴ Pro W3"/>
+              <a:cs typeface="ヒラギノ角ゴ Pro W3"/>
+            </a:endParaRPr>
+          </a:p>
+          <a:p>
+            <a:r>
+              <a:rPr lang="ja-JP" altLang="en-US" sz="900" dirty="0">
+                <a:latin typeface="ヒラギノ角ゴ Pro W3"/>
+                <a:ea typeface="ヒラギノ角ゴ Pro W3"/>
+                <a:cs typeface="ヒラギノ角ゴ Pro W3"/>
+              </a:rPr>
+              <a:t>ここで紹介されたアイデアは多くの皆さんに</a:t>
+            </a:r>
+            <a:r>
+              <a:rPr lang="ja-JP" altLang="en-US" sz="900" dirty="0" smtClean="0">
+                <a:latin typeface="ヒラギノ角ゴ Pro W3"/>
+                <a:ea typeface="ヒラギノ角ゴ Pro W3"/>
+                <a:cs typeface="ヒラギノ角ゴ Pro W3"/>
+              </a:rPr>
+              <a:t>とって新しい</a:t>
+            </a:r>
+            <a:r>
+              <a:rPr lang="ja-JP" altLang="en-US" sz="900" dirty="0">
+                <a:latin typeface="ヒラギノ角ゴ Pro W3"/>
+                <a:ea typeface="ヒラギノ角ゴ Pro W3"/>
+                <a:cs typeface="ヒラギノ角ゴ Pro W3"/>
+              </a:rPr>
+              <a:t>ものであるにもかかわらず、すでに産学両方で</a:t>
+            </a:r>
+          </a:p>
+          <a:p>
+            <a:r>
+              <a:rPr lang="ja-JP" altLang="en-US" sz="900" dirty="0">
+                <a:latin typeface="ヒラギノ角ゴ Pro W3"/>
+                <a:ea typeface="ヒラギノ角ゴ Pro W3"/>
+                <a:cs typeface="ヒラギノ角ゴ Pro W3"/>
+              </a:rPr>
+              <a:t>成功事例として適用されている。</a:t>
+            </a:r>
+          </a:p>
+          <a:p>
+            <a:r>
+              <a:rPr lang="ja-JP" altLang="en-US" sz="900" dirty="0">
+                <a:latin typeface="ヒラギノ角ゴ Pro W3"/>
+                <a:ea typeface="ヒラギノ角ゴ Pro W3"/>
+                <a:cs typeface="ヒラギノ角ゴ Pro W3"/>
+              </a:rPr>
+              <a:t>すべての例</a:t>
+            </a:r>
+            <a:r>
+              <a:rPr lang="ja-JP" altLang="en-US" sz="900" dirty="0" smtClean="0">
+                <a:latin typeface="ヒラギノ角ゴ Pro W3"/>
+                <a:ea typeface="ヒラギノ角ゴ Pro W3"/>
+                <a:cs typeface="ヒラギノ角ゴ Pro W3"/>
+              </a:rPr>
+              <a:t>で</a:t>
+            </a:r>
+            <a:r>
+              <a:rPr lang="en-US" altLang="ja-JP" sz="900" dirty="0" smtClean="0">
+                <a:latin typeface="ヒラギノ角ゴ Pro W3"/>
+                <a:ea typeface="ヒラギノ角ゴ Pro W3"/>
+                <a:cs typeface="ヒラギノ角ゴ Pro W3"/>
+              </a:rPr>
+              <a:t> </a:t>
+            </a:r>
+            <a:r>
+              <a:rPr lang="en-US" altLang="ja-JP" sz="900" dirty="0" err="1" smtClean="0">
                 <a:latin typeface="ヒラギノ角ゴ Pro W3"/>
                 <a:ea typeface="ヒラギノ角ゴ Pro W3"/>
                 <a:cs typeface="ヒラギノ角ゴ Pro W3"/>
@@ -8958,25 +8918,102 @@
               <a:t>Ivar</a:t>
             </a:r>
             <a:r>
-              <a:rPr lang="en-US" sz="900" dirty="0">
-                <a:latin typeface="ヒラギノ角ゴ Pro W3"/>
-                <a:ea typeface="ヒラギノ角ゴ Pro W3"/>
-                <a:cs typeface="ヒラギノ角ゴ Pro W3"/>
-              </a:rPr>
-              <a:t> Jacob- son International.1,10 Early adopters of the kernel idea include:</a:t>
-            </a:r>
-          </a:p>
-          <a:p>
-            <a:r>
-              <a:rPr lang="en-US" sz="900" dirty="0">
-                <a:latin typeface="ヒラギノ角ゴ Pro W3"/>
-                <a:ea typeface="ヒラギノ角ゴ Pro W3"/>
-                <a:cs typeface="ヒラギノ角ゴ Pro W3"/>
-              </a:rPr>
-              <a:t>˲ </a:t>
-            </a:r>
-            <a:r>
-              <a:rPr lang="en-US" sz="900" dirty="0" err="1">
+              <a:rPr lang="en-US" altLang="ja-JP" sz="900" dirty="0" smtClean="0">
+                <a:latin typeface="ヒラギノ角ゴ Pro W3"/>
+                <a:ea typeface="ヒラギノ角ゴ Pro W3"/>
+                <a:cs typeface="ヒラギノ角ゴ Pro W3"/>
+              </a:rPr>
+              <a:t> </a:t>
+            </a:r>
+            <a:r>
+              <a:rPr lang="en-US" altLang="ja-JP" sz="900" dirty="0">
+                <a:latin typeface="ヒラギノ角ゴ Pro W3"/>
+                <a:ea typeface="ヒラギノ角ゴ Pro W3"/>
+                <a:cs typeface="ヒラギノ角ゴ Pro W3"/>
+              </a:rPr>
+              <a:t>Jacobson International</a:t>
+            </a:r>
+            <a:r>
+              <a:rPr lang="ja-JP" altLang="en-US" sz="900" dirty="0">
+                <a:latin typeface="ヒラギノ角ゴ Pro W3"/>
+                <a:ea typeface="ヒラギノ角ゴ Pro W3"/>
+                <a:cs typeface="ヒラギノ角ゴ Pro W3"/>
+              </a:rPr>
+              <a:t>が開発</a:t>
+            </a:r>
+            <a:r>
+              <a:rPr lang="ja-JP" altLang="en-US" sz="900" dirty="0" smtClean="0">
+                <a:latin typeface="ヒラギノ角ゴ Pro W3"/>
+                <a:ea typeface="ヒラギノ角ゴ Pro W3"/>
+                <a:cs typeface="ヒラギノ角ゴ Pro W3"/>
+              </a:rPr>
+              <a:t>したカーネル</a:t>
+            </a:r>
+            <a:r>
+              <a:rPr lang="ja-JP" altLang="en-US" sz="900" dirty="0">
+                <a:latin typeface="ヒラギノ角ゴ Pro W3"/>
+                <a:ea typeface="ヒラギノ角ゴ Pro W3"/>
+                <a:cs typeface="ヒラギノ角ゴ Pro W3"/>
+              </a:rPr>
+              <a:t>とプラクティスが使用されている</a:t>
+            </a:r>
+            <a:r>
+              <a:rPr lang="ja-JP" altLang="en-US" sz="900" dirty="0" smtClean="0">
+                <a:latin typeface="ヒラギノ角ゴ Pro W3"/>
+                <a:ea typeface="ヒラギノ角ゴ Pro W3"/>
+                <a:cs typeface="ヒラギノ角ゴ Pro W3"/>
+              </a:rPr>
+              <a:t>。カーネルアイデア</a:t>
+            </a:r>
+            <a:r>
+              <a:rPr lang="ja-JP" altLang="en-US" sz="900" dirty="0">
+                <a:latin typeface="ヒラギノ角ゴ Pro W3"/>
+                <a:ea typeface="ヒラギノ角ゴ Pro W3"/>
+                <a:cs typeface="ヒラギノ角ゴ Pro W3"/>
+              </a:rPr>
+              <a:t>の早期導入は以下を含む</a:t>
+            </a:r>
+            <a:r>
+              <a:rPr lang="ja-JP" altLang="en-US" sz="900" dirty="0" smtClean="0">
+                <a:latin typeface="ヒラギノ角ゴ Pro W3"/>
+                <a:ea typeface="ヒラギノ角ゴ Pro W3"/>
+                <a:cs typeface="ヒラギノ角ゴ Pro W3"/>
+              </a:rPr>
+              <a:t>。</a:t>
+            </a:r>
+            <a:endParaRPr lang="en-US" altLang="ja-JP" sz="900" dirty="0" smtClean="0">
+              <a:latin typeface="ヒラギノ角ゴ Pro W3"/>
+              <a:ea typeface="ヒラギノ角ゴ Pro W3"/>
+              <a:cs typeface="ヒラギノ角ゴ Pro W3"/>
+            </a:endParaRPr>
+          </a:p>
+          <a:p>
+            <a:r>
+              <a:rPr lang="en-US" altLang="ja-JP" sz="900" baseline="30000" dirty="0">
+                <a:latin typeface="ヒラギノ角ゴ Pro W3"/>
+                <a:ea typeface="ヒラギノ角ゴ Pro W3"/>
+                <a:cs typeface="ヒラギノ角ゴ Pro W3"/>
+              </a:rPr>
+              <a:t>˲</a:t>
+            </a:r>
+            <a:r>
+              <a:rPr lang="ja-JP" altLang="en-US" sz="900" dirty="0" smtClean="0">
+                <a:latin typeface="ヒラギノ角ゴ Pro W3"/>
+                <a:ea typeface="ヒラギノ角ゴ Pro W3"/>
+                <a:cs typeface="ヒラギノ角ゴ Pro W3"/>
+              </a:rPr>
+              <a:t>世界</a:t>
+            </a:r>
+            <a:r>
+              <a:rPr lang="ja-JP" altLang="en-US" sz="900" dirty="0">
+                <a:latin typeface="ヒラギノ角ゴ Pro W3"/>
+                <a:ea typeface="ヒラギノ角ゴ Pro W3"/>
+                <a:cs typeface="ヒラギノ角ゴ Pro W3"/>
+              </a:rPr>
+              <a:t>の主要な再保険会社である</a:t>
+            </a:r>
+            <a:r>
+              <a:rPr lang="en-US" altLang="ja-JP" sz="900" dirty="0" err="1">
                 <a:latin typeface="ヒラギノ角ゴ Pro W3"/>
                 <a:ea typeface="ヒラギノ角ゴ Pro W3"/>
                 <a:cs typeface="ヒラギノ角ゴ Pro W3"/>
@@ -8984,55 +9021,186 @@
               <a:t>MunichRe</a:t>
             </a:r>
             <a:r>
-              <a:rPr lang="en-US" sz="900" dirty="0">
-                <a:latin typeface="ヒラギノ角ゴ Pro W3"/>
-                <a:ea typeface="ヒラギノ角ゴ Pro W3"/>
-                <a:cs typeface="ヒラギノ角ゴ Pro W3"/>
-              </a:rPr>
-              <a:t>, the world’s leading re- insurance company, where a family of “collaboration models” has been as- </a:t>
-            </a:r>
-            <a:r>
-              <a:rPr lang="en-US" sz="900" dirty="0" err="1">
-                <a:latin typeface="ヒラギノ角ゴ Pro W3"/>
-                <a:ea typeface="ヒラギノ角ゴ Pro W3"/>
-                <a:cs typeface="ヒラギノ角ゴ Pro W3"/>
-              </a:rPr>
-              <a:t>sembled</a:t>
-            </a:r>
-            <a:r>
-              <a:rPr lang="en-US" sz="900" dirty="0">
-                <a:latin typeface="ヒラギノ角ゴ Pro W3"/>
-                <a:ea typeface="ヒラギノ角ゴ Pro W3"/>
-                <a:cs typeface="ヒラギノ角ゴ Pro W3"/>
-              </a:rPr>
-              <a:t> to cover the whole spectrum of software and application work. Four collaboration models—exploratory, standard, maintenance, and support— have been built on the same kernel from the same set of 12 practices.</a:t>
-            </a:r>
-          </a:p>
-          <a:p>
-            <a:r>
-              <a:rPr lang="en-US" sz="900" dirty="0">
-                <a:latin typeface="ヒラギノ角ゴ Pro W3"/>
-                <a:ea typeface="ヒラギノ角ゴ Pro W3"/>
-                <a:cs typeface="ヒラギノ角ゴ Pro W3"/>
-              </a:rPr>
-              <a:t>˲ Fujitsu Services, where the Apt Toolkit has been built on top of an ear- </a:t>
-            </a:r>
-            <a:r>
-              <a:rPr lang="en-US" sz="900" dirty="0" err="1">
-                <a:latin typeface="ヒラギノ角ゴ Pro W3"/>
-                <a:ea typeface="ヒラギノ角ゴ Pro W3"/>
-                <a:cs typeface="ヒラギノ角ゴ Pro W3"/>
-              </a:rPr>
-              <a:t>ly</a:t>
-            </a:r>
-            <a:r>
-              <a:rPr lang="en-US" sz="900" dirty="0">
-                <a:latin typeface="ヒラギノ角ゴ Pro W3"/>
-                <a:ea typeface="ヒラギノ角ゴ Pro W3"/>
-                <a:cs typeface="ヒラギノ角ゴ Pro W3"/>
-              </a:rPr>
-              <a:t> version of the software-engineering kernel, including both agile and water- fall ways of working.1</a:t>
-            </a:r>
+              <a:rPr lang="ja-JP" altLang="en-US" sz="900" dirty="0">
+                <a:latin typeface="ヒラギノ角ゴ Pro W3"/>
+                <a:ea typeface="ヒラギノ角ゴ Pro W3"/>
+                <a:cs typeface="ヒラギノ角ゴ Pro W3"/>
+              </a:rPr>
+              <a:t>では</a:t>
+            </a:r>
+            <a:r>
+              <a:rPr lang="ja-JP" altLang="en-US" sz="900" dirty="0" smtClean="0">
+                <a:latin typeface="ヒラギノ角ゴ Pro W3"/>
+                <a:ea typeface="ヒラギノ角ゴ Pro W3"/>
+                <a:cs typeface="ヒラギノ角ゴ Pro W3"/>
+              </a:rPr>
+              <a:t>、ソフトウェア</a:t>
+            </a:r>
+            <a:r>
+              <a:rPr lang="ja-JP" altLang="en-US" sz="900" dirty="0">
+                <a:latin typeface="ヒラギノ角ゴ Pro W3"/>
+                <a:ea typeface="ヒラギノ角ゴ Pro W3"/>
+                <a:cs typeface="ヒラギノ角ゴ Pro W3"/>
+              </a:rPr>
+              <a:t>とアプリケーション開発</a:t>
+            </a:r>
+            <a:r>
+              <a:rPr lang="en-US" altLang="ja-JP" sz="900" dirty="0">
+                <a:latin typeface="ヒラギノ角ゴ Pro W3"/>
+                <a:ea typeface="ヒラギノ角ゴ Pro W3"/>
+                <a:cs typeface="ヒラギノ角ゴ Pro W3"/>
+              </a:rPr>
+              <a:t>(software and application work</a:t>
+            </a:r>
+            <a:r>
+              <a:rPr lang="en-US" altLang="ja-JP" sz="900" dirty="0" smtClean="0">
+                <a:latin typeface="ヒラギノ角ゴ Pro W3"/>
+                <a:ea typeface="ヒラギノ角ゴ Pro W3"/>
+                <a:cs typeface="ヒラギノ角ゴ Pro W3"/>
+              </a:rPr>
+              <a:t>)</a:t>
+            </a:r>
+            <a:r>
+              <a:rPr lang="ja-JP" altLang="en-US" sz="900" dirty="0" smtClean="0">
+                <a:latin typeface="ヒラギノ角ゴ Pro W3"/>
+                <a:ea typeface="ヒラギノ角ゴ Pro W3"/>
+                <a:cs typeface="ヒラギノ角ゴ Pro W3"/>
+              </a:rPr>
+              <a:t>の</a:t>
+            </a:r>
+            <a:r>
+              <a:rPr lang="ja-JP" altLang="en-US" sz="900" dirty="0">
+                <a:latin typeface="ヒラギノ角ゴ Pro W3"/>
+                <a:ea typeface="ヒラギノ角ゴ Pro W3"/>
+                <a:cs typeface="ヒラギノ角ゴ Pro W3"/>
+              </a:rPr>
+              <a:t>すべての領域をカバーするため</a:t>
+            </a:r>
+            <a:r>
+              <a:rPr lang="ja-JP" altLang="en-US" sz="900" dirty="0" smtClean="0">
+                <a:latin typeface="ヒラギノ角ゴ Pro W3"/>
+                <a:ea typeface="ヒラギノ角ゴ Pro W3"/>
+                <a:cs typeface="ヒラギノ角ゴ Pro W3"/>
+              </a:rPr>
+              <a:t>の</a:t>
+            </a:r>
+            <a:r>
+              <a:rPr lang="en-US" altLang="ja-JP" sz="900" dirty="0" smtClean="0">
+                <a:latin typeface="ヒラギノ角ゴ Pro W3"/>
+                <a:ea typeface="ヒラギノ角ゴ Pro W3"/>
+                <a:cs typeface="ヒラギノ角ゴ Pro W3"/>
+              </a:rPr>
+              <a:t>“collaboration models”</a:t>
+            </a:r>
+            <a:r>
+              <a:rPr lang="ja-JP" altLang="en-US" sz="900" dirty="0" smtClean="0">
+                <a:latin typeface="ヒラギノ角ゴ Pro W3"/>
+                <a:ea typeface="ヒラギノ角ゴ Pro W3"/>
+                <a:cs typeface="ヒラギノ角ゴ Pro W3"/>
+              </a:rPr>
+              <a:t>が</a:t>
+            </a:r>
+            <a:r>
+              <a:rPr lang="ja-JP" altLang="en-US" sz="900" dirty="0">
+                <a:latin typeface="ヒラギノ角ゴ Pro W3"/>
+                <a:ea typeface="ヒラギノ角ゴ Pro W3"/>
+                <a:cs typeface="ヒラギノ角ゴ Pro W3"/>
+              </a:rPr>
+              <a:t>整理されている</a:t>
+            </a:r>
+            <a:r>
+              <a:rPr lang="ja-JP" altLang="en-US" sz="900" dirty="0" smtClean="0">
+                <a:latin typeface="ヒラギノ角ゴ Pro W3"/>
+                <a:ea typeface="ヒラギノ角ゴ Pro W3"/>
+                <a:cs typeface="ヒラギノ角ゴ Pro W3"/>
+              </a:rPr>
+              <a:t>。</a:t>
+            </a:r>
+            <a:r>
+              <a:rPr lang="en-US" altLang="ja-JP" sz="900" dirty="0" smtClean="0">
+                <a:latin typeface="ヒラギノ角ゴ Pro W3"/>
+                <a:ea typeface="ヒラギノ角ゴ Pro W3"/>
+                <a:cs typeface="ヒラギノ角ゴ Pro W3"/>
+              </a:rPr>
+              <a:t>4</a:t>
+            </a:r>
+            <a:r>
+              <a:rPr lang="ja-JP" altLang="en-US" sz="900" dirty="0">
+                <a:latin typeface="ヒラギノ角ゴ Pro W3"/>
+                <a:ea typeface="ヒラギノ角ゴ Pro W3"/>
+                <a:cs typeface="ヒラギノ角ゴ Pro W3"/>
+              </a:rPr>
+              <a:t>つの</a:t>
+            </a:r>
+            <a:r>
+              <a:rPr lang="en-US" altLang="ja-JP" sz="900" dirty="0">
+                <a:latin typeface="ヒラギノ角ゴ Pro W3"/>
+                <a:ea typeface="ヒラギノ角ゴ Pro W3"/>
+                <a:cs typeface="ヒラギノ角ゴ Pro W3"/>
+              </a:rPr>
+              <a:t>collaboration models</a:t>
+            </a:r>
+            <a:r>
+              <a:rPr lang="ja-JP" altLang="en-US" sz="900" dirty="0">
+                <a:latin typeface="ヒラギノ角ゴ Pro W3"/>
+                <a:ea typeface="ヒラギノ角ゴ Pro W3"/>
+                <a:cs typeface="ヒラギノ角ゴ Pro W3"/>
+              </a:rPr>
+              <a:t>である</a:t>
+            </a:r>
+            <a:r>
+              <a:rPr lang="ja-JP" altLang="en-US" sz="900" dirty="0" smtClean="0">
+                <a:latin typeface="ヒラギノ角ゴ Pro W3"/>
+                <a:ea typeface="ヒラギノ角ゴ Pro W3"/>
+                <a:cs typeface="ヒラギノ角ゴ Pro W3"/>
+              </a:rPr>
+              <a:t>、調査</a:t>
+            </a:r>
+            <a:r>
+              <a:rPr lang="ja-JP" altLang="en-US" sz="900" dirty="0">
+                <a:latin typeface="ヒラギノ角ゴ Pro W3"/>
+                <a:ea typeface="ヒラギノ角ゴ Pro W3"/>
+                <a:cs typeface="ヒラギノ角ゴ Pro W3"/>
+              </a:rPr>
+              <a:t>、基準、保守、サポートは</a:t>
+            </a:r>
+            <a:r>
+              <a:rPr lang="en-US" altLang="ja-JP" sz="900" dirty="0">
+                <a:latin typeface="ヒラギノ角ゴ Pro W3"/>
+                <a:ea typeface="ヒラギノ角ゴ Pro W3"/>
+                <a:cs typeface="ヒラギノ角ゴ Pro W3"/>
+              </a:rPr>
+              <a:t>12</a:t>
+            </a:r>
+            <a:r>
+              <a:rPr lang="ja-JP" altLang="en-US" sz="900" dirty="0">
+                <a:latin typeface="ヒラギノ角ゴ Pro W3"/>
+                <a:ea typeface="ヒラギノ角ゴ Pro W3"/>
+                <a:cs typeface="ヒラギノ角ゴ Pro W3"/>
+              </a:rPr>
+              <a:t>のプラクティス群</a:t>
+            </a:r>
+            <a:r>
+              <a:rPr lang="ja-JP" altLang="en-US" sz="900" dirty="0" smtClean="0">
+                <a:latin typeface="ヒラギノ角ゴ Pro W3"/>
+                <a:ea typeface="ヒラギノ角ゴ Pro W3"/>
+                <a:cs typeface="ヒラギノ角ゴ Pro W3"/>
+              </a:rPr>
+              <a:t>から構築</a:t>
+            </a:r>
+            <a:r>
+              <a:rPr lang="ja-JP" altLang="en-US" sz="900" dirty="0">
+                <a:latin typeface="ヒラギノ角ゴ Pro W3"/>
+                <a:ea typeface="ヒラギノ角ゴ Pro W3"/>
+                <a:cs typeface="ヒラギノ角ゴ Pro W3"/>
+              </a:rPr>
+              <a:t>された同じカーネルが利用されている。</a:t>
+            </a:r>
+            <a:endParaRPr lang="en-US" sz="900" dirty="0">
+              <a:latin typeface="ヒラギノ角ゴ Pro W3"/>
+              <a:ea typeface="ヒラギノ角ゴ Pro W3"/>
+              <a:cs typeface="ヒラギノ角ゴ Pro W3"/>
+            </a:endParaRPr>
           </a:p>
         </p:txBody>
       </p:sp>
@@ -9045,7 +9213,7 @@
         <p:spPr>
           <a:xfrm>
             <a:off x="2398199" y="3417950"/>
-            <a:ext cx="2170017" cy="5139871"/>
+            <a:ext cx="2170017" cy="5770809"/>
           </a:xfrm>
           <a:prstGeom prst="rect">
             <a:avLst/>
@@ -9059,237 +9227,582 @@
           <a:lstStyle/>
           <a:p>
             <a:r>
-              <a:rPr lang="en-US" sz="1200" baseline="30000" dirty="0">
-                <a:latin typeface="ヒラギノ角ゴ Pro W3"/>
-                <a:ea typeface="ヒラギノ角ゴ Pro W3"/>
-                <a:cs typeface="ヒラギノ角ゴ Pro W3"/>
-              </a:rPr>
-              <a:t>˲ A major Japanese consumer </a:t>
-            </a:r>
-            <a:r>
-              <a:rPr lang="en-US" sz="1200" baseline="30000" dirty="0" err="1">
-                <a:latin typeface="ヒラギノ角ゴ Pro W3"/>
-                <a:ea typeface="ヒラギノ角ゴ Pro W3"/>
-                <a:cs typeface="ヒラギノ角ゴ Pro W3"/>
-              </a:rPr>
-              <a:t>elec</a:t>
-            </a:r>
-            <a:r>
-              <a:rPr lang="en-US" sz="1200" baseline="30000" dirty="0">
-                <a:latin typeface="ヒラギノ角ゴ Pro W3"/>
-                <a:ea typeface="ヒラギノ角ゴ Pro W3"/>
-                <a:cs typeface="ヒラギノ角ゴ Pro W3"/>
-              </a:rPr>
-              <a:t>- </a:t>
-            </a:r>
-            <a:r>
-              <a:rPr lang="en-US" sz="1200" baseline="30000" dirty="0" err="1">
-                <a:latin typeface="ヒラギノ角ゴ Pro W3"/>
-                <a:ea typeface="ヒラギノ角ゴ Pro W3"/>
-                <a:cs typeface="ヒラギノ角ゴ Pro W3"/>
-              </a:rPr>
-              <a:t>tronics</a:t>
-            </a:r>
-            <a:r>
-              <a:rPr lang="en-US" sz="1200" baseline="30000" dirty="0">
-                <a:latin typeface="ヒラギノ角ゴ Pro W3"/>
-                <a:ea typeface="ヒラギノ角ゴ Pro W3"/>
-                <a:cs typeface="ヒラギノ角ゴ Pro W3"/>
-              </a:rPr>
-              <a:t> company, where the software processes have been defined on top of an early version of the kernel, helping teams apply new practices and manage an offshore development vendor.</a:t>
-            </a:r>
-          </a:p>
-          <a:p>
-            <a:r>
-              <a:rPr lang="en-US" sz="1200" baseline="30000" dirty="0">
-                <a:latin typeface="ヒラギノ角ゴ Pro W3"/>
-                <a:ea typeface="ヒラギノ角ゴ Pro W3"/>
-                <a:cs typeface="ヒラギノ角ゴ Pro W3"/>
-              </a:rPr>
-              <a:t>˲ KPN, where a kernel-based process was adopted by more than 300 projects across 13 programs as part of a move to iterative development. The kernel also provided the basis for a new results- focused QA process, which could be applied to all projects regardless of the method or practices used.</a:t>
-            </a:r>
-          </a:p>
-          <a:p>
-            <a:r>
-              <a:rPr lang="en-US" sz="1200" baseline="30000" dirty="0">
-                <a:latin typeface="ヒラギノ角ゴ Pro W3"/>
-                <a:ea typeface="ヒラギノ角ゴ Pro W3"/>
-                <a:cs typeface="ヒラギノ角ゴ Pro W3"/>
-              </a:rPr>
-              <a:t>˲ A major U.K. government depart- </a:t>
-            </a:r>
-            <a:r>
-              <a:rPr lang="en-US" sz="1200" baseline="30000" dirty="0" err="1">
-                <a:latin typeface="ヒラギノ角ゴ Pro W3"/>
-                <a:ea typeface="ヒラギノ角ゴ Pro W3"/>
-                <a:cs typeface="ヒラギノ角ゴ Pro W3"/>
-              </a:rPr>
-              <a:t>ment</a:t>
-            </a:r>
-            <a:r>
-              <a:rPr lang="en-US" sz="1200" baseline="30000" dirty="0">
-                <a:latin typeface="ヒラギノ角ゴ Pro W3"/>
-                <a:ea typeface="ヒラギノ角ゴ Pro W3"/>
-                <a:cs typeface="ヒラギノ角ゴ Pro W3"/>
-              </a:rPr>
-              <a:t>, where a kernel-based agile toolset was introduced to enable dis- </a:t>
-            </a:r>
-            <a:r>
-              <a:rPr lang="en-US" sz="1200" baseline="30000" dirty="0" err="1">
-                <a:latin typeface="ヒラギノ角ゴ Pro W3"/>
-                <a:ea typeface="ヒラギノ角ゴ Pro W3"/>
-                <a:cs typeface="ヒラギノ角ゴ Pro W3"/>
-              </a:rPr>
-              <a:t>ciplined</a:t>
-            </a:r>
-            <a:r>
-              <a:rPr lang="en-US" sz="1200" baseline="30000" dirty="0">
-                <a:latin typeface="ヒラギノ角ゴ Pro W3"/>
-                <a:ea typeface="ヒラギノ角ゴ Pro W3"/>
-                <a:cs typeface="ヒラギノ角ゴ Pro W3"/>
-              </a:rPr>
-              <a:t> agility and the tracking of project progress and health in a </a:t>
-            </a:r>
-            <a:r>
-              <a:rPr lang="en-US" sz="1200" baseline="30000" dirty="0" err="1">
-                <a:latin typeface="ヒラギノ角ゴ Pro W3"/>
-                <a:ea typeface="ヒラギノ角ゴ Pro W3"/>
-                <a:cs typeface="ヒラギノ角ゴ Pro W3"/>
-              </a:rPr>
-              <a:t>prac</a:t>
-            </a:r>
-            <a:r>
-              <a:rPr lang="en-US" sz="1200" baseline="30000" dirty="0">
-                <a:latin typeface="ヒラギノ角ゴ Pro W3"/>
-                <a:ea typeface="ヒラギノ角ゴ Pro W3"/>
-                <a:cs typeface="ヒラギノ角ゴ Pro W3"/>
-              </a:rPr>
-              <a:t>- tice-independent fashion.</a:t>
-            </a:r>
-          </a:p>
-          <a:p>
-            <a:r>
-              <a:rPr lang="en-US" sz="1200" baseline="30000" dirty="0">
-                <a:latin typeface="ヒラギノ角ゴ Pro W3"/>
-                <a:ea typeface="ヒラギノ角ゴ Pro W3"/>
-                <a:cs typeface="ヒラギノ角ゴ Pro W3"/>
-              </a:rPr>
-              <a:t>The kernel is already being used in first- and second-year software-</a:t>
-            </a:r>
-            <a:r>
-              <a:rPr lang="en-US" sz="1200" baseline="30000" dirty="0" err="1">
-                <a:latin typeface="ヒラギノ角ゴ Pro W3"/>
-                <a:ea typeface="ヒラギノ角ゴ Pro W3"/>
-                <a:cs typeface="ヒラギノ角ゴ Pro W3"/>
-              </a:rPr>
-              <a:t>engi</a:t>
-            </a:r>
-            <a:r>
-              <a:rPr lang="en-US" sz="1200" baseline="30000" dirty="0">
-                <a:latin typeface="ヒラギノ角ゴ Pro W3"/>
-                <a:ea typeface="ヒラギノ角ゴ Pro W3"/>
-                <a:cs typeface="ヒラギノ角ゴ Pro W3"/>
-              </a:rPr>
-              <a:t>- </a:t>
-            </a:r>
-            <a:r>
-              <a:rPr lang="en-US" sz="1200" baseline="30000" dirty="0" err="1">
-                <a:latin typeface="ヒラギノ角ゴ Pro W3"/>
-                <a:ea typeface="ヒラギノ角ゴ Pro W3"/>
-                <a:cs typeface="ヒラギノ角ゴ Pro W3"/>
-              </a:rPr>
-              <a:t>neering</a:t>
-            </a:r>
-            <a:r>
-              <a:rPr lang="en-US" sz="1200" baseline="30000" dirty="0">
-                <a:latin typeface="ヒラギノ角ゴ Pro W3"/>
-                <a:ea typeface="ヒラギノ角ゴ Pro W3"/>
-                <a:cs typeface="ヒラギノ角ゴ Pro W3"/>
-              </a:rPr>
-              <a:t> courses at KTH Royal Institute of Technology in Sweden. After </a:t>
-            </a:r>
-            <a:r>
-              <a:rPr lang="en-US" sz="1200" baseline="30000" dirty="0" err="1">
-                <a:latin typeface="ヒラギノ角ゴ Pro W3"/>
-                <a:ea typeface="ヒラギノ角ゴ Pro W3"/>
-                <a:cs typeface="ヒラギノ角ゴ Pro W3"/>
-              </a:rPr>
-              <a:t>stu</a:t>
-            </a:r>
-            <a:r>
-              <a:rPr lang="en-US" sz="1200" baseline="30000" dirty="0">
-                <a:latin typeface="ヒラギノ角ゴ Pro W3"/>
-                <a:ea typeface="ヒラギノ角ゴ Pro W3"/>
-                <a:cs typeface="ヒラギノ角ゴ Pro W3"/>
-              </a:rPr>
-              <a:t>- dents in the first-year courses conduct- </a:t>
-            </a:r>
-            <a:r>
-              <a:rPr lang="en-US" sz="1200" baseline="30000" dirty="0" err="1">
-                <a:latin typeface="ヒラギノ角ゴ Pro W3"/>
-                <a:ea typeface="ヒラギノ角ゴ Pro W3"/>
-                <a:cs typeface="ヒラギノ角ゴ Pro W3"/>
-              </a:rPr>
-              <a:t>ed</a:t>
-            </a:r>
-            <a:r>
-              <a:rPr lang="en-US" sz="1200" baseline="30000" dirty="0">
-                <a:latin typeface="ヒラギノ角ゴ Pro W3"/>
-                <a:ea typeface="ヒラギノ角ゴ Pro W3"/>
-                <a:cs typeface="ヒラギノ角ゴ Pro W3"/>
-              </a:rPr>
-              <a:t> their projects, they went through the SEMAT alphas and matched them to their project results, under the </a:t>
-            </a:r>
-            <a:r>
-              <a:rPr lang="en-US" sz="1200" baseline="30000" dirty="0" err="1">
-                <a:latin typeface="ヒラギノ角ゴ Pro W3"/>
-                <a:ea typeface="ヒラギノ角ゴ Pro W3"/>
-                <a:cs typeface="ヒラギノ角ゴ Pro W3"/>
-              </a:rPr>
-              <a:t>direc</a:t>
-            </a:r>
-            <a:r>
-              <a:rPr lang="en-US" sz="1200" baseline="30000" dirty="0">
-                <a:latin typeface="ヒラギノ角ゴ Pro W3"/>
-                <a:ea typeface="ヒラギノ角ゴ Pro W3"/>
-                <a:cs typeface="ヒラギノ角ゴ Pro W3"/>
-              </a:rPr>
-              <a:t>- </a:t>
-            </a:r>
-            <a:r>
-              <a:rPr lang="en-US" sz="1200" baseline="30000" dirty="0" err="1">
-                <a:latin typeface="ヒラギノ角ゴ Pro W3"/>
-                <a:ea typeface="ヒラギノ角ゴ Pro W3"/>
-                <a:cs typeface="ヒラギノ角ゴ Pro W3"/>
-              </a:rPr>
-              <a:t>tion</a:t>
-            </a:r>
-            <a:r>
-              <a:rPr lang="en-US" sz="1200" baseline="30000" dirty="0">
-                <a:latin typeface="ヒラギノ角ゴ Pro W3"/>
-                <a:ea typeface="ヒラギノ角ゴ Pro W3"/>
-                <a:cs typeface="ヒラギノ角ゴ Pro W3"/>
-              </a:rPr>
-              <a:t> of Anders </a:t>
-            </a:r>
-            <a:r>
-              <a:rPr lang="en-US" sz="1200" baseline="30000" dirty="0" err="1">
-                <a:latin typeface="ヒラギノ角ゴ Pro W3"/>
-                <a:ea typeface="ヒラギノ角ゴ Pro W3"/>
-                <a:cs typeface="ヒラギノ角ゴ Pro W3"/>
-              </a:rPr>
-              <a:t>Sjögren</a:t>
-            </a:r>
-            <a:r>
-              <a:rPr lang="en-US" sz="1200" baseline="30000" dirty="0">
-                <a:latin typeface="ヒラギノ角ゴ Pro W3"/>
-                <a:ea typeface="ヒラギノ角ゴ Pro W3"/>
-                <a:cs typeface="ヒラギノ角ゴ Pro W3"/>
-              </a:rPr>
-              <a:t>. The students had the opportunity to acquaint them- selves with and evaluate the alphas and gain insight into the project’s progress and health. In the second-year courses, run by Mira </a:t>
-            </a:r>
-            <a:r>
-              <a:rPr lang="en-US" sz="1200" baseline="30000" dirty="0" err="1">
+              <a:rPr lang="en-US" sz="900" dirty="0">
+                <a:latin typeface="ヒラギノ角ゴ Pro W3"/>
+                <a:ea typeface="ヒラギノ角ゴ Pro W3"/>
+                <a:cs typeface="ヒラギノ角ゴ Pro W3"/>
+              </a:rPr>
+              <a:t>˲ </a:t>
+            </a:r>
+            <a:r>
+              <a:rPr lang="en-US" altLang="ja-JP" sz="900" dirty="0">
+                <a:latin typeface="ヒラギノ角ゴ Pro W3"/>
+                <a:ea typeface="ヒラギノ角ゴ Pro W3"/>
+                <a:cs typeface="ヒラギノ角ゴ Pro W3"/>
+              </a:rPr>
+              <a:t>Fujitsu Services</a:t>
+            </a:r>
+            <a:r>
+              <a:rPr lang="ja-JP" altLang="en-US" sz="900" dirty="0">
+                <a:latin typeface="ヒラギノ角ゴ Pro W3"/>
+                <a:ea typeface="ヒラギノ角ゴ Pro W3"/>
+                <a:cs typeface="ヒラギノ角ゴ Pro W3"/>
+              </a:rPr>
+              <a:t>では、アジャイルとウォータフロー</a:t>
+            </a:r>
+            <a:r>
+              <a:rPr lang="ja-JP" altLang="en-US" sz="900" dirty="0" smtClean="0">
+                <a:latin typeface="ヒラギノ角ゴ Pro W3"/>
+                <a:ea typeface="ヒラギノ角ゴ Pro W3"/>
+                <a:cs typeface="ヒラギノ角ゴ Pro W3"/>
+              </a:rPr>
+              <a:t>の両方</a:t>
+            </a:r>
+            <a:r>
+              <a:rPr lang="ja-JP" altLang="en-US" sz="900" dirty="0">
+                <a:latin typeface="ヒラギノ角ゴ Pro W3"/>
+                <a:ea typeface="ヒラギノ角ゴ Pro W3"/>
+                <a:cs typeface="ヒラギノ角ゴ Pro W3"/>
+              </a:rPr>
+              <a:t>の仕事の仕方を想定した</a:t>
+            </a:r>
+            <a:r>
+              <a:rPr lang="en-US" altLang="ja-JP" sz="900" dirty="0">
+                <a:latin typeface="ヒラギノ角ゴ Pro W3"/>
+                <a:ea typeface="ヒラギノ角ゴ Pro W3"/>
+                <a:cs typeface="ヒラギノ角ゴ Pro W3"/>
+              </a:rPr>
+              <a:t>the Apt Toolkit</a:t>
+            </a:r>
+            <a:r>
+              <a:rPr lang="ja-JP" altLang="en-US" sz="900" dirty="0" smtClean="0">
+                <a:latin typeface="ヒラギノ角ゴ Pro W3"/>
+                <a:ea typeface="ヒラギノ角ゴ Pro W3"/>
+                <a:cs typeface="ヒラギノ角ゴ Pro W3"/>
+              </a:rPr>
+              <a:t>を初期</a:t>
+            </a:r>
+            <a:r>
+              <a:rPr lang="ja-JP" altLang="en-US" sz="900" dirty="0">
+                <a:latin typeface="ヒラギノ角ゴ Pro W3"/>
+                <a:ea typeface="ヒラギノ角ゴ Pro W3"/>
+                <a:cs typeface="ヒラギノ角ゴ Pro W3"/>
+              </a:rPr>
+              <a:t>バージョンのカーネルで構築している</a:t>
+            </a:r>
+            <a:r>
+              <a:rPr lang="ja-JP" altLang="en-US" sz="900" dirty="0" smtClean="0">
+                <a:latin typeface="ヒラギノ角ゴ Pro W3"/>
+                <a:ea typeface="ヒラギノ角ゴ Pro W3"/>
+                <a:cs typeface="ヒラギノ角ゴ Pro W3"/>
+              </a:rPr>
+              <a:t>。</a:t>
+            </a:r>
+            <a:endParaRPr lang="en-US" sz="900" dirty="0">
+              <a:latin typeface="ヒラギノ角ゴ Pro W3"/>
+              <a:ea typeface="ヒラギノ角ゴ Pro W3"/>
+              <a:cs typeface="ヒラギノ角ゴ Pro W3"/>
+            </a:endParaRPr>
+          </a:p>
+          <a:p>
+            <a:r>
+              <a:rPr lang="en-US" sz="900" dirty="0" smtClean="0">
+                <a:latin typeface="ヒラギノ角ゴ Pro W3"/>
+                <a:ea typeface="ヒラギノ角ゴ Pro W3"/>
+                <a:cs typeface="ヒラギノ角ゴ Pro W3"/>
+              </a:rPr>
+              <a:t>˲</a:t>
+            </a:r>
+            <a:r>
+              <a:rPr lang="ja-JP" altLang="en-US" sz="900" dirty="0">
+                <a:latin typeface="ヒラギノ角ゴ Pro W3"/>
+                <a:ea typeface="ヒラギノ角ゴ Pro W3"/>
+                <a:cs typeface="ヒラギノ角ゴ Pro W3"/>
+              </a:rPr>
+              <a:t>日本の大手家電企業では、新しいプラクティスの適用</a:t>
+            </a:r>
+            <a:r>
+              <a:rPr lang="ja-JP" altLang="en-US" sz="900" dirty="0" smtClean="0">
+                <a:latin typeface="ヒラギノ角ゴ Pro W3"/>
+                <a:ea typeface="ヒラギノ角ゴ Pro W3"/>
+                <a:cs typeface="ヒラギノ角ゴ Pro W3"/>
+              </a:rPr>
+              <a:t>やオフショア</a:t>
+            </a:r>
+            <a:r>
+              <a:rPr lang="ja-JP" altLang="en-US" sz="900" dirty="0">
+                <a:latin typeface="ヒラギノ角ゴ Pro W3"/>
+                <a:ea typeface="ヒラギノ角ゴ Pro W3"/>
+                <a:cs typeface="ヒラギノ角ゴ Pro W3"/>
+              </a:rPr>
+              <a:t>の開発ベンダーのマネジメントを助ける用語</a:t>
+            </a:r>
+            <a:r>
+              <a:rPr lang="ja-JP" altLang="en-US" sz="900" dirty="0" smtClean="0">
+                <a:latin typeface="ヒラギノ角ゴ Pro W3"/>
+                <a:ea typeface="ヒラギノ角ゴ Pro W3"/>
+                <a:cs typeface="ヒラギノ角ゴ Pro W3"/>
+              </a:rPr>
+              <a:t>に初期</a:t>
+            </a:r>
+            <a:r>
+              <a:rPr lang="ja-JP" altLang="en-US" sz="900" dirty="0">
+                <a:latin typeface="ヒラギノ角ゴ Pro W3"/>
+                <a:ea typeface="ヒラギノ角ゴ Pro W3"/>
+                <a:cs typeface="ヒラギノ角ゴ Pro W3"/>
+              </a:rPr>
+              <a:t>バージョンのカーネルを使用</a:t>
+            </a:r>
+            <a:r>
+              <a:rPr lang="ja-JP" altLang="en-US" sz="900" dirty="0" smtClean="0">
+                <a:latin typeface="ヒラギノ角ゴ Pro W3"/>
+                <a:ea typeface="ヒラギノ角ゴ Pro W3"/>
+                <a:cs typeface="ヒラギノ角ゴ Pro W3"/>
+              </a:rPr>
+              <a:t>して</a:t>
+            </a:r>
+            <a:endParaRPr lang="en-US" altLang="ja-JP" sz="900" dirty="0" smtClean="0">
+              <a:latin typeface="ヒラギノ角ゴ Pro W3"/>
+              <a:ea typeface="ヒラギノ角ゴ Pro W3"/>
+              <a:cs typeface="ヒラギノ角ゴ Pro W3"/>
+            </a:endParaRPr>
+          </a:p>
+          <a:p>
+            <a:r>
+              <a:rPr lang="en-US" altLang="ja-JP" sz="900" dirty="0">
+                <a:latin typeface="ヒラギノ角ゴ Pro W3"/>
+                <a:ea typeface="ヒラギノ角ゴ Pro W3"/>
+                <a:cs typeface="ヒラギノ角ゴ Pro W3"/>
+              </a:rPr>
+              <a:t>˲</a:t>
+            </a:r>
+            <a:r>
+              <a:rPr lang="en-US" altLang="ja-JP" sz="900" dirty="0" smtClean="0">
+                <a:latin typeface="ヒラギノ角ゴ Pro W3"/>
+                <a:ea typeface="ヒラギノ角ゴ Pro W3"/>
+                <a:cs typeface="ヒラギノ角ゴ Pro W3"/>
+              </a:rPr>
+              <a:t>KPN</a:t>
+            </a:r>
+            <a:r>
+              <a:rPr lang="ja-JP" altLang="en-US" sz="900" dirty="0">
+                <a:latin typeface="ヒラギノ角ゴ Pro W3"/>
+                <a:ea typeface="ヒラギノ角ゴ Pro W3"/>
+                <a:cs typeface="ヒラギノ角ゴ Pro W3"/>
+              </a:rPr>
+              <a:t>ではカーネルベースのプロセスが繰り返し開発へ</a:t>
+            </a:r>
+            <a:r>
+              <a:rPr lang="ja-JP" altLang="en-US" sz="900" dirty="0" smtClean="0">
+                <a:latin typeface="ヒラギノ角ゴ Pro W3"/>
+                <a:ea typeface="ヒラギノ角ゴ Pro W3"/>
+                <a:cs typeface="ヒラギノ角ゴ Pro W3"/>
+              </a:rPr>
+              <a:t>の移行</a:t>
+            </a:r>
+            <a:r>
+              <a:rPr lang="ja-JP" altLang="en-US" sz="900" dirty="0">
+                <a:latin typeface="ヒラギノ角ゴ Pro W3"/>
+                <a:ea typeface="ヒラギノ角ゴ Pro W3"/>
+                <a:cs typeface="ヒラギノ角ゴ Pro W3"/>
+              </a:rPr>
+              <a:t>の一部として</a:t>
+            </a:r>
+            <a:r>
+              <a:rPr lang="en-US" altLang="ja-JP" sz="900" dirty="0">
+                <a:latin typeface="ヒラギノ角ゴ Pro W3"/>
+                <a:ea typeface="ヒラギノ角ゴ Pro W3"/>
+                <a:cs typeface="ヒラギノ角ゴ Pro W3"/>
+              </a:rPr>
+              <a:t>13</a:t>
+            </a:r>
+            <a:r>
+              <a:rPr lang="ja-JP" altLang="en-US" sz="900" dirty="0">
+                <a:latin typeface="ヒラギノ角ゴ Pro W3"/>
+                <a:ea typeface="ヒラギノ角ゴ Pro W3"/>
+                <a:cs typeface="ヒラギノ角ゴ Pro W3"/>
+              </a:rPr>
+              <a:t>の工程を横断して</a:t>
+            </a:r>
+            <a:r>
+              <a:rPr lang="en-US" altLang="ja-JP" sz="900" dirty="0">
+                <a:latin typeface="ヒラギノ角ゴ Pro W3"/>
+                <a:ea typeface="ヒラギノ角ゴ Pro W3"/>
+                <a:cs typeface="ヒラギノ角ゴ Pro W3"/>
+              </a:rPr>
+              <a:t>300</a:t>
+            </a:r>
+            <a:r>
+              <a:rPr lang="ja-JP" altLang="en-US" sz="900" dirty="0">
+                <a:latin typeface="ヒラギノ角ゴ Pro W3"/>
+                <a:ea typeface="ヒラギノ角ゴ Pro W3"/>
+                <a:cs typeface="ヒラギノ角ゴ Pro W3"/>
+              </a:rPr>
+              <a:t>以上のプロジェクト</a:t>
+            </a:r>
+            <a:r>
+              <a:rPr lang="ja-JP" altLang="en-US" sz="900" dirty="0" smtClean="0">
+                <a:latin typeface="ヒラギノ角ゴ Pro W3"/>
+                <a:ea typeface="ヒラギノ角ゴ Pro W3"/>
+                <a:cs typeface="ヒラギノ角ゴ Pro W3"/>
+              </a:rPr>
+              <a:t>で採用</a:t>
+            </a:r>
+            <a:r>
+              <a:rPr lang="ja-JP" altLang="en-US" sz="900" dirty="0">
+                <a:latin typeface="ヒラギノ角ゴ Pro W3"/>
+                <a:ea typeface="ヒラギノ角ゴ Pro W3"/>
+                <a:cs typeface="ヒラギノ角ゴ Pro W3"/>
+              </a:rPr>
+              <a:t>されている。カーネルは品質プロセスに</a:t>
+            </a:r>
+            <a:r>
+              <a:rPr lang="ja-JP" altLang="en-US" sz="900" dirty="0" smtClean="0">
+                <a:latin typeface="ヒラギノ角ゴ Pro W3"/>
+                <a:ea typeface="ヒラギノ角ゴ Pro W3"/>
+                <a:cs typeface="ヒラギノ角ゴ Pro W3"/>
+              </a:rPr>
+              <a:t>焦点を当てた新た</a:t>
+            </a:r>
+            <a:r>
+              <a:rPr lang="ja-JP" altLang="en-US" sz="900" dirty="0">
+                <a:latin typeface="ヒラギノ角ゴ Pro W3"/>
+                <a:ea typeface="ヒラギノ角ゴ Pro W3"/>
+                <a:cs typeface="ヒラギノ角ゴ Pro W3"/>
+              </a:rPr>
+              <a:t>な結果に対する基礎</a:t>
+            </a:r>
+            <a:r>
+              <a:rPr lang="en-US" altLang="ja-JP" sz="900" dirty="0">
+                <a:latin typeface="ヒラギノ角ゴ Pro W3"/>
+                <a:ea typeface="ヒラギノ角ゴ Pro W3"/>
+                <a:cs typeface="ヒラギノ角ゴ Pro W3"/>
+              </a:rPr>
+              <a:t>(the basis)</a:t>
+            </a:r>
+            <a:r>
+              <a:rPr lang="ja-JP" altLang="en-US" sz="900" dirty="0">
+                <a:latin typeface="ヒラギノ角ゴ Pro W3"/>
+                <a:ea typeface="ヒラギノ角ゴ Pro W3"/>
+                <a:cs typeface="ヒラギノ角ゴ Pro W3"/>
+              </a:rPr>
+              <a:t>も提供しており</a:t>
+            </a:r>
+            <a:r>
+              <a:rPr lang="ja-JP" altLang="en-US" sz="900" dirty="0" smtClean="0">
+                <a:latin typeface="ヒラギノ角ゴ Pro W3"/>
+                <a:ea typeface="ヒラギノ角ゴ Pro W3"/>
+                <a:cs typeface="ヒラギノ角ゴ Pro W3"/>
+              </a:rPr>
+              <a:t>、それ</a:t>
+            </a:r>
+            <a:r>
+              <a:rPr lang="ja-JP" altLang="en-US" sz="900" dirty="0">
+                <a:latin typeface="ヒラギノ角ゴ Pro W3"/>
+                <a:ea typeface="ヒラギノ角ゴ Pro W3"/>
+                <a:cs typeface="ヒラギノ角ゴ Pro W3"/>
+              </a:rPr>
+              <a:t>は使用してきた方法論やプラクティスに</a:t>
+            </a:r>
+            <a:r>
+              <a:rPr lang="ja-JP" altLang="en-US" sz="900" dirty="0" smtClean="0">
+                <a:latin typeface="ヒラギノ角ゴ Pro W3"/>
+                <a:ea typeface="ヒラギノ角ゴ Pro W3"/>
+                <a:cs typeface="ヒラギノ角ゴ Pro W3"/>
+              </a:rPr>
+              <a:t>依らずすべて</a:t>
+            </a:r>
+            <a:r>
+              <a:rPr lang="ja-JP" altLang="en-US" sz="900" dirty="0">
+                <a:latin typeface="ヒラギノ角ゴ Pro W3"/>
+                <a:ea typeface="ヒラギノ角ゴ Pro W3"/>
+                <a:cs typeface="ヒラギノ角ゴ Pro W3"/>
+              </a:rPr>
+              <a:t>のプロジェクトに適用することができた</a:t>
+            </a:r>
+            <a:r>
+              <a:rPr lang="ja-JP" altLang="en-US" sz="900" dirty="0" smtClean="0">
+                <a:latin typeface="ヒラギノ角ゴ Pro W3"/>
+                <a:ea typeface="ヒラギノ角ゴ Pro W3"/>
+                <a:cs typeface="ヒラギノ角ゴ Pro W3"/>
+              </a:rPr>
+              <a:t>。</a:t>
+            </a:r>
+            <a:endParaRPr lang="en-US" altLang="ja-JP" sz="900" dirty="0" smtClean="0">
+              <a:latin typeface="ヒラギノ角ゴ Pro W3"/>
+              <a:ea typeface="ヒラギノ角ゴ Pro W3"/>
+              <a:cs typeface="ヒラギノ角ゴ Pro W3"/>
+            </a:endParaRPr>
+          </a:p>
+          <a:p>
+            <a:r>
+              <a:rPr lang="en-US" altLang="ja-JP" sz="900" dirty="0">
+                <a:latin typeface="ヒラギノ角ゴ Pro W3"/>
+                <a:ea typeface="ヒラギノ角ゴ Pro W3"/>
+                <a:cs typeface="ヒラギノ角ゴ Pro W3"/>
+              </a:rPr>
+              <a:t>˲</a:t>
+            </a:r>
+            <a:r>
+              <a:rPr lang="ja-JP" altLang="en-US" sz="900" dirty="0" smtClean="0">
+                <a:latin typeface="ヒラギノ角ゴ Pro W3"/>
+                <a:ea typeface="ヒラギノ角ゴ Pro W3"/>
+                <a:cs typeface="ヒラギノ角ゴ Pro W3"/>
+              </a:rPr>
+              <a:t>英国</a:t>
+            </a:r>
+            <a:r>
+              <a:rPr lang="ja-JP" altLang="en-US" sz="900" dirty="0">
+                <a:latin typeface="ヒラギノ角ゴ Pro W3"/>
+                <a:ea typeface="ヒラギノ角ゴ Pro W3"/>
+                <a:cs typeface="ヒラギノ角ゴ Pro W3"/>
+              </a:rPr>
+              <a:t>政府省庁ではカーネルベースのアジャイルツールセット</a:t>
+            </a:r>
+            <a:r>
+              <a:rPr lang="ja-JP" altLang="en-US" sz="900" dirty="0" smtClean="0">
+                <a:latin typeface="ヒラギノ角ゴ Pro W3"/>
+                <a:ea typeface="ヒラギノ角ゴ Pro W3"/>
+                <a:cs typeface="ヒラギノ角ゴ Pro W3"/>
+              </a:rPr>
+              <a:t>がやりかた</a:t>
+            </a:r>
+            <a:r>
+              <a:rPr lang="ja-JP" altLang="en-US" sz="900" dirty="0">
+                <a:latin typeface="ヒラギノ角ゴ Pro W3"/>
+                <a:ea typeface="ヒラギノ角ゴ Pro W3"/>
+                <a:cs typeface="ヒラギノ角ゴ Pro W3"/>
+              </a:rPr>
+              <a:t>に依存することなく</a:t>
+            </a:r>
+            <a:r>
+              <a:rPr lang="en-US" altLang="ja-JP" sz="900" dirty="0">
+                <a:latin typeface="ヒラギノ角ゴ Pro W3"/>
+                <a:ea typeface="ヒラギノ角ゴ Pro W3"/>
+                <a:cs typeface="ヒラギノ角ゴ Pro W3"/>
+              </a:rPr>
+              <a:t>(in a practice-independent fashion</a:t>
+            </a:r>
+            <a:r>
+              <a:rPr lang="en-US" altLang="ja-JP" sz="900" dirty="0" smtClean="0">
+                <a:latin typeface="ヒラギノ角ゴ Pro W3"/>
+                <a:ea typeface="ヒラギノ角ゴ Pro W3"/>
+                <a:cs typeface="ヒラギノ角ゴ Pro W3"/>
+              </a:rPr>
+              <a:t>)</a:t>
+            </a:r>
+            <a:r>
+              <a:rPr lang="ja-JP" altLang="en-US" sz="900" dirty="0" smtClean="0">
+                <a:latin typeface="ヒラギノ角ゴ Pro W3"/>
+                <a:ea typeface="ヒラギノ角ゴ Pro W3"/>
+                <a:cs typeface="ヒラギノ角ゴ Pro W3"/>
+              </a:rPr>
+              <a:t>規律</a:t>
+            </a:r>
+            <a:r>
+              <a:rPr lang="ja-JP" altLang="en-US" sz="900" dirty="0">
+                <a:latin typeface="ヒラギノ角ゴ Pro W3"/>
+                <a:ea typeface="ヒラギノ角ゴ Pro W3"/>
+                <a:cs typeface="ヒラギノ角ゴ Pro W3"/>
+              </a:rPr>
+              <a:t>ある機敏さ、プロジェクト進展と健康状態のトラッキング</a:t>
+            </a:r>
+            <a:r>
+              <a:rPr lang="ja-JP" altLang="en-US" sz="900" dirty="0" smtClean="0">
+                <a:latin typeface="ヒラギノ角ゴ Pro W3"/>
+                <a:ea typeface="ヒラギノ角ゴ Pro W3"/>
+                <a:cs typeface="ヒラギノ角ゴ Pro W3"/>
+              </a:rPr>
+              <a:t>を実現</a:t>
+            </a:r>
+            <a:r>
+              <a:rPr lang="ja-JP" altLang="en-US" sz="900" dirty="0">
+                <a:latin typeface="ヒラギノ角ゴ Pro W3"/>
+                <a:ea typeface="ヒラギノ角ゴ Pro W3"/>
+                <a:cs typeface="ヒラギノ角ゴ Pro W3"/>
+              </a:rPr>
+              <a:t>するために導入されている。</a:t>
+            </a:r>
+            <a:endParaRPr lang="en-US" altLang="ja-JP" sz="900" dirty="0" smtClean="0">
+              <a:latin typeface="ヒラギノ角ゴ Pro W3"/>
+              <a:ea typeface="ヒラギノ角ゴ Pro W3"/>
+              <a:cs typeface="ヒラギノ角ゴ Pro W3"/>
+            </a:endParaRPr>
+          </a:p>
+          <a:p>
+            <a:endParaRPr lang="en-US" sz="900" dirty="0">
+              <a:latin typeface="ヒラギノ角ゴ Pro W3"/>
+              <a:ea typeface="ヒラギノ角ゴ Pro W3"/>
+              <a:cs typeface="ヒラギノ角ゴ Pro W3"/>
+            </a:endParaRPr>
+          </a:p>
+          <a:p>
+            <a:r>
+              <a:rPr lang="ja-JP" altLang="en-US" sz="900" dirty="0">
+                <a:latin typeface="ヒラギノ角ゴ Pro W3"/>
+                <a:ea typeface="ヒラギノ角ゴ Pro W3"/>
+                <a:cs typeface="ヒラギノ角ゴ Pro W3"/>
+              </a:rPr>
+              <a:t>カーネルはすでにスウェーデン王立工科大学</a:t>
+            </a:r>
+            <a:r>
+              <a:rPr lang="ja-JP" altLang="en-US" sz="900" dirty="0" smtClean="0">
+                <a:latin typeface="ヒラギノ角ゴ Pro W3"/>
+                <a:ea typeface="ヒラギノ角ゴ Pro W3"/>
+                <a:cs typeface="ヒラギノ角ゴ Pro W3"/>
+              </a:rPr>
+              <a:t>で</a:t>
+            </a:r>
+            <a:r>
+              <a:rPr lang="en-US" altLang="ja-JP" sz="900" dirty="0" smtClean="0">
+                <a:latin typeface="ヒラギノ角ゴ Pro W3"/>
+                <a:ea typeface="ヒラギノ角ゴ Pro W3"/>
+                <a:cs typeface="ヒラギノ角ゴ Pro W3"/>
+              </a:rPr>
+              <a:t>1</a:t>
+            </a:r>
+            <a:r>
+              <a:rPr lang="ja-JP" altLang="en-US" sz="900" dirty="0">
+                <a:latin typeface="ヒラギノ角ゴ Pro W3"/>
+                <a:ea typeface="ヒラギノ角ゴ Pro W3"/>
+                <a:cs typeface="ヒラギノ角ゴ Pro W3"/>
+              </a:rPr>
+              <a:t>－</a:t>
+            </a:r>
+            <a:r>
+              <a:rPr lang="en-US" altLang="ja-JP" sz="900" dirty="0">
+                <a:latin typeface="ヒラギノ角ゴ Pro W3"/>
+                <a:ea typeface="ヒラギノ角ゴ Pro W3"/>
+                <a:cs typeface="ヒラギノ角ゴ Pro W3"/>
+              </a:rPr>
+              <a:t>2</a:t>
+            </a:r>
+            <a:r>
+              <a:rPr lang="ja-JP" altLang="en-US" sz="900" dirty="0">
+                <a:latin typeface="ヒラギノ角ゴ Pro W3"/>
+                <a:ea typeface="ヒラギノ角ゴ Pro W3"/>
+                <a:cs typeface="ヒラギノ角ゴ Pro W3"/>
+              </a:rPr>
+              <a:t>年目のソフトウェアエンジニアリング課程に使用されている</a:t>
+            </a:r>
+            <a:r>
+              <a:rPr lang="ja-JP" altLang="en-US" sz="900" dirty="0" smtClean="0">
+                <a:latin typeface="ヒラギノ角ゴ Pro W3"/>
+                <a:ea typeface="ヒラギノ角ゴ Pro W3"/>
+                <a:cs typeface="ヒラギノ角ゴ Pro W3"/>
+              </a:rPr>
+              <a:t>。</a:t>
+            </a:r>
+            <a:r>
+              <a:rPr lang="en-US" altLang="ja-JP" sz="900" dirty="0" smtClean="0">
+                <a:latin typeface="ヒラギノ角ゴ Pro W3"/>
+                <a:ea typeface="ヒラギノ角ゴ Pro W3"/>
+                <a:cs typeface="ヒラギノ角ゴ Pro W3"/>
+              </a:rPr>
+              <a:t>1</a:t>
+            </a:r>
+            <a:r>
+              <a:rPr lang="ja-JP" altLang="en-US" sz="900" dirty="0">
+                <a:latin typeface="ヒラギノ角ゴ Pro W3"/>
+                <a:ea typeface="ヒラギノ角ゴ Pro W3"/>
+                <a:cs typeface="ヒラギノ角ゴ Pro W3"/>
+              </a:rPr>
+              <a:t>年目の課程で学生は彼らのプロジェクトを進めた後で、</a:t>
+            </a:r>
+          </a:p>
+          <a:p>
+            <a:r>
+              <a:rPr lang="en-US" altLang="ja-JP" sz="900" dirty="0">
+                <a:latin typeface="ヒラギノ角ゴ Pro W3"/>
+                <a:ea typeface="ヒラギノ角ゴ Pro W3"/>
+                <a:cs typeface="ヒラギノ角ゴ Pro W3"/>
+              </a:rPr>
+              <a:t>Anders </a:t>
+            </a:r>
+            <a:r>
+              <a:rPr lang="en-US" altLang="ja-JP" sz="900" dirty="0" err="1">
+                <a:latin typeface="ヒラギノ角ゴ Pro W3"/>
+                <a:ea typeface="ヒラギノ角ゴ Pro W3"/>
+                <a:cs typeface="ヒラギノ角ゴ Pro W3"/>
+              </a:rPr>
+              <a:t>Sjogren</a:t>
+            </a:r>
+            <a:r>
+              <a:rPr lang="ja-JP" altLang="en-US" sz="900" dirty="0">
+                <a:latin typeface="ヒラギノ角ゴ Pro W3"/>
+                <a:ea typeface="ヒラギノ角ゴ Pro W3"/>
+                <a:cs typeface="ヒラギノ角ゴ Pro W3"/>
+              </a:rPr>
+              <a:t>の指導の下、彼らのプロジェクト結果</a:t>
+            </a:r>
+            <a:r>
+              <a:rPr lang="ja-JP" altLang="en-US" sz="900" dirty="0" smtClean="0">
+                <a:latin typeface="ヒラギノ角ゴ Pro W3"/>
+                <a:ea typeface="ヒラギノ角ゴ Pro W3"/>
+                <a:cs typeface="ヒラギノ角ゴ Pro W3"/>
+              </a:rPr>
+              <a:t>を</a:t>
+            </a:r>
+            <a:r>
+              <a:rPr lang="en-US" altLang="ja-JP" sz="900" dirty="0" smtClean="0">
+                <a:latin typeface="ヒラギノ角ゴ Pro W3"/>
+                <a:ea typeface="ヒラギノ角ゴ Pro W3"/>
+                <a:cs typeface="ヒラギノ角ゴ Pro W3"/>
+              </a:rPr>
+              <a:t>SEMAT</a:t>
+            </a:r>
+            <a:r>
+              <a:rPr lang="ja-JP" altLang="en-US" sz="900" dirty="0">
+                <a:latin typeface="ヒラギノ角ゴ Pro W3"/>
+                <a:ea typeface="ヒラギノ角ゴ Pro W3"/>
+                <a:cs typeface="ヒラギノ角ゴ Pro W3"/>
+              </a:rPr>
+              <a:t>のアルファと照らし合わせた。学生はその結果の理解</a:t>
+            </a:r>
+            <a:r>
+              <a:rPr lang="ja-JP" altLang="en-US" sz="900" dirty="0" smtClean="0">
+                <a:latin typeface="ヒラギノ角ゴ Pro W3"/>
+                <a:ea typeface="ヒラギノ角ゴ Pro W3"/>
+                <a:cs typeface="ヒラギノ角ゴ Pro W3"/>
+              </a:rPr>
+              <a:t>とアルファ</a:t>
+            </a:r>
+            <a:r>
+              <a:rPr lang="ja-JP" altLang="en-US" sz="900" dirty="0">
+                <a:latin typeface="ヒラギノ角ゴ Pro W3"/>
+                <a:ea typeface="ヒラギノ角ゴ Pro W3"/>
+                <a:cs typeface="ヒラギノ角ゴ Pro W3"/>
+              </a:rPr>
+              <a:t>を評価する機会、そしてプロジェクトの進展</a:t>
+            </a:r>
+            <a:r>
+              <a:rPr lang="ja-JP" altLang="en-US" sz="900" dirty="0" smtClean="0">
+                <a:latin typeface="ヒラギノ角ゴ Pro W3"/>
+                <a:ea typeface="ヒラギノ角ゴ Pro W3"/>
+                <a:cs typeface="ヒラギノ角ゴ Pro W3"/>
+              </a:rPr>
+              <a:t>と健康</a:t>
+            </a:r>
+            <a:r>
+              <a:rPr lang="ja-JP" altLang="en-US" sz="900" dirty="0">
+                <a:latin typeface="ヒラギノ角ゴ Pro W3"/>
+                <a:ea typeface="ヒラギノ角ゴ Pro W3"/>
+                <a:cs typeface="ヒラギノ角ゴ Pro W3"/>
+              </a:rPr>
+              <a:t>状態を見抜く機会を得た。</a:t>
+            </a:r>
+          </a:p>
+          <a:p>
+            <a:r>
+              <a:rPr lang="en-US" altLang="ja-JP" sz="900" dirty="0">
+                <a:latin typeface="ヒラギノ角ゴ Pro W3"/>
+                <a:ea typeface="ヒラギノ角ゴ Pro W3"/>
+                <a:cs typeface="ヒラギノ角ゴ Pro W3"/>
+              </a:rPr>
+              <a:t>Mira </a:t>
+            </a:r>
+            <a:r>
+              <a:rPr lang="en-US" altLang="ja-JP" sz="900" dirty="0" err="1">
                 <a:latin typeface="ヒラギノ角ゴ Pro W3"/>
                 <a:ea typeface="ヒラギノ角ゴ Pro W3"/>
                 <a:cs typeface="ヒラギノ角ゴ Pro W3"/>
@@ -9297,77 +9810,82 @@
               <a:t>Kajko-Mattsson</a:t>
             </a:r>
             <a:r>
-              <a:rPr lang="en-US" sz="1200" baseline="30000" dirty="0">
-                <a:latin typeface="ヒラギノ角ゴ Pro W3"/>
-                <a:ea typeface="ヒラギノ角ゴ Pro W3"/>
-                <a:cs typeface="ヒラギノ角ゴ Pro W3"/>
-              </a:rPr>
-              <a:t>, the </a:t>
-            </a:r>
-            <a:r>
-              <a:rPr lang="en-US" sz="1200" baseline="30000" dirty="0" err="1">
-                <a:latin typeface="ヒラギノ角ゴ Pro W3"/>
-                <a:ea typeface="ヒラギノ角ゴ Pro W3"/>
-                <a:cs typeface="ヒラギノ角ゴ Pro W3"/>
-              </a:rPr>
-              <a:t>stu</a:t>
-            </a:r>
-            <a:r>
-              <a:rPr lang="en-US" sz="1200" baseline="30000" dirty="0">
-                <a:latin typeface="ヒラギノ角ゴ Pro W3"/>
-                <a:ea typeface="ヒラギノ角ゴ Pro W3"/>
-                <a:cs typeface="ヒラギノ角ゴ Pro W3"/>
-              </a:rPr>
-              <a:t>- dents were asked to use the SEMAT </a:t>
-            </a:r>
-            <a:r>
-              <a:rPr lang="en-US" sz="1200" baseline="30000" dirty="0" err="1">
-                <a:latin typeface="ヒラギノ角ゴ Pro W3"/>
-                <a:ea typeface="ヒラギノ角ゴ Pro W3"/>
-                <a:cs typeface="ヒラギノ角ゴ Pro W3"/>
-              </a:rPr>
-              <a:t>ker</a:t>
-            </a:r>
-            <a:r>
-              <a:rPr lang="en-US" sz="1200" baseline="30000" dirty="0">
-                <a:latin typeface="ヒラギノ角ゴ Pro W3"/>
-                <a:ea typeface="ヒラギノ角ゴ Pro W3"/>
-                <a:cs typeface="ヒラギノ角ゴ Pro W3"/>
-              </a:rPr>
-              <a:t>- </a:t>
-            </a:r>
-            <a:r>
-              <a:rPr lang="en-US" sz="1200" baseline="30000" dirty="0" err="1">
-                <a:latin typeface="ヒラギノ角ゴ Pro W3"/>
-                <a:ea typeface="ヒラギノ角ゴ Pro W3"/>
-                <a:cs typeface="ヒラギノ角ゴ Pro W3"/>
-              </a:rPr>
-              <a:t>nel</a:t>
-            </a:r>
-            <a:r>
-              <a:rPr lang="en-US" sz="1200" baseline="30000" dirty="0">
-                <a:latin typeface="ヒラギノ角ゴ Pro W3"/>
-                <a:ea typeface="ヒラギノ角ゴ Pro W3"/>
-                <a:cs typeface="ヒラギノ角ゴ Pro W3"/>
-              </a:rPr>
-              <a:t> when running their projects along with the development method they followed. As shown in Figure 7, </a:t>
-            </a:r>
-            <a:r>
-              <a:rPr lang="en-US" sz="1200" baseline="30000" dirty="0" err="1">
-                <a:latin typeface="ヒラギノ角ゴ Pro W3"/>
-                <a:ea typeface="ヒラギノ角ゴ Pro W3"/>
-                <a:cs typeface="ヒラギノ角ゴ Pro W3"/>
-              </a:rPr>
-              <a:t>Kajko</a:t>
-            </a:r>
-            <a:r>
-              <a:rPr lang="en-US" sz="1200" baseline="30000" dirty="0">
-                <a:latin typeface="ヒラギノ角ゴ Pro W3"/>
-                <a:ea typeface="ヒラギノ角ゴ Pro W3"/>
-                <a:cs typeface="ヒラギノ角ゴ Pro W3"/>
-              </a:rPr>
-              <a:t>-</a:t>
-            </a:r>
+              <a:rPr lang="ja-JP" altLang="en-US" sz="900" dirty="0">
+                <a:latin typeface="ヒラギノ角ゴ Pro W3"/>
+                <a:ea typeface="ヒラギノ角ゴ Pro W3"/>
+                <a:cs typeface="ヒラギノ角ゴ Pro W3"/>
+              </a:rPr>
+              <a:t>が行った</a:t>
+            </a:r>
+            <a:r>
+              <a:rPr lang="en-US" altLang="ja-JP" sz="900" dirty="0">
+                <a:latin typeface="ヒラギノ角ゴ Pro W3"/>
+                <a:ea typeface="ヒラギノ角ゴ Pro W3"/>
+                <a:cs typeface="ヒラギノ角ゴ Pro W3"/>
+              </a:rPr>
+              <a:t>2</a:t>
+            </a:r>
+            <a:r>
+              <a:rPr lang="ja-JP" altLang="en-US" sz="900" dirty="0">
+                <a:latin typeface="ヒラギノ角ゴ Pro W3"/>
+                <a:ea typeface="ヒラギノ角ゴ Pro W3"/>
+                <a:cs typeface="ヒラギノ角ゴ Pro W3"/>
+              </a:rPr>
+              <a:t>年目の課程において</a:t>
+            </a:r>
+            <a:r>
+              <a:rPr lang="ja-JP" altLang="en-US" sz="900" dirty="0" smtClean="0">
+                <a:latin typeface="ヒラギノ角ゴ Pro W3"/>
+                <a:ea typeface="ヒラギノ角ゴ Pro W3"/>
+                <a:cs typeface="ヒラギノ角ゴ Pro W3"/>
+              </a:rPr>
+              <a:t>、学生</a:t>
+            </a:r>
+            <a:r>
+              <a:rPr lang="ja-JP" altLang="en-US" sz="900" dirty="0">
+                <a:latin typeface="ヒラギノ角ゴ Pro W3"/>
+                <a:ea typeface="ヒラギノ角ゴ Pro W3"/>
+                <a:cs typeface="ヒラギノ角ゴ Pro W3"/>
+              </a:rPr>
+              <a:t>は彼らが従った開発方法を用いてプロジェクトを進める時</a:t>
+            </a:r>
+            <a:r>
+              <a:rPr lang="ja-JP" altLang="en-US" sz="900" dirty="0" smtClean="0">
+                <a:latin typeface="ヒラギノ角ゴ Pro W3"/>
+                <a:ea typeface="ヒラギノ角ゴ Pro W3"/>
+                <a:cs typeface="ヒラギノ角ゴ Pro W3"/>
+              </a:rPr>
+              <a:t>に</a:t>
+            </a:r>
+            <a:r>
+              <a:rPr lang="en-US" altLang="ja-JP" sz="900" dirty="0" smtClean="0">
+                <a:latin typeface="ヒラギノ角ゴ Pro W3"/>
+                <a:ea typeface="ヒラギノ角ゴ Pro W3"/>
+                <a:cs typeface="ヒラギノ角ゴ Pro W3"/>
+              </a:rPr>
+              <a:t>SEMAT</a:t>
+            </a:r>
+            <a:r>
+              <a:rPr lang="ja-JP" altLang="en-US" sz="900" dirty="0">
+                <a:latin typeface="ヒラギノ角ゴ Pro W3"/>
+                <a:ea typeface="ヒラギノ角ゴ Pro W3"/>
+                <a:cs typeface="ヒラギノ角ゴ Pro W3"/>
+              </a:rPr>
+              <a:t>カーネルを使用するよう指示された</a:t>
+            </a:r>
+            <a:r>
+              <a:rPr lang="ja-JP" altLang="en-US" sz="900" dirty="0" smtClean="0">
+                <a:latin typeface="ヒラギノ角ゴ Pro W3"/>
+                <a:ea typeface="ヒラギノ角ゴ Pro W3"/>
+                <a:cs typeface="ヒラギノ角ゴ Pro W3"/>
+              </a:rPr>
+              <a:t>。</a:t>
+            </a:r>
+            <a:endParaRPr lang="ja-JP" altLang="en-US" sz="900" dirty="0">
+              <a:latin typeface="ヒラギノ角ゴ Pro W3"/>
+              <a:ea typeface="ヒラギノ角ゴ Pro W3"/>
+              <a:cs typeface="ヒラギノ角ゴ Pro W3"/>
+            </a:endParaRPr>
           </a:p>
         </p:txBody>
       </p:sp>
@@ -9380,7 +9898,7 @@
         <p:spPr>
           <a:xfrm>
             <a:off x="4696293" y="3440159"/>
-            <a:ext cx="2060928" cy="5386092"/>
+            <a:ext cx="2060928" cy="6878803"/>
           </a:xfrm>
           <a:prstGeom prst="rect">
             <a:avLst/>
@@ -9394,49 +9912,57 @@
           <a:lstStyle/>
           <a:p>
             <a:r>
-              <a:rPr lang="en-US" sz="1200" baseline="30000" dirty="0" err="1">
-                <a:latin typeface="ヒラギノ角ゴ Pro W3"/>
-                <a:ea typeface="ヒラギノ角ゴ Pro W3"/>
-                <a:cs typeface="ヒラギノ角ゴ Pro W3"/>
-              </a:rPr>
-              <a:t>Mattsson</a:t>
-            </a:r>
-            <a:r>
-              <a:rPr lang="en-US" sz="1200" baseline="30000" dirty="0">
-                <a:latin typeface="ヒラギノ角ゴ Pro W3"/>
-                <a:ea typeface="ヒラギノ角ゴ Pro W3"/>
-                <a:cs typeface="ヒラギノ角ゴ Pro W3"/>
-              </a:rPr>
-              <a:t> created a software-develop- </a:t>
-            </a:r>
-            <a:r>
-              <a:rPr lang="en-US" sz="1200" baseline="30000" dirty="0" err="1">
-                <a:latin typeface="ヒラギノ角ゴ Pro W3"/>
-                <a:ea typeface="ヒラギノ角ゴ Pro W3"/>
-                <a:cs typeface="ヒラギノ角ゴ Pro W3"/>
-              </a:rPr>
-              <a:t>ment</a:t>
-            </a:r>
-            <a:r>
-              <a:rPr lang="en-US" sz="1200" baseline="30000" dirty="0">
-                <a:latin typeface="ヒラギノ角ゴ Pro W3"/>
-                <a:ea typeface="ヒラギノ角ゴ Pro W3"/>
-                <a:cs typeface="ヒラギノ角ゴ Pro W3"/>
-              </a:rPr>
-              <a:t> scenario and evaluated it for each alpha, its states, and the state checklist items. The students were then asked to do the same when conducting and evaluating their projects.</a:t>
-            </a:r>
-          </a:p>
-          <a:p>
-            <a:r>
-              <a:rPr lang="en-US" sz="1200" baseline="30000" dirty="0">
-                <a:latin typeface="ヒラギノ角ゴ Pro W3"/>
-                <a:ea typeface="ヒラギノ角ゴ Pro W3"/>
-                <a:cs typeface="ヒラギノ角ゴ Pro W3"/>
-              </a:rPr>
-              <a:t>The experiences of these courses provided valuable lessons. For exam- </a:t>
-            </a:r>
-            <a:r>
-              <a:rPr lang="en-US" sz="1200" baseline="30000" dirty="0" err="1">
+              <a:rPr lang="en-US" altLang="ja-JP" sz="900" dirty="0">
+                <a:latin typeface="ヒラギノ角ゴ Pro W3"/>
+                <a:ea typeface="ヒラギノ角ゴ Pro W3"/>
+                <a:cs typeface="ヒラギノ角ゴ Pro W3"/>
+              </a:rPr>
+              <a:t>Figure 7</a:t>
+            </a:r>
+            <a:r>
+              <a:rPr lang="ja-JP" altLang="en-US" sz="900" dirty="0">
+                <a:latin typeface="ヒラギノ角ゴ Pro W3"/>
+                <a:ea typeface="ヒラギノ角ゴ Pro W3"/>
+                <a:cs typeface="ヒラギノ角ゴ Pro W3"/>
+              </a:rPr>
+              <a:t>に示される様に</a:t>
+            </a:r>
+            <a:r>
+              <a:rPr lang="en-US" altLang="ja-JP" sz="900" dirty="0" err="1">
+                <a:latin typeface="ヒラギノ角ゴ Pro W3"/>
+                <a:ea typeface="ヒラギノ角ゴ Pro W3"/>
+                <a:cs typeface="ヒラギノ角ゴ Pro W3"/>
+              </a:rPr>
+              <a:t>Kajko-Mattsson</a:t>
+            </a:r>
+            <a:r>
+              <a:rPr lang="ja-JP" altLang="en-US" sz="900" dirty="0">
+                <a:latin typeface="ヒラギノ角ゴ Pro W3"/>
+                <a:ea typeface="ヒラギノ角ゴ Pro W3"/>
+                <a:cs typeface="ヒラギノ角ゴ Pro W3"/>
+              </a:rPr>
+              <a:t>はソフトウェア開発シナリオを作成し、アルファ毎にその状態と状態毎のチェックリストアイテムを評価した。学生は彼らのプロジェクトの運営と評価時に同じことをするよう指示された。</a:t>
+            </a:r>
+          </a:p>
+          <a:p>
+            <a:r>
+              <a:rPr lang="en-US" sz="900" dirty="0" smtClean="0">
+                <a:latin typeface="ヒラギノ角ゴ Pro W3"/>
+                <a:ea typeface="ヒラギノ角ゴ Pro W3"/>
+                <a:cs typeface="ヒラギノ角ゴ Pro W3"/>
+              </a:rPr>
+              <a:t>The </a:t>
+            </a:r>
+            <a:r>
+              <a:rPr lang="en-US" sz="900" dirty="0">
+                <a:latin typeface="ヒラギノ角ゴ Pro W3"/>
+                <a:ea typeface="ヒラギノ角ゴ Pro W3"/>
+                <a:cs typeface="ヒラギノ角ゴ Pro W3"/>
+              </a:rPr>
+              <a:t>experiences of these courses provided valuable lessons. For exam- </a:t>
+            </a:r>
+            <a:r>
+              <a:rPr lang="en-US" sz="900" dirty="0" err="1">
                 <a:latin typeface="ヒラギノ角ゴ Pro W3"/>
                 <a:ea typeface="ヒラギノ角ゴ Pro W3"/>
                 <a:cs typeface="ヒラギノ角ゴ Pro W3"/>
@@ -9444,7 +9970,7 @@
               <a:t>ple</a:t>
             </a:r>
             <a:r>
-              <a:rPr lang="en-US" sz="1200" baseline="30000" dirty="0">
+              <a:rPr lang="en-US" sz="900" dirty="0">
                 <a:latin typeface="ヒラギノ角ゴ Pro W3"/>
                 <a:ea typeface="ヒラギノ角ゴ Pro W3"/>
                 <a:cs typeface="ヒラギノ角ゴ Pro W3"/>
@@ -9452,7 +9978,7 @@
               <a:t>, the kernel assures that all the </a:t>
             </a:r>
             <a:r>
-              <a:rPr lang="en-US" sz="1200" baseline="30000" dirty="0" err="1">
+              <a:rPr lang="en-US" sz="900" dirty="0" err="1">
                 <a:latin typeface="ヒラギノ角ゴ Pro W3"/>
                 <a:ea typeface="ヒラギノ角ゴ Pro W3"/>
                 <a:cs typeface="ヒラギノ角ゴ Pro W3"/>
@@ -9460,7 +9986,7 @@
               <a:t>es</a:t>
             </a:r>
             <a:r>
-              <a:rPr lang="en-US" sz="1200" baseline="30000" dirty="0">
+              <a:rPr lang="en-US" sz="900" dirty="0">
                 <a:latin typeface="ヒラギノ角ゴ Pro W3"/>
                 <a:ea typeface="ヒラギノ角ゴ Pro W3"/>
                 <a:cs typeface="ヒラギノ角ゴ Pro W3"/>
@@ -9468,7 +9994,7 @@
               <a:t>- </a:t>
             </a:r>
             <a:r>
-              <a:rPr lang="en-US" sz="1200" baseline="30000" dirty="0" err="1">
+              <a:rPr lang="en-US" sz="900" dirty="0" err="1">
                 <a:latin typeface="ヒラギノ角ゴ Pro W3"/>
                 <a:ea typeface="ヒラギノ角ゴ Pro W3"/>
                 <a:cs typeface="ヒラギノ角ゴ Pro W3"/>
@@ -9476,7 +10002,7 @@
               <a:t>sential</a:t>
             </a:r>
             <a:r>
-              <a:rPr lang="en-US" sz="1200" baseline="30000" dirty="0">
+              <a:rPr lang="en-US" sz="900" dirty="0">
                 <a:latin typeface="ヒラギノ角ゴ Pro W3"/>
                 <a:ea typeface="ヒラギノ角ゴ Pro W3"/>
                 <a:cs typeface="ヒラギノ角ゴ Pro W3"/>
@@ -9484,7 +10010,7 @@
               <a:t> aspects of software engineering are considered in a project. By match- </a:t>
             </a:r>
             <a:r>
-              <a:rPr lang="en-US" sz="1200" baseline="30000" dirty="0" err="1">
+              <a:rPr lang="en-US" sz="900" dirty="0" err="1">
                 <a:latin typeface="ヒラギノ角ゴ Pro W3"/>
                 <a:ea typeface="ヒラギノ角ゴ Pro W3"/>
                 <a:cs typeface="ヒラギノ角ゴ Pro W3"/>
@@ -9492,7 +10018,7 @@
               <a:t>ing</a:t>
             </a:r>
             <a:r>
-              <a:rPr lang="en-US" sz="1200" baseline="30000" dirty="0">
+              <a:rPr lang="en-US" sz="900" dirty="0">
                 <a:latin typeface="ヒラギノ角ゴ Pro W3"/>
                 <a:ea typeface="ヒラギノ角ゴ Pro W3"/>
                 <a:cs typeface="ヒラギノ角ゴ Pro W3"/>
@@ -9500,7 +10026,7 @@
               <a:t> the project results against the </a:t>
             </a:r>
             <a:r>
-              <a:rPr lang="en-US" sz="1200" baseline="30000" dirty="0" err="1">
+              <a:rPr lang="en-US" sz="900" dirty="0" err="1">
                 <a:latin typeface="ヒラギノ角ゴ Pro W3"/>
                 <a:ea typeface="ヒラギノ角ゴ Pro W3"/>
                 <a:cs typeface="ヒラギノ角ゴ Pro W3"/>
@@ -9508,7 +10034,7 @@
               <a:t>ker</a:t>
             </a:r>
             <a:r>
-              <a:rPr lang="en-US" sz="1200" baseline="30000" dirty="0">
+              <a:rPr lang="en-US" sz="900" dirty="0">
                 <a:latin typeface="ヒラギノ角ゴ Pro W3"/>
                 <a:ea typeface="ヒラギノ角ゴ Pro W3"/>
                 <a:cs typeface="ヒラギノ角ゴ Pro W3"/>
@@ -9516,7 +10042,7 @@
               <a:t>- </a:t>
             </a:r>
             <a:r>
-              <a:rPr lang="en-US" sz="1200" baseline="30000" dirty="0" err="1">
+              <a:rPr lang="en-US" sz="900" dirty="0" err="1">
                 <a:latin typeface="ヒラギノ角ゴ Pro W3"/>
                 <a:ea typeface="ヒラギノ角ゴ Pro W3"/>
                 <a:cs typeface="ヒラギノ角ゴ Pro W3"/>
@@ -9524,7 +10050,7 @@
               <a:t>nel</a:t>
             </a:r>
             <a:r>
-              <a:rPr lang="en-US" sz="1200" baseline="30000" dirty="0">
+              <a:rPr lang="en-US" sz="900" dirty="0">
                 <a:latin typeface="ヒラギノ角ゴ Pro W3"/>
                 <a:ea typeface="ヒラギノ角ゴ Pro W3"/>
                 <a:cs typeface="ヒラギノ角ゴ Pro W3"/>
@@ -9532,7 +10058,7 @@
               <a:t> alphas, the students could easily identify the good and bad sides of their development methods. The kernel also prepared students for future software- engineering endeavors with minimal teaching effort. By following all the </a:t>
             </a:r>
             <a:r>
-              <a:rPr lang="en-US" sz="1200" baseline="30000" dirty="0" err="1">
+              <a:rPr lang="en-US" sz="900" dirty="0" err="1">
                 <a:latin typeface="ヒラギノ角ゴ Pro W3"/>
                 <a:ea typeface="ヒラギノ角ゴ Pro W3"/>
                 <a:cs typeface="ヒラギノ角ゴ Pro W3"/>
@@ -9540,7 +10066,7 @@
               <a:t>ker</a:t>
             </a:r>
             <a:r>
-              <a:rPr lang="en-US" sz="1200" baseline="30000" dirty="0">
+              <a:rPr lang="en-US" sz="900" dirty="0">
                 <a:latin typeface="ヒラギノ角ゴ Pro W3"/>
                 <a:ea typeface="ヒラギノ角ゴ Pro W3"/>
                 <a:cs typeface="ヒラギノ角ゴ Pro W3"/>
@@ -9548,7 +10074,7 @@
               <a:t>- </a:t>
             </a:r>
             <a:r>
-              <a:rPr lang="en-US" sz="1200" baseline="30000" dirty="0" err="1">
+              <a:rPr lang="en-US" sz="900" dirty="0" err="1">
                 <a:latin typeface="ヒラギノ角ゴ Pro W3"/>
                 <a:ea typeface="ヒラギノ角ゴ Pro W3"/>
                 <a:cs typeface="ヒラギノ角ゴ Pro W3"/>
@@ -9556,7 +10082,7 @@
               <a:t>nel</a:t>
             </a:r>
             <a:r>
-              <a:rPr lang="en-US" sz="1200" baseline="30000" dirty="0">
+              <a:rPr lang="en-US" sz="900" dirty="0">
                 <a:latin typeface="ヒラギノ角ゴ Pro W3"/>
                 <a:ea typeface="ヒラギノ角ゴ Pro W3"/>
                 <a:cs typeface="ヒラギノ角ゴ Pro W3"/>
@@ -9566,7 +10092,7 @@
           </a:p>
           <a:p>
             <a:r>
-              <a:rPr lang="en-US" sz="1200" baseline="30000" dirty="0">
+              <a:rPr lang="en-US" sz="900" dirty="0">
                 <a:latin typeface="ヒラギノ角ゴ Pro W3"/>
                 <a:ea typeface="ヒラギノ角ゴ Pro W3"/>
                 <a:cs typeface="ヒラギノ角ゴ Pro W3"/>
@@ -9574,7 +10100,7 @@
               <a:t>How the kernel relates to agile and others. The kernel can be used with all the popular management and </a:t>
             </a:r>
             <a:r>
-              <a:rPr lang="en-US" sz="1200" baseline="30000" dirty="0" err="1">
+              <a:rPr lang="en-US" sz="900" dirty="0" err="1">
                 <a:latin typeface="ヒラギノ角ゴ Pro W3"/>
                 <a:ea typeface="ヒラギノ角ゴ Pro W3"/>
                 <a:cs typeface="ヒラギノ角ゴ Pro W3"/>
@@ -9582,7 +10108,7 @@
               <a:t>techni</a:t>
             </a:r>
             <a:r>
-              <a:rPr lang="en-US" sz="1200" baseline="30000" dirty="0">
+              <a:rPr lang="en-US" sz="900" dirty="0">
                 <a:latin typeface="ヒラギノ角ゴ Pro W3"/>
                 <a:ea typeface="ヒラギノ角ゴ Pro W3"/>
                 <a:cs typeface="ヒラギノ角ゴ Pro W3"/>
@@ -9590,7 +10116,7 @@
               <a:t>- </a:t>
             </a:r>
             <a:r>
-              <a:rPr lang="en-US" sz="1200" baseline="30000" dirty="0" err="1">
+              <a:rPr lang="en-US" sz="900" dirty="0" err="1">
                 <a:latin typeface="ヒラギノ角ゴ Pro W3"/>
                 <a:ea typeface="ヒラギノ角ゴ Pro W3"/>
                 <a:cs typeface="ヒラギノ角ゴ Pro W3"/>
@@ -9598,7 +10124,7 @@
               <a:t>cal</a:t>
             </a:r>
             <a:r>
-              <a:rPr lang="en-US" sz="1200" baseline="30000" dirty="0">
+              <a:rPr lang="en-US" sz="900" dirty="0">
                 <a:latin typeface="ヒラギノ角ゴ Pro W3"/>
                 <a:ea typeface="ヒラギノ角ゴ Pro W3"/>
                 <a:cs typeface="ヒラギノ角ゴ Pro W3"/>
@@ -9606,7 +10132,7 @@
               <a:t> practices, including Scrum, </a:t>
             </a:r>
             <a:r>
-              <a:rPr lang="en-US" sz="1200" baseline="30000" dirty="0" err="1">
+              <a:rPr lang="en-US" sz="900" dirty="0" err="1">
                 <a:latin typeface="ヒラギノ角ゴ Pro W3"/>
                 <a:ea typeface="ヒラギノ角ゴ Pro W3"/>
                 <a:cs typeface="ヒラギノ角ゴ Pro W3"/>
@@ -9614,7 +10140,7 @@
               <a:t>Kan</a:t>
             </a:r>
             <a:r>
-              <a:rPr lang="en-US" sz="1200" baseline="30000" dirty="0">
+              <a:rPr lang="en-US" sz="900" dirty="0">
                 <a:latin typeface="ヒラギノ角ゴ Pro W3"/>
                 <a:ea typeface="ヒラギノ角ゴ Pro W3"/>
                 <a:cs typeface="ヒラギノ角ゴ Pro W3"/>
@@ -9622,7 +10148,7 @@
               <a:t>- ban, risk-driven iterative, waterfall, use-case-driven development, </a:t>
             </a:r>
             <a:r>
-              <a:rPr lang="en-US" sz="1200" baseline="30000" dirty="0" err="1">
+              <a:rPr lang="en-US" sz="900" dirty="0" err="1">
                 <a:latin typeface="ヒラギノ角ゴ Pro W3"/>
                 <a:ea typeface="ヒラギノ角ゴ Pro W3"/>
                 <a:cs typeface="ヒラギノ角ゴ Pro W3"/>
@@ -9630,7 +10156,7 @@
               <a:t>accep</a:t>
             </a:r>
             <a:r>
-              <a:rPr lang="en-US" sz="1200" baseline="30000" dirty="0">
+              <a:rPr lang="en-US" sz="900" dirty="0">
                 <a:latin typeface="ヒラギノ角ゴ Pro W3"/>
                 <a:ea typeface="ヒラギノ角ゴ Pro W3"/>
                 <a:cs typeface="ヒラギノ角ゴ Pro W3"/>
@@ -9638,7 +10164,7 @@
               <a:t>- </a:t>
             </a:r>
             <a:r>
-              <a:rPr lang="en-US" sz="1200" baseline="30000" dirty="0" err="1">
+              <a:rPr lang="en-US" sz="900" dirty="0" err="1">
                 <a:latin typeface="ヒラギノ角ゴ Pro W3"/>
                 <a:ea typeface="ヒラギノ角ゴ Pro W3"/>
                 <a:cs typeface="ヒラギノ角ゴ Pro W3"/>
@@ -9646,7 +10172,7 @@
               <a:t>tance</a:t>
             </a:r>
             <a:r>
-              <a:rPr lang="en-US" sz="1200" baseline="30000" dirty="0">
+              <a:rPr lang="en-US" sz="900" dirty="0">
                 <a:latin typeface="ヒラギノ角ゴ Pro W3"/>
                 <a:ea typeface="ヒラギノ角ゴ Pro W3"/>
                 <a:cs typeface="ヒラギノ角ゴ Pro W3"/>
@@ -9654,7 +10180,7 @@
               <a:t>-test-driven development, con- </a:t>
             </a:r>
             <a:r>
-              <a:rPr lang="en-US" sz="1200" baseline="30000" dirty="0" err="1">
+              <a:rPr lang="en-US" sz="900" dirty="0" err="1">
                 <a:latin typeface="ヒラギノ角ゴ Pro W3"/>
                 <a:ea typeface="ヒラギノ角ゴ Pro W3"/>
                 <a:cs typeface="ヒラギノ角ゴ Pro W3"/>
@@ -9662,7 +10188,7 @@
               <a:t>tinuous</a:t>
             </a:r>
             <a:r>
-              <a:rPr lang="en-US" sz="1200" baseline="30000" dirty="0">
+              <a:rPr lang="en-US" sz="900" dirty="0">
                 <a:latin typeface="ヒラギノ角ゴ Pro W3"/>
                 <a:ea typeface="ヒラギノ角ゴ Pro W3"/>
                 <a:cs typeface="ヒラギノ角ゴ Pro W3"/>
@@ -9670,7 +10196,7 @@
               <a:t> integration, and test-driven development. It will help teams </a:t>
             </a:r>
             <a:r>
-              <a:rPr lang="en-US" sz="1200" baseline="30000" dirty="0" err="1">
+              <a:rPr lang="en-US" sz="900" dirty="0" err="1">
                 <a:latin typeface="ヒラギノ角ゴ Pro W3"/>
                 <a:ea typeface="ヒラギノ角ゴ Pro W3"/>
                 <a:cs typeface="ヒラギノ角ゴ Pro W3"/>
@@ -9678,7 +10204,7 @@
               <a:t>em</a:t>
             </a:r>
             <a:r>
-              <a:rPr lang="en-US" sz="1200" baseline="30000" dirty="0">
+              <a:rPr lang="en-US" sz="900" dirty="0">
                 <a:latin typeface="ヒラギノ角ゴ Pro W3"/>
                 <a:ea typeface="ヒラギノ角ゴ Pro W3"/>
                 <a:cs typeface="ヒラギノ角ゴ Pro W3"/>
@@ -9686,7 +10212,7 @@
               <a:t>- barking on the development of new and innovative software products and those involved in enhancing and main- </a:t>
             </a:r>
             <a:r>
-              <a:rPr lang="en-US" sz="1200" baseline="30000" dirty="0" err="1">
+              <a:rPr lang="en-US" sz="900" dirty="0" err="1">
                 <a:latin typeface="ヒラギノ角ゴ Pro W3"/>
                 <a:ea typeface="ヒラギノ角ゴ Pro W3"/>
                 <a:cs typeface="ヒラギノ角ゴ Pro W3"/>
@@ -9694,7 +10220,7 @@
               <a:t>taining</a:t>
             </a:r>
             <a:r>
-              <a:rPr lang="en-US" sz="1200" baseline="30000" dirty="0">
+              <a:rPr lang="en-US" sz="900" dirty="0">
                 <a:latin typeface="ヒラギノ角ゴ Pro W3"/>
                 <a:ea typeface="ヒラギノ角ゴ Pro W3"/>
                 <a:cs typeface="ヒラギノ角ゴ Pro W3"/>

</xml_diff>

<commit_message>
Merge 05 into pptx
</commit_message>
<xml_diff>
--- a/p42-jacobson_ja/p42-jacobson_ja.pptx
+++ b/p42-jacobson_ja/p42-jacobson_ja.pptx
@@ -295,7 +295,7 @@
           <a:p>
             <a:fld id="{0250A163-ACDB-304E-8C8E-D7913C06F9E0}" type="datetimeFigureOut">
               <a:rPr lang="en-US" smtClean="0"/>
-              <a:t>4/10/13</a:t>
+              <a:t>4/11/13</a:t>
             </a:fld>
             <a:endParaRPr lang="en-US"/>
           </a:p>
@@ -465,7 +465,7 @@
           <a:p>
             <a:fld id="{0250A163-ACDB-304E-8C8E-D7913C06F9E0}" type="datetimeFigureOut">
               <a:rPr lang="en-US" smtClean="0"/>
-              <a:t>4/10/13</a:t>
+              <a:t>4/11/13</a:t>
             </a:fld>
             <a:endParaRPr lang="en-US"/>
           </a:p>
@@ -645,7 +645,7 @@
           <a:p>
             <a:fld id="{0250A163-ACDB-304E-8C8E-D7913C06F9E0}" type="datetimeFigureOut">
               <a:rPr lang="en-US" smtClean="0"/>
-              <a:t>4/10/13</a:t>
+              <a:t>4/11/13</a:t>
             </a:fld>
             <a:endParaRPr lang="en-US"/>
           </a:p>
@@ -815,7 +815,7 @@
           <a:p>
             <a:fld id="{0250A163-ACDB-304E-8C8E-D7913C06F9E0}" type="datetimeFigureOut">
               <a:rPr lang="en-US" smtClean="0"/>
-              <a:t>4/10/13</a:t>
+              <a:t>4/11/13</a:t>
             </a:fld>
             <a:endParaRPr lang="en-US"/>
           </a:p>
@@ -1061,7 +1061,7 @@
           <a:p>
             <a:fld id="{0250A163-ACDB-304E-8C8E-D7913C06F9E0}" type="datetimeFigureOut">
               <a:rPr lang="en-US" smtClean="0"/>
-              <a:t>4/10/13</a:t>
+              <a:t>4/11/13</a:t>
             </a:fld>
             <a:endParaRPr lang="en-US"/>
           </a:p>
@@ -1349,7 +1349,7 @@
           <a:p>
             <a:fld id="{0250A163-ACDB-304E-8C8E-D7913C06F9E0}" type="datetimeFigureOut">
               <a:rPr lang="en-US" smtClean="0"/>
-              <a:t>4/10/13</a:t>
+              <a:t>4/11/13</a:t>
             </a:fld>
             <a:endParaRPr lang="en-US"/>
           </a:p>
@@ -1776,7 +1776,7 @@
           <a:p>
             <a:fld id="{0250A163-ACDB-304E-8C8E-D7913C06F9E0}" type="datetimeFigureOut">
               <a:rPr lang="en-US" smtClean="0"/>
-              <a:t>4/10/13</a:t>
+              <a:t>4/11/13</a:t>
             </a:fld>
             <a:endParaRPr lang="en-US"/>
           </a:p>
@@ -1894,7 +1894,7 @@
           <a:p>
             <a:fld id="{0250A163-ACDB-304E-8C8E-D7913C06F9E0}" type="datetimeFigureOut">
               <a:rPr lang="en-US" smtClean="0"/>
-              <a:t>4/10/13</a:t>
+              <a:t>4/11/13</a:t>
             </a:fld>
             <a:endParaRPr lang="en-US"/>
           </a:p>
@@ -1989,7 +1989,7 @@
           <a:p>
             <a:fld id="{0250A163-ACDB-304E-8C8E-D7913C06F9E0}" type="datetimeFigureOut">
               <a:rPr lang="en-US" smtClean="0"/>
-              <a:t>4/10/13</a:t>
+              <a:t>4/11/13</a:t>
             </a:fld>
             <a:endParaRPr lang="en-US"/>
           </a:p>
@@ -2266,7 +2266,7 @@
           <a:p>
             <a:fld id="{0250A163-ACDB-304E-8C8E-D7913C06F9E0}" type="datetimeFigureOut">
               <a:rPr lang="en-US" smtClean="0"/>
-              <a:t>4/10/13</a:t>
+              <a:t>4/11/13</a:t>
             </a:fld>
             <a:endParaRPr lang="en-US"/>
           </a:p>
@@ -2519,7 +2519,7 @@
           <a:p>
             <a:fld id="{0250A163-ACDB-304E-8C8E-D7913C06F9E0}" type="datetimeFigureOut">
               <a:rPr lang="en-US" smtClean="0"/>
-              <a:t>4/10/13</a:t>
+              <a:t>4/11/13</a:t>
             </a:fld>
             <a:endParaRPr lang="en-US"/>
           </a:p>
@@ -2732,7 +2732,7 @@
           <a:p>
             <a:fld id="{0250A163-ACDB-304E-8C8E-D7913C06F9E0}" type="datetimeFigureOut">
               <a:rPr lang="en-US" smtClean="0"/>
-              <a:t>4/10/13</a:t>
+              <a:t>4/11/13</a:t>
             </a:fld>
             <a:endParaRPr lang="en-US"/>
           </a:p>
@@ -4901,20 +4901,20 @@
           <a:lstStyle/>
           <a:p>
             <a:r>
-              <a:rPr lang="en-US" sz="900" dirty="0" err="1" smtClean="0">
-                <a:latin typeface="ヒラギノ角ゴ Pro W3"/>
-                <a:ea typeface="ヒラギノ角ゴ Pro W3"/>
-                <a:cs typeface="ヒラギノ角ゴ Pro W3"/>
-              </a:rPr>
-              <a:t>i</a:t>
-            </a:r>
-            <a:r>
-              <a:rPr lang="ja-JP" altLang="en-US" sz="900" dirty="0">
-                <a:latin typeface="ヒラギノ角ゴ Pro W3"/>
-                <a:ea typeface="ヒラギノ角ゴ Pro W3"/>
-                <a:cs typeface="ヒラギノ角ゴ Pro W3"/>
-              </a:rPr>
-              <a:t>彼らが反対しているのは、ソリューションが流行っているから（あるいは、政治的正当性</a:t>
+              <a:rPr lang="ja-JP" altLang="en-US" sz="900" dirty="0" smtClean="0">
+                <a:latin typeface="ヒラギノ角ゴ Pro W3"/>
+                <a:ea typeface="ヒラギノ角ゴ Pro W3"/>
+                <a:cs typeface="ヒラギノ角ゴ Pro W3"/>
+              </a:rPr>
+              <a:t>彼ら</a:t>
+            </a:r>
+            <a:r>
+              <a:rPr lang="ja-JP" altLang="en-US" sz="900" dirty="0">
+                <a:latin typeface="ヒラギノ角ゴ Pro W3"/>
+                <a:ea typeface="ヒラギノ角ゴ Pro W3"/>
+                <a:cs typeface="ヒラギノ角ゴ Pro W3"/>
+              </a:rPr>
+              <a:t>が反対しているのは、ソリューションが流行っているから（あるいは、政治的正当性</a:t>
             </a:r>
             <a:r>
               <a:rPr lang="en-US" altLang="ja-JP" sz="900" dirty="0">
@@ -9897,8 +9897,8 @@
         </p:nvSpPr>
         <p:spPr>
           <a:xfrm>
-            <a:off x="4696293" y="3440159"/>
-            <a:ext cx="2060928" cy="6878803"/>
+            <a:off x="4672320" y="3425265"/>
+            <a:ext cx="2060928" cy="6647971"/>
           </a:xfrm>
           <a:prstGeom prst="rect">
             <a:avLst/>
@@ -9941,292 +9941,406 @@
                 <a:ea typeface="ヒラギノ角ゴ Pro W3"/>
                 <a:cs typeface="ヒラギノ角ゴ Pro W3"/>
               </a:rPr>
-              <a:t>はソフトウェア開発シナリオを作成し、アルファ毎にその状態と状態毎のチェックリストアイテムを評価した。学生は彼らのプロジェクトの運営と評価時に同じことをするよう指示された。</a:t>
-            </a:r>
-          </a:p>
-          <a:p>
-            <a:r>
-              <a:rPr lang="en-US" sz="900" dirty="0" smtClean="0">
-                <a:latin typeface="ヒラギノ角ゴ Pro W3"/>
-                <a:ea typeface="ヒラギノ角ゴ Pro W3"/>
-                <a:cs typeface="ヒラギノ角ゴ Pro W3"/>
-              </a:rPr>
-              <a:t>The </a:t>
-            </a:r>
-            <a:r>
-              <a:rPr lang="en-US" sz="900" dirty="0">
-                <a:latin typeface="ヒラギノ角ゴ Pro W3"/>
-                <a:ea typeface="ヒラギノ角ゴ Pro W3"/>
-                <a:cs typeface="ヒラギノ角ゴ Pro W3"/>
-              </a:rPr>
-              <a:t>experiences of these courses provided valuable lessons. For exam- </a:t>
-            </a:r>
-            <a:r>
-              <a:rPr lang="en-US" sz="900" dirty="0" err="1">
-                <a:latin typeface="ヒラギノ角ゴ Pro W3"/>
-                <a:ea typeface="ヒラギノ角ゴ Pro W3"/>
-                <a:cs typeface="ヒラギノ角ゴ Pro W3"/>
-              </a:rPr>
-              <a:t>ple</a:t>
-            </a:r>
-            <a:r>
-              <a:rPr lang="en-US" sz="900" dirty="0">
-                <a:latin typeface="ヒラギノ角ゴ Pro W3"/>
-                <a:ea typeface="ヒラギノ角ゴ Pro W3"/>
-                <a:cs typeface="ヒラギノ角ゴ Pro W3"/>
-              </a:rPr>
-              <a:t>, the kernel assures that all the </a:t>
-            </a:r>
-            <a:r>
-              <a:rPr lang="en-US" sz="900" dirty="0" err="1">
-                <a:latin typeface="ヒラギノ角ゴ Pro W3"/>
-                <a:ea typeface="ヒラギノ角ゴ Pro W3"/>
-                <a:cs typeface="ヒラギノ角ゴ Pro W3"/>
-              </a:rPr>
-              <a:t>es</a:t>
-            </a:r>
-            <a:r>
-              <a:rPr lang="en-US" sz="900" dirty="0">
-                <a:latin typeface="ヒラギノ角ゴ Pro W3"/>
-                <a:ea typeface="ヒラギノ角ゴ Pro W3"/>
-                <a:cs typeface="ヒラギノ角ゴ Pro W3"/>
-              </a:rPr>
-              <a:t>- </a:t>
-            </a:r>
-            <a:r>
-              <a:rPr lang="en-US" sz="900" dirty="0" err="1">
-                <a:latin typeface="ヒラギノ角ゴ Pro W3"/>
-                <a:ea typeface="ヒラギノ角ゴ Pro W3"/>
-                <a:cs typeface="ヒラギノ角ゴ Pro W3"/>
-              </a:rPr>
-              <a:t>sential</a:t>
-            </a:r>
-            <a:r>
-              <a:rPr lang="en-US" sz="900" dirty="0">
-                <a:latin typeface="ヒラギノ角ゴ Pro W3"/>
-                <a:ea typeface="ヒラギノ角ゴ Pro W3"/>
-                <a:cs typeface="ヒラギノ角ゴ Pro W3"/>
-              </a:rPr>
-              <a:t> aspects of software engineering are considered in a project. By match- </a:t>
-            </a:r>
-            <a:r>
-              <a:rPr lang="en-US" sz="900" dirty="0" err="1">
-                <a:latin typeface="ヒラギノ角ゴ Pro W3"/>
-                <a:ea typeface="ヒラギノ角ゴ Pro W3"/>
-                <a:cs typeface="ヒラギノ角ゴ Pro W3"/>
-              </a:rPr>
-              <a:t>ing</a:t>
-            </a:r>
-            <a:r>
-              <a:rPr lang="en-US" sz="900" dirty="0">
-                <a:latin typeface="ヒラギノ角ゴ Pro W3"/>
-                <a:ea typeface="ヒラギノ角ゴ Pro W3"/>
-                <a:cs typeface="ヒラギノ角ゴ Pro W3"/>
-              </a:rPr>
-              <a:t> the project results against the </a:t>
-            </a:r>
-            <a:r>
-              <a:rPr lang="en-US" sz="900" dirty="0" err="1">
-                <a:latin typeface="ヒラギノ角ゴ Pro W3"/>
-                <a:ea typeface="ヒラギノ角ゴ Pro W3"/>
-                <a:cs typeface="ヒラギノ角ゴ Pro W3"/>
-              </a:rPr>
-              <a:t>ker</a:t>
-            </a:r>
-            <a:r>
-              <a:rPr lang="en-US" sz="900" dirty="0">
-                <a:latin typeface="ヒラギノ角ゴ Pro W3"/>
-                <a:ea typeface="ヒラギノ角ゴ Pro W3"/>
-                <a:cs typeface="ヒラギノ角ゴ Pro W3"/>
-              </a:rPr>
-              <a:t>- </a:t>
-            </a:r>
-            <a:r>
-              <a:rPr lang="en-US" sz="900" dirty="0" err="1">
-                <a:latin typeface="ヒラギノ角ゴ Pro W3"/>
-                <a:ea typeface="ヒラギノ角ゴ Pro W3"/>
-                <a:cs typeface="ヒラギノ角ゴ Pro W3"/>
-              </a:rPr>
-              <a:t>nel</a:t>
-            </a:r>
-            <a:r>
-              <a:rPr lang="en-US" sz="900" dirty="0">
-                <a:latin typeface="ヒラギノ角ゴ Pro W3"/>
-                <a:ea typeface="ヒラギノ角ゴ Pro W3"/>
-                <a:cs typeface="ヒラギノ角ゴ Pro W3"/>
-              </a:rPr>
-              <a:t> alphas, the students could easily identify the good and bad sides of their development methods. The kernel also prepared students for future software- engineering endeavors with minimal teaching effort. By following all the </a:t>
-            </a:r>
-            <a:r>
-              <a:rPr lang="en-US" sz="900" dirty="0" err="1">
-                <a:latin typeface="ヒラギノ角ゴ Pro W3"/>
-                <a:ea typeface="ヒラギノ角ゴ Pro W3"/>
-                <a:cs typeface="ヒラギノ角ゴ Pro W3"/>
-              </a:rPr>
-              <a:t>ker</a:t>
-            </a:r>
-            <a:r>
-              <a:rPr lang="en-US" sz="900" dirty="0">
-                <a:latin typeface="ヒラギノ角ゴ Pro W3"/>
-                <a:ea typeface="ヒラギノ角ゴ Pro W3"/>
-                <a:cs typeface="ヒラギノ角ゴ Pro W3"/>
-              </a:rPr>
-              <a:t>- </a:t>
-            </a:r>
-            <a:r>
-              <a:rPr lang="en-US" sz="900" dirty="0" err="1">
-                <a:latin typeface="ヒラギノ角ゴ Pro W3"/>
-                <a:ea typeface="ヒラギノ角ゴ Pro W3"/>
-                <a:cs typeface="ヒラギノ角ゴ Pro W3"/>
-              </a:rPr>
-              <a:t>nel</a:t>
-            </a:r>
-            <a:r>
-              <a:rPr lang="en-US" sz="900" dirty="0">
-                <a:latin typeface="ヒラギノ角ゴ Pro W3"/>
-                <a:ea typeface="ヒラギノ角ゴ Pro W3"/>
-                <a:cs typeface="ヒラギノ角ゴ Pro W3"/>
-              </a:rPr>
-              <a:t> alphas, the students could learn the total scope of the software-engineering endeavor and thereby see what would be required of them in their future as professionals.</a:t>
-            </a:r>
-          </a:p>
-          <a:p>
-            <a:r>
-              <a:rPr lang="en-US" sz="900" dirty="0">
-                <a:latin typeface="ヒラギノ角ゴ Pro W3"/>
-                <a:ea typeface="ヒラギノ角ゴ Pro W3"/>
-                <a:cs typeface="ヒラギノ角ゴ Pro W3"/>
-              </a:rPr>
-              <a:t>How the kernel relates to agile and others. The kernel can be used with all the popular management and </a:t>
-            </a:r>
-            <a:r>
-              <a:rPr lang="en-US" sz="900" dirty="0" err="1">
-                <a:latin typeface="ヒラギノ角ゴ Pro W3"/>
-                <a:ea typeface="ヒラギノ角ゴ Pro W3"/>
-                <a:cs typeface="ヒラギノ角ゴ Pro W3"/>
-              </a:rPr>
-              <a:t>techni</a:t>
-            </a:r>
-            <a:r>
-              <a:rPr lang="en-US" sz="900" dirty="0">
-                <a:latin typeface="ヒラギノ角ゴ Pro W3"/>
-                <a:ea typeface="ヒラギノ角ゴ Pro W3"/>
-                <a:cs typeface="ヒラギノ角ゴ Pro W3"/>
-              </a:rPr>
-              <a:t>- </a:t>
-            </a:r>
-            <a:r>
-              <a:rPr lang="en-US" sz="900" dirty="0" err="1">
-                <a:latin typeface="ヒラギノ角ゴ Pro W3"/>
-                <a:ea typeface="ヒラギノ角ゴ Pro W3"/>
-                <a:cs typeface="ヒラギノ角ゴ Pro W3"/>
-              </a:rPr>
-              <a:t>cal</a:t>
-            </a:r>
-            <a:r>
-              <a:rPr lang="en-US" sz="900" dirty="0">
-                <a:latin typeface="ヒラギノ角ゴ Pro W3"/>
-                <a:ea typeface="ヒラギノ角ゴ Pro W3"/>
-                <a:cs typeface="ヒラギノ角ゴ Pro W3"/>
-              </a:rPr>
-              <a:t> practices, including Scrum, </a:t>
-            </a:r>
-            <a:r>
-              <a:rPr lang="en-US" sz="900" dirty="0" err="1">
-                <a:latin typeface="ヒラギノ角ゴ Pro W3"/>
-                <a:ea typeface="ヒラギノ角ゴ Pro W3"/>
-                <a:cs typeface="ヒラギノ角ゴ Pro W3"/>
-              </a:rPr>
-              <a:t>Kan</a:t>
-            </a:r>
-            <a:r>
-              <a:rPr lang="en-US" sz="900" dirty="0">
-                <a:latin typeface="ヒラギノ角ゴ Pro W3"/>
-                <a:ea typeface="ヒラギノ角ゴ Pro W3"/>
-                <a:cs typeface="ヒラギノ角ゴ Pro W3"/>
-              </a:rPr>
-              <a:t>- ban, risk-driven iterative, waterfall, use-case-driven development, </a:t>
-            </a:r>
-            <a:r>
-              <a:rPr lang="en-US" sz="900" dirty="0" err="1">
-                <a:latin typeface="ヒラギノ角ゴ Pro W3"/>
-                <a:ea typeface="ヒラギノ角ゴ Pro W3"/>
-                <a:cs typeface="ヒラギノ角ゴ Pro W3"/>
-              </a:rPr>
-              <a:t>accep</a:t>
-            </a:r>
-            <a:r>
-              <a:rPr lang="en-US" sz="900" dirty="0">
-                <a:latin typeface="ヒラギノ角ゴ Pro W3"/>
-                <a:ea typeface="ヒラギノ角ゴ Pro W3"/>
-                <a:cs typeface="ヒラギノ角ゴ Pro W3"/>
-              </a:rPr>
-              <a:t>- </a:t>
-            </a:r>
-            <a:r>
-              <a:rPr lang="en-US" sz="900" dirty="0" err="1">
-                <a:latin typeface="ヒラギノ角ゴ Pro W3"/>
-                <a:ea typeface="ヒラギノ角ゴ Pro W3"/>
-                <a:cs typeface="ヒラギノ角ゴ Pro W3"/>
-              </a:rPr>
-              <a:t>tance</a:t>
-            </a:r>
-            <a:r>
-              <a:rPr lang="en-US" sz="900" dirty="0">
-                <a:latin typeface="ヒラギノ角ゴ Pro W3"/>
-                <a:ea typeface="ヒラギノ角ゴ Pro W3"/>
-                <a:cs typeface="ヒラギノ角ゴ Pro W3"/>
-              </a:rPr>
-              <a:t>-test-driven development, con- </a:t>
-            </a:r>
-            <a:r>
-              <a:rPr lang="en-US" sz="900" dirty="0" err="1">
-                <a:latin typeface="ヒラギノ角ゴ Pro W3"/>
-                <a:ea typeface="ヒラギノ角ゴ Pro W3"/>
-                <a:cs typeface="ヒラギノ角ゴ Pro W3"/>
-              </a:rPr>
-              <a:t>tinuous</a:t>
-            </a:r>
-            <a:r>
-              <a:rPr lang="en-US" sz="900" dirty="0">
-                <a:latin typeface="ヒラギノ角ゴ Pro W3"/>
-                <a:ea typeface="ヒラギノ角ゴ Pro W3"/>
-                <a:cs typeface="ヒラギノ角ゴ Pro W3"/>
-              </a:rPr>
-              <a:t> integration, and test-driven development. It will help teams </a:t>
-            </a:r>
-            <a:r>
-              <a:rPr lang="en-US" sz="900" dirty="0" err="1">
-                <a:latin typeface="ヒラギノ角ゴ Pro W3"/>
-                <a:ea typeface="ヒラギノ角ゴ Pro W3"/>
-                <a:cs typeface="ヒラギノ角ゴ Pro W3"/>
-              </a:rPr>
-              <a:t>em</a:t>
-            </a:r>
-            <a:r>
-              <a:rPr lang="en-US" sz="900" dirty="0">
-                <a:latin typeface="ヒラギノ角ゴ Pro W3"/>
-                <a:ea typeface="ヒラギノ角ゴ Pro W3"/>
-                <a:cs typeface="ヒラギノ角ゴ Pro W3"/>
-              </a:rPr>
-              <a:t>- barking on the development of new and innovative software products and those involved in enhancing and main- </a:t>
-            </a:r>
-            <a:r>
-              <a:rPr lang="en-US" sz="900" dirty="0" err="1">
-                <a:latin typeface="ヒラギノ角ゴ Pro W3"/>
-                <a:ea typeface="ヒラギノ角ゴ Pro W3"/>
-                <a:cs typeface="ヒラギノ角ゴ Pro W3"/>
-              </a:rPr>
-              <a:t>taining</a:t>
-            </a:r>
-            <a:r>
-              <a:rPr lang="en-US" sz="900" dirty="0">
-                <a:latin typeface="ヒラギノ角ゴ Pro W3"/>
-                <a:ea typeface="ヒラギノ角ゴ Pro W3"/>
-                <a:cs typeface="ヒラギノ角ゴ Pro W3"/>
-              </a:rPr>
-              <a:t> established software products. It will help all sizes of teams from one- man bands to 1,000-strong software-</a:t>
-            </a:r>
+              <a:t>はソフトウェア開発シナリオを作成し、アルファ毎にその状態と状態毎のチェックリストアイテムを評価した。学生は彼らのプロジェクトの運営と評価時に同じことをするよう指示された</a:t>
+            </a:r>
+            <a:r>
+              <a:rPr lang="ja-JP" altLang="en-US" sz="900" dirty="0" smtClean="0">
+                <a:latin typeface="ヒラギノ角ゴ Pro W3"/>
+                <a:ea typeface="ヒラギノ角ゴ Pro W3"/>
+                <a:cs typeface="ヒラギノ角ゴ Pro W3"/>
+              </a:rPr>
+              <a:t>。</a:t>
+            </a:r>
+            <a:endParaRPr lang="ja-JP" altLang="en-US" sz="900" dirty="0">
+              <a:latin typeface="ヒラギノ角ゴ Pro W3"/>
+              <a:ea typeface="ヒラギノ角ゴ Pro W3"/>
+              <a:cs typeface="ヒラギノ角ゴ Pro W3"/>
+            </a:endParaRPr>
+          </a:p>
+          <a:p>
+            <a:r>
+              <a:rPr lang="ja-JP" altLang="en-US" sz="900" dirty="0">
+                <a:latin typeface="ヒラギノ角ゴ Pro W3"/>
+                <a:ea typeface="ヒラギノ角ゴ Pro W3"/>
+                <a:cs typeface="ヒラギノ角ゴ Pro W3"/>
+              </a:rPr>
+              <a:t>これらの課程を通した体験は有益な経験を提供した</a:t>
+            </a:r>
+            <a:r>
+              <a:rPr lang="ja-JP" altLang="en-US" sz="900" dirty="0" smtClean="0">
+                <a:latin typeface="ヒラギノ角ゴ Pro W3"/>
+                <a:ea typeface="ヒラギノ角ゴ Pro W3"/>
+                <a:cs typeface="ヒラギノ角ゴ Pro W3"/>
+              </a:rPr>
+              <a:t>。例えば</a:t>
+            </a:r>
+            <a:r>
+              <a:rPr lang="ja-JP" altLang="en-US" sz="900" dirty="0">
+                <a:latin typeface="ヒラギノ角ゴ Pro W3"/>
+                <a:ea typeface="ヒラギノ角ゴ Pro W3"/>
+                <a:cs typeface="ヒラギノ角ゴ Pro W3"/>
+              </a:rPr>
+              <a:t>、カーネルはソフトウェアエンジニアリングの</a:t>
+            </a:r>
+          </a:p>
+          <a:p>
+            <a:r>
+              <a:rPr lang="ja-JP" altLang="en-US" sz="900" dirty="0">
+                <a:latin typeface="ヒラギノ角ゴ Pro W3"/>
+                <a:ea typeface="ヒラギノ角ゴ Pro W3"/>
+                <a:cs typeface="ヒラギノ角ゴ Pro W3"/>
+              </a:rPr>
+              <a:t>すべての必須な観点がプロジェクトにおいて熟慮されることを保証している</a:t>
+            </a:r>
+            <a:r>
+              <a:rPr lang="ja-JP" altLang="en-US" sz="900" dirty="0" smtClean="0">
+                <a:latin typeface="ヒラギノ角ゴ Pro W3"/>
+                <a:ea typeface="ヒラギノ角ゴ Pro W3"/>
+                <a:cs typeface="ヒラギノ角ゴ Pro W3"/>
+              </a:rPr>
+              <a:t>。カーネル</a:t>
+            </a:r>
+            <a:r>
+              <a:rPr lang="ja-JP" altLang="en-US" sz="900" dirty="0">
+                <a:latin typeface="ヒラギノ角ゴ Pro W3"/>
+                <a:ea typeface="ヒラギノ角ゴ Pro W3"/>
+                <a:cs typeface="ヒラギノ角ゴ Pro W3"/>
+              </a:rPr>
+              <a:t>のアルファとプロジェクトの結果を照らし合わせることで</a:t>
+            </a:r>
+            <a:r>
+              <a:rPr lang="ja-JP" altLang="en-US" sz="900" dirty="0" smtClean="0">
+                <a:latin typeface="ヒラギノ角ゴ Pro W3"/>
+                <a:ea typeface="ヒラギノ角ゴ Pro W3"/>
+                <a:cs typeface="ヒラギノ角ゴ Pro W3"/>
+              </a:rPr>
+              <a:t>、学生</a:t>
+            </a:r>
+            <a:r>
+              <a:rPr lang="ja-JP" altLang="en-US" sz="900" dirty="0">
+                <a:latin typeface="ヒラギノ角ゴ Pro W3"/>
+                <a:ea typeface="ヒラギノ角ゴ Pro W3"/>
+                <a:cs typeface="ヒラギノ角ゴ Pro W3"/>
+              </a:rPr>
+              <a:t>は彼らの開発方法の良い面と悪い面を容易に識別することができる</a:t>
+            </a:r>
+            <a:r>
+              <a:rPr lang="ja-JP" altLang="en-US" sz="900" dirty="0" smtClean="0">
+                <a:latin typeface="ヒラギノ角ゴ Pro W3"/>
+                <a:ea typeface="ヒラギノ角ゴ Pro W3"/>
+                <a:cs typeface="ヒラギノ角ゴ Pro W3"/>
+              </a:rPr>
+              <a:t>。また</a:t>
+            </a:r>
+            <a:r>
+              <a:rPr lang="ja-JP" altLang="en-US" sz="900" dirty="0">
+                <a:latin typeface="ヒラギノ角ゴ Pro W3"/>
+                <a:ea typeface="ヒラギノ角ゴ Pro W3"/>
+                <a:cs typeface="ヒラギノ角ゴ Pro W3"/>
+              </a:rPr>
+              <a:t>カーネルは学生に最小限の学習努力で将来の</a:t>
+            </a:r>
+            <a:r>
+              <a:rPr lang="ja-JP" altLang="en-US" sz="900" dirty="0" smtClean="0">
+                <a:latin typeface="ヒラギノ角ゴ Pro W3"/>
+                <a:ea typeface="ヒラギノ角ゴ Pro W3"/>
+                <a:cs typeface="ヒラギノ角ゴ Pro W3"/>
+              </a:rPr>
+              <a:t>ソフトウェアエンジニアリング活動</a:t>
+            </a:r>
+            <a:r>
+              <a:rPr lang="en-US" altLang="ja-JP" sz="900" dirty="0">
+                <a:latin typeface="ヒラギノ角ゴ Pro W3"/>
+                <a:ea typeface="ヒラギノ角ゴ Pro W3"/>
+                <a:cs typeface="ヒラギノ角ゴ Pro W3"/>
+              </a:rPr>
+              <a:t>(endeavors)</a:t>
+            </a:r>
+            <a:r>
+              <a:rPr lang="ja-JP" altLang="en-US" sz="900" dirty="0">
+                <a:latin typeface="ヒラギノ角ゴ Pro W3"/>
+                <a:ea typeface="ヒラギノ角ゴ Pro W3"/>
+                <a:cs typeface="ヒラギノ角ゴ Pro W3"/>
+              </a:rPr>
+              <a:t>に対する備えを与えた</a:t>
+            </a:r>
+            <a:r>
+              <a:rPr lang="ja-JP" altLang="en-US" sz="900" dirty="0" smtClean="0">
+                <a:latin typeface="ヒラギノ角ゴ Pro W3"/>
+                <a:ea typeface="ヒラギノ角ゴ Pro W3"/>
+                <a:cs typeface="ヒラギノ角ゴ Pro W3"/>
+              </a:rPr>
+              <a:t>。すべて</a:t>
+            </a:r>
+            <a:r>
+              <a:rPr lang="ja-JP" altLang="en-US" sz="900" dirty="0">
+                <a:latin typeface="ヒラギノ角ゴ Pro W3"/>
+                <a:ea typeface="ヒラギノ角ゴ Pro W3"/>
+                <a:cs typeface="ヒラギノ角ゴ Pro W3"/>
+              </a:rPr>
+              <a:t>のカーネルのアルファに従うことで、</a:t>
+            </a:r>
+          </a:p>
+          <a:p>
+            <a:r>
+              <a:rPr lang="ja-JP" altLang="en-US" sz="900" dirty="0">
+                <a:latin typeface="ヒラギノ角ゴ Pro W3"/>
+                <a:ea typeface="ヒラギノ角ゴ Pro W3"/>
+                <a:cs typeface="ヒラギノ角ゴ Pro W3"/>
+              </a:rPr>
+              <a:t>学生はソフトウェアエンジニアリング活動</a:t>
+            </a:r>
+            <a:r>
+              <a:rPr lang="en-US" altLang="ja-JP" sz="900" dirty="0">
+                <a:latin typeface="ヒラギノ角ゴ Pro W3"/>
+                <a:ea typeface="ヒラギノ角ゴ Pro W3"/>
+                <a:cs typeface="ヒラギノ角ゴ Pro W3"/>
+              </a:rPr>
+              <a:t>(endeavors)</a:t>
+            </a:r>
+            <a:r>
+              <a:rPr lang="ja-JP" altLang="en-US" sz="900" dirty="0">
+                <a:latin typeface="ヒラギノ角ゴ Pro W3"/>
+                <a:ea typeface="ヒラギノ角ゴ Pro W3"/>
+                <a:cs typeface="ヒラギノ角ゴ Pro W3"/>
+              </a:rPr>
+              <a:t>の全範囲</a:t>
+            </a:r>
+            <a:r>
+              <a:rPr lang="ja-JP" altLang="en-US" sz="900" dirty="0" smtClean="0">
+                <a:latin typeface="ヒラギノ角ゴ Pro W3"/>
+                <a:ea typeface="ヒラギノ角ゴ Pro W3"/>
+                <a:cs typeface="ヒラギノ角ゴ Pro W3"/>
+              </a:rPr>
+              <a:t>を習得</a:t>
+            </a:r>
+            <a:r>
+              <a:rPr lang="ja-JP" altLang="en-US" sz="900" dirty="0">
+                <a:latin typeface="ヒラギノ角ゴ Pro W3"/>
+                <a:ea typeface="ヒラギノ角ゴ Pro W3"/>
+                <a:cs typeface="ヒラギノ角ゴ Pro W3"/>
+              </a:rPr>
+              <a:t>することができた。そしてそれによってプロフェッショナルとしての</a:t>
+            </a:r>
+          </a:p>
+          <a:p>
+            <a:r>
+              <a:rPr lang="ja-JP" altLang="en-US" sz="900" dirty="0">
+                <a:latin typeface="ヒラギノ角ゴ Pro W3"/>
+                <a:ea typeface="ヒラギノ角ゴ Pro W3"/>
+                <a:cs typeface="ヒラギノ角ゴ Pro W3"/>
+              </a:rPr>
+              <a:t>彼らの将来において必要とされるものが何かを確かめることができた</a:t>
+            </a:r>
+            <a:r>
+              <a:rPr lang="ja-JP" altLang="en-US" sz="900" dirty="0" smtClean="0">
+                <a:latin typeface="ヒラギノ角ゴ Pro W3"/>
+                <a:ea typeface="ヒラギノ角ゴ Pro W3"/>
+                <a:cs typeface="ヒラギノ角ゴ Pro W3"/>
+              </a:rPr>
+              <a:t>。</a:t>
+            </a:r>
+            <a:endParaRPr lang="en-US" altLang="ja-JP" sz="900" dirty="0" smtClean="0">
+              <a:latin typeface="ヒラギノ角ゴ Pro W3"/>
+              <a:ea typeface="ヒラギノ角ゴ Pro W3"/>
+              <a:cs typeface="ヒラギノ角ゴ Pro W3"/>
+            </a:endParaRPr>
+          </a:p>
+          <a:p>
+            <a:endParaRPr lang="en-US" altLang="ja-JP" sz="900" dirty="0" smtClean="0">
+              <a:latin typeface="ヒラギノ角ゴ Pro W3"/>
+              <a:ea typeface="ヒラギノ角ゴ Pro W3"/>
+              <a:cs typeface="ヒラギノ角ゴ Pro W3"/>
+            </a:endParaRPr>
+          </a:p>
+          <a:p>
+            <a:r>
+              <a:rPr lang="ja-JP" altLang="en-US" sz="1050" b="1" dirty="0">
+                <a:latin typeface="ヒラギノ角ゴ Pro W3"/>
+                <a:ea typeface="ヒラギノ角ゴ Pro W3"/>
+                <a:cs typeface="ヒラギノ角ゴ Pro W3"/>
+              </a:rPr>
+              <a:t>カーネルはアジャイルなどとどう関係するのか？</a:t>
+            </a:r>
+          </a:p>
+          <a:p>
+            <a:r>
+              <a:rPr lang="ja-JP" altLang="en-US" sz="900" dirty="0">
+                <a:latin typeface="ヒラギノ角ゴ Pro W3"/>
+                <a:ea typeface="ヒラギノ角ゴ Pro W3"/>
+                <a:cs typeface="ヒラギノ角ゴ Pro W3"/>
+              </a:rPr>
+              <a:t>カーネルはスクラム、カンバン、</a:t>
+            </a:r>
+            <a:r>
+              <a:rPr lang="ja-JP" altLang="en-US" sz="900" dirty="0" smtClean="0">
+                <a:latin typeface="ヒラギノ角ゴ Pro W3"/>
+                <a:ea typeface="ヒラギノ角ゴ Pro W3"/>
+                <a:cs typeface="ヒラギノ角ゴ Pro W3"/>
+              </a:rPr>
+              <a:t>リスクドリブンイテレーティブ</a:t>
+            </a:r>
+            <a:r>
+              <a:rPr lang="en-US" altLang="en-US" sz="900" dirty="0" smtClean="0">
+                <a:latin typeface="ヒラギノ角ゴ Pro W3"/>
+                <a:ea typeface="ヒラギノ角ゴ Pro W3"/>
+                <a:cs typeface="ヒラギノ角ゴ Pro W3"/>
+              </a:rPr>
+              <a:t>、</a:t>
+            </a:r>
+            <a:r>
+              <a:rPr lang="ja-JP" altLang="en-US" sz="900" dirty="0" smtClean="0">
+                <a:latin typeface="ヒラギノ角ゴ Pro W3"/>
+                <a:ea typeface="ヒラギノ角ゴ Pro W3"/>
+                <a:cs typeface="ヒラギノ角ゴ Pro W3"/>
+              </a:rPr>
+              <a:t>ウォータフォール</a:t>
+            </a:r>
+            <a:r>
+              <a:rPr lang="ja-JP" altLang="en-US" sz="900" dirty="0">
+                <a:latin typeface="ヒラギノ角ゴ Pro W3"/>
+                <a:ea typeface="ヒラギノ角ゴ Pro W3"/>
+                <a:cs typeface="ヒラギノ角ゴ Pro W3"/>
+              </a:rPr>
+              <a:t>、ユースケースドリブン開発</a:t>
+            </a:r>
+            <a:r>
+              <a:rPr lang="ja-JP" altLang="en-US" sz="900" dirty="0" smtClean="0">
+                <a:latin typeface="ヒラギノ角ゴ Pro W3"/>
+                <a:ea typeface="ヒラギノ角ゴ Pro W3"/>
+                <a:cs typeface="ヒラギノ角ゴ Pro W3"/>
+              </a:rPr>
+              <a:t>、アクセプタンステストドリブン</a:t>
+            </a:r>
+            <a:r>
+              <a:rPr lang="ja-JP" altLang="en-US" sz="900" dirty="0">
+                <a:latin typeface="ヒラギノ角ゴ Pro W3"/>
+                <a:ea typeface="ヒラギノ角ゴ Pro W3"/>
+                <a:cs typeface="ヒラギノ角ゴ Pro W3"/>
+              </a:rPr>
+              <a:t>開発</a:t>
+            </a:r>
+            <a:r>
+              <a:rPr lang="ja-JP" altLang="en-US" sz="900" dirty="0" smtClean="0">
+                <a:latin typeface="ヒラギノ角ゴ Pro W3"/>
+                <a:ea typeface="ヒラギノ角ゴ Pro W3"/>
+                <a:cs typeface="ヒラギノ角ゴ Pro W3"/>
+              </a:rPr>
+              <a:t>、継続的</a:t>
+            </a:r>
+            <a:r>
+              <a:rPr lang="ja-JP" altLang="en-US" sz="900" dirty="0">
+                <a:latin typeface="ヒラギノ角ゴ Pro W3"/>
+                <a:ea typeface="ヒラギノ角ゴ Pro W3"/>
+                <a:cs typeface="ヒラギノ角ゴ Pro W3"/>
+              </a:rPr>
+              <a:t>インテグレーション、テストドリブン開発を含む</a:t>
+            </a:r>
+          </a:p>
+          <a:p>
+            <a:r>
+              <a:rPr lang="ja-JP" altLang="en-US" sz="900" dirty="0">
+                <a:latin typeface="ヒラギノ角ゴ Pro W3"/>
+                <a:ea typeface="ヒラギノ角ゴ Pro W3"/>
+                <a:cs typeface="ヒラギノ角ゴ Pro W3"/>
+              </a:rPr>
+              <a:t>人気の高いマネジメントやテクニカルなプラクティスを採用することができる</a:t>
+            </a:r>
+            <a:r>
+              <a:rPr lang="ja-JP" altLang="en-US" sz="900" dirty="0" smtClean="0">
+                <a:latin typeface="ヒラギノ角ゴ Pro W3"/>
+                <a:ea typeface="ヒラギノ角ゴ Pro W3"/>
+                <a:cs typeface="ヒラギノ角ゴ Pro W3"/>
+              </a:rPr>
+              <a:t>。また</a:t>
+            </a:r>
+            <a:r>
+              <a:rPr lang="ja-JP" altLang="en-US" sz="900" dirty="0">
+                <a:latin typeface="ヒラギノ角ゴ Pro W3"/>
+                <a:ea typeface="ヒラギノ角ゴ Pro W3"/>
+                <a:cs typeface="ヒラギノ角ゴ Pro W3"/>
+              </a:rPr>
+              <a:t>、カーネルは新しく、革新的なソフトウェア製品の開発や</a:t>
+            </a:r>
+          </a:p>
+          <a:p>
+            <a:r>
+              <a:rPr lang="ja-JP" altLang="en-US" sz="900" dirty="0">
+                <a:latin typeface="ヒラギノ角ゴ Pro W3"/>
+                <a:ea typeface="ヒラギノ角ゴ Pro W3"/>
+                <a:cs typeface="ヒラギノ角ゴ Pro W3"/>
+              </a:rPr>
+              <a:t>既存のソフトウェア製品の強化、</a:t>
+            </a:r>
+            <a:r>
+              <a:rPr lang="ja-JP" altLang="en-US" sz="900" dirty="0" smtClean="0">
+                <a:latin typeface="ヒラギノ角ゴ Pro W3"/>
+                <a:ea typeface="ヒラギノ角ゴ Pro W3"/>
+                <a:cs typeface="ヒラギノ角ゴ Pro W3"/>
+              </a:rPr>
+              <a:t>メンテナンスに</a:t>
+            </a:r>
+            <a:r>
+              <a:rPr lang="ja-JP" altLang="en-US" sz="900" dirty="0">
+                <a:latin typeface="ヒラギノ角ゴ Pro W3"/>
+                <a:ea typeface="ヒラギノ角ゴ Pro W3"/>
+                <a:cs typeface="ヒラギノ角ゴ Pro W3"/>
+              </a:rPr>
+              <a:t>取り組んでいるチームを手助けできる</a:t>
+            </a:r>
+            <a:r>
+              <a:rPr lang="ja-JP" altLang="en-US" sz="900" dirty="0" smtClean="0">
+                <a:latin typeface="ヒラギノ角ゴ Pro W3"/>
+                <a:ea typeface="ヒラギノ角ゴ Pro W3"/>
+                <a:cs typeface="ヒラギノ角ゴ Pro W3"/>
+              </a:rPr>
+              <a:t>。さらに</a:t>
+            </a:r>
+            <a:r>
+              <a:rPr lang="ja-JP" altLang="en-US" sz="900" dirty="0">
+                <a:latin typeface="ヒラギノ角ゴ Pro W3"/>
+                <a:ea typeface="ヒラギノ角ゴ Pro W3"/>
+                <a:cs typeface="ヒラギノ角ゴ Pro W3"/>
+              </a:rPr>
+              <a:t>単独から</a:t>
+            </a:r>
+            <a:r>
+              <a:rPr lang="en-US" altLang="ja-JP" sz="900" dirty="0">
+                <a:latin typeface="ヒラギノ角ゴ Pro W3"/>
+                <a:ea typeface="ヒラギノ角ゴ Pro W3"/>
+                <a:cs typeface="ヒラギノ角ゴ Pro W3"/>
+              </a:rPr>
+              <a:t>1000</a:t>
+            </a:r>
+            <a:r>
+              <a:rPr lang="ja-JP" altLang="en-US" sz="900" dirty="0">
+                <a:latin typeface="ヒラギノ角ゴ Pro W3"/>
+                <a:ea typeface="ヒラギノ角ゴ Pro W3"/>
+                <a:cs typeface="ヒラギノ角ゴ Pro W3"/>
+              </a:rPr>
+              <a:t>人強のソフトウェアエンジニア</a:t>
+            </a:r>
+            <a:r>
+              <a:rPr lang="ja-JP" altLang="en-US" sz="900" dirty="0" smtClean="0">
+                <a:latin typeface="ヒラギノ角ゴ Pro W3"/>
+                <a:ea typeface="ヒラギノ角ゴ Pro W3"/>
+                <a:cs typeface="ヒラギノ角ゴ Pro W3"/>
+              </a:rPr>
+              <a:t>を擁する</a:t>
+            </a:r>
+            <a:r>
+              <a:rPr lang="ja-JP" altLang="en-US" sz="900" dirty="0">
+                <a:latin typeface="ヒラギノ角ゴ Pro W3"/>
+                <a:ea typeface="ヒラギノ角ゴ Pro W3"/>
+                <a:cs typeface="ヒラギノ角ゴ Pro W3"/>
+              </a:rPr>
+              <a:t>チームまで手助けすることができる。</a:t>
+            </a:r>
+            <a:endParaRPr lang="en-US" sz="900" dirty="0">
+              <a:latin typeface="ヒラギノ角ゴ Pro W3"/>
+              <a:ea typeface="ヒラギノ角ゴ Pro W3"/>
+              <a:cs typeface="ヒラギノ角ゴ Pro W3"/>
+            </a:endParaRPr>
           </a:p>
         </p:txBody>
       </p:sp>
@@ -10340,8 +10454,8 @@
         </p:nvSpPr>
         <p:spPr>
           <a:xfrm>
-            <a:off x="302336" y="526505"/>
-            <a:ext cx="1955111" cy="8833184"/>
+            <a:off x="100061" y="466934"/>
+            <a:ext cx="2257827" cy="8863960"/>
           </a:xfrm>
           <a:prstGeom prst="rect">
             <a:avLst/>
@@ -10355,367 +10469,778 @@
           <a:lstStyle/>
           <a:p>
             <a:r>
-              <a:rPr lang="en-US" sz="1200" baseline="30000" dirty="0">
-                <a:latin typeface="ヒラギノ角ゴ Pro W3"/>
-                <a:ea typeface="ヒラギノ角ゴ Pro W3"/>
-                <a:cs typeface="ヒラギノ角ゴ Pro W3"/>
-              </a:rPr>
-              <a:t>engineering programs.</a:t>
-            </a:r>
-            <a:br>
-              <a:rPr lang="en-US" sz="1200" baseline="30000" dirty="0">
-                <a:latin typeface="ヒラギノ角ゴ Pro W3"/>
-                <a:ea typeface="ヒラギノ角ゴ Pro W3"/>
-                <a:cs typeface="ヒラギノ角ゴ Pro W3"/>
-              </a:rPr>
-            </a:br>
-            <a:r>
-              <a:rPr lang="en-US" sz="1200" baseline="30000" dirty="0">
-                <a:latin typeface="ヒラギノ角ゴ Pro W3"/>
-                <a:ea typeface="ヒラギノ角ゴ Pro W3"/>
-                <a:cs typeface="ヒラギノ角ゴ Pro W3"/>
-              </a:rPr>
-              <a:t>For example, the kernel supports </a:t>
-            </a:r>
-          </a:p>
-          <a:p>
-            <a:r>
-              <a:rPr lang="en-US" sz="1200" baseline="30000" dirty="0">
-                <a:latin typeface="ヒラギノ角ゴ Pro W3"/>
-                <a:ea typeface="ヒラギノ角ゴ Pro W3"/>
-                <a:cs typeface="ヒラギノ角ゴ Pro W3"/>
-              </a:rPr>
-              <a:t>the values of the Agile Manifesto. With its focus on checklists and results, and its inherent practice independence, it values individuals and interactions over processes and tools. With its focus on the needs of professional software- development teams, it values the way of working and fulfilling team </a:t>
-            </a:r>
-            <a:r>
-              <a:rPr lang="en-US" sz="1200" baseline="30000" dirty="0" err="1">
-                <a:latin typeface="ヒラギノ角ゴ Pro W3"/>
-                <a:ea typeface="ヒラギノ角ゴ Pro W3"/>
-                <a:cs typeface="ヒラギノ角ゴ Pro W3"/>
-              </a:rPr>
-              <a:t>respon</a:t>
-            </a:r>
-            <a:r>
-              <a:rPr lang="en-US" sz="1200" baseline="30000" dirty="0">
-                <a:latin typeface="ヒラギノ角ゴ Pro W3"/>
-                <a:ea typeface="ヒラギノ角ゴ Pro W3"/>
-                <a:cs typeface="ヒラギノ角ゴ Pro W3"/>
-              </a:rPr>
-              <a:t>- </a:t>
-            </a:r>
-            <a:r>
-              <a:rPr lang="en-US" sz="1200" baseline="30000" dirty="0" err="1">
-                <a:latin typeface="ヒラギノ角ゴ Pro W3"/>
-                <a:ea typeface="ヒラギノ角ゴ Pro W3"/>
-                <a:cs typeface="ヒラギノ角ゴ Pro W3"/>
-              </a:rPr>
-              <a:t>sibilities</a:t>
-            </a:r>
-            <a:r>
-              <a:rPr lang="en-US" sz="1200" baseline="30000" dirty="0">
-                <a:latin typeface="ヒラギノ角ゴ Pro W3"/>
-                <a:ea typeface="ヒラギノ角ゴ Pro W3"/>
-                <a:cs typeface="ヒラギノ角ゴ Pro W3"/>
-              </a:rPr>
-              <a:t> over methods. </a:t>
-            </a:r>
-          </a:p>
-          <a:p>
-            <a:r>
-              <a:rPr lang="en-US" sz="1200" baseline="30000" dirty="0">
-                <a:latin typeface="ヒラギノ角ゴ Pro W3"/>
-                <a:ea typeface="ヒラギノ角ゴ Pro W3"/>
-                <a:cs typeface="ヒラギノ角ゴ Pro W3"/>
-              </a:rPr>
-              <a:t>The kernel does not in any way com- </a:t>
-            </a:r>
-            <a:r>
-              <a:rPr lang="en-US" sz="1200" baseline="30000" dirty="0" err="1">
-                <a:latin typeface="ヒラギノ角ゴ Pro W3"/>
-                <a:ea typeface="ヒラギノ角ゴ Pro W3"/>
-                <a:cs typeface="ヒラギノ角ゴ Pro W3"/>
-              </a:rPr>
-              <a:t>pete</a:t>
-            </a:r>
-            <a:r>
-              <a:rPr lang="en-US" sz="1200" baseline="30000" dirty="0">
-                <a:latin typeface="ヒラギノ角ゴ Pro W3"/>
-                <a:ea typeface="ヒラギノ角ゴ Pro W3"/>
-                <a:cs typeface="ヒラギノ角ゴ Pro W3"/>
-              </a:rPr>
-              <a:t> with existing methods, be they agile or anything else. On the contrary, the kernel is agnostic to a team’s </a:t>
-            </a:r>
-            <a:r>
-              <a:rPr lang="en-US" sz="1200" baseline="30000" dirty="0" err="1">
-                <a:latin typeface="ヒラギノ角ゴ Pro W3"/>
-                <a:ea typeface="ヒラギノ角ゴ Pro W3"/>
-                <a:cs typeface="ヒラギノ角ゴ Pro W3"/>
-              </a:rPr>
-              <a:t>cho</a:t>
-            </a:r>
-            <a:r>
-              <a:rPr lang="en-US" sz="1200" baseline="30000" dirty="0">
-                <a:latin typeface="ヒラギノ角ゴ Pro W3"/>
-                <a:ea typeface="ヒラギノ角ゴ Pro W3"/>
-                <a:cs typeface="ヒラギノ角ゴ Pro W3"/>
-              </a:rPr>
-              <a:t>- </a:t>
-            </a:r>
-            <a:r>
-              <a:rPr lang="en-US" sz="1200" baseline="30000" dirty="0" err="1">
-                <a:latin typeface="ヒラギノ角ゴ Pro W3"/>
-                <a:ea typeface="ヒラギノ角ゴ Pro W3"/>
-                <a:cs typeface="ヒラギノ角ゴ Pro W3"/>
-              </a:rPr>
-              <a:t>sen</a:t>
-            </a:r>
-            <a:r>
-              <a:rPr lang="en-US" sz="1200" baseline="30000" dirty="0">
-                <a:latin typeface="ヒラギノ角ゴ Pro W3"/>
-                <a:ea typeface="ヒラギノ角ゴ Pro W3"/>
-                <a:cs typeface="ヒラギノ角ゴ Pro W3"/>
-              </a:rPr>
-              <a:t> method. Even if a team is already using a particular method, the kernel can still help. Regardless of the meth- od used, as Robert Martin pointed out in his foreword to </a:t>
-            </a:r>
-            <a:r>
-              <a:rPr lang="en-US" sz="1200" i="1" baseline="30000" dirty="0">
-                <a:latin typeface="ヒラギノ角ゴ Pro W3"/>
-                <a:ea typeface="ヒラギノ角ゴ Pro W3"/>
-                <a:cs typeface="ヒラギノ角ゴ Pro W3"/>
-              </a:rPr>
-              <a:t>The Essence of Soft- ware Engineering, </a:t>
-            </a:r>
-            <a:r>
-              <a:rPr lang="en-US" sz="1200" baseline="30000" dirty="0">
-                <a:latin typeface="ヒラギノ角ゴ Pro W3"/>
-                <a:ea typeface="ヒラギノ角ゴ Pro W3"/>
-                <a:cs typeface="ヒラギノ角ゴ Pro W3"/>
-              </a:rPr>
-              <a:t>projects—even agile ones—can get out of kilter, and when they do, teams need to know more. This is where the real value of the </a:t>
-            </a:r>
-            <a:r>
-              <a:rPr lang="en-US" sz="1200" baseline="30000" dirty="0" err="1">
-                <a:latin typeface="ヒラギノ角ゴ Pro W3"/>
-                <a:ea typeface="ヒラギノ角ゴ Pro W3"/>
-                <a:cs typeface="ヒラギノ角ゴ Pro W3"/>
-              </a:rPr>
-              <a:t>ker</a:t>
-            </a:r>
-            <a:r>
-              <a:rPr lang="en-US" sz="1200" baseline="30000" dirty="0">
-                <a:latin typeface="ヒラギノ角ゴ Pro W3"/>
-                <a:ea typeface="ヒラギノ角ゴ Pro W3"/>
-                <a:cs typeface="ヒラギノ角ゴ Pro W3"/>
-              </a:rPr>
-              <a:t>- </a:t>
-            </a:r>
-            <a:r>
-              <a:rPr lang="en-US" sz="1200" baseline="30000" dirty="0" err="1">
-                <a:latin typeface="ヒラギノ角ゴ Pro W3"/>
-                <a:ea typeface="ヒラギノ角ゴ Pro W3"/>
-                <a:cs typeface="ヒラギノ角ゴ Pro W3"/>
-              </a:rPr>
-              <a:t>nel</a:t>
-            </a:r>
-            <a:r>
-              <a:rPr lang="en-US" sz="1200" baseline="30000" dirty="0">
-                <a:latin typeface="ヒラギノ角ゴ Pro W3"/>
-                <a:ea typeface="ヒラギノ角ゴ Pro W3"/>
-                <a:cs typeface="ヒラギノ角ゴ Pro W3"/>
-              </a:rPr>
-              <a:t> lies. It can guide a team in the ac- </a:t>
-            </a:r>
-            <a:r>
-              <a:rPr lang="en-US" sz="1200" baseline="30000" dirty="0" err="1">
-                <a:latin typeface="ヒラギノ角ゴ Pro W3"/>
-                <a:ea typeface="ヒラギノ角ゴ Pro W3"/>
-                <a:cs typeface="ヒラギノ角ゴ Pro W3"/>
-              </a:rPr>
-              <a:t>tions</a:t>
-            </a:r>
-            <a:r>
-              <a:rPr lang="en-US" sz="1200" baseline="30000" dirty="0">
-                <a:latin typeface="ヒラギノ角ゴ Pro W3"/>
-                <a:ea typeface="ヒラギノ角ゴ Pro W3"/>
-                <a:cs typeface="ヒラギノ角ゴ Pro W3"/>
-              </a:rPr>
-              <a:t> they need to take to get back on course, to extend their method, or to address a critical gap in their way of working. It focuses on the needs of the software professional and values the “use of methods” over “the description of method definitions” (as has been normal in the past). </a:t>
-            </a:r>
-          </a:p>
-          <a:p>
-            <a:r>
-              <a:rPr lang="en-US" sz="1200" baseline="30000" dirty="0">
-                <a:latin typeface="ヒラギノ角ゴ Pro W3"/>
-                <a:ea typeface="ヒラギノ角ゴ Pro W3"/>
-                <a:cs typeface="ヒラギノ角ゴ Pro W3"/>
-              </a:rPr>
-              <a:t>The kernel does not just support modern best practices; it also </a:t>
-            </a:r>
-            <a:r>
-              <a:rPr lang="en-US" sz="1200" baseline="30000" dirty="0" err="1">
-                <a:latin typeface="ヒラギノ角ゴ Pro W3"/>
-                <a:ea typeface="ヒラギノ角ゴ Pro W3"/>
-                <a:cs typeface="ヒラギノ角ゴ Pro W3"/>
-              </a:rPr>
-              <a:t>recogniz</a:t>
-            </a:r>
-            <a:r>
-              <a:rPr lang="en-US" sz="1200" baseline="30000" dirty="0">
-                <a:latin typeface="ヒラギノ角ゴ Pro W3"/>
-                <a:ea typeface="ヒラギノ角ゴ Pro W3"/>
-                <a:cs typeface="ヒラギノ角ゴ Pro W3"/>
-              </a:rPr>
-              <a:t>- </a:t>
-            </a:r>
-            <a:r>
-              <a:rPr lang="en-US" sz="1200" baseline="30000" dirty="0" err="1">
-                <a:latin typeface="ヒラギノ角ゴ Pro W3"/>
-                <a:ea typeface="ヒラギノ角ゴ Pro W3"/>
-                <a:cs typeface="ヒラギノ角ゴ Pro W3"/>
-              </a:rPr>
-              <a:t>es</a:t>
-            </a:r>
-            <a:r>
-              <a:rPr lang="en-US" sz="1200" baseline="30000" dirty="0">
-                <a:latin typeface="ヒラギノ角ゴ Pro W3"/>
-                <a:ea typeface="ヒラギノ角ゴ Pro W3"/>
-                <a:cs typeface="ヒラギノ角ゴ Pro W3"/>
-              </a:rPr>
-              <a:t> that a vast amount of software is al- ready developed and needs to be main- </a:t>
-            </a:r>
-            <a:r>
-              <a:rPr lang="en-US" sz="1200" baseline="30000" dirty="0" err="1">
-                <a:latin typeface="ヒラギノ角ゴ Pro W3"/>
-                <a:ea typeface="ヒラギノ角ゴ Pro W3"/>
-                <a:cs typeface="ヒラギノ角ゴ Pro W3"/>
-              </a:rPr>
-              <a:t>tained</a:t>
-            </a:r>
-            <a:r>
-              <a:rPr lang="en-US" sz="1200" baseline="30000" dirty="0">
-                <a:latin typeface="ヒラギノ角ゴ Pro W3"/>
-                <a:ea typeface="ヒラギノ角ゴ Pro W3"/>
-                <a:cs typeface="ヒラギノ角ゴ Pro W3"/>
-              </a:rPr>
-              <a:t>. It will live for decades and will have to be maintained in an efficient way. This means the way you work with this software will have to evolve along- side the software itself. New practices will need to be introduced in a way that complements the ones already in use. The kernel provides the </a:t>
-            </a:r>
-            <a:r>
-              <a:rPr lang="en-US" sz="1200" baseline="30000" dirty="0" err="1">
-                <a:latin typeface="ヒラギノ角ゴ Pro W3"/>
-                <a:ea typeface="ヒラギノ角ゴ Pro W3"/>
-                <a:cs typeface="ヒラギノ角ゴ Pro W3"/>
-              </a:rPr>
-              <a:t>mecha</a:t>
-            </a:r>
-            <a:r>
-              <a:rPr lang="en-US" sz="1200" baseline="30000" dirty="0">
-                <a:latin typeface="ヒラギノ角ゴ Pro W3"/>
-                <a:ea typeface="ヒラギノ角ゴ Pro W3"/>
-                <a:cs typeface="ヒラギノ角ゴ Pro W3"/>
-              </a:rPr>
-              <a:t>- </a:t>
-            </a:r>
-            <a:r>
-              <a:rPr lang="en-US" sz="1200" baseline="30000" dirty="0" err="1">
-                <a:latin typeface="ヒラギノ角ゴ Pro W3"/>
-                <a:ea typeface="ヒラギノ角ゴ Pro W3"/>
-                <a:cs typeface="ヒラギノ角ゴ Pro W3"/>
-              </a:rPr>
-              <a:t>nisms</a:t>
-            </a:r>
-            <a:r>
-              <a:rPr lang="en-US" sz="1200" baseline="30000" dirty="0">
-                <a:latin typeface="ヒラギノ角ゴ Pro W3"/>
-                <a:ea typeface="ヒラギノ角ゴ Pro W3"/>
-                <a:cs typeface="ヒラギノ角ゴ Pro W3"/>
-              </a:rPr>
-              <a:t> to migrate legacy methods from monolithic waterfall approaches to more modern agile ones and beyond, in an evolutionary way. It allows you to change your legacy methods practice- by-practice, while maintaining and </a:t>
-            </a:r>
-            <a:r>
-              <a:rPr lang="en-US" sz="1200" baseline="30000" dirty="0" err="1">
-                <a:latin typeface="ヒラギノ角ゴ Pro W3"/>
-                <a:ea typeface="ヒラギノ角ゴ Pro W3"/>
-                <a:cs typeface="ヒラギノ角ゴ Pro W3"/>
-              </a:rPr>
-              <a:t>im</a:t>
-            </a:r>
-            <a:r>
-              <a:rPr lang="en-US" sz="1200" baseline="30000" dirty="0">
-                <a:latin typeface="ヒラギノ角ゴ Pro W3"/>
-                <a:ea typeface="ヒラギノ角ゴ Pro W3"/>
-                <a:cs typeface="ヒラギノ角ゴ Pro W3"/>
-              </a:rPr>
-              <a:t>- proving the teams’ ability to deliver. </a:t>
-            </a:r>
-          </a:p>
-          <a:p>
-            <a:r>
-              <a:rPr lang="en-US" sz="1200" b="1" baseline="30000" dirty="0">
-                <a:latin typeface="ヒラギノ角ゴ Pro W3"/>
-                <a:ea typeface="ヒラギノ角ゴ Pro W3"/>
-                <a:cs typeface="ヒラギノ角ゴ Pro W3"/>
-              </a:rPr>
-              <a:t>How the kernel will help you. </a:t>
-            </a:r>
-            <a:r>
-              <a:rPr lang="en-US" sz="1200" baseline="30000" dirty="0">
-                <a:latin typeface="ヒラギノ角ゴ Pro W3"/>
-                <a:ea typeface="ヒラギノ角ゴ Pro W3"/>
-                <a:cs typeface="ヒラギノ角ゴ Pro W3"/>
-              </a:rPr>
-              <a:t>Use of the kernel has many benefits for ex- </a:t>
-            </a:r>
-            <a:r>
-              <a:rPr lang="en-US" sz="1200" baseline="30000" dirty="0" err="1">
-                <a:latin typeface="ヒラギノ角ゴ Pro W3"/>
-                <a:ea typeface="ヒラギノ角ゴ Pro W3"/>
-                <a:cs typeface="ヒラギノ角ゴ Pro W3"/>
-              </a:rPr>
-              <a:t>perienced</a:t>
-            </a:r>
-            <a:r>
-              <a:rPr lang="en-US" sz="1200" baseline="30000" dirty="0">
-                <a:latin typeface="ヒラギノ角ゴ Pro W3"/>
-                <a:ea typeface="ヒラギノ角ゴ Pro W3"/>
-                <a:cs typeface="ヒラギノ角ゴ Pro W3"/>
-              </a:rPr>
-              <a:t> or aspiring software </a:t>
-            </a:r>
-            <a:r>
-              <a:rPr lang="en-US" sz="1200" baseline="30000" dirty="0" err="1">
-                <a:latin typeface="ヒラギノ角ゴ Pro W3"/>
-                <a:ea typeface="ヒラギノ角ゴ Pro W3"/>
-                <a:cs typeface="ヒラギノ角ゴ Pro W3"/>
-              </a:rPr>
-              <a:t>profes</a:t>
-            </a:r>
-            <a:r>
-              <a:rPr lang="en-US" sz="1200" baseline="30000" dirty="0">
-                <a:latin typeface="ヒラギノ角ゴ Pro W3"/>
-                <a:ea typeface="ヒラギノ角ゴ Pro W3"/>
-                <a:cs typeface="ヒラギノ角ゴ Pro W3"/>
-              </a:rPr>
-              <a:t>- </a:t>
-            </a:r>
-            <a:r>
-              <a:rPr lang="en-US" sz="1200" baseline="30000" dirty="0" err="1">
-                <a:latin typeface="ヒラギノ角ゴ Pro W3"/>
-                <a:ea typeface="ヒラギノ角ゴ Pro W3"/>
-                <a:cs typeface="ヒラギノ角ゴ Pro W3"/>
-              </a:rPr>
-              <a:t>sionals</a:t>
-            </a:r>
-            <a:r>
-              <a:rPr lang="en-US" sz="1200" baseline="30000" dirty="0">
-                <a:latin typeface="ヒラギノ角ゴ Pro W3"/>
-                <a:ea typeface="ヒラギノ角ゴ Pro W3"/>
-                <a:cs typeface="ヒラギノ角ゴ Pro W3"/>
-              </a:rPr>
-              <a:t>, and for the teams they work in. For example, it helps you assess the progress and health of software- development endeavors, evaluate cur- rent practices, and improve your way </a:t>
-            </a:r>
-          </a:p>
-          <a:p>
-            <a:endParaRPr lang="en-US" sz="1200" baseline="30000" dirty="0">
+              <a:rPr lang="ja-JP" altLang="en-US" sz="900" dirty="0">
+                <a:latin typeface="ヒラギノ角ゴ Pro W3"/>
+                <a:ea typeface="ヒラギノ角ゴ Pro W3"/>
+                <a:cs typeface="ヒラギノ角ゴ Pro W3"/>
+              </a:rPr>
+              <a:t>例えば、カーネルはアジャイルマニフェスト</a:t>
+            </a:r>
+            <a:r>
+              <a:rPr lang="ja-JP" altLang="en-US" sz="900" dirty="0" smtClean="0">
+                <a:latin typeface="ヒラギノ角ゴ Pro W3"/>
+                <a:ea typeface="ヒラギノ角ゴ Pro W3"/>
+                <a:cs typeface="ヒラギノ角ゴ Pro W3"/>
+              </a:rPr>
+              <a:t>の有用性</a:t>
+            </a:r>
+            <a:r>
+              <a:rPr lang="ja-JP" altLang="en-US" sz="900" dirty="0">
+                <a:latin typeface="ヒラギノ角ゴ Pro W3"/>
+                <a:ea typeface="ヒラギノ角ゴ Pro W3"/>
+                <a:cs typeface="ヒラギノ角ゴ Pro W3"/>
+              </a:rPr>
+              <a:t>をサポートする。</a:t>
+            </a:r>
+          </a:p>
+          <a:p>
+            <a:r>
+              <a:rPr lang="ja-JP" altLang="en-US" sz="900" dirty="0">
+                <a:latin typeface="ヒラギノ角ゴ Pro W3"/>
+                <a:ea typeface="ヒラギノ角ゴ Pro W3"/>
+                <a:cs typeface="ヒラギノ角ゴ Pro W3"/>
+              </a:rPr>
+              <a:t>特定のプラクティスに依存</a:t>
+            </a:r>
+            <a:r>
+              <a:rPr lang="ja-JP" altLang="en-US" sz="900" dirty="0" smtClean="0">
+                <a:latin typeface="ヒラギノ角ゴ Pro W3"/>
+                <a:ea typeface="ヒラギノ角ゴ Pro W3"/>
+                <a:cs typeface="ヒラギノ角ゴ Pro W3"/>
+              </a:rPr>
+              <a:t>せず</a:t>
+            </a:r>
+            <a:r>
+              <a:rPr lang="ja-JP" altLang="en-US" sz="900" dirty="0" smtClean="0">
+                <a:latin typeface="ヒラギノ角ゴ Pro W3"/>
+                <a:ea typeface="ヒラギノ角ゴ Pro W3"/>
+                <a:cs typeface="ヒラギノ角ゴ Pro W3"/>
+              </a:rPr>
+              <a:t>、</a:t>
+            </a:r>
+            <a:r>
+              <a:rPr lang="ja-JP" altLang="en-US" sz="900" dirty="0" smtClean="0">
+                <a:latin typeface="ヒラギノ角ゴ Pro W3"/>
+                <a:ea typeface="ヒラギノ角ゴ Pro W3"/>
+                <a:cs typeface="ヒラギノ角ゴ Pro W3"/>
+              </a:rPr>
+              <a:t>チェックリストとプロジェクト</a:t>
+            </a:r>
+            <a:r>
+              <a:rPr lang="ja-JP" altLang="en-US" sz="900" dirty="0">
+                <a:latin typeface="ヒラギノ角ゴ Pro W3"/>
+                <a:ea typeface="ヒラギノ角ゴ Pro W3"/>
+                <a:cs typeface="ヒラギノ角ゴ Pro W3"/>
+              </a:rPr>
+              <a:t>の結果に焦点を当てることで</a:t>
+            </a:r>
+            <a:r>
+              <a:rPr lang="ja-JP" altLang="en-US" sz="900" dirty="0" smtClean="0">
+                <a:latin typeface="ヒラギノ角ゴ Pro W3"/>
+                <a:ea typeface="ヒラギノ角ゴ Pro W3"/>
+                <a:cs typeface="ヒラギノ角ゴ Pro W3"/>
+              </a:rPr>
+              <a:t>、プロセス</a:t>
+            </a:r>
+            <a:r>
+              <a:rPr lang="ja-JP" altLang="en-US" sz="900" dirty="0">
+                <a:latin typeface="ヒラギノ角ゴ Pro W3"/>
+                <a:ea typeface="ヒラギノ角ゴ Pro W3"/>
+                <a:cs typeface="ヒラギノ角ゴ Pro W3"/>
+              </a:rPr>
+              <a:t>やツールよりも個人や個人間の意思疎通</a:t>
+            </a:r>
+            <a:r>
+              <a:rPr lang="ja-JP" altLang="en-US" sz="900" dirty="0" smtClean="0">
+                <a:latin typeface="ヒラギノ角ゴ Pro W3"/>
+                <a:ea typeface="ヒラギノ角ゴ Pro W3"/>
+                <a:cs typeface="ヒラギノ角ゴ Pro W3"/>
+              </a:rPr>
+              <a:t>に有用性</a:t>
+            </a:r>
+            <a:r>
+              <a:rPr lang="ja-JP" altLang="en-US" sz="900" dirty="0">
+                <a:latin typeface="ヒラギノ角ゴ Pro W3"/>
+                <a:ea typeface="ヒラギノ角ゴ Pro W3"/>
+                <a:cs typeface="ヒラギノ角ゴ Pro W3"/>
+              </a:rPr>
+              <a:t>を見出している</a:t>
+            </a:r>
+            <a:r>
+              <a:rPr lang="ja-JP" altLang="en-US" sz="900" dirty="0" smtClean="0">
+                <a:latin typeface="ヒラギノ角ゴ Pro W3"/>
+                <a:ea typeface="ヒラギノ角ゴ Pro W3"/>
+                <a:cs typeface="ヒラギノ角ゴ Pro W3"/>
+              </a:rPr>
+              <a:t>。また</a:t>
+            </a:r>
+            <a:r>
+              <a:rPr lang="ja-JP" altLang="en-US" sz="900" dirty="0">
+                <a:latin typeface="ヒラギノ角ゴ Pro W3"/>
+                <a:ea typeface="ヒラギノ角ゴ Pro W3"/>
+                <a:cs typeface="ヒラギノ角ゴ Pro W3"/>
+              </a:rPr>
+              <a:t>、プロフェッショナルなソフトウェア開発チーム</a:t>
+            </a:r>
+            <a:r>
+              <a:rPr lang="ja-JP" altLang="en-US" sz="900" dirty="0" smtClean="0">
+                <a:latin typeface="ヒラギノ角ゴ Pro W3"/>
+                <a:ea typeface="ヒラギノ角ゴ Pro W3"/>
+                <a:cs typeface="ヒラギノ角ゴ Pro W3"/>
+              </a:rPr>
+              <a:t>のニーズ</a:t>
+            </a:r>
+            <a:r>
+              <a:rPr lang="ja-JP" altLang="en-US" sz="900" dirty="0">
+                <a:latin typeface="ヒラギノ角ゴ Pro W3"/>
+                <a:ea typeface="ヒラギノ角ゴ Pro W3"/>
+                <a:cs typeface="ヒラギノ角ゴ Pro W3"/>
+              </a:rPr>
+              <a:t>に焦点を当てることで、開発手法より</a:t>
+            </a:r>
+            <a:r>
+              <a:rPr lang="ja-JP" altLang="en-US" sz="900" dirty="0" smtClean="0">
+                <a:latin typeface="ヒラギノ角ゴ Pro W3"/>
+                <a:ea typeface="ヒラギノ角ゴ Pro W3"/>
+                <a:cs typeface="ヒラギノ角ゴ Pro W3"/>
+              </a:rPr>
+              <a:t>も仕事</a:t>
+            </a:r>
+            <a:r>
+              <a:rPr lang="ja-JP" altLang="en-US" sz="900" dirty="0">
+                <a:latin typeface="ヒラギノ角ゴ Pro W3"/>
+                <a:ea typeface="ヒラギノ角ゴ Pro W3"/>
+                <a:cs typeface="ヒラギノ角ゴ Pro W3"/>
+              </a:rPr>
+              <a:t>の仕方やチームの役割履行に有用性を見出している。</a:t>
+            </a:r>
+          </a:p>
+          <a:p>
+            <a:r>
+              <a:rPr lang="ja-JP" altLang="en-US" sz="900" dirty="0" smtClean="0">
+                <a:latin typeface="ヒラギノ角ゴ Pro W3"/>
+                <a:ea typeface="ヒラギノ角ゴ Pro W3"/>
+                <a:cs typeface="ヒラギノ角ゴ Pro W3"/>
+              </a:rPr>
+              <a:t>カーネル</a:t>
+            </a:r>
+            <a:r>
+              <a:rPr lang="ja-JP" altLang="en-US" sz="900" dirty="0">
+                <a:latin typeface="ヒラギノ角ゴ Pro W3"/>
+                <a:ea typeface="ヒラギノ角ゴ Pro W3"/>
+                <a:cs typeface="ヒラギノ角ゴ Pro W3"/>
+              </a:rPr>
+              <a:t>はアジャイルなどの既存の開発手法と競合しない</a:t>
+            </a:r>
+            <a:r>
+              <a:rPr lang="ja-JP" altLang="en-US" sz="900" dirty="0" smtClean="0">
+                <a:latin typeface="ヒラギノ角ゴ Pro W3"/>
+                <a:ea typeface="ヒラギノ角ゴ Pro W3"/>
+                <a:cs typeface="ヒラギノ角ゴ Pro W3"/>
+              </a:rPr>
+              <a:t>。むしろ</a:t>
+            </a:r>
+            <a:r>
+              <a:rPr lang="ja-JP" altLang="en-US" sz="900" dirty="0">
+                <a:latin typeface="ヒラギノ角ゴ Pro W3"/>
+                <a:ea typeface="ヒラギノ角ゴ Pro W3"/>
+                <a:cs typeface="ヒラギノ角ゴ Pro W3"/>
+              </a:rPr>
+              <a:t>カーネルはチームが選択する手法にとらわれることはない</a:t>
+            </a:r>
+            <a:r>
+              <a:rPr lang="ja-JP" altLang="en-US" sz="900" dirty="0" smtClean="0">
+                <a:latin typeface="ヒラギノ角ゴ Pro W3"/>
+                <a:ea typeface="ヒラギノ角ゴ Pro W3"/>
+                <a:cs typeface="ヒラギノ角ゴ Pro W3"/>
+              </a:rPr>
+              <a:t>。チーム</a:t>
+            </a:r>
+            <a:r>
+              <a:rPr lang="ja-JP" altLang="en-US" sz="900" dirty="0">
+                <a:latin typeface="ヒラギノ角ゴ Pro W3"/>
+                <a:ea typeface="ヒラギノ角ゴ Pro W3"/>
+                <a:cs typeface="ヒラギノ角ゴ Pro W3"/>
+              </a:rPr>
+              <a:t>がすでに特定の開発手法を使用している時でさえ</a:t>
+            </a:r>
+            <a:r>
+              <a:rPr lang="ja-JP" altLang="en-US" sz="900" dirty="0" smtClean="0">
+                <a:latin typeface="ヒラギノ角ゴ Pro W3"/>
+                <a:ea typeface="ヒラギノ角ゴ Pro W3"/>
+                <a:cs typeface="ヒラギノ角ゴ Pro W3"/>
+              </a:rPr>
+              <a:t>、カーネル</a:t>
+            </a:r>
+            <a:r>
+              <a:rPr lang="ja-JP" altLang="en-US" sz="900" dirty="0">
+                <a:latin typeface="ヒラギノ角ゴ Pro W3"/>
+                <a:ea typeface="ヒラギノ角ゴ Pro W3"/>
+                <a:cs typeface="ヒラギノ角ゴ Pro W3"/>
+              </a:rPr>
+              <a:t>は手助けする余地がある</a:t>
+            </a:r>
+            <a:r>
+              <a:rPr lang="ja-JP" altLang="en-US" sz="900" dirty="0" smtClean="0">
+                <a:latin typeface="ヒラギノ角ゴ Pro W3"/>
+                <a:ea typeface="ヒラギノ角ゴ Pro W3"/>
+                <a:cs typeface="ヒラギノ角ゴ Pro W3"/>
+              </a:rPr>
+              <a:t>。</a:t>
+            </a:r>
+            <a:r>
+              <a:rPr lang="en-US" altLang="ja-JP" sz="900" dirty="0" smtClean="0">
+                <a:latin typeface="ヒラギノ角ゴ Pro W3"/>
+                <a:ea typeface="ヒラギノ角ゴ Pro W3"/>
+                <a:cs typeface="ヒラギノ角ゴ Pro W3"/>
+              </a:rPr>
+              <a:t>Robert </a:t>
+            </a:r>
+            <a:r>
+              <a:rPr lang="en-US" altLang="ja-JP" sz="900" dirty="0">
+                <a:latin typeface="ヒラギノ角ゴ Pro W3"/>
+                <a:ea typeface="ヒラギノ角ゴ Pro W3"/>
+                <a:cs typeface="ヒラギノ角ゴ Pro W3"/>
+              </a:rPr>
+              <a:t>Martin</a:t>
+            </a:r>
+            <a:r>
+              <a:rPr lang="ja-JP" altLang="en-US" sz="900" dirty="0">
+                <a:latin typeface="ヒラギノ角ゴ Pro W3"/>
+                <a:ea typeface="ヒラギノ角ゴ Pro W3"/>
+                <a:cs typeface="ヒラギノ角ゴ Pro W3"/>
+              </a:rPr>
+              <a:t>が</a:t>
+            </a:r>
+            <a:r>
+              <a:rPr lang="en-US" altLang="ja-JP" sz="900" dirty="0">
+                <a:latin typeface="ヒラギノ角ゴ Pro W3"/>
+                <a:ea typeface="ヒラギノ角ゴ Pro W3"/>
+                <a:cs typeface="ヒラギノ角ゴ Pro W3"/>
+              </a:rPr>
+              <a:t>The </a:t>
+            </a:r>
+            <a:r>
+              <a:rPr lang="en-US" altLang="ja-JP" sz="900" dirty="0" err="1">
+                <a:latin typeface="ヒラギノ角ゴ Pro W3"/>
+                <a:ea typeface="ヒラギノ角ゴ Pro W3"/>
+                <a:cs typeface="ヒラギノ角ゴ Pro W3"/>
+              </a:rPr>
+              <a:t>Essense</a:t>
+            </a:r>
+            <a:r>
+              <a:rPr lang="en-US" altLang="ja-JP" sz="900" dirty="0">
+                <a:latin typeface="ヒラギノ角ゴ Pro W3"/>
+                <a:ea typeface="ヒラギノ角ゴ Pro W3"/>
+                <a:cs typeface="ヒラギノ角ゴ Pro W3"/>
+              </a:rPr>
+              <a:t> of Software Engineering</a:t>
+            </a:r>
+            <a:r>
+              <a:rPr lang="ja-JP" altLang="en-US" sz="900" dirty="0" smtClean="0">
+                <a:latin typeface="ヒラギノ角ゴ Pro W3"/>
+                <a:ea typeface="ヒラギノ角ゴ Pro W3"/>
+                <a:cs typeface="ヒラギノ角ゴ Pro W3"/>
+              </a:rPr>
+              <a:t>の序文</a:t>
+            </a:r>
+            <a:r>
+              <a:rPr lang="ja-JP" altLang="en-US" sz="900" dirty="0">
+                <a:latin typeface="ヒラギノ角ゴ Pro W3"/>
+                <a:ea typeface="ヒラギノ角ゴ Pro W3"/>
+                <a:cs typeface="ヒラギノ角ゴ Pro W3"/>
+              </a:rPr>
+              <a:t>で指摘しているように、使用された開発手法に</a:t>
+            </a:r>
+            <a:r>
+              <a:rPr lang="ja-JP" altLang="en-US" sz="900" dirty="0" smtClean="0">
+                <a:latin typeface="ヒラギノ角ゴ Pro W3"/>
+                <a:ea typeface="ヒラギノ角ゴ Pro W3"/>
+                <a:cs typeface="ヒラギノ角ゴ Pro W3"/>
+              </a:rPr>
+              <a:t>よらずチーム</a:t>
+            </a:r>
+            <a:r>
+              <a:rPr lang="ja-JP" altLang="en-US" sz="900" dirty="0">
+                <a:latin typeface="ヒラギノ角ゴ Pro W3"/>
+                <a:ea typeface="ヒラギノ角ゴ Pro W3"/>
+                <a:cs typeface="ヒラギノ角ゴ Pro W3"/>
+              </a:rPr>
+              <a:t>がさらに知ることを願い、実際に行動した時</a:t>
+            </a:r>
+            <a:r>
+              <a:rPr lang="ja-JP" altLang="en-US" sz="900" dirty="0" smtClean="0">
+                <a:latin typeface="ヒラギノ角ゴ Pro W3"/>
+                <a:ea typeface="ヒラギノ角ゴ Pro W3"/>
+                <a:cs typeface="ヒラギノ角ゴ Pro W3"/>
+              </a:rPr>
+              <a:t>にプロジェクト</a:t>
+            </a:r>
+            <a:r>
+              <a:rPr lang="ja-JP" altLang="en-US" sz="900" dirty="0">
+                <a:latin typeface="ヒラギノ角ゴ Pro W3"/>
+                <a:ea typeface="ヒラギノ角ゴ Pro W3"/>
+                <a:cs typeface="ヒラギノ角ゴ Pro W3"/>
+              </a:rPr>
+              <a:t>は不調から抜け出すことができる</a:t>
+            </a:r>
+            <a:r>
+              <a:rPr lang="ja-JP" altLang="en-US" sz="900" dirty="0" smtClean="0">
+                <a:latin typeface="ヒラギノ角ゴ Pro W3"/>
+                <a:ea typeface="ヒラギノ角ゴ Pro W3"/>
+                <a:cs typeface="ヒラギノ角ゴ Pro W3"/>
+              </a:rPr>
+              <a:t>。これ</a:t>
+            </a:r>
+            <a:r>
+              <a:rPr lang="ja-JP" altLang="en-US" sz="900" dirty="0">
+                <a:latin typeface="ヒラギノ角ゴ Pro W3"/>
+                <a:ea typeface="ヒラギノ角ゴ Pro W3"/>
+                <a:cs typeface="ヒラギノ角ゴ Pro W3"/>
+              </a:rPr>
+              <a:t>はカーネルの本質がどこにあるかを示している</a:t>
+            </a:r>
+            <a:r>
+              <a:rPr lang="ja-JP" altLang="en-US" sz="900" dirty="0" smtClean="0">
+                <a:latin typeface="ヒラギノ角ゴ Pro W3"/>
+                <a:ea typeface="ヒラギノ角ゴ Pro W3"/>
+                <a:cs typeface="ヒラギノ角ゴ Pro W3"/>
+              </a:rPr>
+              <a:t>。カーネル</a:t>
+            </a:r>
+            <a:r>
+              <a:rPr lang="ja-JP" altLang="en-US" sz="900" dirty="0">
+                <a:latin typeface="ヒラギノ角ゴ Pro W3"/>
+                <a:ea typeface="ヒラギノ角ゴ Pro W3"/>
+                <a:cs typeface="ヒラギノ角ゴ Pro W3"/>
+              </a:rPr>
+              <a:t>はチームが仕事の仕方における開発手法を拡張するため</a:t>
+            </a:r>
+            <a:r>
+              <a:rPr lang="ja-JP" altLang="en-US" sz="900" dirty="0" smtClean="0">
+                <a:latin typeface="ヒラギノ角ゴ Pro W3"/>
+                <a:ea typeface="ヒラギノ角ゴ Pro W3"/>
+                <a:cs typeface="ヒラギノ角ゴ Pro W3"/>
+              </a:rPr>
+              <a:t>、あるいは</a:t>
+            </a:r>
+            <a:r>
+              <a:rPr lang="ja-JP" altLang="en-US" sz="900" dirty="0">
+                <a:latin typeface="ヒラギノ角ゴ Pro W3"/>
+                <a:ea typeface="ヒラギノ角ゴ Pro W3"/>
+                <a:cs typeface="ヒラギノ角ゴ Pro W3"/>
+              </a:rPr>
+              <a:t>重要なギャップに対処するために立ち返る場所</a:t>
+            </a:r>
+            <a:r>
+              <a:rPr lang="ja-JP" altLang="en-US" sz="900" dirty="0" smtClean="0">
+                <a:latin typeface="ヒラギノ角ゴ Pro W3"/>
+                <a:ea typeface="ヒラギノ角ゴ Pro W3"/>
+                <a:cs typeface="ヒラギノ角ゴ Pro W3"/>
+              </a:rPr>
+              <a:t>を必要</a:t>
+            </a:r>
+            <a:r>
+              <a:rPr lang="ja-JP" altLang="en-US" sz="900" dirty="0">
+                <a:latin typeface="ヒラギノ角ゴ Pro W3"/>
+                <a:ea typeface="ヒラギノ角ゴ Pro W3"/>
+                <a:cs typeface="ヒラギノ角ゴ Pro W3"/>
+              </a:rPr>
+              <a:t>とする時に彼らが取るべき行動を導くことができる</a:t>
+            </a:r>
+            <a:r>
+              <a:rPr lang="ja-JP" altLang="en-US" sz="900" dirty="0" smtClean="0">
+                <a:latin typeface="ヒラギノ角ゴ Pro W3"/>
+                <a:ea typeface="ヒラギノ角ゴ Pro W3"/>
+                <a:cs typeface="ヒラギノ角ゴ Pro W3"/>
+              </a:rPr>
+              <a:t>。カーネル</a:t>
+            </a:r>
+            <a:r>
+              <a:rPr lang="ja-JP" altLang="en-US" sz="900" dirty="0">
+                <a:latin typeface="ヒラギノ角ゴ Pro W3"/>
+                <a:ea typeface="ヒラギノ角ゴ Pro W3"/>
+                <a:cs typeface="ヒラギノ角ゴ Pro W3"/>
+              </a:rPr>
+              <a:t>はソフトウェアの専門家のニーズに焦点を当て</a:t>
+            </a:r>
+            <a:r>
+              <a:rPr lang="ja-JP" altLang="en-US" sz="900" dirty="0" smtClean="0">
+                <a:latin typeface="ヒラギノ角ゴ Pro W3"/>
+                <a:ea typeface="ヒラギノ角ゴ Pro W3"/>
+                <a:cs typeface="ヒラギノ角ゴ Pro W3"/>
+              </a:rPr>
+              <a:t>、過去</a:t>
+            </a:r>
+            <a:r>
+              <a:rPr lang="ja-JP" altLang="en-US" sz="900" dirty="0">
+                <a:latin typeface="ヒラギノ角ゴ Pro W3"/>
+                <a:ea typeface="ヒラギノ角ゴ Pro W3"/>
+                <a:cs typeface="ヒラギノ角ゴ Pro W3"/>
+              </a:rPr>
+              <a:t>において正常だった開発手法定義の説明より</a:t>
+            </a:r>
+            <a:r>
+              <a:rPr lang="ja-JP" altLang="en-US" sz="900" dirty="0" smtClean="0">
+                <a:latin typeface="ヒラギノ角ゴ Pro W3"/>
+                <a:ea typeface="ヒラギノ角ゴ Pro W3"/>
+                <a:cs typeface="ヒラギノ角ゴ Pro W3"/>
+              </a:rPr>
+              <a:t>も開発</a:t>
+            </a:r>
+            <a:r>
+              <a:rPr lang="ja-JP" altLang="en-US" sz="900" dirty="0">
+                <a:latin typeface="ヒラギノ角ゴ Pro W3"/>
+                <a:ea typeface="ヒラギノ角ゴ Pro W3"/>
+                <a:cs typeface="ヒラギノ角ゴ Pro W3"/>
+              </a:rPr>
+              <a:t>方法を使用することに有用性を見出している</a:t>
+            </a:r>
+            <a:r>
+              <a:rPr lang="ja-JP" altLang="en-US" sz="900" dirty="0" smtClean="0">
+                <a:latin typeface="ヒラギノ角ゴ Pro W3"/>
+                <a:ea typeface="ヒラギノ角ゴ Pro W3"/>
+                <a:cs typeface="ヒラギノ角ゴ Pro W3"/>
+              </a:rPr>
+              <a:t>。カーネル</a:t>
+            </a:r>
+            <a:r>
+              <a:rPr lang="ja-JP" altLang="en-US" sz="900" dirty="0">
+                <a:latin typeface="ヒラギノ角ゴ Pro W3"/>
+                <a:ea typeface="ヒラギノ角ゴ Pro W3"/>
+                <a:cs typeface="ヒラギノ角ゴ Pro W3"/>
+              </a:rPr>
+              <a:t>は最新で最良のプラクティスをサポートしていないが</a:t>
+            </a:r>
+            <a:r>
+              <a:rPr lang="ja-JP" altLang="en-US" sz="900" dirty="0" smtClean="0">
+                <a:latin typeface="ヒラギノ角ゴ Pro W3"/>
+                <a:ea typeface="ヒラギノ角ゴ Pro W3"/>
+                <a:cs typeface="ヒラギノ角ゴ Pro W3"/>
+              </a:rPr>
+              <a:t>、膨大</a:t>
+            </a:r>
+            <a:r>
+              <a:rPr lang="ja-JP" altLang="en-US" sz="900" dirty="0">
+                <a:latin typeface="ヒラギノ角ゴ Pro W3"/>
+                <a:ea typeface="ヒラギノ角ゴ Pro W3"/>
+                <a:cs typeface="ヒラギノ角ゴ Pro W3"/>
+              </a:rPr>
+              <a:t>な量のソフトウェアがすでに開発され</a:t>
+            </a:r>
+            <a:r>
+              <a:rPr lang="ja-JP" altLang="en-US" sz="900" dirty="0" smtClean="0">
+                <a:latin typeface="ヒラギノ角ゴ Pro W3"/>
+                <a:ea typeface="ヒラギノ角ゴ Pro W3"/>
+                <a:cs typeface="ヒラギノ角ゴ Pro W3"/>
+              </a:rPr>
+              <a:t>、メンテナンス</a:t>
+            </a:r>
+            <a:r>
+              <a:rPr lang="ja-JP" altLang="en-US" sz="900" dirty="0">
+                <a:latin typeface="ヒラギノ角ゴ Pro W3"/>
+                <a:ea typeface="ヒラギノ角ゴ Pro W3"/>
+                <a:cs typeface="ヒラギノ角ゴ Pro W3"/>
+              </a:rPr>
+              <a:t>が必要とされていることを認識している</a:t>
+            </a:r>
+            <a:r>
+              <a:rPr lang="ja-JP" altLang="en-US" sz="900" dirty="0" smtClean="0">
+                <a:latin typeface="ヒラギノ角ゴ Pro W3"/>
+                <a:ea typeface="ヒラギノ角ゴ Pro W3"/>
+                <a:cs typeface="ヒラギノ角ゴ Pro W3"/>
+              </a:rPr>
+              <a:t>。それら</a:t>
+            </a:r>
+            <a:r>
+              <a:rPr lang="ja-JP" altLang="en-US" sz="900" dirty="0">
+                <a:latin typeface="ヒラギノ角ゴ Pro W3"/>
+                <a:ea typeface="ヒラギノ角ゴ Pro W3"/>
+                <a:cs typeface="ヒラギノ角ゴ Pro W3"/>
+              </a:rPr>
+              <a:t>は何十年も稼働し、効率的な方法で維持される必要がある</a:t>
+            </a:r>
+            <a:r>
+              <a:rPr lang="ja-JP" altLang="en-US" sz="900" dirty="0" smtClean="0">
+                <a:latin typeface="ヒラギノ角ゴ Pro W3"/>
+                <a:ea typeface="ヒラギノ角ゴ Pro W3"/>
+                <a:cs typeface="ヒラギノ角ゴ Pro W3"/>
+              </a:rPr>
+              <a:t>。これ</a:t>
+            </a:r>
+            <a:r>
+              <a:rPr lang="ja-JP" altLang="en-US" sz="900" dirty="0">
+                <a:latin typeface="ヒラギノ角ゴ Pro W3"/>
+                <a:ea typeface="ヒラギノ角ゴ Pro W3"/>
+                <a:cs typeface="ヒラギノ角ゴ Pro W3"/>
+              </a:rPr>
+              <a:t>はあなたの仕事の仕方がこのソフトウェア自身</a:t>
+            </a:r>
+            <a:r>
+              <a:rPr lang="ja-JP" altLang="en-US" sz="900" dirty="0" smtClean="0">
+                <a:latin typeface="ヒラギノ角ゴ Pro W3"/>
+                <a:ea typeface="ヒラギノ角ゴ Pro W3"/>
+                <a:cs typeface="ヒラギノ角ゴ Pro W3"/>
+              </a:rPr>
+              <a:t>と一緒</a:t>
+            </a:r>
+            <a:r>
+              <a:rPr lang="ja-JP" altLang="en-US" sz="900" dirty="0">
+                <a:latin typeface="ヒラギノ角ゴ Pro W3"/>
+                <a:ea typeface="ヒラギノ角ゴ Pro W3"/>
+                <a:cs typeface="ヒラギノ角ゴ Pro W3"/>
+              </a:rPr>
+              <a:t>に進化しなければならないことを意味しており</a:t>
+            </a:r>
+            <a:r>
+              <a:rPr lang="ja-JP" altLang="en-US" sz="900" dirty="0" smtClean="0">
+                <a:latin typeface="ヒラギノ角ゴ Pro W3"/>
+                <a:ea typeface="ヒラギノ角ゴ Pro W3"/>
+                <a:cs typeface="ヒラギノ角ゴ Pro W3"/>
+              </a:rPr>
+              <a:t>、新しい</a:t>
+            </a:r>
+            <a:r>
+              <a:rPr lang="ja-JP" altLang="en-US" sz="900" dirty="0">
+                <a:latin typeface="ヒラギノ角ゴ Pro W3"/>
+                <a:ea typeface="ヒラギノ角ゴ Pro W3"/>
+                <a:cs typeface="ヒラギノ角ゴ Pro W3"/>
+              </a:rPr>
+              <a:t>プラクティスはすでに使用されているプラクティス</a:t>
+            </a:r>
+            <a:r>
+              <a:rPr lang="ja-JP" altLang="en-US" sz="900" dirty="0" smtClean="0">
+                <a:latin typeface="ヒラギノ角ゴ Pro W3"/>
+                <a:ea typeface="ヒラギノ角ゴ Pro W3"/>
+                <a:cs typeface="ヒラギノ角ゴ Pro W3"/>
+              </a:rPr>
+              <a:t>を補完</a:t>
+            </a:r>
+            <a:r>
+              <a:rPr lang="ja-JP" altLang="en-US" sz="900" dirty="0">
+                <a:latin typeface="ヒラギノ角ゴ Pro W3"/>
+                <a:ea typeface="ヒラギノ角ゴ Pro W3"/>
+                <a:cs typeface="ヒラギノ角ゴ Pro W3"/>
+              </a:rPr>
+              <a:t>する形で導入できる必要がある</a:t>
+            </a:r>
+            <a:r>
+              <a:rPr lang="ja-JP" altLang="en-US" sz="900" dirty="0" smtClean="0">
+                <a:latin typeface="ヒラギノ角ゴ Pro W3"/>
+                <a:ea typeface="ヒラギノ角ゴ Pro W3"/>
+                <a:cs typeface="ヒラギノ角ゴ Pro W3"/>
+              </a:rPr>
+              <a:t>。カーネル</a:t>
+            </a:r>
+            <a:r>
+              <a:rPr lang="ja-JP" altLang="en-US" sz="900" dirty="0">
+                <a:latin typeface="ヒラギノ角ゴ Pro W3"/>
+                <a:ea typeface="ヒラギノ角ゴ Pro W3"/>
+                <a:cs typeface="ヒラギノ角ゴ Pro W3"/>
+              </a:rPr>
+              <a:t>はソフトウェア自身の進化の過程に</a:t>
+            </a:r>
+            <a:r>
+              <a:rPr lang="ja-JP" altLang="en-US" sz="900" dirty="0" smtClean="0">
+                <a:latin typeface="ヒラギノ角ゴ Pro W3"/>
+                <a:ea typeface="ヒラギノ角ゴ Pro W3"/>
+                <a:cs typeface="ヒラギノ角ゴ Pro W3"/>
+              </a:rPr>
+              <a:t>おいて既存</a:t>
+            </a:r>
+            <a:r>
+              <a:rPr lang="ja-JP" altLang="en-US" sz="900" dirty="0">
+                <a:latin typeface="ヒラギノ角ゴ Pro W3"/>
+                <a:ea typeface="ヒラギノ角ゴ Pro W3"/>
+                <a:cs typeface="ヒラギノ角ゴ Pro W3"/>
+              </a:rPr>
+              <a:t>の開発手法を</a:t>
+            </a:r>
+            <a:r>
+              <a:rPr lang="ja-JP" altLang="en-US" sz="900" dirty="0" smtClean="0">
+                <a:latin typeface="ヒラギノ角ゴ Pro W3"/>
+                <a:ea typeface="ヒラギノ角ゴ Pro W3"/>
+                <a:cs typeface="ヒラギノ角ゴ Pro W3"/>
+              </a:rPr>
+              <a:t>モノシリックなウォータフローアプローチからより</a:t>
+            </a:r>
+            <a:r>
+              <a:rPr lang="ja-JP" altLang="en-US" sz="900" dirty="0">
+                <a:latin typeface="ヒラギノ角ゴ Pro W3"/>
+                <a:ea typeface="ヒラギノ角ゴ Pro W3"/>
+                <a:cs typeface="ヒラギノ角ゴ Pro W3"/>
+              </a:rPr>
+              <a:t>現代的なアジャイル、さらにそれより先の開発手法</a:t>
+            </a:r>
+            <a:r>
+              <a:rPr lang="ja-JP" altLang="en-US" sz="900" dirty="0" smtClean="0">
+                <a:latin typeface="ヒラギノ角ゴ Pro W3"/>
+                <a:ea typeface="ヒラギノ角ゴ Pro W3"/>
+                <a:cs typeface="ヒラギノ角ゴ Pro W3"/>
+              </a:rPr>
+              <a:t>に移行</a:t>
+            </a:r>
+            <a:r>
+              <a:rPr lang="ja-JP" altLang="en-US" sz="900" dirty="0">
+                <a:latin typeface="ヒラギノ角ゴ Pro W3"/>
+                <a:ea typeface="ヒラギノ角ゴ Pro W3"/>
+                <a:cs typeface="ヒラギノ角ゴ Pro W3"/>
+              </a:rPr>
+              <a:t>させるためのメカニズムを提供する</a:t>
+            </a:r>
+            <a:r>
+              <a:rPr lang="ja-JP" altLang="en-US" sz="900" dirty="0" smtClean="0">
+                <a:latin typeface="ヒラギノ角ゴ Pro W3"/>
+                <a:ea typeface="ヒラギノ角ゴ Pro W3"/>
+                <a:cs typeface="ヒラギノ角ゴ Pro W3"/>
+              </a:rPr>
+              <a:t>。これ</a:t>
+            </a:r>
+            <a:r>
+              <a:rPr lang="ja-JP" altLang="en-US" sz="900" dirty="0">
+                <a:latin typeface="ヒラギノ角ゴ Pro W3"/>
+                <a:ea typeface="ヒラギノ角ゴ Pro W3"/>
+                <a:cs typeface="ヒラギノ角ゴ Pro W3"/>
+              </a:rPr>
+              <a:t>はチームの実行力を維持、向上</a:t>
+            </a:r>
+            <a:r>
+              <a:rPr lang="ja-JP" altLang="en-US" sz="900" dirty="0" smtClean="0">
+                <a:latin typeface="ヒラギノ角ゴ Pro W3"/>
+                <a:ea typeface="ヒラギノ角ゴ Pro W3"/>
+                <a:cs typeface="ヒラギノ角ゴ Pro W3"/>
+              </a:rPr>
+              <a:t>させながら実践</a:t>
+            </a:r>
+            <a:r>
+              <a:rPr lang="ja-JP" altLang="en-US" sz="900" dirty="0">
+                <a:latin typeface="ヒラギノ角ゴ Pro W3"/>
+                <a:ea typeface="ヒラギノ角ゴ Pro W3"/>
+                <a:cs typeface="ヒラギノ角ゴ Pro W3"/>
+              </a:rPr>
+              <a:t>を繰り返すことで既存の開発手法が変化できることを示している。</a:t>
+            </a:r>
+          </a:p>
+          <a:p>
+            <a:endParaRPr lang="en-US" sz="900" b="1" dirty="0" smtClean="0">
+              <a:latin typeface="ヒラギノ角ゴ Pro W3"/>
+              <a:ea typeface="ヒラギノ角ゴ Pro W3"/>
+              <a:cs typeface="ヒラギノ角ゴ Pro W3"/>
+            </a:endParaRPr>
+          </a:p>
+          <a:p>
+            <a:r>
+              <a:rPr lang="ja-JP" altLang="en-US" sz="1050" b="1" dirty="0">
+                <a:latin typeface="ヒラギノ角ゴ Pro W3"/>
+                <a:ea typeface="ヒラギノ角ゴ Pro W3"/>
+                <a:cs typeface="ヒラギノ角ゴ Pro W3"/>
+              </a:rPr>
+              <a:t>カーネルはあなたをどう助けてくれるか？</a:t>
+            </a:r>
+            <a:endParaRPr lang="en-US" sz="1050" b="1" dirty="0">
+              <a:latin typeface="ヒラギノ角ゴ Pro W3"/>
+              <a:ea typeface="ヒラギノ角ゴ Pro W3"/>
+              <a:cs typeface="ヒラギノ角ゴ Pro W3"/>
+            </a:endParaRPr>
+          </a:p>
+          <a:p>
+            <a:r>
+              <a:rPr lang="ja-JP" altLang="en-US" sz="900" dirty="0">
+                <a:latin typeface="ヒラギノ角ゴ Pro W3"/>
+                <a:ea typeface="ヒラギノ角ゴ Pro W3"/>
+                <a:cs typeface="ヒラギノ角ゴ Pro W3"/>
+              </a:rPr>
+              <a:t>カーネルの使用は経験豊富なソフトウェア開発者</a:t>
+            </a:r>
+            <a:r>
+              <a:rPr lang="ja-JP" altLang="en-US" sz="900" dirty="0" smtClean="0">
+                <a:latin typeface="ヒラギノ角ゴ Pro W3"/>
+                <a:ea typeface="ヒラギノ角ゴ Pro W3"/>
+                <a:cs typeface="ヒラギノ角ゴ Pro W3"/>
+              </a:rPr>
+              <a:t>や意欲的</a:t>
+            </a:r>
+            <a:r>
+              <a:rPr lang="ja-JP" altLang="en-US" sz="900" dirty="0">
+                <a:latin typeface="ヒラギノ角ゴ Pro W3"/>
+                <a:ea typeface="ヒラギノ角ゴ Pro W3"/>
+                <a:cs typeface="ヒラギノ角ゴ Pro W3"/>
+              </a:rPr>
+              <a:t>なソフトウェア開発者、そして彼らが参加</a:t>
+            </a:r>
+            <a:r>
+              <a:rPr lang="ja-JP" altLang="en-US" sz="900" dirty="0" smtClean="0">
+                <a:latin typeface="ヒラギノ角ゴ Pro W3"/>
+                <a:ea typeface="ヒラギノ角ゴ Pro W3"/>
+                <a:cs typeface="ヒラギノ角ゴ Pro W3"/>
+              </a:rPr>
+              <a:t>するチーム</a:t>
+            </a:r>
+            <a:r>
+              <a:rPr lang="ja-JP" altLang="en-US" sz="900" dirty="0">
+                <a:latin typeface="ヒラギノ角ゴ Pro W3"/>
+                <a:ea typeface="ヒラギノ角ゴ Pro W3"/>
+                <a:cs typeface="ヒラギノ角ゴ Pro W3"/>
+              </a:rPr>
+              <a:t>に多くの利益を与える。例えば、カーネル</a:t>
+            </a:r>
+            <a:r>
+              <a:rPr lang="ja-JP" altLang="en-US" sz="900" dirty="0" smtClean="0">
+                <a:latin typeface="ヒラギノ角ゴ Pro W3"/>
+                <a:ea typeface="ヒラギノ角ゴ Pro W3"/>
+                <a:cs typeface="ヒラギノ角ゴ Pro W3"/>
+              </a:rPr>
+              <a:t>はソフトウェア</a:t>
+            </a:r>
+            <a:r>
+              <a:rPr lang="ja-JP" altLang="en-US" sz="900" dirty="0">
+                <a:latin typeface="ヒラギノ角ゴ Pro W3"/>
+                <a:ea typeface="ヒラギノ角ゴ Pro W3"/>
+                <a:cs typeface="ヒラギノ角ゴ Pro W3"/>
+              </a:rPr>
+              <a:t>開発活動の進展や健康状態の診断</a:t>
+            </a:r>
+            <a:r>
+              <a:rPr lang="ja-JP" altLang="en-US" sz="900" dirty="0" smtClean="0">
+                <a:latin typeface="ヒラギノ角ゴ Pro W3"/>
+                <a:ea typeface="ヒラギノ角ゴ Pro W3"/>
+                <a:cs typeface="ヒラギノ角ゴ Pro W3"/>
+              </a:rPr>
+              <a:t>、現在</a:t>
+            </a:r>
+            <a:r>
+              <a:rPr lang="ja-JP" altLang="en-US" sz="900" dirty="0">
+                <a:latin typeface="ヒラギノ角ゴ Pro W3"/>
+                <a:ea typeface="ヒラギノ角ゴ Pro W3"/>
+                <a:cs typeface="ヒラギノ角ゴ Pro W3"/>
+              </a:rPr>
+              <a:t>取り組んでいるプラクティスの評価</a:t>
+            </a:r>
+            <a:r>
+              <a:rPr lang="ja-JP" altLang="en-US" sz="900" dirty="0" smtClean="0">
+                <a:latin typeface="ヒラギノ角ゴ Pro W3"/>
+                <a:ea typeface="ヒラギノ角ゴ Pro W3"/>
+                <a:cs typeface="ヒラギノ角ゴ Pro W3"/>
+              </a:rPr>
+              <a:t>、そして</a:t>
+            </a:r>
+            <a:r>
+              <a:rPr lang="ja-JP" altLang="en-US" sz="900" dirty="0">
+                <a:latin typeface="ヒラギノ角ゴ Pro W3"/>
+                <a:ea typeface="ヒラギノ角ゴ Pro W3"/>
+                <a:cs typeface="ヒラギノ角ゴ Pro W3"/>
+              </a:rPr>
+              <a:t>仕事の仕方の改善を手助けしてくれる</a:t>
+            </a:r>
+            <a:r>
+              <a:rPr lang="ja-JP" altLang="en-US" sz="900" dirty="0" smtClean="0">
+                <a:latin typeface="ヒラギノ角ゴ Pro W3"/>
+                <a:ea typeface="ヒラギノ角ゴ Pro W3"/>
+                <a:cs typeface="ヒラギノ角ゴ Pro W3"/>
+              </a:rPr>
+              <a:t>。</a:t>
+            </a:r>
+            <a:endParaRPr lang="en-US" sz="900" dirty="0" smtClean="0">
               <a:latin typeface="ヒラギノ角ゴ Pro W3"/>
               <a:ea typeface="ヒラギノ角ゴ Pro W3"/>
               <a:cs typeface="ヒラギノ角ゴ Pro W3"/>
@@ -10731,8 +11256,8 @@
         </p:nvSpPr>
         <p:spPr>
           <a:xfrm>
-            <a:off x="2458668" y="526505"/>
-            <a:ext cx="2129704" cy="5016760"/>
+            <a:off x="2375942" y="466934"/>
+            <a:ext cx="2232586" cy="5355311"/>
           </a:xfrm>
           <a:prstGeom prst="rect">
             <a:avLst/>
@@ -10746,341 +11271,340 @@
           <a:lstStyle/>
           <a:p>
             <a:r>
-              <a:rPr lang="en-US" sz="1200" baseline="30000" dirty="0">
-                <a:latin typeface="ヒラギノ角ゴ Pro W3"/>
-                <a:ea typeface="ヒラギノ角ゴ Pro W3"/>
-                <a:cs typeface="ヒラギノ角ゴ Pro W3"/>
-              </a:rPr>
-              <a:t>of working. It also helps you improve communication, move more easily be- tween teams, and adopt new ideas. It will help the industry as a whole by </a:t>
-            </a:r>
-            <a:r>
-              <a:rPr lang="en-US" sz="1200" baseline="30000" dirty="0" err="1">
-                <a:latin typeface="ヒラギノ角ゴ Pro W3"/>
-                <a:ea typeface="ヒラギノ角ゴ Pro W3"/>
-                <a:cs typeface="ヒラギノ角ゴ Pro W3"/>
-              </a:rPr>
-              <a:t>im</a:t>
-            </a:r>
-            <a:r>
-              <a:rPr lang="en-US" sz="1200" baseline="30000" dirty="0">
-                <a:latin typeface="ヒラギノ角ゴ Pro W3"/>
-                <a:ea typeface="ヒラギノ角ゴ Pro W3"/>
-                <a:cs typeface="ヒラギノ角ゴ Pro W3"/>
-              </a:rPr>
-              <a:t>- proving interoperability among teams, suppliers, and development </a:t>
-            </a:r>
-            <a:r>
-              <a:rPr lang="en-US" sz="1200" baseline="30000" dirty="0" err="1">
-                <a:latin typeface="ヒラギノ角ゴ Pro W3"/>
-                <a:ea typeface="ヒラギノ角ゴ Pro W3"/>
-                <a:cs typeface="ヒラギノ角ゴ Pro W3"/>
-              </a:rPr>
-              <a:t>organiza</a:t>
-            </a:r>
-            <a:r>
-              <a:rPr lang="en-US" sz="1200" baseline="30000" dirty="0">
-                <a:latin typeface="ヒラギノ角ゴ Pro W3"/>
-                <a:ea typeface="ヒラギノ角ゴ Pro W3"/>
-                <a:cs typeface="ヒラギノ角ゴ Pro W3"/>
-              </a:rPr>
-              <a:t>- </a:t>
-            </a:r>
-            <a:r>
-              <a:rPr lang="en-US" sz="1200" baseline="30000" dirty="0" err="1">
-                <a:latin typeface="ヒラギノ角ゴ Pro W3"/>
-                <a:ea typeface="ヒラギノ角ゴ Pro W3"/>
-                <a:cs typeface="ヒラギノ角ゴ Pro W3"/>
-              </a:rPr>
-              <a:t>tions</a:t>
-            </a:r>
-            <a:r>
-              <a:rPr lang="en-US" sz="1200" baseline="30000" dirty="0">
-                <a:latin typeface="ヒラギノ角ゴ Pro W3"/>
-                <a:ea typeface="ヒラギノ角ゴ Pro W3"/>
-                <a:cs typeface="ヒラギノ角ゴ Pro W3"/>
-              </a:rPr>
-              <a:t>.</a:t>
-            </a:r>
-          </a:p>
-          <a:p>
-            <a:r>
-              <a:rPr lang="en-US" sz="1200" baseline="30000" dirty="0">
-                <a:latin typeface="ヒラギノ角ゴ Pro W3"/>
-                <a:ea typeface="ヒラギノ角ゴ Pro W3"/>
-                <a:cs typeface="ヒラギノ角ゴ Pro W3"/>
-              </a:rPr>
-              <a:t>By providing a practice-</a:t>
-            </a:r>
-            <a:r>
-              <a:rPr lang="en-US" sz="1200" baseline="30000" dirty="0" err="1">
-                <a:latin typeface="ヒラギノ角ゴ Pro W3"/>
-                <a:ea typeface="ヒラギノ角ゴ Pro W3"/>
-                <a:cs typeface="ヒラギノ角ゴ Pro W3"/>
-              </a:rPr>
-              <a:t>indepen</a:t>
-            </a:r>
-            <a:r>
-              <a:rPr lang="en-US" sz="1200" baseline="30000" dirty="0">
-                <a:latin typeface="ヒラギノ角ゴ Pro W3"/>
-                <a:ea typeface="ヒラギノ角ゴ Pro W3"/>
-                <a:cs typeface="ヒラギノ角ゴ Pro W3"/>
-              </a:rPr>
-              <a:t>- dent foundation for the definition of software methods, the kernel also has the power completely to transform the way that methods are defined and </a:t>
-            </a:r>
-            <a:r>
-              <a:rPr lang="en-US" sz="1200" baseline="30000" dirty="0" err="1">
-                <a:latin typeface="ヒラギノ角ゴ Pro W3"/>
-                <a:ea typeface="ヒラギノ角ゴ Pro W3"/>
-                <a:cs typeface="ヒラギノ角ゴ Pro W3"/>
-              </a:rPr>
-              <a:t>prac</a:t>
-            </a:r>
-            <a:r>
-              <a:rPr lang="en-US" sz="1200" baseline="30000" dirty="0">
-                <a:latin typeface="ヒラギノ角ゴ Pro W3"/>
-                <a:ea typeface="ヒラギノ角ゴ Pro W3"/>
-                <a:cs typeface="ヒラギノ角ゴ Pro W3"/>
-              </a:rPr>
-              <a:t>- </a:t>
-            </a:r>
-            <a:r>
-              <a:rPr lang="en-US" sz="1200" baseline="30000" dirty="0" err="1">
-                <a:latin typeface="ヒラギノ角ゴ Pro W3"/>
-                <a:ea typeface="ヒラギノ角ゴ Pro W3"/>
-                <a:cs typeface="ヒラギノ角ゴ Pro W3"/>
-              </a:rPr>
-              <a:t>tices</a:t>
-            </a:r>
-            <a:r>
-              <a:rPr lang="en-US" sz="1200" baseline="30000" dirty="0">
-                <a:latin typeface="ヒラギノ角ゴ Pro W3"/>
-                <a:ea typeface="ヒラギノ角ゴ Pro W3"/>
-                <a:cs typeface="ヒラギノ角ゴ Pro W3"/>
-              </a:rPr>
-              <a:t> are shared. For example, by allow- </a:t>
-            </a:r>
-            <a:r>
-              <a:rPr lang="en-US" sz="1200" baseline="30000" dirty="0" err="1">
-                <a:latin typeface="ヒラギノ角ゴ Pro W3"/>
-                <a:ea typeface="ヒラギノ角ゴ Pro W3"/>
-                <a:cs typeface="ヒラギノ角ゴ Pro W3"/>
-              </a:rPr>
-              <a:t>ing</a:t>
-            </a:r>
-            <a:r>
-              <a:rPr lang="en-US" sz="1200" baseline="30000" dirty="0">
-                <a:latin typeface="ヒラギノ角ゴ Pro W3"/>
-                <a:ea typeface="ヒラギノ角ゴ Pro W3"/>
-                <a:cs typeface="ヒラギノ角ゴ Pro W3"/>
-              </a:rPr>
-              <a:t> teams to mix and match practices from different sources to build and </a:t>
-            </a:r>
-            <a:r>
-              <a:rPr lang="en-US" sz="1200" baseline="30000" dirty="0" err="1">
-                <a:latin typeface="ヒラギノ角ゴ Pro W3"/>
-                <a:ea typeface="ヒラギノ角ゴ Pro W3"/>
-                <a:cs typeface="ヒラギノ角ゴ Pro W3"/>
-              </a:rPr>
-              <a:t>im</a:t>
-            </a:r>
-            <a:r>
-              <a:rPr lang="en-US" sz="1200" baseline="30000" dirty="0">
-                <a:latin typeface="ヒラギノ角ゴ Pro W3"/>
-                <a:ea typeface="ヒラギノ角ゴ Pro W3"/>
-                <a:cs typeface="ヒラギノ角ゴ Pro W3"/>
-              </a:rPr>
-              <a:t>- prove their way of working, the kernel addresses two of the key </a:t>
-            </a:r>
-            <a:r>
-              <a:rPr lang="en-US" sz="1200" baseline="30000" dirty="0" err="1">
-                <a:latin typeface="ヒラギノ角ゴ Pro W3"/>
-                <a:ea typeface="ヒラギノ角ゴ Pro W3"/>
-                <a:cs typeface="ヒラギノ角ゴ Pro W3"/>
-              </a:rPr>
-              <a:t>methodologi</a:t>
-            </a:r>
-            <a:r>
-              <a:rPr lang="en-US" sz="1200" baseline="30000" dirty="0">
-                <a:latin typeface="ヒラギノ角ゴ Pro W3"/>
-                <a:ea typeface="ヒラギノ角ゴ Pro W3"/>
-                <a:cs typeface="ヒラギノ角ゴ Pro W3"/>
-              </a:rPr>
-              <a:t>- </a:t>
-            </a:r>
-            <a:r>
-              <a:rPr lang="en-US" sz="1200" baseline="30000" dirty="0" err="1">
-                <a:latin typeface="ヒラギノ角ゴ Pro W3"/>
-                <a:ea typeface="ヒラギノ角ゴ Pro W3"/>
-                <a:cs typeface="ヒラギノ角ゴ Pro W3"/>
-              </a:rPr>
-              <a:t>cal</a:t>
-            </a:r>
-            <a:r>
-              <a:rPr lang="en-US" sz="1200" baseline="30000" dirty="0">
-                <a:latin typeface="ヒラギノ角ゴ Pro W3"/>
-                <a:ea typeface="ヒラギノ角ゴ Pro W3"/>
-                <a:cs typeface="ヒラギノ角ゴ Pro W3"/>
-              </a:rPr>
-              <a:t> problems facing the industry:</a:t>
-            </a:r>
-          </a:p>
-          <a:p>
-            <a:r>
-              <a:rPr lang="en-US" sz="1200" baseline="30000" dirty="0">
-                <a:latin typeface="ヒラギノ角ゴ Pro W3"/>
-                <a:ea typeface="ヒラギノ角ゴ Pro W3"/>
-                <a:cs typeface="ヒラギノ角ゴ Pro W3"/>
-              </a:rPr>
-              <a:t>˲ Teams are no longer trapped by their methods; they can continuously improve their way of working by adding or removing practices when the </a:t>
-            </a:r>
-            <a:r>
-              <a:rPr lang="en-US" sz="1200" baseline="30000" dirty="0" err="1">
-                <a:latin typeface="ヒラギノ角ゴ Pro W3"/>
-                <a:ea typeface="ヒラギノ角ゴ Pro W3"/>
-                <a:cs typeface="ヒラギノ角ゴ Pro W3"/>
-              </a:rPr>
-              <a:t>situa</a:t>
-            </a:r>
-            <a:r>
-              <a:rPr lang="en-US" sz="1200" baseline="30000" dirty="0">
-                <a:latin typeface="ヒラギノ角ゴ Pro W3"/>
-                <a:ea typeface="ヒラギノ角ゴ Pro W3"/>
-                <a:cs typeface="ヒラギノ角ゴ Pro W3"/>
-              </a:rPr>
-              <a:t>- </a:t>
-            </a:r>
-            <a:r>
-              <a:rPr lang="en-US" sz="1200" baseline="30000" dirty="0" err="1">
-                <a:latin typeface="ヒラギノ角ゴ Pro W3"/>
-                <a:ea typeface="ヒラギノ角ゴ Pro W3"/>
-                <a:cs typeface="ヒラギノ角ゴ Pro W3"/>
-              </a:rPr>
-              <a:t>tion</a:t>
-            </a:r>
-            <a:r>
-              <a:rPr lang="en-US" sz="1200" baseline="30000" dirty="0">
-                <a:latin typeface="ヒラギノ角ゴ Pro W3"/>
-                <a:ea typeface="ヒラギノ角ゴ Pro W3"/>
-                <a:cs typeface="ヒラギノ角ゴ Pro W3"/>
-              </a:rPr>
-              <a:t> demands.</a:t>
-            </a:r>
-          </a:p>
-          <a:p>
-            <a:r>
-              <a:rPr lang="en-US" sz="1200" baseline="30000" dirty="0">
-                <a:latin typeface="ヒラギノ角ゴ Pro W3"/>
-                <a:ea typeface="ヒラギノ角ゴ Pro W3"/>
-                <a:cs typeface="ヒラギノ角ゴ Pro W3"/>
-              </a:rPr>
-              <a:t>˲ Methodologists no longer need to waste time describing complete meth- </a:t>
-            </a:r>
-            <a:r>
-              <a:rPr lang="en-US" sz="1200" baseline="30000" dirty="0" err="1">
-                <a:latin typeface="ヒラギノ角ゴ Pro W3"/>
-                <a:ea typeface="ヒラギノ角ゴ Pro W3"/>
-                <a:cs typeface="ヒラギノ角ゴ Pro W3"/>
-              </a:rPr>
-              <a:t>ods</a:t>
-            </a:r>
-            <a:r>
-              <a:rPr lang="en-US" sz="1200" baseline="30000" dirty="0">
-                <a:latin typeface="ヒラギノ角ゴ Pro W3"/>
-                <a:ea typeface="ヒラギノ角ゴ Pro W3"/>
-                <a:cs typeface="ヒラギノ角ゴ Pro W3"/>
-              </a:rPr>
-              <a:t>; they can easily describe their new ideas in a concise and reusable way.</a:t>
-            </a:r>
-          </a:p>
-          <a:p>
-            <a:r>
-              <a:rPr lang="en-US" sz="1200" baseline="30000" dirty="0">
-                <a:latin typeface="ヒラギノ角ゴ Pro W3"/>
-                <a:ea typeface="ヒラギノ角ゴ Pro W3"/>
-                <a:cs typeface="ヒラギノ角ゴ Pro W3"/>
-              </a:rPr>
-              <a:t>Finally, the kernel benefits </a:t>
-            </a:r>
-            <a:r>
-              <a:rPr lang="en-US" sz="1200" baseline="30000" dirty="0" err="1">
-                <a:latin typeface="ヒラギノ角ゴ Pro W3"/>
-                <a:ea typeface="ヒラギノ角ゴ Pro W3"/>
-                <a:cs typeface="ヒラギノ角ゴ Pro W3"/>
-              </a:rPr>
-              <a:t>aca</a:t>
-            </a:r>
-            <a:r>
-              <a:rPr lang="en-US" sz="1200" baseline="30000" dirty="0">
-                <a:latin typeface="ヒラギノ角ゴ Pro W3"/>
-                <a:ea typeface="ヒラギノ角ゴ Pro W3"/>
-                <a:cs typeface="ヒラギノ角ゴ Pro W3"/>
-              </a:rPr>
-              <a:t>- </a:t>
-            </a:r>
-            <a:r>
-              <a:rPr lang="en-US" sz="1200" baseline="30000" dirty="0" err="1">
-                <a:latin typeface="ヒラギノ角ゴ Pro W3"/>
-                <a:ea typeface="ヒラギノ角ゴ Pro W3"/>
-                <a:cs typeface="ヒラギノ角ゴ Pro W3"/>
-              </a:rPr>
-              <a:t>demia</a:t>
-            </a:r>
-            <a:r>
-              <a:rPr lang="en-US" sz="1200" baseline="30000" dirty="0">
-                <a:latin typeface="ヒラギノ角ゴ Pro W3"/>
-                <a:ea typeface="ヒラギノ角ゴ Pro W3"/>
-                <a:cs typeface="ヒラギノ角ゴ Pro W3"/>
-              </a:rPr>
-              <a:t>. The kernel provides a basis for the creation of foundation courses in software engineering that can then be complemented with additional </a:t>
-            </a:r>
-            <a:r>
-              <a:rPr lang="en-US" sz="1200" baseline="30000" dirty="0" err="1">
-                <a:latin typeface="ヒラギノ角ゴ Pro W3"/>
-                <a:ea typeface="ヒラギノ角ゴ Pro W3"/>
-                <a:cs typeface="ヒラギノ角ゴ Pro W3"/>
-              </a:rPr>
-              <a:t>cours</a:t>
-            </a:r>
-            <a:r>
-              <a:rPr lang="en-US" sz="1200" baseline="30000" dirty="0">
-                <a:latin typeface="ヒラギノ角ゴ Pro W3"/>
-                <a:ea typeface="ヒラギノ角ゴ Pro W3"/>
-                <a:cs typeface="ヒラギノ角ゴ Pro W3"/>
-              </a:rPr>
-              <a:t>- </a:t>
-            </a:r>
-            <a:r>
-              <a:rPr lang="en-US" sz="1200" baseline="30000" dirty="0" err="1">
-                <a:latin typeface="ヒラギノ角ゴ Pro W3"/>
-                <a:ea typeface="ヒラギノ角ゴ Pro W3"/>
-                <a:cs typeface="ヒラギノ角ゴ Pro W3"/>
-              </a:rPr>
-              <a:t>es</a:t>
-            </a:r>
-            <a:r>
-              <a:rPr lang="en-US" sz="1200" baseline="30000" dirty="0">
-                <a:latin typeface="ヒラギノ角ゴ Pro W3"/>
-                <a:ea typeface="ヒラギノ角ゴ Pro W3"/>
-                <a:cs typeface="ヒラギノ角ゴ Pro W3"/>
-              </a:rPr>
-              <a:t> in specific practices—either as part of the initial educational curriculum or later during the student’s professional development. Equally as important is the kernel’s ability to act as a shared reference model and enabler for fur- </a:t>
-            </a:r>
-            <a:r>
-              <a:rPr lang="en-US" sz="1200" baseline="30000" dirty="0" err="1">
-                <a:latin typeface="ヒラギノ角ゴ Pro W3"/>
-                <a:ea typeface="ヒラギノ角ゴ Pro W3"/>
-                <a:cs typeface="ヒラギノ角ゴ Pro W3"/>
-              </a:rPr>
-              <a:t>ther</a:t>
-            </a:r>
-            <a:r>
-              <a:rPr lang="en-US" sz="1200" baseline="30000" dirty="0">
-                <a:latin typeface="ヒラギノ角ゴ Pro W3"/>
-                <a:ea typeface="ヒラギノ角ゴ Pro W3"/>
-                <a:cs typeface="ヒラギノ角ゴ Pro W3"/>
-              </a:rPr>
-              <a:t> research and experimentation.</a:t>
-            </a:r>
+              <a:rPr lang="ja-JP" altLang="en-US" sz="900" dirty="0">
+                <a:latin typeface="ヒラギノ角ゴ Pro W3"/>
+                <a:ea typeface="ヒラギノ角ゴ Pro W3"/>
+                <a:cs typeface="ヒラギノ角ゴ Pro W3"/>
+              </a:rPr>
+              <a:t>また、コミュニケーションの改善やチーム間の移動のしやすさ、そして新しいアイデアの採用を手助けしてくれる。カーネルはチーム、サプライヤ、および開発組織間の相互運用の改善により産業界全体を手助けしてくれるでしょう</a:t>
+            </a:r>
+            <a:r>
+              <a:rPr lang="ja-JP" altLang="en-US" sz="900" dirty="0" smtClean="0">
+                <a:latin typeface="ヒラギノ角ゴ Pro W3"/>
+                <a:ea typeface="ヒラギノ角ゴ Pro W3"/>
+                <a:cs typeface="ヒラギノ角ゴ Pro W3"/>
+              </a:rPr>
+              <a:t>。</a:t>
+            </a:r>
+            <a:endParaRPr lang="en-US" altLang="ja-JP" sz="900" dirty="0" smtClean="0">
+              <a:latin typeface="ヒラギノ角ゴ Pro W3"/>
+              <a:ea typeface="ヒラギノ角ゴ Pro W3"/>
+              <a:cs typeface="ヒラギノ角ゴ Pro W3"/>
+            </a:endParaRPr>
+          </a:p>
+          <a:p>
+            <a:r>
+              <a:rPr lang="ja-JP" altLang="en-US" sz="900" dirty="0" smtClean="0">
+                <a:latin typeface="ヒラギノ角ゴ Pro W3"/>
+                <a:ea typeface="ヒラギノ角ゴ Pro W3"/>
+                <a:cs typeface="ヒラギノ角ゴ Pro W3"/>
+              </a:rPr>
+              <a:t>ソフトウェア</a:t>
+            </a:r>
+            <a:r>
+              <a:rPr lang="ja-JP" altLang="en-US" sz="900" dirty="0">
+                <a:latin typeface="ヒラギノ角ゴ Pro W3"/>
+                <a:ea typeface="ヒラギノ角ゴ Pro W3"/>
+                <a:cs typeface="ヒラギノ角ゴ Pro W3"/>
+              </a:rPr>
+              <a:t>開発手法の定義に</a:t>
+            </a:r>
+            <a:r>
+              <a:rPr lang="ja-JP" altLang="en-US" sz="900" dirty="0" smtClean="0">
+                <a:latin typeface="ヒラギノ角ゴ Pro W3"/>
+                <a:ea typeface="ヒラギノ角ゴ Pro W3"/>
+                <a:cs typeface="ヒラギノ角ゴ Pro W3"/>
+              </a:rPr>
+              <a:t>対する基盤に依存しないプラクティスを提供することによって、カーネルは手法の定義やプラクティスの共有の仕方を変換するための完全な力を持っている。例えば、彼らの仕事の仕方を構築したり、改善するために異なる発信元からのプラクティスを混在させたり調和させることをチームに許可することによって、カーネルは産業界が直面している重要な</a:t>
+            </a:r>
+            <a:r>
+              <a:rPr lang="en-US" altLang="ja-JP" sz="900" dirty="0" smtClean="0">
+                <a:latin typeface="ヒラギノ角ゴ Pro W3"/>
+                <a:ea typeface="ヒラギノ角ゴ Pro W3"/>
+                <a:cs typeface="ヒラギノ角ゴ Pro W3"/>
+              </a:rPr>
+              <a:t>2</a:t>
+            </a:r>
+            <a:r>
+              <a:rPr lang="ja-JP" altLang="en-US" sz="900" dirty="0" smtClean="0">
+                <a:latin typeface="ヒラギノ角ゴ Pro W3"/>
+                <a:ea typeface="ヒラギノ角ゴ Pro W3"/>
+                <a:cs typeface="ヒラギノ角ゴ Pro W3"/>
+              </a:rPr>
+              <a:t>つの方法論の問題解決に取り組んでいる。</a:t>
+            </a:r>
+            <a:endParaRPr lang="en-US" altLang="ja-JP" sz="900" dirty="0" smtClean="0">
+              <a:latin typeface="ヒラギノ角ゴ Pro W3"/>
+              <a:ea typeface="ヒラギノ角ゴ Pro W3"/>
+              <a:cs typeface="ヒラギノ角ゴ Pro W3"/>
+            </a:endParaRPr>
+          </a:p>
+          <a:p>
+            <a:r>
+              <a:rPr lang="en-US" altLang="ja-JP" sz="900" dirty="0" smtClean="0">
+                <a:latin typeface="ヒラギノ角ゴ Pro W3"/>
+                <a:ea typeface="ヒラギノ角ゴ Pro W3"/>
+                <a:cs typeface="ヒラギノ角ゴ Pro W3"/>
+              </a:rPr>
+              <a:t>˲</a:t>
+            </a:r>
+            <a:r>
+              <a:rPr lang="ja-JP" altLang="en-US" sz="900" dirty="0">
+                <a:latin typeface="ヒラギノ角ゴ Pro W3"/>
+                <a:ea typeface="ヒラギノ角ゴ Pro W3"/>
+                <a:cs typeface="ヒラギノ角ゴ Pro W3"/>
+              </a:rPr>
+              <a:t>チームは自分たちの方法論によって</a:t>
+            </a:r>
+          </a:p>
+          <a:p>
+            <a:r>
+              <a:rPr lang="ja-JP" altLang="en-US" sz="900" dirty="0">
+                <a:latin typeface="ヒラギノ角ゴ Pro W3"/>
+                <a:ea typeface="ヒラギノ角ゴ Pro W3"/>
+                <a:cs typeface="ヒラギノ角ゴ Pro W3"/>
+              </a:rPr>
+              <a:t>身動きが取れなくなることはない</a:t>
+            </a:r>
+            <a:r>
+              <a:rPr lang="ja-JP" altLang="en-US" sz="900" dirty="0" smtClean="0">
+                <a:latin typeface="ヒラギノ角ゴ Pro W3"/>
+                <a:ea typeface="ヒラギノ角ゴ Pro W3"/>
+                <a:cs typeface="ヒラギノ角ゴ Pro W3"/>
+              </a:rPr>
+              <a:t>。チーム</a:t>
+            </a:r>
+            <a:r>
+              <a:rPr lang="ja-JP" altLang="en-US" sz="900" dirty="0">
+                <a:latin typeface="ヒラギノ角ゴ Pro W3"/>
+                <a:ea typeface="ヒラギノ角ゴ Pro W3"/>
+                <a:cs typeface="ヒラギノ角ゴ Pro W3"/>
+              </a:rPr>
+              <a:t>は状況に応じてプラクティスを追加、削除</a:t>
+            </a:r>
+            <a:r>
+              <a:rPr lang="ja-JP" altLang="en-US" sz="900" dirty="0" smtClean="0">
+                <a:latin typeface="ヒラギノ角ゴ Pro W3"/>
+                <a:ea typeface="ヒラギノ角ゴ Pro W3"/>
+                <a:cs typeface="ヒラギノ角ゴ Pro W3"/>
+              </a:rPr>
+              <a:t>して絶え間</a:t>
+            </a:r>
+            <a:r>
+              <a:rPr lang="ja-JP" altLang="en-US" sz="900" dirty="0">
+                <a:latin typeface="ヒラギノ角ゴ Pro W3"/>
+                <a:ea typeface="ヒラギノ角ゴ Pro W3"/>
+                <a:cs typeface="ヒラギノ角ゴ Pro W3"/>
+              </a:rPr>
+              <a:t>なく仕事の仕方を改善することができる。</a:t>
+            </a:r>
+            <a:endParaRPr lang="en-US" altLang="ja-JP" sz="900" dirty="0" smtClean="0">
+              <a:latin typeface="ヒラギノ角ゴ Pro W3"/>
+              <a:ea typeface="ヒラギノ角ゴ Pro W3"/>
+              <a:cs typeface="ヒラギノ角ゴ Pro W3"/>
+            </a:endParaRPr>
+          </a:p>
+          <a:p>
+            <a:r>
+              <a:rPr lang="en-US" altLang="ja-JP" sz="900" dirty="0" smtClean="0">
+                <a:latin typeface="ヒラギノ角ゴ Pro W3"/>
+                <a:ea typeface="ヒラギノ角ゴ Pro W3"/>
+                <a:cs typeface="ヒラギノ角ゴ Pro W3"/>
+              </a:rPr>
+              <a:t>˲</a:t>
+            </a:r>
+            <a:r>
+              <a:rPr lang="ja-JP" altLang="en-US" sz="900" dirty="0">
+                <a:latin typeface="ヒラギノ角ゴ Pro W3"/>
+                <a:ea typeface="ヒラギノ角ゴ Pro W3"/>
+                <a:cs typeface="ヒラギノ角ゴ Pro W3"/>
+              </a:rPr>
+              <a:t>方法論者は完全な方法を記述するために時間を浪費することはない</a:t>
+            </a:r>
+            <a:r>
+              <a:rPr lang="ja-JP" altLang="en-US" sz="900" dirty="0" smtClean="0">
+                <a:latin typeface="ヒラギノ角ゴ Pro W3"/>
+                <a:ea typeface="ヒラギノ角ゴ Pro W3"/>
+                <a:cs typeface="ヒラギノ角ゴ Pro W3"/>
+              </a:rPr>
+              <a:t>。彼ら</a:t>
+            </a:r>
+            <a:r>
+              <a:rPr lang="ja-JP" altLang="en-US" sz="900" dirty="0">
+                <a:latin typeface="ヒラギノ角ゴ Pro W3"/>
+                <a:ea typeface="ヒラギノ角ゴ Pro W3"/>
+                <a:cs typeface="ヒラギノ角ゴ Pro W3"/>
+              </a:rPr>
+              <a:t>は簡潔で再利用可能な方法で彼らの新たな考え</a:t>
+            </a:r>
+            <a:r>
+              <a:rPr lang="ja-JP" altLang="en-US" sz="900" dirty="0" smtClean="0">
+                <a:latin typeface="ヒラギノ角ゴ Pro W3"/>
+                <a:ea typeface="ヒラギノ角ゴ Pro W3"/>
+                <a:cs typeface="ヒラギノ角ゴ Pro W3"/>
+              </a:rPr>
+              <a:t>を容易</a:t>
+            </a:r>
+            <a:r>
+              <a:rPr lang="ja-JP" altLang="en-US" sz="900" dirty="0">
+                <a:latin typeface="ヒラギノ角ゴ Pro W3"/>
+                <a:ea typeface="ヒラギノ角ゴ Pro W3"/>
+                <a:cs typeface="ヒラギノ角ゴ Pro W3"/>
+              </a:rPr>
+              <a:t>に記述することができる</a:t>
+            </a:r>
+            <a:r>
+              <a:rPr lang="ja-JP" altLang="en-US" sz="900" dirty="0" smtClean="0">
+                <a:latin typeface="ヒラギノ角ゴ Pro W3"/>
+                <a:ea typeface="ヒラギノ角ゴ Pro W3"/>
+                <a:cs typeface="ヒラギノ角ゴ Pro W3"/>
+              </a:rPr>
+              <a:t>。</a:t>
+            </a:r>
+            <a:endParaRPr lang="en-US" altLang="ja-JP" sz="900" dirty="0" smtClean="0">
+              <a:latin typeface="ヒラギノ角ゴ Pro W3"/>
+              <a:ea typeface="ヒラギノ角ゴ Pro W3"/>
+              <a:cs typeface="ヒラギノ角ゴ Pro W3"/>
+            </a:endParaRPr>
+          </a:p>
+          <a:p>
+            <a:r>
+              <a:rPr lang="ja-JP" altLang="en-US" sz="900" dirty="0">
+                <a:latin typeface="ヒラギノ角ゴ Pro W3"/>
+                <a:ea typeface="ヒラギノ角ゴ Pro W3"/>
+                <a:cs typeface="ヒラギノ角ゴ Pro W3"/>
+              </a:rPr>
+              <a:t>最後に、カーネルは学会にとって有益である</a:t>
+            </a:r>
+            <a:r>
+              <a:rPr lang="ja-JP" altLang="en-US" sz="900" dirty="0" smtClean="0">
+                <a:latin typeface="ヒラギノ角ゴ Pro W3"/>
+                <a:ea typeface="ヒラギノ角ゴ Pro W3"/>
+                <a:cs typeface="ヒラギノ角ゴ Pro W3"/>
+              </a:rPr>
+              <a:t>。カーネル</a:t>
+            </a:r>
+            <a:r>
+              <a:rPr lang="ja-JP" altLang="en-US" sz="900" dirty="0">
+                <a:latin typeface="ヒラギノ角ゴ Pro W3"/>
+                <a:ea typeface="ヒラギノ角ゴ Pro W3"/>
+                <a:cs typeface="ヒラギノ角ゴ Pro W3"/>
+              </a:rPr>
+              <a:t>は初期教育のカリキュラムの一部として</a:t>
+            </a:r>
+            <a:r>
+              <a:rPr lang="ja-JP" altLang="en-US" sz="900" dirty="0" smtClean="0">
+                <a:latin typeface="ヒラギノ角ゴ Pro W3"/>
+                <a:ea typeface="ヒラギノ角ゴ Pro W3"/>
+                <a:cs typeface="ヒラギノ角ゴ Pro W3"/>
+              </a:rPr>
+              <a:t>、あるいは</a:t>
+            </a:r>
+            <a:r>
+              <a:rPr lang="ja-JP" altLang="en-US" sz="900" dirty="0">
+                <a:latin typeface="ヒラギノ角ゴ Pro W3"/>
+                <a:ea typeface="ヒラギノ角ゴ Pro W3"/>
+                <a:cs typeface="ヒラギノ角ゴ Pro W3"/>
+              </a:rPr>
+              <a:t>その後の専門課程の間に特定プラクティス</a:t>
+            </a:r>
+            <a:r>
+              <a:rPr lang="ja-JP" altLang="en-US" sz="900" dirty="0" smtClean="0">
+                <a:latin typeface="ヒラギノ角ゴ Pro W3"/>
+                <a:ea typeface="ヒラギノ角ゴ Pro W3"/>
+                <a:cs typeface="ヒラギノ角ゴ Pro W3"/>
+              </a:rPr>
+              <a:t>の追加</a:t>
+            </a:r>
+            <a:r>
+              <a:rPr lang="ja-JP" altLang="en-US" sz="900" dirty="0">
+                <a:latin typeface="ヒラギノ角ゴ Pro W3"/>
+                <a:ea typeface="ヒラギノ角ゴ Pro W3"/>
+                <a:cs typeface="ヒラギノ角ゴ Pro W3"/>
+              </a:rPr>
+              <a:t>課程を補足することで完成するソフトウェアエンジニアリングの</a:t>
+            </a:r>
+          </a:p>
+          <a:p>
+            <a:r>
+              <a:rPr lang="ja-JP" altLang="en-US" sz="900" dirty="0">
+                <a:latin typeface="ヒラギノ角ゴ Pro W3"/>
+                <a:ea typeface="ヒラギノ角ゴ Pro W3"/>
+                <a:cs typeface="ヒラギノ角ゴ Pro W3"/>
+              </a:rPr>
+              <a:t>一般教養課程の構築に基礎</a:t>
+            </a:r>
+            <a:r>
+              <a:rPr lang="en-US" altLang="ja-JP" sz="900" dirty="0">
+                <a:latin typeface="ヒラギノ角ゴ Pro W3"/>
+                <a:ea typeface="ヒラギノ角ゴ Pro W3"/>
+                <a:cs typeface="ヒラギノ角ゴ Pro W3"/>
+              </a:rPr>
+              <a:t>(basis)</a:t>
+            </a:r>
+            <a:r>
+              <a:rPr lang="ja-JP" altLang="en-US" sz="900" dirty="0">
+                <a:latin typeface="ヒラギノ角ゴ Pro W3"/>
+                <a:ea typeface="ヒラギノ角ゴ Pro W3"/>
+                <a:cs typeface="ヒラギノ角ゴ Pro W3"/>
+              </a:rPr>
+              <a:t>を提供する</a:t>
+            </a:r>
+            <a:r>
+              <a:rPr lang="ja-JP" altLang="en-US" sz="900" dirty="0" smtClean="0">
+                <a:latin typeface="ヒラギノ角ゴ Pro W3"/>
+                <a:ea typeface="ヒラギノ角ゴ Pro W3"/>
+                <a:cs typeface="ヒラギノ角ゴ Pro W3"/>
+              </a:rPr>
+              <a:t>。共有</a:t>
+            </a:r>
+            <a:r>
+              <a:rPr lang="ja-JP" altLang="en-US" sz="900" dirty="0">
+                <a:latin typeface="ヒラギノ角ゴ Pro W3"/>
+                <a:ea typeface="ヒラギノ角ゴ Pro W3"/>
+                <a:cs typeface="ヒラギノ角ゴ Pro W3"/>
+              </a:rPr>
+              <a:t>されたリファレンスモデルとしてのカーネルの役割</a:t>
+            </a:r>
+            <a:r>
+              <a:rPr lang="ja-JP" altLang="en-US" sz="900" dirty="0" smtClean="0">
+                <a:latin typeface="ヒラギノ角ゴ Pro W3"/>
+                <a:ea typeface="ヒラギノ角ゴ Pro W3"/>
+                <a:cs typeface="ヒラギノ角ゴ Pro W3"/>
+              </a:rPr>
+              <a:t>と更</a:t>
+            </a:r>
+            <a:r>
+              <a:rPr lang="ja-JP" altLang="en-US" sz="900" dirty="0">
+                <a:latin typeface="ヒラギノ角ゴ Pro W3"/>
+                <a:ea typeface="ヒラギノ角ゴ Pro W3"/>
+                <a:cs typeface="ヒラギノ角ゴ Pro W3"/>
+              </a:rPr>
+              <a:t>なる研究と実験を可能にするカーネルの役割はとも</a:t>
+            </a:r>
+            <a:r>
+              <a:rPr lang="ja-JP" altLang="en-US" sz="900" dirty="0" smtClean="0">
+                <a:latin typeface="ヒラギノ角ゴ Pro W3"/>
+                <a:ea typeface="ヒラギノ角ゴ Pro W3"/>
+                <a:cs typeface="ヒラギノ角ゴ Pro W3"/>
+              </a:rPr>
+              <a:t>に等しく</a:t>
+            </a:r>
+            <a:r>
+              <a:rPr lang="ja-JP" altLang="en-US" sz="900" dirty="0">
+                <a:latin typeface="ヒラギノ角ゴ Pro W3"/>
+                <a:ea typeface="ヒラギノ角ゴ Pro W3"/>
+                <a:cs typeface="ヒラギノ角ゴ Pro W3"/>
+              </a:rPr>
+              <a:t>重要である。</a:t>
+            </a:r>
+          </a:p>
+          <a:p>
+            <a:endParaRPr lang="en-US" altLang="ja-JP" sz="900" dirty="0" smtClean="0">
+              <a:latin typeface="ヒラギノ角ゴ Pro W3"/>
+              <a:ea typeface="ヒラギノ角ゴ Pro W3"/>
+              <a:cs typeface="ヒラギノ角ゴ Pro W3"/>
+            </a:endParaRPr>
           </a:p>
         </p:txBody>
       </p:sp>

</xml_diff>

<commit_message>
Merge 01.txt into pptx
</commit_message>
<xml_diff>
--- a/p42-jacobson_ja/p42-jacobson_ja.pptx
+++ b/p42-jacobson_ja/p42-jacobson_ja.pptx
@@ -295,7 +295,7 @@
           <a:p>
             <a:fld id="{0250A163-ACDB-304E-8C8E-D7913C06F9E0}" type="datetimeFigureOut">
               <a:rPr lang="en-US" smtClean="0"/>
-              <a:t>4/11/13</a:t>
+              <a:t>4/14/13</a:t>
             </a:fld>
             <a:endParaRPr lang="en-US"/>
           </a:p>
@@ -465,7 +465,7 @@
           <a:p>
             <a:fld id="{0250A163-ACDB-304E-8C8E-D7913C06F9E0}" type="datetimeFigureOut">
               <a:rPr lang="en-US" smtClean="0"/>
-              <a:t>4/11/13</a:t>
+              <a:t>4/14/13</a:t>
             </a:fld>
             <a:endParaRPr lang="en-US"/>
           </a:p>
@@ -645,7 +645,7 @@
           <a:p>
             <a:fld id="{0250A163-ACDB-304E-8C8E-D7913C06F9E0}" type="datetimeFigureOut">
               <a:rPr lang="en-US" smtClean="0"/>
-              <a:t>4/11/13</a:t>
+              <a:t>4/14/13</a:t>
             </a:fld>
             <a:endParaRPr lang="en-US"/>
           </a:p>
@@ -815,7 +815,7 @@
           <a:p>
             <a:fld id="{0250A163-ACDB-304E-8C8E-D7913C06F9E0}" type="datetimeFigureOut">
               <a:rPr lang="en-US" smtClean="0"/>
-              <a:t>4/11/13</a:t>
+              <a:t>4/14/13</a:t>
             </a:fld>
             <a:endParaRPr lang="en-US"/>
           </a:p>
@@ -1061,7 +1061,7 @@
           <a:p>
             <a:fld id="{0250A163-ACDB-304E-8C8E-D7913C06F9E0}" type="datetimeFigureOut">
               <a:rPr lang="en-US" smtClean="0"/>
-              <a:t>4/11/13</a:t>
+              <a:t>4/14/13</a:t>
             </a:fld>
             <a:endParaRPr lang="en-US"/>
           </a:p>
@@ -1349,7 +1349,7 @@
           <a:p>
             <a:fld id="{0250A163-ACDB-304E-8C8E-D7913C06F9E0}" type="datetimeFigureOut">
               <a:rPr lang="en-US" smtClean="0"/>
-              <a:t>4/11/13</a:t>
+              <a:t>4/14/13</a:t>
             </a:fld>
             <a:endParaRPr lang="en-US"/>
           </a:p>
@@ -1776,7 +1776,7 @@
           <a:p>
             <a:fld id="{0250A163-ACDB-304E-8C8E-D7913C06F9E0}" type="datetimeFigureOut">
               <a:rPr lang="en-US" smtClean="0"/>
-              <a:t>4/11/13</a:t>
+              <a:t>4/14/13</a:t>
             </a:fld>
             <a:endParaRPr lang="en-US"/>
           </a:p>
@@ -1894,7 +1894,7 @@
           <a:p>
             <a:fld id="{0250A163-ACDB-304E-8C8E-D7913C06F9E0}" type="datetimeFigureOut">
               <a:rPr lang="en-US" smtClean="0"/>
-              <a:t>4/11/13</a:t>
+              <a:t>4/14/13</a:t>
             </a:fld>
             <a:endParaRPr lang="en-US"/>
           </a:p>
@@ -1989,7 +1989,7 @@
           <a:p>
             <a:fld id="{0250A163-ACDB-304E-8C8E-D7913C06F9E0}" type="datetimeFigureOut">
               <a:rPr lang="en-US" smtClean="0"/>
-              <a:t>4/11/13</a:t>
+              <a:t>4/14/13</a:t>
             </a:fld>
             <a:endParaRPr lang="en-US"/>
           </a:p>
@@ -2266,7 +2266,7 @@
           <a:p>
             <a:fld id="{0250A163-ACDB-304E-8C8E-D7913C06F9E0}" type="datetimeFigureOut">
               <a:rPr lang="en-US" smtClean="0"/>
-              <a:t>4/11/13</a:t>
+              <a:t>4/14/13</a:t>
             </a:fld>
             <a:endParaRPr lang="en-US"/>
           </a:p>
@@ -2519,7 +2519,7 @@
           <a:p>
             <a:fld id="{0250A163-ACDB-304E-8C8E-D7913C06F9E0}" type="datetimeFigureOut">
               <a:rPr lang="en-US" smtClean="0"/>
-              <a:t>4/11/13</a:t>
+              <a:t>4/14/13</a:t>
             </a:fld>
             <a:endParaRPr lang="en-US"/>
           </a:p>
@@ -2732,7 +2732,7 @@
           <a:p>
             <a:fld id="{0250A163-ACDB-304E-8C8E-D7913C06F9E0}" type="datetimeFigureOut">
               <a:rPr lang="en-US" smtClean="0"/>
-              <a:t>4/11/13</a:t>
+              <a:t>4/14/13</a:t>
             </a:fld>
             <a:endParaRPr lang="en-US"/>
           </a:p>
@@ -3330,7 +3330,29 @@
                 <a:ea typeface="ヒラギノ角ゴ Std W8"/>
                 <a:cs typeface="ヒラギノ角ゴ Std W8"/>
               </a:rPr>
-              <a:t>思考フレームワークを「アクション可能なカーネル</a:t>
+              <a:t>思考フレームワークを</a:t>
+            </a:r>
+            <a:r>
+              <a:rPr lang="ja-JP" altLang="en-US" sz="1100" dirty="0">
+                <a:solidFill>
+                  <a:srgbClr val="008000"/>
+                </a:solidFill>
+                <a:latin typeface="ヒラギノ角ゴ Std W8"/>
+                <a:ea typeface="ヒラギノ角ゴ Std W8"/>
+                <a:cs typeface="ヒラギノ角ゴ Std W8"/>
+              </a:rPr>
+              <a:t>「アクショナブル・カーネル</a:t>
+            </a:r>
+            <a:r>
+              <a:rPr lang="en-US" altLang="ja-JP" sz="1100" dirty="0" smtClean="0">
+                <a:solidFill>
+                  <a:srgbClr val="008000"/>
+                </a:solidFill>
+                <a:latin typeface="ヒラギノ角ゴ Std W8"/>
+                <a:ea typeface="ヒラギノ角ゴ Std W8"/>
+                <a:cs typeface="ヒラギノ角ゴ Std W8"/>
+              </a:rPr>
+              <a:t>(</a:t>
             </a:r>
             <a:r>
               <a:rPr lang="en-US" altLang="ja-JP" sz="1100" dirty="0">
@@ -3341,7 +3363,7 @@
                 <a:ea typeface="ヒラギノ角ゴ Std W8"/>
                 <a:cs typeface="ヒラギノ角ゴ Std W8"/>
               </a:rPr>
-              <a:t>(actionable kernel)</a:t>
+              <a:t>actionable kernel)</a:t>
             </a:r>
             <a:r>
               <a:rPr lang="ja-JP" altLang="en-US" sz="1100" dirty="0">
@@ -3704,15 +3726,7 @@
                 <a:ea typeface="ヒラギノ角ゴ Pro W3"/>
                 <a:cs typeface="ヒラギノ角ゴ Pro W3"/>
               </a:rPr>
-              <a:t>ソフトウェア開発に携わる人なら誰でも、それが複雑でリスクの高い仕事であること、そして参加者がよりよいソフトウェアにつながる新しいアイディアを、いつでも探していることを知っている。幸運なことに、ソフトウェア工学は、まだその若年代にあり毎年毎年ベストプラクティスの中に新しいイノベーションと改善を見ることができる、成長過程の専門分野だ</a:t>
-            </a:r>
-            <a:r>
-              <a:rPr lang="ja-JP" altLang="en-US" sz="1200" dirty="0" smtClean="0">
-                <a:latin typeface="ヒラギノ角ゴ Pro W3"/>
-                <a:ea typeface="ヒラギノ角ゴ Pro W3"/>
-                <a:cs typeface="ヒラギノ角ゴ Pro W3"/>
-              </a:rPr>
-              <a:t>。</a:t>
+              <a:t>ソフトウェア開発に携わる人なら誰でも、それが複雑でリスクの高い仕事であること、そして関わる人々がよりよいソフトウェアにつながる新しいアイディアをいつでも探していることを知っている。幸運なことに、ソフトウェア工学はまだその若年代にあり、毎年毎年ベストプラクティスの中にイノベーションと改善を見てとれる成長過程の専門分野である。それは例えば、リーンとアジャイルの考え方（</a:t>
             </a:r>
             <a:r>
               <a:rPr lang="en-US" altLang="ja-JP" sz="1200" dirty="0" smtClean="0">
@@ -3720,118 +3734,47 @@
                 <a:ea typeface="ヒラギノ角ゴ Pro W3"/>
                 <a:cs typeface="ヒラギノ角ゴ Pro W3"/>
               </a:rPr>
-              <a:t/>
-            </a:r>
-            <a:br>
+              <a:t>lean and </a:t>
+            </a:r>
+            <a:r>
+              <a:rPr lang="en-US" altLang="ja-JP" sz="1200" dirty="0">
+                <a:latin typeface="ヒラギノ角ゴ Pro W3"/>
+                <a:ea typeface="ヒラギノ角ゴ Pro W3"/>
+                <a:cs typeface="ヒラギノ角ゴ Pro W3"/>
+              </a:rPr>
+              <a:t>agile thinking</a:t>
+            </a:r>
+            <a:r>
+              <a:rPr lang="ja-JP" altLang="en-US" sz="1200" dirty="0">
+                <a:latin typeface="ヒラギノ角ゴ Pro W3"/>
+                <a:ea typeface="ヒラギノ角ゴ Pro W3"/>
+                <a:cs typeface="ヒラギノ角ゴ Pro W3"/>
+              </a:rPr>
+              <a:t>）がソフトウェア開発チームにもたらした改善と恩恵を見てみれば分かる。ソフトウェア開発チームが成功するためには、動くソフトウェアシステムをすばやく提供すること、ステークホルダーを満足させることや、リスクに対処すること、さらには仕事の仕方（</a:t>
+            </a:r>
+            <a:r>
               <a:rPr lang="en-US" altLang="ja-JP" sz="1200" dirty="0" smtClean="0">
                 <a:latin typeface="ヒラギノ角ゴ Pro W3"/>
                 <a:ea typeface="ヒラギノ角ゴ Pro W3"/>
                 <a:cs typeface="ヒラギノ角ゴ Pro W3"/>
               </a:rPr>
-            </a:br>
+              <a:t>way of </a:t>
+            </a:r>
+            <a:r>
+              <a:rPr lang="en-US" altLang="ja-JP" sz="1200" dirty="0">
+                <a:latin typeface="ヒラギノ角ゴ Pro W3"/>
+                <a:ea typeface="ヒラギノ角ゴ Pro W3"/>
+                <a:cs typeface="ヒラギノ角ゴ Pro W3"/>
+              </a:rPr>
+              <a:t>working</a:t>
+            </a:r>
             <a:r>
               <a:rPr lang="ja-JP" altLang="en-US" sz="1200" dirty="0">
                 <a:latin typeface="ヒラギノ角ゴ Pro W3"/>
                 <a:ea typeface="ヒラギノ角ゴ Pro W3"/>
                 <a:cs typeface="ヒラギノ角ゴ Pro W3"/>
               </a:rPr>
-              <a:t>例えば、リーンとアジャイルの考え方</a:t>
-            </a:r>
-            <a:r>
-              <a:rPr lang="en-US" altLang="ja-JP" sz="1200" dirty="0">
-                <a:latin typeface="ヒラギノ角ゴ Pro W3"/>
-                <a:ea typeface="ヒラギノ角ゴ Pro W3"/>
-                <a:cs typeface="ヒラギノ角ゴ Pro W3"/>
-              </a:rPr>
-              <a:t>(</a:t>
-            </a:r>
-            <a:r>
-              <a:rPr lang="en-US" altLang="ja-JP" sz="1200" dirty="0" smtClean="0">
-                <a:latin typeface="ヒラギノ角ゴ Pro W3"/>
-                <a:ea typeface="ヒラギノ角ゴ Pro W3"/>
-                <a:cs typeface="ヒラギノ角ゴ Pro W3"/>
-              </a:rPr>
-              <a:t>lean and </a:t>
-            </a:r>
-            <a:r>
-              <a:rPr lang="en-US" altLang="ja-JP" sz="1200" dirty="0">
-                <a:latin typeface="ヒラギノ角ゴ Pro W3"/>
-                <a:ea typeface="ヒラギノ角ゴ Pro W3"/>
-                <a:cs typeface="ヒラギノ角ゴ Pro W3"/>
-              </a:rPr>
-              <a:t>agile thinking)</a:t>
-            </a:r>
-            <a:r>
-              <a:rPr lang="ja-JP" altLang="en-US" sz="1200" dirty="0">
-                <a:latin typeface="ヒラギノ角ゴ Pro W3"/>
-                <a:ea typeface="ヒラギノ角ゴ Pro W3"/>
-                <a:cs typeface="ヒラギノ角ゴ Pro W3"/>
-              </a:rPr>
-              <a:t>がソフトウェア開発チームにもたらした改善と恩恵を見てみれば分かる。成功しているソフトウェア開発チームは、すばやく動くソフトウェアシステムを提供すること、ステークホルダーを満足させること、リスクに対処すること、そして仕事の仕方</a:t>
-            </a:r>
-            <a:r>
-              <a:rPr lang="en-US" altLang="ja-JP" sz="1200" dirty="0">
-                <a:latin typeface="ヒラギノ角ゴ Pro W3"/>
-                <a:ea typeface="ヒラギノ角ゴ Pro W3"/>
-                <a:cs typeface="ヒラギノ角ゴ Pro W3"/>
-              </a:rPr>
-              <a:t>(</a:t>
-            </a:r>
-            <a:r>
-              <a:rPr lang="en-US" altLang="ja-JP" sz="1200" dirty="0" smtClean="0">
-                <a:latin typeface="ヒラギノ角ゴ Pro W3"/>
-                <a:ea typeface="ヒラギノ角ゴ Pro W3"/>
-                <a:cs typeface="ヒラギノ角ゴ Pro W3"/>
-              </a:rPr>
-              <a:t>way</a:t>
-            </a:r>
-            <a:r>
-              <a:rPr lang="en-US" altLang="ja-JP" sz="1200" dirty="0">
-                <a:latin typeface="ヒラギノ角ゴ Pro W3"/>
-                <a:ea typeface="ヒラギノ角ゴ Pro W3"/>
-                <a:cs typeface="ヒラギノ角ゴ Pro W3"/>
-              </a:rPr>
-              <a:t> </a:t>
-            </a:r>
-            <a:r>
-              <a:rPr lang="en-US" altLang="ja-JP" sz="1200" dirty="0" smtClean="0">
-                <a:latin typeface="ヒラギノ角ゴ Pro W3"/>
-                <a:ea typeface="ヒラギノ角ゴ Pro W3"/>
-                <a:cs typeface="ヒラギノ角ゴ Pro W3"/>
-              </a:rPr>
-              <a:t>of </a:t>
-            </a:r>
-            <a:r>
-              <a:rPr lang="en-US" altLang="ja-JP" sz="1200" dirty="0">
-                <a:latin typeface="ヒラギノ角ゴ Pro W3"/>
-                <a:ea typeface="ヒラギノ角ゴ Pro W3"/>
-                <a:cs typeface="ヒラギノ角ゴ Pro W3"/>
-              </a:rPr>
-              <a:t>working)</a:t>
-            </a:r>
-            <a:r>
-              <a:rPr lang="ja-JP" altLang="en-US" sz="1200" dirty="0">
-                <a:latin typeface="ヒラギノ角ゴ Pro W3"/>
-                <a:ea typeface="ヒラギノ角ゴ Pro W3"/>
-                <a:cs typeface="ヒラギノ角ゴ Pro W3"/>
-              </a:rPr>
-              <a:t>を改善すること、これらのバランスをうまくとらなくては</a:t>
-            </a:r>
-            <a:r>
-              <a:rPr lang="ja-JP" altLang="en-US" sz="1200" dirty="0" smtClean="0">
-                <a:latin typeface="ヒラギノ角ゴ Pro W3"/>
-                <a:ea typeface="ヒラギノ角ゴ Pro W3"/>
-                <a:cs typeface="ヒラギノ角ゴ Pro W3"/>
-              </a:rPr>
-              <a:t>ならない</a:t>
-            </a:r>
-            <a:r>
-              <a:rPr lang="ja-JP" altLang="en-US" sz="1200" dirty="0">
-                <a:latin typeface="ヒラギノ角ゴ Pro W3"/>
-                <a:ea typeface="ヒラギノ角ゴ Pro W3"/>
-                <a:cs typeface="ヒラギノ角ゴ Pro W3"/>
-              </a:rPr>
-              <a:t>。</a:t>
+              <a:t>）を改善することのバランスをうまくとらなくてはならない。</a:t>
             </a:r>
             <a:endParaRPr lang="en-US" sz="1200" dirty="0">
               <a:latin typeface="ヒラギノ角ゴ Pro W3"/>
@@ -3850,7 +3793,7 @@
         <p:spPr>
           <a:xfrm>
             <a:off x="4305299" y="1306537"/>
-            <a:ext cx="2374901" cy="8402296"/>
+            <a:ext cx="2374901" cy="8540795"/>
           </a:xfrm>
           <a:prstGeom prst="rect">
             <a:avLst/>
@@ -3868,7 +3811,85 @@
                 <a:ea typeface="ヒラギノ角ゴ Pro W3"/>
                 <a:cs typeface="ヒラギノ角ゴ Pro W3"/>
               </a:rPr>
-              <a:t>そのためには、現在の仕事の仕方</a:t>
+              <a:t>そのためには、現在の仕事の仕方と、採用しようとする新しいアイディアのギャップを橋渡しする効果的な思考フレームワーク（</a:t>
+            </a:r>
+            <a:r>
+              <a:rPr lang="en-US" altLang="ja-JP" sz="900" dirty="0" smtClean="0">
+                <a:latin typeface="ヒラギノ角ゴ Pro W3"/>
+                <a:ea typeface="ヒラギノ角ゴ Pro W3"/>
+                <a:cs typeface="ヒラギノ角ゴ Pro W3"/>
+              </a:rPr>
+              <a:t>thinking framework</a:t>
+            </a:r>
+            <a:r>
+              <a:rPr lang="ja-JP" altLang="en-US" sz="900" dirty="0">
+                <a:latin typeface="ヒラギノ角ゴ Pro W3"/>
+                <a:ea typeface="ヒラギノ角ゴ Pro W3"/>
+                <a:cs typeface="ヒラギノ角ゴ Pro W3"/>
+              </a:rPr>
+              <a:t>）が必要である。この記事は、そのような思考フレームワークを「アクショナブル</a:t>
+            </a:r>
+            <a:r>
+              <a:rPr lang="ja-JP" altLang="en-US" sz="900" dirty="0" smtClean="0">
+                <a:latin typeface="ヒラギノ角ゴ Pro W3"/>
+                <a:ea typeface="ヒラギノ角ゴ Pro W3"/>
+                <a:cs typeface="ヒラギノ角ゴ Pro W3"/>
+              </a:rPr>
+              <a:t>・</a:t>
+            </a:r>
+            <a:r>
+              <a:rPr lang="en-US" altLang="en-US" sz="900" dirty="0" smtClean="0">
+                <a:latin typeface="ヒラギノ角ゴ Pro W3"/>
+                <a:ea typeface="ヒラギノ角ゴ Pro W3"/>
+                <a:cs typeface="ヒラギノ角ゴ Pro W3"/>
+              </a:rPr>
+              <a:t>カーネル</a:t>
+            </a:r>
+            <a:r>
+              <a:rPr lang="ja-JP" altLang="en-US" sz="900" dirty="0" smtClean="0">
+                <a:latin typeface="ヒラギノ角ゴ Pro W3"/>
+                <a:ea typeface="ヒラギノ角ゴ Pro W3"/>
+                <a:cs typeface="ヒラギノ角ゴ Pro W3"/>
+              </a:rPr>
+              <a:t>（</a:t>
+            </a:r>
+            <a:r>
+              <a:rPr lang="en-US" altLang="ja-JP" sz="900" dirty="0" smtClean="0">
+                <a:latin typeface="ヒラギノ角ゴ Pro W3"/>
+                <a:ea typeface="ヒラギノ角ゴ Pro W3"/>
+                <a:cs typeface="ヒラギノ角ゴ Pro W3"/>
+              </a:rPr>
+              <a:t>actionable kernel</a:t>
+            </a:r>
+            <a:r>
+              <a:rPr lang="ja-JP" altLang="en-US" sz="900" dirty="0">
+                <a:latin typeface="ヒラギノ角ゴ Pro W3"/>
+                <a:ea typeface="ヒラギノ角ゴ Pro W3"/>
+                <a:cs typeface="ヒラギノ角ゴ Pro W3"/>
+              </a:rPr>
+              <a:t>）」の形で提示することで、様々なリスクのバランスをとり、仕事の仕方を改善しようとするチームを支援する。</a:t>
+            </a:r>
+            <a:endParaRPr lang="en-US" altLang="ja-JP" sz="900" dirty="0" smtClean="0">
+              <a:latin typeface="ヒラギノ角ゴ Pro W3"/>
+              <a:ea typeface="ヒラギノ角ゴ Pro W3"/>
+              <a:cs typeface="ヒラギノ角ゴ Pro W3"/>
+            </a:endParaRPr>
+          </a:p>
+          <a:p>
+            <a:endParaRPr lang="en-US" altLang="ja-JP" sz="900" dirty="0" smtClean="0">
+              <a:latin typeface="ヒラギノ角ゴ Pro W3"/>
+              <a:ea typeface="ヒラギノ角ゴ Pro W3"/>
+              <a:cs typeface="ヒラギノ角ゴ Pro W3"/>
+            </a:endParaRPr>
+          </a:p>
+          <a:p>
+            <a:r>
+              <a:rPr lang="ja-JP" altLang="en-US" sz="900" dirty="0">
+                <a:latin typeface="ヒラギノ角ゴ Pro W3"/>
+                <a:ea typeface="ヒラギノ角ゴ Pro W3"/>
+                <a:cs typeface="ヒラギノ角ゴ Pro W3"/>
+              </a:rPr>
+              <a:t>このカーネルの構築、すなわち「ソフトウェア工学のエッセンス（</a:t>
             </a:r>
             <a:r>
               <a:rPr lang="en-US" altLang="ja-JP" sz="900" dirty="0">
@@ -3876,33 +3897,23 @@
                 <a:ea typeface="ヒラギノ角ゴ Pro W3"/>
                 <a:cs typeface="ヒラギノ角ゴ Pro W3"/>
               </a:rPr>
-              <a:t>(way of</a:t>
-            </a:r>
-          </a:p>
-          <a:p>
+              <a:t>the essence of software engineering</a:t>
+            </a:r>
+            <a:r>
+              <a:rPr lang="ja-JP" altLang="en-US" sz="900" dirty="0">
+                <a:latin typeface="ヒラギノ角ゴ Pro W3"/>
+                <a:ea typeface="ヒラギノ角ゴ Pro W3"/>
+                <a:cs typeface="ヒラギノ角ゴ Pro W3"/>
+              </a:rPr>
+              <a:t>）」は、「ソフトウェア工学の方法論と理論（</a:t>
+            </a:r>
             <a:r>
               <a:rPr lang="en-US" altLang="ja-JP" sz="900" dirty="0">
                 <a:latin typeface="ヒラギノ角ゴ Pro W3"/>
                 <a:ea typeface="ヒラギノ角ゴ Pro W3"/>
                 <a:cs typeface="ヒラギノ角ゴ Pro W3"/>
               </a:rPr>
-              <a:t>working)</a:t>
-            </a:r>
-            <a:r>
-              <a:rPr lang="ja-JP" altLang="en-US" sz="900" dirty="0">
-                <a:latin typeface="ヒラギノ角ゴ Pro W3"/>
-                <a:ea typeface="ヒラギノ角ゴ Pro W3"/>
-                <a:cs typeface="ヒラギノ角ゴ Pro W3"/>
-              </a:rPr>
-              <a:t>と採用しようとする新しいアイディアのギャップを橋渡しする、効果的な思考</a:t>
-            </a:r>
-            <a:r>
-              <a:rPr lang="ja-JP" altLang="en-US" sz="900" dirty="0" smtClean="0">
-                <a:latin typeface="ヒラギノ角ゴ Pro W3"/>
-                <a:ea typeface="ヒラギノ角ゴ Pro W3"/>
-                <a:cs typeface="ヒラギノ角ゴ Pro W3"/>
-              </a:rPr>
-              <a:t>フレームワーク</a:t>
+              <a:t>Software Engineering Methods and Theory</a:t>
             </a:r>
             <a:r>
               <a:rPr lang="en-US" altLang="ja-JP" sz="900" dirty="0" smtClean="0">
@@ -3910,31 +3921,23 @@
                 <a:ea typeface="ヒラギノ角ゴ Pro W3"/>
                 <a:cs typeface="ヒラギノ角ゴ Pro W3"/>
               </a:rPr>
-              <a:t> ( thinking framework) </a:t>
-            </a:r>
-            <a:r>
-              <a:rPr lang="ja-JP" altLang="en-US" sz="900" dirty="0" smtClean="0">
-                <a:latin typeface="ヒラギノ角ゴ Pro W3"/>
-                <a:ea typeface="ヒラギノ角ゴ Pro W3"/>
-                <a:cs typeface="ヒラギノ角ゴ Pro W3"/>
-              </a:rPr>
-              <a:t>が</a:t>
-            </a:r>
-            <a:r>
-              <a:rPr lang="ja-JP" altLang="en-US" sz="900" dirty="0">
-                <a:latin typeface="ヒラギノ角ゴ Pro W3"/>
-                <a:ea typeface="ヒラギノ角ゴ Pro W3"/>
-                <a:cs typeface="ヒラギノ角ゴ Pro W3"/>
-              </a:rPr>
-              <a:t>必要だ。この記事は、そのような思考フレームワークを「アクション可能な</a:t>
-            </a:r>
-            <a:r>
-              <a:rPr lang="ja-JP" altLang="en-US" sz="900" dirty="0" smtClean="0">
-                <a:latin typeface="ヒラギノ角ゴ Pro W3"/>
-                <a:ea typeface="ヒラギノ角ゴ Pro W3"/>
-                <a:cs typeface="ヒラギノ角ゴ Pro W3"/>
-              </a:rPr>
-              <a:t>カーネル</a:t>
+              <a:t>; SEMAT</a:t>
+            </a:r>
+            <a:r>
+              <a:rPr lang="ja-JP" altLang="en-US" sz="900" dirty="0">
+                <a:latin typeface="ヒラギノ角ゴ Pro W3"/>
+                <a:ea typeface="ヒラギノ角ゴ Pro W3"/>
+                <a:cs typeface="ヒラギノ角ゴ Pro W3"/>
+              </a:rPr>
+              <a:t>）」の行動宣言（</a:t>
+            </a:r>
+            <a:r>
+              <a:rPr lang="en-US" altLang="ja-JP" sz="900" dirty="0">
+                <a:latin typeface="ヒラギノ角ゴ Pro W3"/>
+                <a:ea typeface="ヒラギノ角ゴ Pro W3"/>
+                <a:cs typeface="ヒラギノ角ゴ Pro W3"/>
+              </a:rPr>
+              <a:t>call </a:t>
             </a:r>
             <a:r>
               <a:rPr lang="en-US" altLang="ja-JP" sz="900" dirty="0" smtClean="0">
@@ -3942,7 +3945,125 @@
                 <a:ea typeface="ヒラギノ角ゴ Pro W3"/>
                 <a:cs typeface="ヒラギノ角ゴ Pro W3"/>
               </a:rPr>
-              <a:t> ( actionable</a:t>
+              <a:t>for action</a:t>
+            </a:r>
+            <a:r>
+              <a:rPr lang="ja-JP" altLang="en-US" sz="900" dirty="0">
+                <a:latin typeface="ヒラギノ角ゴ Pro W3"/>
+                <a:ea typeface="ヒラギノ角ゴ Pro W3"/>
+                <a:cs typeface="ヒラギノ角ゴ Pro W3"/>
+              </a:rPr>
+              <a:t>）（図</a:t>
+            </a:r>
+            <a:r>
+              <a:rPr lang="en-US" altLang="ja-JP" sz="900" dirty="0">
+                <a:latin typeface="ヒラギノ角ゴ Pro W3"/>
+                <a:ea typeface="ヒラギノ角ゴ Pro W3"/>
+                <a:cs typeface="ヒラギノ角ゴ Pro W3"/>
+              </a:rPr>
+              <a:t>1</a:t>
+            </a:r>
+            <a:r>
+              <a:rPr lang="ja-JP" altLang="en-US" sz="900" dirty="0">
+                <a:latin typeface="ヒラギノ角ゴ Pro W3"/>
+                <a:ea typeface="ヒラギノ角ゴ Pro W3"/>
+                <a:cs typeface="ヒラギノ角ゴ Pro W3"/>
+              </a:rPr>
+              <a:t>）に触発されたものであり、それに対する直接の回答でもある。そして、ソフトウェア工学の再定義に向けた小さな一歩でもある</a:t>
+            </a:r>
+            <a:r>
+              <a:rPr lang="ja-JP" altLang="en-US" sz="900" dirty="0" smtClean="0">
+                <a:latin typeface="ヒラギノ角ゴ Pro W3"/>
+                <a:ea typeface="ヒラギノ角ゴ Pro W3"/>
+                <a:cs typeface="ヒラギノ角ゴ Pro W3"/>
+              </a:rPr>
+              <a:t>。</a:t>
+            </a:r>
+            <a:endParaRPr lang="en-US" altLang="ja-JP" sz="900" dirty="0" smtClean="0">
+              <a:latin typeface="ヒラギノ角ゴ Pro W3"/>
+              <a:ea typeface="ヒラギノ角ゴ Pro W3"/>
+              <a:cs typeface="ヒラギノ角ゴ Pro W3"/>
+            </a:endParaRPr>
+          </a:p>
+          <a:p>
+            <a:endParaRPr lang="en-US" sz="900" dirty="0" smtClean="0">
+              <a:latin typeface="ヒラギノ角ゴ Pro W3"/>
+              <a:ea typeface="ヒラギノ角ゴ Pro W3"/>
+              <a:cs typeface="ヒラギノ角ゴ Pro W3"/>
+            </a:endParaRPr>
+          </a:p>
+          <a:p>
+            <a:r>
+              <a:rPr lang="en-US" altLang="ja-JP" sz="900" dirty="0">
+                <a:latin typeface="ヒラギノ角ゴ Pro W3"/>
+                <a:ea typeface="ヒラギノ角ゴ Pro W3"/>
+                <a:cs typeface="ヒラギノ角ゴ Pro W3"/>
+              </a:rPr>
+              <a:t>SEMAT</a:t>
+            </a:r>
+            <a:r>
+              <a:rPr lang="ja-JP" altLang="en-US" sz="900" dirty="0">
+                <a:latin typeface="ヒラギノ角ゴ Pro W3"/>
+                <a:ea typeface="ヒラギノ角ゴ Pro W3"/>
+                <a:cs typeface="ヒラギノ角ゴ Pro W3"/>
+              </a:rPr>
+              <a:t>は</a:t>
+            </a:r>
+            <a:r>
+              <a:rPr lang="en-US" altLang="ja-JP" sz="900" dirty="0">
+                <a:latin typeface="ヒラギノ角ゴ Pro W3"/>
+                <a:ea typeface="ヒラギノ角ゴ Pro W3"/>
+                <a:cs typeface="ヒラギノ角ゴ Pro W3"/>
+              </a:rPr>
+              <a:t>2009</a:t>
+            </a:r>
+            <a:r>
+              <a:rPr lang="ja-JP" altLang="en-US" sz="900" dirty="0">
+                <a:latin typeface="ヒラギノ角ゴ Pro W3"/>
+                <a:ea typeface="ヒラギノ角ゴ Pro W3"/>
+                <a:cs typeface="ヒラギノ角ゴ Pro W3"/>
+              </a:rPr>
+              <a:t>年</a:t>
+            </a:r>
+            <a:r>
+              <a:rPr lang="en-US" altLang="ja-JP" sz="900" dirty="0">
+                <a:latin typeface="ヒラギノ角ゴ Pro W3"/>
+                <a:ea typeface="ヒラギノ角ゴ Pro W3"/>
+                <a:cs typeface="ヒラギノ角ゴ Pro W3"/>
+              </a:rPr>
+              <a:t>9</a:t>
+            </a:r>
+            <a:r>
+              <a:rPr lang="ja-JP" altLang="en-US" sz="900" dirty="0">
+                <a:latin typeface="ヒラギノ角ゴ Pro W3"/>
+                <a:ea typeface="ヒラギノ角ゴ Pro W3"/>
+                <a:cs typeface="ヒラギノ角ゴ Pro W3"/>
+              </a:rPr>
+              <a:t>月に、人々のソフトウェア開発手法への関わり方を抜本的に変更する時期に来ていると感じた</a:t>
+            </a:r>
+            <a:r>
+              <a:rPr lang="en-US" altLang="ja-JP" sz="900" dirty="0">
+                <a:latin typeface="ヒラギノ角ゴ Pro W3"/>
+                <a:ea typeface="ヒラギノ角ゴ Pro W3"/>
+                <a:cs typeface="ヒラギノ角ゴ Pro W3"/>
+              </a:rPr>
+              <a:t>3</a:t>
+            </a:r>
+            <a:r>
+              <a:rPr lang="ja-JP" altLang="en-US" sz="900" dirty="0">
+                <a:latin typeface="ヒラギノ角ゴ Pro W3"/>
+                <a:ea typeface="ヒラギノ角ゴ Pro W3"/>
+                <a:cs typeface="ヒラギノ角ゴ Pro W3"/>
+              </a:rPr>
+              <a:t>人、</a:t>
+            </a:r>
+            <a:r>
+              <a:rPr lang="en-US" altLang="ja-JP" sz="900" dirty="0" err="1">
+                <a:latin typeface="ヒラギノ角ゴ Pro W3"/>
+                <a:ea typeface="ヒラギノ角ゴ Pro W3"/>
+                <a:cs typeface="ヒラギノ角ゴ Pro W3"/>
+              </a:rPr>
+              <a:t>Ivar</a:t>
             </a:r>
             <a:endParaRPr lang="en-US" altLang="ja-JP" sz="900" dirty="0">
               <a:latin typeface="ヒラギノ角ゴ Pro W3"/>
@@ -3957,15 +4078,71 @@
                 <a:ea typeface="ヒラギノ角ゴ Pro W3"/>
                 <a:cs typeface="ヒラギノ角ゴ Pro W3"/>
               </a:rPr>
-              <a:t>kernel)</a:t>
-            </a:r>
-            <a:r>
-              <a:rPr lang="ja-JP" altLang="en-US" sz="900" dirty="0">
-                <a:latin typeface="ヒラギノ角ゴ Pro W3"/>
-                <a:ea typeface="ヒラギノ角ゴ Pro W3"/>
-                <a:cs typeface="ヒラギノ角ゴ Pro W3"/>
-              </a:rPr>
-              <a:t>」の形で提示することで、リスクと仕事の仕方の改善のバランスさせようとしているチームを支援したい</a:t>
+              <a:t>Jacobson</a:t>
+            </a:r>
+            <a:r>
+              <a:rPr lang="ja-JP" altLang="en-US" sz="900" dirty="0">
+                <a:latin typeface="ヒラギノ角ゴ Pro W3"/>
+                <a:ea typeface="ヒラギノ角ゴ Pro W3"/>
+                <a:cs typeface="ヒラギノ角ゴ Pro W3"/>
+              </a:rPr>
+              <a:t>、</a:t>
+            </a:r>
+            <a:r>
+              <a:rPr lang="en-US" altLang="ja-JP" sz="900" dirty="0">
+                <a:latin typeface="ヒラギノ角ゴ Pro W3"/>
+                <a:ea typeface="ヒラギノ角ゴ Pro W3"/>
+                <a:cs typeface="ヒラギノ角ゴ Pro W3"/>
+              </a:rPr>
+              <a:t>Bertrand Meyer</a:t>
+            </a:r>
+            <a:r>
+              <a:rPr lang="ja-JP" altLang="en-US" sz="900" dirty="0">
+                <a:latin typeface="ヒラギノ角ゴ Pro W3"/>
+                <a:ea typeface="ヒラギノ角ゴ Pro W3"/>
+                <a:cs typeface="ヒラギノ角ゴ Pro W3"/>
+              </a:rPr>
+              <a:t>、</a:t>
+            </a:r>
+            <a:r>
+              <a:rPr lang="en-US" altLang="ja-JP" sz="900" dirty="0">
+                <a:latin typeface="ヒラギノ角ゴ Pro W3"/>
+                <a:ea typeface="ヒラギノ角ゴ Pro W3"/>
+                <a:cs typeface="ヒラギノ角ゴ Pro W3"/>
+              </a:rPr>
+              <a:t>Richard </a:t>
+            </a:r>
+            <a:r>
+              <a:rPr lang="en-US" altLang="ja-JP" sz="900" dirty="0" err="1">
+                <a:latin typeface="ヒラギノ角ゴ Pro W3"/>
+                <a:ea typeface="ヒラギノ角ゴ Pro W3"/>
+                <a:cs typeface="ヒラギノ角ゴ Pro W3"/>
+              </a:rPr>
+              <a:t>Soley</a:t>
+            </a:r>
+            <a:r>
+              <a:rPr lang="ja-JP" altLang="en-US" sz="900" dirty="0">
+                <a:latin typeface="ヒラギノ角ゴ Pro W3"/>
+                <a:ea typeface="ヒラギノ角ゴ Pro W3"/>
+                <a:cs typeface="ヒラギノ角ゴ Pro W3"/>
+              </a:rPr>
+              <a:t>によって創設された </a:t>
+            </a:r>
+            <a:r>
+              <a:rPr lang="en-US" altLang="ja-JP" sz="900" dirty="0">
+                <a:latin typeface="ヒラギノ角ゴ Pro W3"/>
+                <a:ea typeface="ヒラギノ角ゴ Pro W3"/>
+                <a:cs typeface="ヒラギノ角ゴ Pro W3"/>
+              </a:rPr>
+              <a:t>[3,4,8] </a:t>
+            </a:r>
+            <a:r>
+              <a:rPr lang="ja-JP" altLang="en-US" sz="900" dirty="0">
+                <a:latin typeface="ヒラギノ角ゴ Pro W3"/>
+                <a:ea typeface="ヒラギノ角ゴ Pro W3"/>
+                <a:cs typeface="ヒラギノ角ゴ Pro W3"/>
+              </a:rPr>
+              <a:t>。彼らは 行動宣言を書き、いくつかの致命的な問題を特定し、なぜ行動が必要かを説明し、そして何が必要なのかを示唆した。その行動宣言を以下に示す</a:t>
             </a:r>
             <a:r>
               <a:rPr lang="ja-JP" altLang="en-US" sz="900" dirty="0" smtClean="0">
@@ -3982,6 +4159,190 @@
             </a:endParaRPr>
           </a:p>
           <a:p>
+            <a:endParaRPr lang="en-US" sz="900" dirty="0">
+              <a:latin typeface="ヒラギノ角ゴ Pro W3"/>
+              <a:ea typeface="ヒラギノ角ゴ Pro W3"/>
+              <a:cs typeface="ヒラギノ角ゴ Pro W3"/>
+            </a:endParaRPr>
+          </a:p>
+          <a:p>
+            <a:r>
+              <a:rPr lang="ja-JP" altLang="en-US" sz="900" dirty="0">
+                <a:latin typeface="ヒラギノ角ゴ Pro W3"/>
+                <a:ea typeface="ヒラギノ角ゴ Pro W3"/>
+                <a:cs typeface="ヒラギノ角ゴ Pro W3"/>
+              </a:rPr>
+              <a:t>現在のソフトウェア工学のいくつかの分野では、未成熟なプラクティス</a:t>
+            </a:r>
+            <a:r>
+              <a:rPr lang="en-US" altLang="ja-JP" sz="900" dirty="0">
+                <a:latin typeface="ヒラギノ角ゴ Pro W3"/>
+                <a:ea typeface="ヒラギノ角ゴ Pro W3"/>
+                <a:cs typeface="ヒラギノ角ゴ Pro W3"/>
+              </a:rPr>
+              <a:t>(immature practices)</a:t>
+            </a:r>
+            <a:r>
+              <a:rPr lang="ja-JP" altLang="en-US" sz="900" dirty="0">
+                <a:latin typeface="ヒラギノ角ゴ Pro W3"/>
+                <a:ea typeface="ヒラギノ角ゴ Pro W3"/>
+                <a:cs typeface="ヒラギノ角ゴ Pro W3"/>
+              </a:rPr>
+              <a:t>に苦しめられている。具体的には、以下の問題を含む。</a:t>
+            </a:r>
+          </a:p>
+          <a:p>
+            <a:endParaRPr lang="ja-JP" altLang="en-US" sz="900" dirty="0">
+              <a:latin typeface="ヒラギノ角ゴ Pro W3"/>
+              <a:ea typeface="ヒラギノ角ゴ Pro W3"/>
+              <a:cs typeface="ヒラギノ角ゴ Pro W3"/>
+            </a:endParaRPr>
+          </a:p>
+          <a:p>
+            <a:r>
+              <a:rPr lang="ja-JP" altLang="en-US" sz="900" dirty="0">
+                <a:latin typeface="ヒラギノ角ゴ Pro W3"/>
+                <a:ea typeface="ヒラギノ角ゴ Pro W3"/>
+                <a:cs typeface="ヒラギノ角ゴ Pro W3"/>
+              </a:rPr>
+              <a:t>* 言葉の流行が、工学の一分野というよりファッション業界のようである。</a:t>
+            </a:r>
+          </a:p>
+          <a:p>
+            <a:r>
+              <a:rPr lang="ja-JP" altLang="en-US" sz="900" dirty="0">
+                <a:latin typeface="ヒラギノ角ゴ Pro W3"/>
+                <a:ea typeface="ヒラギノ角ゴ Pro W3"/>
+                <a:cs typeface="ヒラギノ角ゴ Pro W3"/>
+              </a:rPr>
+              <a:t>* 堅固で広く受け入れられるような理論的基礎を欠いている。</a:t>
+            </a:r>
+          </a:p>
+          <a:p>
+            <a:r>
+              <a:rPr lang="ja-JP" altLang="en-US" sz="900" dirty="0">
+                <a:latin typeface="ヒラギノ角ゴ Pro W3"/>
+                <a:ea typeface="ヒラギノ角ゴ Pro W3"/>
+                <a:cs typeface="ヒラギノ角ゴ Pro W3"/>
+              </a:rPr>
+              <a:t>* 非常に多くの方法論</a:t>
+            </a:r>
+            <a:r>
+              <a:rPr lang="en-US" altLang="ja-JP" sz="900" dirty="0">
+                <a:latin typeface="ヒラギノ角ゴ Pro W3"/>
+                <a:ea typeface="ヒラギノ角ゴ Pro W3"/>
+                <a:cs typeface="ヒラギノ角ゴ Pro W3"/>
+              </a:rPr>
+              <a:t>(methods)</a:t>
+            </a:r>
+            <a:r>
+              <a:rPr lang="ja-JP" altLang="en-US" sz="900" dirty="0">
+                <a:latin typeface="ヒラギノ角ゴ Pro W3"/>
+                <a:ea typeface="ヒラギノ角ゴ Pro W3"/>
+                <a:cs typeface="ヒラギノ角ゴ Pro W3"/>
+              </a:rPr>
+              <a:t>とその派生であふれ、それらの違いはほとんど理解されず作為的に強調されている。</a:t>
+            </a:r>
+          </a:p>
+          <a:p>
+            <a:r>
+              <a:rPr lang="ja-JP" altLang="en-US" sz="900" dirty="0">
+                <a:latin typeface="ヒラギノ角ゴ Pro W3"/>
+                <a:ea typeface="ヒラギノ角ゴ Pro W3"/>
+                <a:cs typeface="ヒラギノ角ゴ Pro W3"/>
+              </a:rPr>
+              <a:t>* 信頼できる実験的評価</a:t>
+            </a:r>
+            <a:r>
+              <a:rPr lang="en-US" altLang="ja-JP" sz="900" dirty="0">
+                <a:latin typeface="ヒラギノ角ゴ Pro W3"/>
+                <a:ea typeface="ヒラギノ角ゴ Pro W3"/>
+                <a:cs typeface="ヒラギノ角ゴ Pro W3"/>
+              </a:rPr>
+              <a:t>(experimental evaluation)</a:t>
+            </a:r>
+            <a:r>
+              <a:rPr lang="ja-JP" altLang="en-US" sz="900" dirty="0">
+                <a:latin typeface="ヒラギノ角ゴ Pro W3"/>
+                <a:ea typeface="ヒラギノ角ゴ Pro W3"/>
+                <a:cs typeface="ヒラギノ角ゴ Pro W3"/>
+              </a:rPr>
+              <a:t>と妥当性確認</a:t>
+            </a:r>
+            <a:r>
+              <a:rPr lang="en-US" altLang="ja-JP" sz="900" dirty="0">
+                <a:latin typeface="ヒラギノ角ゴ Pro W3"/>
+                <a:ea typeface="ヒラギノ角ゴ Pro W3"/>
+                <a:cs typeface="ヒラギノ角ゴ Pro W3"/>
+              </a:rPr>
+              <a:t>(validation)</a:t>
+            </a:r>
+            <a:r>
+              <a:rPr lang="ja-JP" altLang="en-US" sz="900" dirty="0">
+                <a:latin typeface="ヒラギノ角ゴ Pro W3"/>
+                <a:ea typeface="ヒラギノ角ゴ Pro W3"/>
+                <a:cs typeface="ヒラギノ角ゴ Pro W3"/>
+              </a:rPr>
+              <a:t>を欠いている。</a:t>
+            </a:r>
+          </a:p>
+          <a:p>
+            <a:r>
+              <a:rPr lang="ja-JP" altLang="en-US" sz="900" dirty="0" smtClean="0">
+                <a:latin typeface="ヒラギノ角ゴ Pro W3"/>
+                <a:ea typeface="ヒラギノ角ゴ Pro W3"/>
+                <a:cs typeface="ヒラギノ角ゴ Pro W3"/>
+              </a:rPr>
+              <a:t>* 産</a:t>
+            </a:r>
+            <a:r>
+              <a:rPr lang="ja-JP" altLang="en-US" sz="900" dirty="0">
+                <a:latin typeface="ヒラギノ角ゴ Pro W3"/>
+                <a:ea typeface="ヒラギノ角ゴ Pro W3"/>
+                <a:cs typeface="ヒラギノ角ゴ Pro W3"/>
+              </a:rPr>
+              <a:t>業界の実践</a:t>
+            </a:r>
+            <a:r>
+              <a:rPr lang="en-US" altLang="ja-JP" sz="900" dirty="0">
+                <a:latin typeface="ヒラギノ角ゴ Pro W3"/>
+                <a:ea typeface="ヒラギノ角ゴ Pro W3"/>
+                <a:cs typeface="ヒラギノ角ゴ Pro W3"/>
+              </a:rPr>
+              <a:t>(industry practice)</a:t>
+            </a:r>
+            <a:r>
+              <a:rPr lang="ja-JP" altLang="en-US" sz="900" dirty="0">
+                <a:latin typeface="ヒラギノ角ゴ Pro W3"/>
+                <a:ea typeface="ヒラギノ角ゴ Pro W3"/>
+                <a:cs typeface="ヒラギノ角ゴ Pro W3"/>
+              </a:rPr>
+              <a:t>と学界の研究</a:t>
+            </a:r>
+            <a:r>
+              <a:rPr lang="en-US" altLang="ja-JP" sz="900" dirty="0">
+                <a:latin typeface="ヒラギノ角ゴ Pro W3"/>
+                <a:ea typeface="ヒラギノ角ゴ Pro W3"/>
+                <a:cs typeface="ヒラギノ角ゴ Pro W3"/>
+              </a:rPr>
+              <a:t>(academic research)</a:t>
+            </a:r>
+            <a:r>
+              <a:rPr lang="ja-JP" altLang="en-US" sz="900" dirty="0">
+                <a:latin typeface="ヒラギノ角ゴ Pro W3"/>
+                <a:ea typeface="ヒラギノ角ゴ Pro W3"/>
+                <a:cs typeface="ヒラギノ角ゴ Pro W3"/>
+              </a:rPr>
+              <a:t>の乖離</a:t>
+            </a:r>
+            <a:r>
+              <a:rPr lang="ja-JP" altLang="en-US" sz="900" dirty="0" smtClean="0">
+                <a:latin typeface="ヒラギノ角ゴ Pro W3"/>
+                <a:ea typeface="ヒラギノ角ゴ Pro W3"/>
+                <a:cs typeface="ヒラギノ角ゴ Pro W3"/>
+              </a:rPr>
+              <a:t>。</a:t>
+            </a:r>
             <a:endParaRPr lang="en-US" altLang="ja-JP" sz="900" dirty="0" smtClean="0">
               <a:latin typeface="ヒラギノ角ゴ Pro W3"/>
               <a:ea typeface="ヒラギノ角ゴ Pro W3"/>
@@ -3989,92 +4350,6 @@
             </a:endParaRPr>
           </a:p>
           <a:p>
-            <a:r>
-              <a:rPr lang="ja-JP" altLang="en-US" sz="900" dirty="0" smtClean="0">
-                <a:latin typeface="ヒラギノ角ゴ Pro W3"/>
-                <a:ea typeface="ヒラギノ角ゴ Pro W3"/>
-                <a:cs typeface="ヒラギノ角ゴ Pro W3"/>
-              </a:rPr>
-              <a:t>この</a:t>
-            </a:r>
-            <a:r>
-              <a:rPr lang="ja-JP" altLang="en-US" sz="900" dirty="0">
-                <a:latin typeface="ヒラギノ角ゴ Pro W3"/>
-                <a:ea typeface="ヒラギノ角ゴ Pro W3"/>
-                <a:cs typeface="ヒラギノ角ゴ Pro W3"/>
-              </a:rPr>
-              <a:t>カーネルの構築、すなわち「ソフトウェア工学のエッセンス</a:t>
-            </a:r>
-            <a:r>
-              <a:rPr lang="en-US" altLang="ja-JP" sz="900" dirty="0">
-                <a:latin typeface="ヒラギノ角ゴ Pro W3"/>
-                <a:ea typeface="ヒラギノ角ゴ Pro W3"/>
-                <a:cs typeface="ヒラギノ角ゴ Pro W3"/>
-              </a:rPr>
-              <a:t>(the essence of </a:t>
-            </a:r>
-            <a:r>
-              <a:rPr lang="en-US" altLang="ja-JP" sz="900" dirty="0" smtClean="0">
-                <a:latin typeface="ヒラギノ角ゴ Pro W3"/>
-                <a:ea typeface="ヒラギノ角ゴ Pro W3"/>
-                <a:cs typeface="ヒラギノ角ゴ Pro W3"/>
-              </a:rPr>
-              <a:t>software engineering)</a:t>
-            </a:r>
-            <a:r>
-              <a:rPr lang="ja-JP" altLang="en-US" sz="900" dirty="0">
-                <a:latin typeface="ヒラギノ角ゴ Pro W3"/>
-                <a:ea typeface="ヒラギノ角ゴ Pro W3"/>
-                <a:cs typeface="ヒラギノ角ゴ Pro W3"/>
-              </a:rPr>
-              <a:t>」は、「ソフトウェア工学の方法論と理論</a:t>
-            </a:r>
-            <a:r>
-              <a:rPr lang="en-US" altLang="ja-JP" sz="900" dirty="0">
-                <a:latin typeface="ヒラギノ角ゴ Pro W3"/>
-                <a:ea typeface="ヒラギノ角ゴ Pro W3"/>
-                <a:cs typeface="ヒラギノ角ゴ Pro W3"/>
-              </a:rPr>
-              <a:t>(Software Engineering Methods and Theory</a:t>
-            </a:r>
-          </a:p>
-          <a:p>
-            <a:r>
-              <a:rPr lang="en-US" altLang="ja-JP" sz="900" dirty="0">
-                <a:latin typeface="ヒラギノ角ゴ Pro W3"/>
-                <a:ea typeface="ヒラギノ角ゴ Pro W3"/>
-                <a:cs typeface="ヒラギノ角ゴ Pro W3"/>
-              </a:rPr>
-              <a:t>(SEMAT) call for action (</a:t>
-            </a:r>
-            <a:r>
-              <a:rPr lang="ja-JP" altLang="en-US" sz="900" dirty="0">
-                <a:latin typeface="ヒラギノ角ゴ Pro W3"/>
-                <a:ea typeface="ヒラギノ角ゴ Pro W3"/>
-                <a:cs typeface="ヒラギノ角ゴ Pro W3"/>
-              </a:rPr>
-              <a:t>図</a:t>
-            </a:r>
-          </a:p>
-          <a:p>
-            <a:r>
-              <a:rPr lang="en-US" altLang="ja-JP" sz="900" dirty="0">
-                <a:latin typeface="ヒラギノ角ゴ Pro W3"/>
-                <a:ea typeface="ヒラギノ角ゴ Pro W3"/>
-                <a:cs typeface="ヒラギノ角ゴ Pro W3"/>
-              </a:rPr>
-              <a:t>1))</a:t>
-            </a:r>
-            <a:r>
-              <a:rPr lang="ja-JP" altLang="en-US" sz="900" dirty="0">
-                <a:latin typeface="ヒラギノ角ゴ Pro W3"/>
-                <a:ea typeface="ヒラギノ角ゴ Pro W3"/>
-                <a:cs typeface="ヒラギノ角ゴ Pro W3"/>
-              </a:rPr>
-              <a:t>」にインスパイアされたものであり、それに対する直接の回答でもある。そして、ソフトウェア工学の再定義に向けた小さな一歩でもあるのだ。</a:t>
-            </a:r>
-          </a:p>
-          <a:p>
             <a:endParaRPr lang="en-US" sz="900" dirty="0" smtClean="0">
               <a:latin typeface="ヒラギノ角ゴ Pro W3"/>
               <a:ea typeface="ヒラギノ角ゴ Pro W3"/>
@@ -4083,11 +4358,67 @@
           </a:p>
           <a:p>
             <a:r>
+              <a:rPr lang="ja-JP" altLang="en-US" sz="900" dirty="0">
+                <a:latin typeface="ヒラギノ角ゴ Pro W3"/>
+                <a:ea typeface="ヒラギノ角ゴ Pro W3"/>
+                <a:cs typeface="ヒラギノ角ゴ Pro W3"/>
+              </a:rPr>
+              <a:t>このように行動宣言は、ソフトウェア産業が流行とファッションに陥りやすいという前提を置いており、ある人々には「新しいアイディアへの抵抗」と映ったようである。しかし、それは真実からかけ離れている。この記事および間もなく刊行される書籍（</a:t>
+            </a:r>
+            <a:r>
               <a:rPr lang="en-US" altLang="ja-JP" sz="900" dirty="0">
                 <a:latin typeface="ヒラギノ角ゴ Pro W3"/>
                 <a:ea typeface="ヒラギノ角ゴ Pro W3"/>
                 <a:cs typeface="ヒラギノ角ゴ Pro W3"/>
               </a:rPr>
+              <a:t>The Essence of </a:t>
+            </a:r>
+            <a:r>
+              <a:rPr lang="en-US" altLang="ja-JP" sz="900" dirty="0" smtClean="0">
+                <a:latin typeface="ヒラギノ角ゴ Pro W3"/>
+                <a:ea typeface="ヒラギノ角ゴ Pro W3"/>
+                <a:cs typeface="ヒラギノ角ゴ Pro W3"/>
+              </a:rPr>
+              <a:t>Software Engineering — Applying </a:t>
+            </a:r>
+            <a:r>
+              <a:rPr lang="en-US" altLang="ja-JP" sz="900" dirty="0">
+                <a:latin typeface="ヒラギノ角ゴ Pro W3"/>
+                <a:ea typeface="ヒラギノ角ゴ Pro W3"/>
+                <a:cs typeface="ヒラギノ角ゴ Pro W3"/>
+              </a:rPr>
+              <a:t>the SEMAT Kernel</a:t>
+            </a:r>
+            <a:r>
+              <a:rPr lang="ja-JP" altLang="en-US" sz="900" dirty="0">
+                <a:latin typeface="ヒラギノ角ゴ Pro W3"/>
+                <a:ea typeface="ヒラギノ角ゴ Pro W3"/>
+                <a:cs typeface="ヒラギノ角ゴ Pro W3"/>
+              </a:rPr>
+              <a:t>）</a:t>
+            </a:r>
+            <a:r>
+              <a:rPr lang="en-US" altLang="ja-JP" sz="900" dirty="0">
+                <a:latin typeface="ヒラギノ角ゴ Pro W3"/>
+                <a:ea typeface="ヒラギノ角ゴ Pro W3"/>
+                <a:cs typeface="ヒラギノ角ゴ Pro W3"/>
+              </a:rPr>
+              <a:t>[6]</a:t>
+            </a:r>
+            <a:r>
+              <a:rPr lang="ja-JP" altLang="en-US" sz="900" dirty="0">
+                <a:latin typeface="ヒラギノ角ゴ Pro W3"/>
+                <a:ea typeface="ヒラギノ角ゴ Pro W3"/>
+                <a:cs typeface="ヒラギノ角ゴ Pro W3"/>
+              </a:rPr>
+              <a:t>で見てとれるように、</a:t>
+            </a:r>
+            <a:r>
+              <a:rPr lang="en-US" altLang="ja-JP" sz="900" dirty="0">
+                <a:latin typeface="ヒラギノ角ゴ Pro W3"/>
+                <a:ea typeface="ヒラギノ角ゴ Pro W3"/>
+                <a:cs typeface="ヒラギノ角ゴ Pro W3"/>
+              </a:rPr>
               <a:t>SEMAT</a:t>
             </a:r>
             <a:r>
@@ -4096,505 +4427,7 @@
                 <a:ea typeface="ヒラギノ角ゴ Pro W3"/>
                 <a:cs typeface="ヒラギノ角ゴ Pro W3"/>
               </a:rPr>
-              <a:t>は、</a:t>
-            </a:r>
-            <a:r>
-              <a:rPr lang="en-US" altLang="ja-JP" sz="900" dirty="0">
-                <a:latin typeface="ヒラギノ角ゴ Pro W3"/>
-                <a:ea typeface="ヒラギノ角ゴ Pro W3"/>
-                <a:cs typeface="ヒラギノ角ゴ Pro W3"/>
-              </a:rPr>
-              <a:t>2009</a:t>
-            </a:r>
-            <a:r>
-              <a:rPr lang="ja-JP" altLang="en-US" sz="900" dirty="0">
-                <a:latin typeface="ヒラギノ角ゴ Pro W3"/>
-                <a:ea typeface="ヒラギノ角ゴ Pro W3"/>
-                <a:cs typeface="ヒラギノ角ゴ Pro W3"/>
-              </a:rPr>
-              <a:t>年</a:t>
-            </a:r>
-            <a:r>
-              <a:rPr lang="en-US" altLang="ja-JP" sz="900" dirty="0">
-                <a:latin typeface="ヒラギノ角ゴ Pro W3"/>
-                <a:ea typeface="ヒラギノ角ゴ Pro W3"/>
-                <a:cs typeface="ヒラギノ角ゴ Pro W3"/>
-              </a:rPr>
-              <a:t>9</a:t>
-            </a:r>
-            <a:r>
-              <a:rPr lang="ja-JP" altLang="en-US" sz="900" dirty="0">
-                <a:latin typeface="ヒラギノ角ゴ Pro W3"/>
-                <a:ea typeface="ヒラギノ角ゴ Pro W3"/>
-                <a:cs typeface="ヒラギノ角ゴ Pro W3"/>
-              </a:rPr>
-              <a:t>月、人々のソフトウェア開発手法への関わり方を抜本的に変更する時期に来ていると感じた</a:t>
-            </a:r>
-            <a:r>
-              <a:rPr lang="en-US" altLang="ja-JP" sz="900" dirty="0">
-                <a:latin typeface="ヒラギノ角ゴ Pro W3"/>
-                <a:ea typeface="ヒラギノ角ゴ Pro W3"/>
-                <a:cs typeface="ヒラギノ角ゴ Pro W3"/>
-              </a:rPr>
-              <a:t>3</a:t>
-            </a:r>
-            <a:r>
-              <a:rPr lang="ja-JP" altLang="en-US" sz="900" dirty="0">
-                <a:latin typeface="ヒラギノ角ゴ Pro W3"/>
-                <a:ea typeface="ヒラギノ角ゴ Pro W3"/>
-                <a:cs typeface="ヒラギノ角ゴ Pro W3"/>
-              </a:rPr>
-              <a:t>人、</a:t>
-            </a:r>
-            <a:r>
-              <a:rPr lang="en-US" altLang="ja-JP" sz="900" dirty="0" err="1">
-                <a:latin typeface="ヒラギノ角ゴ Pro W3"/>
-                <a:ea typeface="ヒラギノ角ゴ Pro W3"/>
-                <a:cs typeface="ヒラギノ角ゴ Pro W3"/>
-              </a:rPr>
-              <a:t>Ivar</a:t>
-            </a:r>
-            <a:endParaRPr lang="en-US" altLang="ja-JP" sz="900" dirty="0">
-              <a:latin typeface="ヒラギノ角ゴ Pro W3"/>
-              <a:ea typeface="ヒラギノ角ゴ Pro W3"/>
-              <a:cs typeface="ヒラギノ角ゴ Pro W3"/>
-            </a:endParaRPr>
-          </a:p>
-          <a:p>
-            <a:r>
-              <a:rPr lang="en-US" altLang="ja-JP" sz="900" dirty="0">
-                <a:latin typeface="ヒラギノ角ゴ Pro W3"/>
-                <a:ea typeface="ヒラギノ角ゴ Pro W3"/>
-                <a:cs typeface="ヒラギノ角ゴ Pro W3"/>
-              </a:rPr>
-              <a:t>Jacobson</a:t>
-            </a:r>
-            <a:r>
-              <a:rPr lang="ja-JP" altLang="en-US" sz="900" dirty="0">
-                <a:latin typeface="ヒラギノ角ゴ Pro W3"/>
-                <a:ea typeface="ヒラギノ角ゴ Pro W3"/>
-                <a:cs typeface="ヒラギノ角ゴ Pro W3"/>
-              </a:rPr>
-              <a:t>、</a:t>
-            </a:r>
-            <a:r>
-              <a:rPr lang="en-US" altLang="ja-JP" sz="900" dirty="0">
-                <a:latin typeface="ヒラギノ角ゴ Pro W3"/>
-                <a:ea typeface="ヒラギノ角ゴ Pro W3"/>
-                <a:cs typeface="ヒラギノ角ゴ Pro W3"/>
-              </a:rPr>
-              <a:t>Bertrand Meyer</a:t>
-            </a:r>
-            <a:r>
-              <a:rPr lang="ja-JP" altLang="en-US" sz="900" dirty="0">
-                <a:latin typeface="ヒラギノ角ゴ Pro W3"/>
-                <a:ea typeface="ヒラギノ角ゴ Pro W3"/>
-                <a:cs typeface="ヒラギノ角ゴ Pro W3"/>
-              </a:rPr>
-              <a:t>、</a:t>
-            </a:r>
-            <a:r>
-              <a:rPr lang="en-US" altLang="ja-JP" sz="900" dirty="0">
-                <a:latin typeface="ヒラギノ角ゴ Pro W3"/>
-                <a:ea typeface="ヒラギノ角ゴ Pro W3"/>
-                <a:cs typeface="ヒラギノ角ゴ Pro W3"/>
-              </a:rPr>
-              <a:t>Richard </a:t>
-            </a:r>
-            <a:r>
-              <a:rPr lang="en-US" altLang="ja-JP" sz="900" dirty="0" err="1">
-                <a:latin typeface="ヒラギノ角ゴ Pro W3"/>
-                <a:ea typeface="ヒラギノ角ゴ Pro W3"/>
-                <a:cs typeface="ヒラギノ角ゴ Pro W3"/>
-              </a:rPr>
-              <a:t>Soley</a:t>
-            </a:r>
-            <a:r>
-              <a:rPr lang="ja-JP" altLang="en-US" sz="900" dirty="0">
-                <a:latin typeface="ヒラギノ角ゴ Pro W3"/>
-                <a:ea typeface="ヒラギノ角ゴ Pro W3"/>
-                <a:cs typeface="ヒラギノ角ゴ Pro W3"/>
-              </a:rPr>
-              <a:t>によって創設された</a:t>
-            </a:r>
-            <a:r>
-              <a:rPr lang="en-US" altLang="ja-JP" sz="900" dirty="0">
-                <a:latin typeface="ヒラギノ角ゴ Pro W3"/>
-                <a:ea typeface="ヒラギノ角ゴ Pro W3"/>
-                <a:cs typeface="ヒラギノ角ゴ Pro W3"/>
-              </a:rPr>
-              <a:t>(3,4,8) </a:t>
-            </a:r>
-            <a:r>
-              <a:rPr lang="ja-JP" altLang="en-US" sz="900" dirty="0">
-                <a:latin typeface="ヒラギノ角ゴ Pro W3"/>
-                <a:ea typeface="ヒラギノ角ゴ Pro W3"/>
-                <a:cs typeface="ヒラギノ角ゴ Pro W3"/>
-              </a:rPr>
-              <a:t>。彼らは </a:t>
-            </a:r>
-            <a:r>
-              <a:rPr lang="en-US" altLang="ja-JP" sz="900" dirty="0">
-                <a:latin typeface="ヒラギノ角ゴ Pro W3"/>
-                <a:ea typeface="ヒラギノ角ゴ Pro W3"/>
-                <a:cs typeface="ヒラギノ角ゴ Pro W3"/>
-              </a:rPr>
-              <a:t>call </a:t>
-            </a:r>
-            <a:r>
-              <a:rPr lang="en-US" altLang="ja-JP" sz="900" dirty="0" smtClean="0">
-                <a:latin typeface="ヒラギノ角ゴ Pro W3"/>
-                <a:ea typeface="ヒラギノ角ゴ Pro W3"/>
-                <a:cs typeface="ヒラギノ角ゴ Pro W3"/>
-              </a:rPr>
-              <a:t>for action </a:t>
-            </a:r>
-            <a:r>
-              <a:rPr lang="ja-JP" altLang="en-US" sz="900" dirty="0">
-                <a:latin typeface="ヒラギノ角ゴ Pro W3"/>
-                <a:ea typeface="ヒラギノ角ゴ Pro W3"/>
-                <a:cs typeface="ヒラギノ角ゴ Pro W3"/>
-              </a:rPr>
-              <a:t>を書き、いくつかの致命的な問題を特定し、なぜ行動が必要かを説明し、そして何が必要なのかを示唆した。その </a:t>
-            </a:r>
-            <a:r>
-              <a:rPr lang="en-US" altLang="ja-JP" sz="900" dirty="0">
-                <a:latin typeface="ヒラギノ角ゴ Pro W3"/>
-                <a:ea typeface="ヒラギノ角ゴ Pro W3"/>
-                <a:cs typeface="ヒラギノ角ゴ Pro W3"/>
-              </a:rPr>
-              <a:t>call </a:t>
-            </a:r>
-            <a:r>
-              <a:rPr lang="en-US" altLang="ja-JP" sz="900" dirty="0" smtClean="0">
-                <a:latin typeface="ヒラギノ角ゴ Pro W3"/>
-                <a:ea typeface="ヒラギノ角ゴ Pro W3"/>
-                <a:cs typeface="ヒラギノ角ゴ Pro W3"/>
-              </a:rPr>
-              <a:t>for</a:t>
-            </a:r>
-            <a:r>
-              <a:rPr lang="en-US" altLang="ja-JP" sz="900" dirty="0">
-                <a:latin typeface="ヒラギノ角ゴ Pro W3"/>
-                <a:ea typeface="ヒラギノ角ゴ Pro W3"/>
-                <a:cs typeface="ヒラギノ角ゴ Pro W3"/>
-              </a:rPr>
-              <a:t> </a:t>
-            </a:r>
-            <a:r>
-              <a:rPr lang="en-US" altLang="ja-JP" sz="900" dirty="0" smtClean="0">
-                <a:latin typeface="ヒラギノ角ゴ Pro W3"/>
-                <a:ea typeface="ヒラギノ角ゴ Pro W3"/>
-                <a:cs typeface="ヒラギノ角ゴ Pro W3"/>
-              </a:rPr>
-              <a:t>action </a:t>
-            </a:r>
-            <a:r>
-              <a:rPr lang="ja-JP" altLang="en-US" sz="900" dirty="0">
-                <a:latin typeface="ヒラギノ角ゴ Pro W3"/>
-                <a:ea typeface="ヒラギノ角ゴ Pro W3"/>
-                <a:cs typeface="ヒラギノ角ゴ Pro W3"/>
-              </a:rPr>
-              <a:t>とは、以下のようなものだ</a:t>
-            </a:r>
-            <a:r>
-              <a:rPr lang="ja-JP" altLang="en-US" sz="900" dirty="0" smtClean="0">
-                <a:latin typeface="ヒラギノ角ゴ Pro W3"/>
-                <a:ea typeface="ヒラギノ角ゴ Pro W3"/>
-                <a:cs typeface="ヒラギノ角ゴ Pro W3"/>
-              </a:rPr>
-              <a:t>。</a:t>
-            </a:r>
-            <a:endParaRPr lang="en-US" altLang="ja-JP" sz="900" dirty="0" smtClean="0">
-              <a:latin typeface="ヒラギノ角ゴ Pro W3"/>
-              <a:ea typeface="ヒラギノ角ゴ Pro W3"/>
-              <a:cs typeface="ヒラギノ角ゴ Pro W3"/>
-            </a:endParaRPr>
-          </a:p>
-          <a:p>
-            <a:endParaRPr lang="en-US" sz="900" dirty="0">
-              <a:latin typeface="ヒラギノ角ゴ Pro W3"/>
-              <a:ea typeface="ヒラギノ角ゴ Pro W3"/>
-              <a:cs typeface="ヒラギノ角ゴ Pro W3"/>
-            </a:endParaRPr>
-          </a:p>
-          <a:p>
-            <a:r>
-              <a:rPr lang="ja-JP" altLang="en-US" sz="900" dirty="0">
-                <a:latin typeface="ヒラギノ角ゴ Pro W3"/>
-                <a:ea typeface="ヒラギノ角ゴ Pro W3"/>
-                <a:cs typeface="ヒラギノ角ゴ Pro W3"/>
-              </a:rPr>
-              <a:t>現在のソフトウェア工学のいくつかの分野では、未成熟なプラクティス</a:t>
-            </a:r>
-            <a:r>
-              <a:rPr lang="en-US" altLang="ja-JP" sz="900" dirty="0">
-                <a:latin typeface="ヒラギノ角ゴ Pro W3"/>
-                <a:ea typeface="ヒラギノ角ゴ Pro W3"/>
-                <a:cs typeface="ヒラギノ角ゴ Pro W3"/>
-              </a:rPr>
-              <a:t>(immature practices)</a:t>
-            </a:r>
-            <a:r>
-              <a:rPr lang="ja-JP" altLang="en-US" sz="900" dirty="0">
-                <a:latin typeface="ヒラギノ角ゴ Pro W3"/>
-                <a:ea typeface="ヒラギノ角ゴ Pro W3"/>
-                <a:cs typeface="ヒラギノ角ゴ Pro W3"/>
-              </a:rPr>
-              <a:t>に苦しめられている。具体的には、以下のような問題を含む</a:t>
-            </a:r>
-            <a:r>
-              <a:rPr lang="ja-JP" altLang="en-US" sz="900" dirty="0" smtClean="0">
-                <a:latin typeface="ヒラギノ角ゴ Pro W3"/>
-                <a:ea typeface="ヒラギノ角ゴ Pro W3"/>
-                <a:cs typeface="ヒラギノ角ゴ Pro W3"/>
-              </a:rPr>
-              <a:t>。</a:t>
-            </a:r>
-            <a:endParaRPr lang="en-US" sz="900" dirty="0" smtClean="0">
-              <a:latin typeface="ヒラギノ角ゴ Pro W3"/>
-              <a:ea typeface="ヒラギノ角ゴ Pro W3"/>
-              <a:cs typeface="ヒラギノ角ゴ Pro W3"/>
-            </a:endParaRPr>
-          </a:p>
-          <a:p>
-            <a:r>
-              <a:rPr lang="en-US" sz="900" dirty="0" smtClean="0">
-                <a:latin typeface="ヒラギノ角ゴ Pro W3"/>
-                <a:ea typeface="ヒラギノ角ゴ Pro W3"/>
-                <a:cs typeface="ヒラギノ角ゴ Pro W3"/>
-              </a:rPr>
-              <a:t>˲ </a:t>
-            </a:r>
-            <a:r>
-              <a:rPr lang="ja-JP" altLang="en-US" sz="900" dirty="0">
-                <a:latin typeface="ヒラギノ角ゴ Pro W3"/>
-                <a:ea typeface="ヒラギノ角ゴ Pro W3"/>
-                <a:cs typeface="ヒラギノ角ゴ Pro W3"/>
-              </a:rPr>
-              <a:t>言葉の流行が、工学の一分野というよりファッション業界のよう</a:t>
-            </a:r>
-            <a:r>
-              <a:rPr lang="ja-JP" altLang="en-US" sz="900" dirty="0" smtClean="0">
-                <a:latin typeface="ヒラギノ角ゴ Pro W3"/>
-                <a:ea typeface="ヒラギノ角ゴ Pro W3"/>
-                <a:cs typeface="ヒラギノ角ゴ Pro W3"/>
-              </a:rPr>
-              <a:t>だ。</a:t>
-            </a:r>
-            <a:endParaRPr lang="en-US" sz="900" dirty="0" smtClean="0">
-              <a:latin typeface="ヒラギノ角ゴ Pro W3"/>
-              <a:ea typeface="ヒラギノ角ゴ Pro W3"/>
-              <a:cs typeface="ヒラギノ角ゴ Pro W3"/>
-            </a:endParaRPr>
-          </a:p>
-          <a:p>
-            <a:r>
-              <a:rPr lang="en-US" sz="900" dirty="0" smtClean="0">
-                <a:latin typeface="ヒラギノ角ゴ Pro W3"/>
-                <a:ea typeface="ヒラギノ角ゴ Pro W3"/>
-                <a:cs typeface="ヒラギノ角ゴ Pro W3"/>
-              </a:rPr>
-              <a:t>˲ </a:t>
-            </a:r>
-            <a:r>
-              <a:rPr lang="ja-JP" altLang="en-US" sz="900" dirty="0">
-                <a:latin typeface="ヒラギノ角ゴ Pro W3"/>
-                <a:ea typeface="ヒラギノ角ゴ Pro W3"/>
-                <a:cs typeface="ヒラギノ角ゴ Pro W3"/>
-              </a:rPr>
-              <a:t>しっかりした広く受け入れられた、理論的基礎の欠如</a:t>
-            </a:r>
-            <a:r>
-              <a:rPr lang="ja-JP" altLang="en-US" sz="900" dirty="0" smtClean="0">
-                <a:latin typeface="ヒラギノ角ゴ Pro W3"/>
-                <a:ea typeface="ヒラギノ角ゴ Pro W3"/>
-                <a:cs typeface="ヒラギノ角ゴ Pro W3"/>
-              </a:rPr>
-              <a:t>。</a:t>
-            </a:r>
-            <a:endParaRPr lang="en-US" altLang="ja-JP" sz="900" dirty="0" smtClean="0">
-              <a:latin typeface="ヒラギノ角ゴ Pro W3"/>
-              <a:ea typeface="ヒラギノ角ゴ Pro W3"/>
-              <a:cs typeface="ヒラギノ角ゴ Pro W3"/>
-            </a:endParaRPr>
-          </a:p>
-          <a:p>
-            <a:r>
-              <a:rPr lang="en-US" sz="900" dirty="0" smtClean="0">
-                <a:latin typeface="ヒラギノ角ゴ Pro W3"/>
-                <a:ea typeface="ヒラギノ角ゴ Pro W3"/>
-                <a:cs typeface="ヒラギノ角ゴ Pro W3"/>
-              </a:rPr>
-              <a:t>˲ </a:t>
-            </a:r>
-            <a:r>
-              <a:rPr lang="ja-JP" altLang="en-US" sz="900" dirty="0">
-                <a:latin typeface="ヒラギノ角ゴ Pro W3"/>
-                <a:ea typeface="ヒラギノ角ゴ Pro W3"/>
-                <a:cs typeface="ヒラギノ角ゴ Pro W3"/>
-              </a:rPr>
-              <a:t>非常に多くの方法論</a:t>
-            </a:r>
-            <a:r>
-              <a:rPr lang="en-US" altLang="ja-JP" sz="900" dirty="0">
-                <a:latin typeface="ヒラギノ角ゴ Pro W3"/>
-                <a:ea typeface="ヒラギノ角ゴ Pro W3"/>
-                <a:cs typeface="ヒラギノ角ゴ Pro W3"/>
-              </a:rPr>
-              <a:t>(methods)</a:t>
-            </a:r>
-            <a:r>
-              <a:rPr lang="ja-JP" altLang="en-US" sz="900" dirty="0">
-                <a:latin typeface="ヒラギノ角ゴ Pro W3"/>
-                <a:ea typeface="ヒラギノ角ゴ Pro W3"/>
-                <a:cs typeface="ヒラギノ角ゴ Pro W3"/>
-              </a:rPr>
-              <a:t>とその派生。またそれらの違いがほとんど理解されずに作為的に強調されている</a:t>
-            </a:r>
-            <a:r>
-              <a:rPr lang="ja-JP" altLang="en-US" sz="900" dirty="0" smtClean="0">
-                <a:latin typeface="ヒラギノ角ゴ Pro W3"/>
-                <a:ea typeface="ヒラギノ角ゴ Pro W3"/>
-                <a:cs typeface="ヒラギノ角ゴ Pro W3"/>
-              </a:rPr>
-              <a:t>。</a:t>
-            </a:r>
-            <a:endParaRPr lang="en-US" sz="900" dirty="0" smtClean="0">
-              <a:latin typeface="ヒラギノ角ゴ Pro W3"/>
-              <a:ea typeface="ヒラギノ角ゴ Pro W3"/>
-              <a:cs typeface="ヒラギノ角ゴ Pro W3"/>
-            </a:endParaRPr>
-          </a:p>
-          <a:p>
-            <a:r>
-              <a:rPr lang="en-US" sz="900" dirty="0" smtClean="0">
-                <a:latin typeface="ヒラギノ角ゴ Pro W3"/>
-                <a:ea typeface="ヒラギノ角ゴ Pro W3"/>
-                <a:cs typeface="ヒラギノ角ゴ Pro W3"/>
-              </a:rPr>
-              <a:t>˲ </a:t>
-            </a:r>
-            <a:r>
-              <a:rPr lang="en-US" sz="900" dirty="0">
-                <a:latin typeface="ヒラギノ角ゴ Pro W3"/>
-                <a:ea typeface="ヒラギノ角ゴ Pro W3"/>
-                <a:cs typeface="ヒラギノ角ゴ Pro W3"/>
-              </a:rPr>
-              <a:t>信頼できる実験的評価(experimental evaluation)と妥当性確認(validation)の欠如</a:t>
-            </a:r>
-            <a:r>
-              <a:rPr lang="en-US" sz="900" dirty="0" smtClean="0">
-                <a:latin typeface="ヒラギノ角ゴ Pro W3"/>
-                <a:ea typeface="ヒラギノ角ゴ Pro W3"/>
-                <a:cs typeface="ヒラギノ角ゴ Pro W3"/>
-              </a:rPr>
-              <a:t>。</a:t>
-            </a:r>
-          </a:p>
-          <a:p>
-            <a:r>
-              <a:rPr lang="en-US" sz="900" dirty="0" smtClean="0">
-                <a:latin typeface="ヒラギノ角ゴ Pro W3"/>
-                <a:ea typeface="ヒラギノ角ゴ Pro W3"/>
-                <a:cs typeface="ヒラギノ角ゴ Pro W3"/>
-              </a:rPr>
-              <a:t>˲ </a:t>
-            </a:r>
-            <a:r>
-              <a:rPr lang="en-US" sz="900" dirty="0">
-                <a:latin typeface="ヒラギノ角ゴ Pro W3"/>
-                <a:ea typeface="ヒラギノ角ゴ Pro W3"/>
-                <a:cs typeface="ヒラギノ角ゴ Pro W3"/>
-              </a:rPr>
-              <a:t>産業界の実践(industry practice)と学界の研究(academic research)の乖離</a:t>
-            </a:r>
-            <a:r>
-              <a:rPr lang="en-US" sz="900" dirty="0" smtClean="0">
-                <a:latin typeface="ヒラギノ角ゴ Pro W3"/>
-                <a:ea typeface="ヒラギノ角ゴ Pro W3"/>
-                <a:cs typeface="ヒラギノ角ゴ Pro W3"/>
-              </a:rPr>
-              <a:t>。</a:t>
-            </a:r>
-          </a:p>
-          <a:p>
-            <a:endParaRPr lang="en-US" sz="900" dirty="0" smtClean="0">
-              <a:latin typeface="ヒラギノ角ゴ Pro W3"/>
-              <a:ea typeface="ヒラギノ角ゴ Pro W3"/>
-              <a:cs typeface="ヒラギノ角ゴ Pro W3"/>
-            </a:endParaRPr>
-          </a:p>
-          <a:p>
-            <a:r>
-              <a:rPr lang="ja-JP" altLang="en-US" sz="900" dirty="0">
-                <a:latin typeface="ヒラギノ角ゴ Pro W3"/>
-                <a:ea typeface="ヒラギノ角ゴ Pro W3"/>
-                <a:cs typeface="ヒラギノ角ゴ Pro W3"/>
-              </a:rPr>
-              <a:t>ソフトウェア産業はファッションと流行に陥りやすいという、この </a:t>
-            </a:r>
-            <a:r>
-              <a:rPr lang="en-US" altLang="ja-JP" sz="900" dirty="0">
-                <a:latin typeface="ヒラギノ角ゴ Pro W3"/>
-                <a:ea typeface="ヒラギノ角ゴ Pro W3"/>
-                <a:cs typeface="ヒラギノ角ゴ Pro W3"/>
-              </a:rPr>
-              <a:t>call for action</a:t>
-            </a:r>
-          </a:p>
-          <a:p>
-            <a:r>
-              <a:rPr lang="ja-JP" altLang="en-US" sz="900" dirty="0">
-                <a:latin typeface="ヒラギノ角ゴ Pro W3"/>
-                <a:ea typeface="ヒラギノ角ゴ Pro W3"/>
-                <a:cs typeface="ヒラギノ角ゴ Pro W3"/>
-              </a:rPr>
-              <a:t>の前提は、ある人々には「新しいアイディアへの抵抗」と映ったようだが、それは真実からはかけ離れている。この記事および間もなく刊行される書籍（</a:t>
-            </a:r>
-          </a:p>
-          <a:p>
-            <a:r>
-              <a:rPr lang="en-US" altLang="ja-JP" sz="900" dirty="0">
-                <a:latin typeface="ヒラギノ角ゴ Pro W3"/>
-                <a:ea typeface="ヒラギノ角ゴ Pro W3"/>
-                <a:cs typeface="ヒラギノ角ゴ Pro W3"/>
-              </a:rPr>
-              <a:t>The Essence of Software Engineering—Applying the SEMAT Kernel),6</a:t>
-            </a:r>
-          </a:p>
-          <a:p>
-            <a:r>
-              <a:rPr lang="ja-JP" altLang="en-US" sz="900" dirty="0">
-                <a:latin typeface="ヒラギノ角ゴ Pro W3"/>
-                <a:ea typeface="ヒラギノ角ゴ Pro W3"/>
-                <a:cs typeface="ヒラギノ角ゴ Pro W3"/>
-              </a:rPr>
-              <a:t>）で見るように、</a:t>
-            </a:r>
-            <a:r>
-              <a:rPr lang="en-US" altLang="ja-JP" sz="900" dirty="0">
-                <a:latin typeface="ヒラギノ角ゴ Pro W3"/>
-                <a:ea typeface="ヒラギノ角ゴ Pro W3"/>
-                <a:cs typeface="ヒラギノ角ゴ Pro W3"/>
-              </a:rPr>
-              <a:t>SEMAT</a:t>
-            </a:r>
-            <a:r>
-              <a:rPr lang="ja-JP" altLang="en-US" sz="900" dirty="0">
-                <a:latin typeface="ヒラギノ角ゴ Pro W3"/>
-                <a:ea typeface="ヒラギノ角ゴ Pro W3"/>
-                <a:cs typeface="ヒラギノ角ゴ Pro W3"/>
-              </a:rPr>
-              <a:t>の支援者は新しいアイディアに敏感である</a:t>
-            </a:r>
-            <a:r>
-              <a:rPr lang="ja-JP" altLang="en-US" sz="900" dirty="0" smtClean="0">
-                <a:latin typeface="ヒラギノ角ゴ Pro W3"/>
-                <a:ea typeface="ヒラギノ角ゴ Pro W3"/>
-                <a:cs typeface="ヒラギノ角ゴ Pro W3"/>
-              </a:rPr>
-              <a:t>。</a:t>
+              <a:t>の支持者は新しいアイディアに敏感である。</a:t>
             </a:r>
             <a:endParaRPr lang="ja-JP" altLang="en-US" sz="900" dirty="0">
               <a:latin typeface="ヒラギノ角ゴ Pro W3"/>
@@ -4720,6 +4553,35 @@
               <a:ea typeface="ヒラギノ角ゴ Std W8"/>
               <a:cs typeface="ヒラギノ角ゴ Std W8"/>
             </a:endParaRPr>
+          </a:p>
+        </p:txBody>
+      </p:sp>
+      <p:sp>
+        <p:nvSpPr>
+          <p:cNvPr id="5" name="テキスト ボックス 4"/>
+          <p:cNvSpPr txBox="1"/>
+          <p:nvPr/>
+        </p:nvSpPr>
+        <p:spPr>
+          <a:xfrm>
+            <a:off x="1031394" y="6596303"/>
+            <a:ext cx="247897" cy="646331"/>
+          </a:xfrm>
+          <a:prstGeom prst="rect">
+            <a:avLst/>
+          </a:prstGeom>
+          <a:noFill/>
+        </p:spPr>
+        <p:txBody>
+          <a:bodyPr wrap="none" rtlCol="0">
+            <a:spAutoFit/>
+          </a:bodyPr>
+          <a:lstStyle/>
+          <a:p>
+            <a:endParaRPr kumimoji="1" lang="en-US" altLang="ja-JP" dirty="0" smtClean="0"/>
+          </a:p>
+          <a:p>
+            <a:endParaRPr kumimoji="1" lang="ja-JP" altLang="en-US" dirty="0"/>
           </a:p>
         </p:txBody>
       </p:sp>
@@ -4887,8 +4749,8 @@
         </p:nvSpPr>
         <p:spPr>
           <a:xfrm>
-            <a:off x="218070" y="7750440"/>
-            <a:ext cx="2062853" cy="2169825"/>
+            <a:off x="184723" y="7645162"/>
+            <a:ext cx="2173165" cy="2031326"/>
           </a:xfrm>
           <a:prstGeom prst="rect">
             <a:avLst/>
@@ -4901,36 +4763,20 @@
           <a:lstStyle/>
           <a:p>
             <a:r>
-              <a:rPr lang="ja-JP" altLang="en-US" sz="900" dirty="0" smtClean="0">
-                <a:latin typeface="ヒラギノ角ゴ Pro W3"/>
-                <a:ea typeface="ヒラギノ角ゴ Pro W3"/>
-                <a:cs typeface="ヒラギノ角ゴ Pro W3"/>
-              </a:rPr>
-              <a:t>彼ら</a:t>
-            </a:r>
-            <a:r>
-              <a:rPr lang="ja-JP" altLang="en-US" sz="900" dirty="0">
-                <a:latin typeface="ヒラギノ角ゴ Pro W3"/>
-                <a:ea typeface="ヒラギノ角ゴ Pro W3"/>
-                <a:cs typeface="ヒラギノ角ゴ Pro W3"/>
-              </a:rPr>
-              <a:t>が反対しているのは、ソリューションが流行っているから（あるいは、政治的正当性</a:t>
-            </a:r>
-            <a:r>
               <a:rPr lang="en-US" altLang="ja-JP" sz="900" dirty="0">
                 <a:latin typeface="ヒラギノ角ゴ Pro W3"/>
                 <a:ea typeface="ヒラギノ角ゴ Pro W3"/>
                 <a:cs typeface="ヒラギノ角ゴ Pro W3"/>
               </a:rPr>
-              <a:t>(</a:t>
-            </a:r>
-            <a:r>
-              <a:rPr lang="en-US" altLang="ja-JP" sz="900" dirty="0" smtClean="0">
-                <a:latin typeface="ヒラギノ角ゴ Pro W3"/>
-                <a:ea typeface="ヒラギノ角ゴ Pro W3"/>
-                <a:cs typeface="ヒラギノ角ゴ Pro W3"/>
-              </a:rPr>
-              <a:t>political correctness</a:t>
+              <a:t>SEMAT</a:t>
+            </a:r>
+            <a:r>
+              <a:rPr lang="ja-JP" altLang="en-US" sz="900" dirty="0">
+                <a:latin typeface="ヒラギノ角ゴ Pro W3"/>
+                <a:ea typeface="ヒラギノ角ゴ Pro W3"/>
+                <a:cs typeface="ヒラギノ角ゴ Pro W3"/>
+              </a:rPr>
+              <a:t>の支持者が反対しているのは「新しいアイディア」ではない。ただソリューションが流行っているから、あるいは、単なる政治的な理由や同僚からの圧力によって、不適切なソリューションを採用する人々の非リーン（</a:t>
             </a:r>
             <a:r>
               <a:rPr lang="en-US" altLang="ja-JP" sz="900" dirty="0">
@@ -4938,15 +4784,15 @@
                 <a:ea typeface="ヒラギノ角ゴ Pro W3"/>
                 <a:cs typeface="ヒラギノ角ゴ Pro W3"/>
               </a:rPr>
-              <a:t>)</a:t>
-            </a:r>
-            <a:r>
-              <a:rPr lang="ja-JP" altLang="en-US" sz="900" dirty="0">
-                <a:latin typeface="ヒラギノ角ゴ Pro W3"/>
-                <a:ea typeface="ヒラギノ角ゴ Pro W3"/>
-                <a:cs typeface="ヒラギノ角ゴ Pro W3"/>
-              </a:rPr>
-              <a:t>や同僚からの圧力）という理由だけで不適切なソリューションを採用する人々の、</a:t>
+              <a:t>non-lean</a:t>
+            </a:r>
+            <a:r>
+              <a:rPr lang="ja-JP" altLang="en-US" sz="900" dirty="0">
+                <a:latin typeface="ヒラギノ角ゴ Pro W3"/>
+                <a:ea typeface="ヒラギノ角ゴ Pro W3"/>
+                <a:cs typeface="ヒラギノ角ゴ Pro W3"/>
+              </a:rPr>
+              <a:t>）、非アジャイル（</a:t>
             </a:r>
             <a:r>
               <a:rPr lang="en-US" altLang="ja-JP" sz="900" dirty="0">
@@ -4954,22 +4800,6 @@
                 <a:ea typeface="ヒラギノ角ゴ Pro W3"/>
                 <a:cs typeface="ヒラギノ角ゴ Pro W3"/>
               </a:rPr>
-              <a:t>non-lean</a:t>
-            </a:r>
-            <a:r>
-              <a:rPr lang="ja-JP" altLang="en-US" sz="900" dirty="0">
-                <a:latin typeface="ヒラギノ角ゴ Pro W3"/>
-                <a:ea typeface="ヒラギノ角ゴ Pro W3"/>
-                <a:cs typeface="ヒラギノ角ゴ Pro W3"/>
-              </a:rPr>
-              <a:t>、</a:t>
-            </a:r>
-            <a:r>
-              <a:rPr lang="en-US" altLang="ja-JP" sz="900" dirty="0">
-                <a:latin typeface="ヒラギノ角ゴ Pro W3"/>
-                <a:ea typeface="ヒラギノ角ゴ Pro W3"/>
-                <a:cs typeface="ヒラギノ角ゴ Pro W3"/>
-              </a:rPr>
               <a:t>non-agile</a:t>
             </a:r>
             <a:r>
@@ -4978,7 +4808,7 @@
                 <a:ea typeface="ヒラギノ角ゴ Pro W3"/>
                 <a:cs typeface="ヒラギノ角ゴ Pro W3"/>
               </a:rPr>
-              <a:t>な行動なのである</a:t>
+              <a:t>）な行動である</a:t>
             </a:r>
             <a:r>
               <a:rPr lang="ja-JP" altLang="en-US" sz="900" dirty="0" smtClean="0">
@@ -5016,7 +4846,23 @@
                 <a:ea typeface="ヒラギノ角ゴ Pro W3"/>
                 <a:cs typeface="ヒラギノ角ゴ Pro W3"/>
               </a:rPr>
-              <a:t>は、ソフトウェア工学を堅固な理論および検証された原則とベストプラクティスを基礎として、再建するプロセスを支援する。そのプロセスは、以下の特徴を備えている</a:t>
+              <a:t>は、堅固な理論および検証された原則とベストプラクティスに基づいて、ソフトウェア工学を再建するプロセスを支援する。</a:t>
+            </a:r>
+            <a:r>
+              <a:rPr lang="en-US" altLang="ja-JP" sz="900" dirty="0">
+                <a:latin typeface="ヒラギノ角ゴ Pro W3"/>
+                <a:ea typeface="ヒラギノ角ゴ Pro W3"/>
+                <a:cs typeface="ヒラギノ角ゴ Pro W3"/>
+              </a:rPr>
+              <a:t>SEMAT</a:t>
+            </a:r>
+            <a:r>
+              <a:rPr lang="ja-JP" altLang="en-US" sz="900" dirty="0">
+                <a:latin typeface="ヒラギノ角ゴ Pro W3"/>
+                <a:ea typeface="ヒラギノ角ゴ Pro W3"/>
+                <a:cs typeface="ヒラギノ角ゴ Pro W3"/>
+              </a:rPr>
+              <a:t>は以下の特徴を備えている</a:t>
             </a:r>
             <a:r>
               <a:rPr lang="ja-JP" altLang="en-US" sz="900" dirty="0" smtClean="0">
@@ -5026,30 +4872,7 @@
               </a:rPr>
               <a:t>。</a:t>
             </a:r>
-            <a:endParaRPr lang="en-US" sz="900" dirty="0">
-              <a:latin typeface="ヒラギノ角ゴ Pro W3"/>
-              <a:ea typeface="ヒラギノ角ゴ Pro W3"/>
-              <a:cs typeface="ヒラギノ角ゴ Pro W3"/>
-            </a:endParaRPr>
-          </a:p>
-          <a:p>
-            <a:r>
-              <a:rPr lang="en-US" sz="900" dirty="0">
-                <a:latin typeface="ヒラギノ角ゴ Pro W3"/>
-                <a:ea typeface="ヒラギノ角ゴ Pro W3"/>
-                <a:cs typeface="ヒラギノ角ゴ Pro W3"/>
-              </a:rPr>
-              <a:t>˲ </a:t>
-            </a:r>
-            <a:r>
-              <a:rPr lang="ja-JP" altLang="en-US" sz="900" dirty="0">
-                <a:latin typeface="ヒラギノ角ゴ Pro W3"/>
-                <a:ea typeface="ヒラギノ角ゴ Pro W3"/>
-                <a:cs typeface="ヒラギノ角ゴ Pro W3"/>
-              </a:rPr>
-              <a:t>広く合意された要素からなる、特定用途に拡張可能なカーネルを含み、</a:t>
-            </a:r>
-            <a:endParaRPr lang="en-US" sz="900" dirty="0">
+            <a:endParaRPr lang="ja-JP" altLang="en-US" sz="900" dirty="0">
               <a:latin typeface="ヒラギノ角ゴ Pro W3"/>
               <a:ea typeface="ヒラギノ角ゴ Pro W3"/>
               <a:cs typeface="ヒラギノ角ゴ Pro W3"/>
@@ -5065,8 +4888,8 @@
         </p:nvSpPr>
         <p:spPr>
           <a:xfrm>
-            <a:off x="2424431" y="7750440"/>
-            <a:ext cx="2072252" cy="1892826"/>
+            <a:off x="2424431" y="7645162"/>
+            <a:ext cx="2072252" cy="2169825"/>
           </a:xfrm>
           <a:prstGeom prst="rect">
             <a:avLst/>
@@ -5080,7 +4903,7 @@
           <a:lstStyle/>
           <a:p>
             <a:r>
-              <a:rPr lang="en-US" sz="900" dirty="0">
+              <a:rPr lang="ja-JP" altLang="en-US" sz="900" dirty="0">
                 <a:solidFill>
                   <a:srgbClr val="1A1818"/>
                 </a:solidFill>
@@ -5088,8 +4911,10 @@
                 <a:ea typeface="ヒラギノ角ゴ Pro W3"/>
                 <a:cs typeface="ヒラギノ角ゴ Pro W3"/>
               </a:rPr>
-              <a:t>˲ </a:t>
-            </a:r>
+              <a:t>* 広く合意された要素からなり、特定用途に拡張可能なカーネルを含む。</a:t>
+            </a:r>
+          </a:p>
+          <a:p>
             <a:r>
               <a:rPr lang="ja-JP" altLang="en-US" sz="900" dirty="0">
                 <a:solidFill>
@@ -5099,10 +4924,12 @@
                 <a:ea typeface="ヒラギノ角ゴ Pro W3"/>
                 <a:cs typeface="ヒラギノ角ゴ Pro W3"/>
               </a:rPr>
-              <a:t>技術の問題と人の問題の両方を扱い</a:t>
-            </a:r>
-            <a:r>
-              <a:rPr lang="ja-JP" altLang="en-US" sz="900" dirty="0" smtClean="0">
+              <a:t>* 技術の問題と人の問題の両方を扱う。</a:t>
+            </a:r>
+          </a:p>
+          <a:p>
+            <a:r>
+              <a:rPr lang="ja-JP" altLang="en-US" sz="900" dirty="0">
                 <a:solidFill>
                   <a:srgbClr val="1A1818"/>
                 </a:solidFill>
@@ -5110,7 +4937,20 @@
                 <a:ea typeface="ヒラギノ角ゴ Pro W3"/>
                 <a:cs typeface="ヒラギノ角ゴ Pro W3"/>
               </a:rPr>
-              <a:t>、</a:t>
+              <a:t>* 産業界、学界、研究者、そして、ユーザによって支えられる。</a:t>
+            </a:r>
+          </a:p>
+          <a:p>
+            <a:r>
+              <a:rPr lang="ja-JP" altLang="en-US" sz="900" dirty="0">
+                <a:solidFill>
+                  <a:srgbClr val="1A1818"/>
+                </a:solidFill>
+                <a:latin typeface="ヒラギノ角ゴ Pro W3"/>
+                <a:ea typeface="ヒラギノ角ゴ Pro W3"/>
+                <a:cs typeface="ヒラギノ角ゴ Pro W3"/>
+              </a:rPr>
+              <a:t>* 要求と技術の変化に応じて追随できるような拡張性を備える。。</a:t>
             </a:r>
             <a:endParaRPr lang="en-US" altLang="ja-JP" sz="900" dirty="0" smtClean="0">
               <a:solidFill>
@@ -5122,92 +4962,6 @@
             </a:endParaRPr>
           </a:p>
           <a:p>
-            <a:r>
-              <a:rPr lang="en-US" sz="900" dirty="0" smtClean="0">
-                <a:solidFill>
-                  <a:srgbClr val="1A1818"/>
-                </a:solidFill>
-                <a:latin typeface="ヒラギノ角ゴ Pro W3"/>
-                <a:ea typeface="ヒラギノ角ゴ Pro W3"/>
-                <a:cs typeface="ヒラギノ角ゴ Pro W3"/>
-              </a:rPr>
-              <a:t>˲ </a:t>
-            </a:r>
-            <a:r>
-              <a:rPr lang="ja-JP" altLang="en-US" sz="900" dirty="0">
-                <a:solidFill>
-                  <a:srgbClr val="1A1818"/>
-                </a:solidFill>
-                <a:latin typeface="ヒラギノ角ゴ Pro W3"/>
-                <a:ea typeface="ヒラギノ角ゴ Pro W3"/>
-                <a:cs typeface="ヒラギノ角ゴ Pro W3"/>
-              </a:rPr>
-              <a:t>産業界、学界、研究者そして、ユーザに支援され</a:t>
-            </a:r>
-            <a:r>
-              <a:rPr lang="ja-JP" altLang="en-US" sz="900" dirty="0" smtClean="0">
-                <a:solidFill>
-                  <a:srgbClr val="1A1818"/>
-                </a:solidFill>
-                <a:latin typeface="ヒラギノ角ゴ Pro W3"/>
-                <a:ea typeface="ヒラギノ角ゴ Pro W3"/>
-                <a:cs typeface="ヒラギノ角ゴ Pro W3"/>
-              </a:rPr>
-              <a:t>、</a:t>
-            </a:r>
-            <a:endParaRPr lang="en-US" altLang="ja-JP" sz="900" dirty="0" smtClean="0">
-              <a:solidFill>
-                <a:srgbClr val="1A1818"/>
-              </a:solidFill>
-              <a:latin typeface="ヒラギノ角ゴ Pro W3"/>
-              <a:ea typeface="ヒラギノ角ゴ Pro W3"/>
-              <a:cs typeface="ヒラギノ角ゴ Pro W3"/>
-            </a:endParaRPr>
-          </a:p>
-          <a:p>
-            <a:r>
-              <a:rPr lang="en-US" sz="900" dirty="0" smtClean="0">
-                <a:solidFill>
-                  <a:srgbClr val="1A1818"/>
-                </a:solidFill>
-                <a:latin typeface="ヒラギノ角ゴ Pro W3"/>
-                <a:ea typeface="ヒラギノ角ゴ Pro W3"/>
-                <a:cs typeface="ヒラギノ角ゴ Pro W3"/>
-              </a:rPr>
-              <a:t>˲ </a:t>
-            </a:r>
-            <a:r>
-              <a:rPr lang="ja-JP" altLang="en-US" sz="900" dirty="0">
-                <a:solidFill>
-                  <a:srgbClr val="1A1818"/>
-                </a:solidFill>
-                <a:latin typeface="ヒラギノ角ゴ Pro W3"/>
-                <a:ea typeface="ヒラギノ角ゴ Pro W3"/>
-                <a:cs typeface="ヒラギノ角ゴ Pro W3"/>
-              </a:rPr>
-              <a:t>要求とテクノロジの変化に応じて追随できるような拡張性を備えている</a:t>
-            </a:r>
-            <a:r>
-              <a:rPr lang="ja-JP" altLang="en-US" sz="900" dirty="0" smtClean="0">
-                <a:solidFill>
-                  <a:srgbClr val="1A1818"/>
-                </a:solidFill>
-                <a:latin typeface="ヒラギノ角ゴ Pro W3"/>
-                <a:ea typeface="ヒラギノ角ゴ Pro W3"/>
-                <a:cs typeface="ヒラギノ角ゴ Pro W3"/>
-              </a:rPr>
-              <a:t>。</a:t>
-            </a:r>
-            <a:endParaRPr lang="en-US" altLang="ja-JP" sz="900" dirty="0" smtClean="0">
-              <a:solidFill>
-                <a:srgbClr val="1A1818"/>
-              </a:solidFill>
-              <a:latin typeface="ヒラギノ角ゴ Pro W3"/>
-              <a:ea typeface="ヒラギノ角ゴ Pro W3"/>
-              <a:cs typeface="ヒラギノ角ゴ Pro W3"/>
-            </a:endParaRPr>
-          </a:p>
-          <a:p>
             <a:endParaRPr lang="en-US" sz="900" dirty="0">
               <a:solidFill>
                 <a:srgbClr val="1A1818"/>
@@ -5238,7 +4992,7 @@
                 <a:ea typeface="ヒラギノ角ゴ Pro W3"/>
                 <a:cs typeface="ヒラギノ角ゴ Pro W3"/>
               </a:rPr>
-              <a:t>の </a:t>
+              <a:t>の行動宣言は支持を広く集め、署名者や支持者が増え続けている（</a:t>
             </a:r>
             <a:r>
               <a:rPr lang="en-US" altLang="ja-JP" sz="900" dirty="0">
@@ -5249,10 +5003,10 @@
                 <a:ea typeface="ヒラギノ角ゴ Pro W3"/>
                 <a:cs typeface="ヒラギノ角ゴ Pro W3"/>
               </a:rPr>
-              <a:t>call for action </a:t>
-            </a:r>
-            <a:r>
-              <a:rPr lang="ja-JP" altLang="en-US" sz="900" dirty="0">
+              <a:t>http://</a:t>
+            </a:r>
+            <a:r>
+              <a:rPr lang="en-US" altLang="ja-JP" sz="900" dirty="0" err="1">
                 <a:solidFill>
                   <a:srgbClr val="1A1818"/>
                 </a:solidFill>
@@ -5260,7 +5014,18 @@
                 <a:ea typeface="ヒラギノ角ゴ Pro W3"/>
                 <a:cs typeface="ヒラギノ角ゴ Pro W3"/>
               </a:rPr>
-              <a:t>は、増え続ける署名者、サポーターのリスト</a:t>
+              <a:t>www.semat.org</a:t>
+            </a:r>
+            <a:r>
+              <a:rPr lang="ja-JP" altLang="en-US" sz="900" dirty="0">
+                <a:solidFill>
+                  <a:srgbClr val="1A1818"/>
+                </a:solidFill>
+                <a:latin typeface="ヒラギノ角ゴ Pro W3"/>
+                <a:ea typeface="ヒラギノ角ゴ Pro W3"/>
+                <a:cs typeface="ヒラギノ角ゴ Pro W3"/>
+              </a:rPr>
+              <a:t>）。</a:t>
             </a:r>
             <a:r>
               <a:rPr lang="en-US" altLang="ja-JP" sz="900" dirty="0">
@@ -5271,10 +5036,10 @@
                 <a:ea typeface="ヒラギノ角ゴ Pro W3"/>
                 <a:cs typeface="ヒラギノ角ゴ Pro W3"/>
               </a:rPr>
-              <a:t>(http://</a:t>
-            </a:r>
-            <a:r>
-              <a:rPr lang="en-US" altLang="ja-JP" sz="900" dirty="0" err="1">
+              <a:t>2010</a:t>
+            </a:r>
+            <a:r>
+              <a:rPr lang="ja-JP" altLang="en-US" sz="900" dirty="0">
                 <a:solidFill>
                   <a:srgbClr val="1A1818"/>
                 </a:solidFill>
@@ -5282,40 +5047,7 @@
                 <a:ea typeface="ヒラギノ角ゴ Pro W3"/>
                 <a:cs typeface="ヒラギノ角ゴ Pro W3"/>
               </a:rPr>
-              <a:t>www.semat.org</a:t>
-            </a:r>
-            <a:r>
-              <a:rPr lang="en-US" altLang="ja-JP" sz="900" dirty="0" smtClean="0">
-                <a:solidFill>
-                  <a:srgbClr val="1A1818"/>
-                </a:solidFill>
-                <a:latin typeface="ヒラギノ角ゴ Pro W3"/>
-                <a:ea typeface="ヒラギノ角ゴ Pro W3"/>
-                <a:cs typeface="ヒラギノ角ゴ Pro W3"/>
-              </a:rPr>
-              <a:t>) </a:t>
-            </a:r>
-            <a:r>
-              <a:rPr lang="ja-JP" altLang="en-US" sz="900" dirty="0" smtClean="0">
-                <a:solidFill>
-                  <a:srgbClr val="1A1818"/>
-                </a:solidFill>
-                <a:latin typeface="ヒラギノ角ゴ Pro W3"/>
-                <a:ea typeface="ヒラギノ角ゴ Pro W3"/>
-                <a:cs typeface="ヒラギノ角ゴ Pro W3"/>
-              </a:rPr>
-              <a:t>を</a:t>
-            </a:r>
-            <a:r>
-              <a:rPr lang="ja-JP" altLang="en-US" sz="900" dirty="0">
-                <a:solidFill>
-                  <a:srgbClr val="1A1818"/>
-                </a:solidFill>
-                <a:latin typeface="ヒラギノ角ゴ Pro W3"/>
-                <a:ea typeface="ヒラギノ角ゴ Pro W3"/>
-                <a:cs typeface="ヒラギノ角ゴ Pro W3"/>
-              </a:rPr>
-              <a:t>含む、広い支援者ベースを得た。</a:t>
+              <a:t>年</a:t>
             </a:r>
             <a:r>
               <a:rPr lang="en-US" altLang="ja-JP" sz="900" dirty="0">
@@ -5326,7 +5058,7 @@
                 <a:ea typeface="ヒラギノ角ゴ Pro W3"/>
                 <a:cs typeface="ヒラギノ角ゴ Pro W3"/>
               </a:rPr>
-              <a:t>2010</a:t>
+              <a:t>2</a:t>
             </a:r>
             <a:r>
               <a:rPr lang="ja-JP" altLang="en-US" sz="900" dirty="0">
@@ -5337,7 +5069,7 @@
                 <a:ea typeface="ヒラギノ角ゴ Pro W3"/>
                 <a:cs typeface="ヒラギノ角ゴ Pro W3"/>
               </a:rPr>
-              <a:t>年</a:t>
+              <a:t>月には、</a:t>
             </a:r>
             <a:r>
               <a:rPr lang="en-US" altLang="ja-JP" sz="900" dirty="0">
@@ -5348,7 +5080,7 @@
                 <a:ea typeface="ヒラギノ角ゴ Pro W3"/>
                 <a:cs typeface="ヒラギノ角ゴ Pro W3"/>
               </a:rPr>
-              <a:t>2</a:t>
+              <a:t>SEMAT</a:t>
             </a:r>
             <a:r>
               <a:rPr lang="ja-JP" altLang="en-US" sz="900" dirty="0">
@@ -5359,7 +5091,7 @@
                 <a:ea typeface="ヒラギノ角ゴ Pro W3"/>
                 <a:cs typeface="ヒラギノ角ゴ Pro W3"/>
               </a:rPr>
-              <a:t>月には、</a:t>
+              <a:t>の創設者は行動宣言をビジョン声明（</a:t>
             </a:r>
             <a:r>
               <a:rPr lang="en-US" altLang="ja-JP" sz="900" dirty="0">
@@ -5370,7 +5102,7 @@
                 <a:ea typeface="ヒラギノ角ゴ Pro W3"/>
                 <a:cs typeface="ヒラギノ角ゴ Pro W3"/>
               </a:rPr>
-              <a:t>SEMAT</a:t>
+              <a:t>vision statement</a:t>
             </a:r>
             <a:r>
               <a:rPr lang="ja-JP" altLang="en-US" sz="900" dirty="0">
@@ -5381,18 +5113,7 @@
                 <a:ea typeface="ヒラギノ角ゴ Pro W3"/>
                 <a:cs typeface="ヒラギノ角ゴ Pro W3"/>
               </a:rPr>
-              <a:t>の創設者</a:t>
-            </a:r>
-            <a:r>
-              <a:rPr lang="ja-JP" altLang="en-US" sz="900" dirty="0" smtClean="0">
-                <a:solidFill>
-                  <a:srgbClr val="1A1818"/>
-                </a:solidFill>
-                <a:latin typeface="ヒラギノ角ゴ Pro W3"/>
-                <a:ea typeface="ヒラギノ角ゴ Pro W3"/>
-                <a:cs typeface="ヒラギノ角ゴ Pro W3"/>
-              </a:rPr>
-              <a:t>は</a:t>
+              <a:t>）として発展させた </a:t>
             </a:r>
             <a:r>
               <a:rPr lang="en-US" altLang="ja-JP" sz="900" dirty="0">
@@ -5403,10 +5124,10 @@
                 <a:ea typeface="ヒラギノ角ゴ Pro W3"/>
                 <a:cs typeface="ヒラギノ角ゴ Pro W3"/>
               </a:rPr>
-              <a:t> </a:t>
-            </a:r>
-            <a:r>
-              <a:rPr lang="en-US" altLang="ja-JP" sz="900" dirty="0" smtClean="0">
+              <a:t>[5]</a:t>
+            </a:r>
+            <a:r>
+              <a:rPr lang="ja-JP" altLang="en-US" sz="900" dirty="0">
                 <a:solidFill>
                   <a:srgbClr val="1A1818"/>
                 </a:solidFill>
@@ -5414,52 +5135,16 @@
                 <a:ea typeface="ヒラギノ角ゴ Pro W3"/>
                 <a:cs typeface="ヒラギノ角ゴ Pro W3"/>
               </a:rPr>
-              <a:t>call for action </a:t>
-            </a:r>
-            <a:r>
-              <a:rPr lang="ja-JP" altLang="en-US" sz="900" dirty="0" smtClean="0">
-                <a:solidFill>
-                  <a:srgbClr val="1A1818"/>
-                </a:solidFill>
-                <a:latin typeface="ヒラギノ角ゴ Pro W3"/>
-                <a:ea typeface="ヒラギノ角ゴ Pro W3"/>
-                <a:cs typeface="ヒラギノ角ゴ Pro W3"/>
-              </a:rPr>
-              <a:t>を</a:t>
-            </a:r>
-            <a:r>
-              <a:rPr lang="ja-JP" altLang="en-US" sz="900" dirty="0">
-                <a:solidFill>
-                  <a:srgbClr val="1A1818"/>
-                </a:solidFill>
-                <a:latin typeface="ヒラギノ角ゴ Pro W3"/>
-                <a:ea typeface="ヒラギノ角ゴ Pro W3"/>
-                <a:cs typeface="ヒラギノ角ゴ Pro W3"/>
-              </a:rPr>
-              <a:t>ビジョンステートメントとして発展させた</a:t>
-            </a:r>
-            <a:r>
-              <a:rPr lang="en-US" altLang="ja-JP" sz="900" dirty="0">
-                <a:solidFill>
-                  <a:srgbClr val="1A1818"/>
-                </a:solidFill>
-                <a:latin typeface="ヒラギノ角ゴ Pro W3"/>
-                <a:ea typeface="ヒラギノ角ゴ Pro W3"/>
-                <a:cs typeface="ヒラギノ角ゴ Pro W3"/>
-              </a:rPr>
-              <a:t>(5)</a:t>
-            </a:r>
-            <a:r>
-              <a:rPr lang="ja-JP" altLang="en-US" sz="900" dirty="0">
-                <a:solidFill>
-                  <a:srgbClr val="1A1818"/>
-                </a:solidFill>
-                <a:latin typeface="ヒラギノ角ゴ Pro W3"/>
-                <a:ea typeface="ヒラギノ角ゴ Pro W3"/>
-                <a:cs typeface="ヒラギノ角ゴ Pro W3"/>
-              </a:rPr>
               <a:t>。</a:t>
             </a:r>
+            <a:endParaRPr lang="ja-JP" altLang="en-US" sz="900" dirty="0">
+              <a:solidFill>
+                <a:srgbClr val="1A1818"/>
+              </a:solidFill>
+              <a:latin typeface="ヒラギノ角ゴ Pro W3"/>
+              <a:ea typeface="ヒラギノ角ゴ Pro W3"/>
+              <a:cs typeface="ヒラギノ角ゴ Pro W3"/>
+            </a:endParaRPr>
           </a:p>
         </p:txBody>
       </p:sp>
@@ -5471,8 +5156,8 @@
         </p:nvSpPr>
         <p:spPr>
           <a:xfrm>
-            <a:off x="4690522" y="1303572"/>
-            <a:ext cx="2056839" cy="8910125"/>
+            <a:off x="4599308" y="1303572"/>
+            <a:ext cx="2148054" cy="8217629"/>
           </a:xfrm>
           <a:prstGeom prst="rect">
             <a:avLst/>
@@ -5493,7 +5178,7 @@
               <a:t>このビジョンに沿って、</a:t>
             </a:r>
             <a:r>
-              <a:rPr lang="en-US" altLang="ja-JP" sz="900" dirty="0" smtClean="0">
+              <a:rPr lang="en-US" altLang="ja-JP" sz="900" dirty="0">
                 <a:latin typeface="ヒラギノ角ゴ Pro W3"/>
                 <a:ea typeface="ヒラギノ角ゴ Pro W3"/>
                 <a:cs typeface="ヒラギノ角ゴ Pro W3"/>
@@ -5522,23 +5207,30 @@
                 <a:ea typeface="ヒラギノ角ゴ Pro W3"/>
                 <a:cs typeface="ヒラギノ角ゴ Pro W3"/>
               </a:rPr>
-              <a:t>つのゴールに焦点を</a:t>
-            </a:r>
-            <a:r>
-              <a:rPr lang="ja-JP" altLang="en-US" sz="900" dirty="0" smtClean="0">
-                <a:latin typeface="ヒラギノ角ゴ Pro W3"/>
-                <a:ea typeface="ヒラギノ角ゴ Pro W3"/>
-                <a:cs typeface="ヒラギノ角ゴ Pro W3"/>
-              </a:rPr>
-              <a:t>合わせた：広く</a:t>
-            </a:r>
-            <a:r>
-              <a:rPr lang="ja-JP" altLang="en-US" sz="900" dirty="0">
-                <a:latin typeface="ヒラギノ角ゴ Pro W3"/>
-                <a:ea typeface="ヒラギノ角ゴ Pro W3"/>
-                <a:cs typeface="ヒラギノ角ゴ Pro W3"/>
-              </a:rPr>
-              <a:t>合意された要素からなるカーネルを見つけること、そして堅固な理論的基礎を定義すること。これら</a:t>
+              <a:t>つのゴールに焦点を合わせた： 広く合意された要素からなるカーネルを見つけること、そして、堅固な理論的基礎を定義することである</a:t>
+            </a:r>
+            <a:r>
+              <a:rPr lang="ja-JP" altLang="en-US" sz="900" dirty="0" smtClean="0">
+                <a:latin typeface="ヒラギノ角ゴ Pro W3"/>
+                <a:ea typeface="ヒラギノ角ゴ Pro W3"/>
+                <a:cs typeface="ヒラギノ角ゴ Pro W3"/>
+              </a:rPr>
+              <a:t>。</a:t>
+            </a:r>
+            <a:endParaRPr lang="en-US" altLang="ja-JP" sz="900" dirty="0" smtClean="0">
+              <a:latin typeface="ヒラギノ角ゴ Pro W3"/>
+              <a:ea typeface="ヒラギノ角ゴ Pro W3"/>
+              <a:cs typeface="ヒラギノ角ゴ Pro W3"/>
+            </a:endParaRPr>
+          </a:p>
+          <a:p>
+            <a:r>
+              <a:rPr lang="ja-JP" altLang="en-US" sz="900" dirty="0">
+                <a:latin typeface="ヒラギノ角ゴ Pro W3"/>
+                <a:ea typeface="ヒラギノ角ゴ Pro W3"/>
+                <a:cs typeface="ヒラギノ角ゴ Pro W3"/>
+              </a:rPr>
+              <a:t>これらの</a:t>
             </a:r>
             <a:r>
               <a:rPr lang="en-US" altLang="ja-JP" sz="900" dirty="0">
@@ -5554,7 +5246,7 @@
                 <a:ea typeface="ヒラギノ角ゴ Pro W3"/>
                 <a:cs typeface="ヒラギノ角ゴ Pro W3"/>
               </a:rPr>
-              <a:t>つの作業はかなりの範囲で独立している。カーネルを見つけることは多数の既存手法の知識を備えた経験のあるソフトウェアエンジニアの実践的な活動である。理論的基礎を定義することはアカデミックな研究活動であり、成功といえる結果に到達するには、何年もかかるだろう</a:t>
+              <a:t>つの作業は、かなりの範囲で独立している。カーネルやその要素を見つけることは、多数の既存手法の知識を備えた経験のあるソフトウェアエンジニアによる実践的な活動となる。対して理論的基礎の定義はアカデミックな研究活動であり、成功といえる結果に到達するには何年もかかるだろう</a:t>
             </a:r>
             <a:r>
               <a:rPr lang="ja-JP" altLang="en-US" sz="900" dirty="0" smtClean="0">
@@ -5564,7 +5256,7 @@
               </a:rPr>
               <a:t>。</a:t>
             </a:r>
-            <a:endParaRPr lang="en-US" sz="900" dirty="0">
+            <a:endParaRPr lang="en-US" altLang="ja-JP" sz="900" dirty="0" smtClean="0">
               <a:latin typeface="ヒラギノ角ゴ Pro W3"/>
               <a:ea typeface="ヒラギノ角ゴ Pro W3"/>
               <a:cs typeface="ヒラギノ角ゴ Pro W3"/>
@@ -10508,23 +10200,7 @@
                 <a:ea typeface="ヒラギノ角ゴ Pro W3"/>
                 <a:cs typeface="ヒラギノ角ゴ Pro W3"/>
               </a:rPr>
-              <a:t>せず</a:t>
-            </a:r>
-            <a:r>
-              <a:rPr lang="ja-JP" altLang="en-US" sz="900" dirty="0" smtClean="0">
-                <a:latin typeface="ヒラギノ角ゴ Pro W3"/>
-                <a:ea typeface="ヒラギノ角ゴ Pro W3"/>
-                <a:cs typeface="ヒラギノ角ゴ Pro W3"/>
-              </a:rPr>
-              <a:t>、</a:t>
-            </a:r>
-            <a:r>
-              <a:rPr lang="ja-JP" altLang="en-US" sz="900" dirty="0" smtClean="0">
-                <a:latin typeface="ヒラギノ角ゴ Pro W3"/>
-                <a:ea typeface="ヒラギノ角ゴ Pro W3"/>
-                <a:cs typeface="ヒラギノ角ゴ Pro W3"/>
-              </a:rPr>
-              <a:t>チェックリストとプロジェクト</a:t>
+              <a:t>せず、チェックリストとプロジェクト</a:t>
             </a:r>
             <a:r>
               <a:rPr lang="ja-JP" altLang="en-US" sz="900" dirty="0">

</xml_diff>

<commit_message>
Merge 02.txt into pptx
</commit_message>
<xml_diff>
--- a/p42-jacobson_ja/p42-jacobson_ja.pptx
+++ b/p42-jacobson_ja/p42-jacobson_ja.pptx
@@ -3330,18 +3330,7 @@
                 <a:ea typeface="ヒラギノ角ゴ Std W8"/>
                 <a:cs typeface="ヒラギノ角ゴ Std W8"/>
               </a:rPr>
-              <a:t>思考フレームワークを</a:t>
-            </a:r>
-            <a:r>
-              <a:rPr lang="ja-JP" altLang="en-US" sz="1100" dirty="0">
-                <a:solidFill>
-                  <a:srgbClr val="008000"/>
-                </a:solidFill>
-                <a:latin typeface="ヒラギノ角ゴ Std W8"/>
-                <a:ea typeface="ヒラギノ角ゴ Std W8"/>
-                <a:cs typeface="ヒラギノ角ゴ Std W8"/>
-              </a:rPr>
-              <a:t>「アクショナブル・カーネル</a:t>
+              <a:t>思考フレームワークを「アクショナブル・カーネル</a:t>
             </a:r>
             <a:r>
               <a:rPr lang="en-US" altLang="ja-JP" sz="1100" dirty="0" smtClean="0">
@@ -4429,11 +4418,6 @@
               </a:rPr>
               <a:t>の支持者は新しいアイディアに敏感である。</a:t>
             </a:r>
-            <a:endParaRPr lang="ja-JP" altLang="en-US" sz="900" dirty="0">
-              <a:latin typeface="ヒラギノ角ゴ Pro W3"/>
-              <a:ea typeface="ヒラギノ角ゴ Pro W3"/>
-              <a:cs typeface="ヒラギノ角ゴ Pro W3"/>
-            </a:endParaRPr>
           </a:p>
         </p:txBody>
       </p:sp>
@@ -5137,14 +5121,6 @@
               </a:rPr>
               <a:t>。</a:t>
             </a:r>
-            <a:endParaRPr lang="ja-JP" altLang="en-US" sz="900" dirty="0">
-              <a:solidFill>
-                <a:srgbClr val="1A1818"/>
-              </a:solidFill>
-              <a:latin typeface="ヒラギノ角ゴ Pro W3"/>
-              <a:ea typeface="ヒラギノ角ゴ Pro W3"/>
-              <a:cs typeface="ヒラギノ角ゴ Pro W3"/>
-            </a:endParaRPr>
           </a:p>
         </p:txBody>
       </p:sp>
@@ -5157,7 +5133,7 @@
         <p:spPr>
           <a:xfrm>
             <a:off x="4599308" y="1303572"/>
-            <a:ext cx="2148054" cy="8217629"/>
+            <a:ext cx="2150934" cy="8633128"/>
           </a:xfrm>
           <a:prstGeom prst="rect">
             <a:avLst/>
@@ -5271,12 +5247,28 @@
           </a:p>
           <a:p>
             <a:r>
+              <a:rPr lang="en-US" altLang="en-US" sz="1200" dirty="0" smtClean="0">
+                <a:latin typeface="ヒラギノ角ゴ Pro W6"/>
+                <a:ea typeface="ヒラギノ角ゴ Pro W6"/>
+                <a:cs typeface="ヒラギノ角ゴ Pro W6"/>
+              </a:rPr>
+              <a:t>共通</a:t>
+            </a:r>
+            <a:r>
+              <a:rPr lang="ja-JP" altLang="en-US" sz="1200" dirty="0" smtClean="0">
+                <a:latin typeface="ヒラギノ角ゴ Pro W6"/>
+                <a:ea typeface="ヒラギノ角ゴ Pro W6"/>
+                <a:cs typeface="ヒラギノ角ゴ Pro W6"/>
+              </a:rPr>
+              <a:t>基盤</a:t>
+            </a:r>
+            <a:r>
               <a:rPr lang="ja-JP" altLang="en-US" sz="1200" dirty="0">
                 <a:latin typeface="ヒラギノ角ゴ Pro W6"/>
                 <a:ea typeface="ヒラギノ角ゴ Pro W6"/>
                 <a:cs typeface="ヒラギノ角ゴ Pro W6"/>
               </a:rPr>
-              <a:t>共通基盤の</a:t>
+              <a:t>の「力</a:t>
             </a:r>
             <a:r>
               <a:rPr lang="ja-JP" altLang="en-US" sz="1200" dirty="0" smtClean="0">
@@ -5284,7 +5276,7 @@
                 <a:ea typeface="ヒラギノ角ゴ Pro W6"/>
                 <a:cs typeface="ヒラギノ角ゴ Pro W6"/>
               </a:rPr>
-              <a:t>能力</a:t>
+              <a:t>」</a:t>
             </a:r>
             <a:endParaRPr lang="en-US" altLang="ja-JP" sz="1200" dirty="0" smtClean="0">
               <a:latin typeface="ヒラギノ角ゴ Pro W6"/>
@@ -5294,60 +5286,52 @@
           </a:p>
           <a:p>
             <a:r>
+              <a:rPr lang="en-US" altLang="ja-JP" sz="900" dirty="0" smtClean="0">
+                <a:latin typeface="ヒラギノ角ゴ Pro W3"/>
+                <a:ea typeface="ヒラギノ角ゴ Pro W3"/>
+                <a:cs typeface="ヒラギノ角ゴ Pro W3"/>
+              </a:rPr>
+              <a:t>SEMAT</a:t>
+            </a:r>
+            <a:r>
+              <a:rPr lang="ja-JP" altLang="en-US" sz="900" dirty="0">
+                <a:latin typeface="ヒラギノ角ゴ Pro W3"/>
+                <a:ea typeface="ヒラギノ角ゴ Pro W3"/>
+                <a:cs typeface="ヒラギノ角ゴ Pro W3"/>
+              </a:rPr>
+              <a:t>の第一歩は、ソフトウェア開発における共通基盤（</a:t>
+            </a:r>
+            <a:r>
               <a:rPr lang="en-US" altLang="ja-JP" sz="900" dirty="0">
                 <a:latin typeface="ヒラギノ角ゴ Pro W3"/>
                 <a:ea typeface="ヒラギノ角ゴ Pro W3"/>
                 <a:cs typeface="ヒラギノ角ゴ Pro W3"/>
               </a:rPr>
-              <a:t>SEMAT</a:t>
-            </a:r>
-            <a:r>
-              <a:rPr lang="ja-JP" altLang="en-US" sz="900" dirty="0">
-                <a:latin typeface="ヒラギノ角ゴ Pro W3"/>
-                <a:ea typeface="ヒラギノ角ゴ Pro W3"/>
-                <a:cs typeface="ヒラギノ角ゴ Pro W3"/>
-              </a:rPr>
-              <a:t>の最初のステップは、ソフトウェア開発における共通基盤を確認すること</a:t>
-            </a:r>
-            <a:r>
-              <a:rPr lang="ja-JP" altLang="en-US" sz="900" dirty="0" smtClean="0">
-                <a:latin typeface="ヒラギノ角ゴ Pro W3"/>
-                <a:ea typeface="ヒラギノ角ゴ Pro W3"/>
-                <a:cs typeface="ヒラギノ角ゴ Pro W3"/>
-              </a:rPr>
-              <a:t>であった</a:t>
-            </a:r>
-            <a:r>
-              <a:rPr lang="ja-JP" altLang="en-US" sz="900" dirty="0">
-                <a:latin typeface="ヒラギノ角ゴ Pro W3"/>
-                <a:ea typeface="ヒラギノ角ゴ Pro W3"/>
-                <a:cs typeface="ヒラギノ角ゴ Pro W3"/>
-              </a:rPr>
-              <a:t>。この共通基盤は、すべてのソフトウェア開発活動において普遍的な</a:t>
-            </a:r>
-            <a:r>
-              <a:rPr lang="ja-JP" altLang="en-US" sz="900" dirty="0" smtClean="0">
-                <a:latin typeface="ヒラギノ角ゴ Pro W3"/>
-                <a:ea typeface="ヒラギノ角ゴ Pro W3"/>
-                <a:cs typeface="ヒラギノ角ゴ Pro W3"/>
-              </a:rPr>
-              <a:t>必須要素</a:t>
-            </a:r>
-            <a:r>
-              <a:rPr lang="ja-JP" altLang="en-US" sz="900" dirty="0">
-                <a:latin typeface="ヒラギノ角ゴ Pro W3"/>
-                <a:ea typeface="ヒラギノ角ゴ Pro W3"/>
-                <a:cs typeface="ヒラギノ角ゴ Pro W3"/>
-              </a:rPr>
-              <a:t>のカーネルと、方法論と実践とを記述するためのシンプルな言語として示される</a:t>
-            </a:r>
-            <a:r>
-              <a:rPr lang="ja-JP" altLang="en-US" sz="900" dirty="0" smtClean="0">
-                <a:latin typeface="ヒラギノ角ゴ Pro W3"/>
-                <a:ea typeface="ヒラギノ角ゴ Pro W3"/>
-                <a:cs typeface="ヒラギノ角ゴ Pro W3"/>
-              </a:rPr>
-              <a:t>。</a:t>
+              <a:t>common ground</a:t>
+            </a:r>
+            <a:r>
+              <a:rPr lang="ja-JP" altLang="en-US" sz="900" dirty="0">
+                <a:latin typeface="ヒラギノ角ゴ Pro W3"/>
+                <a:ea typeface="ヒラギノ角ゴ Pro W3"/>
+                <a:cs typeface="ヒラギノ角ゴ Pro W3"/>
+              </a:rPr>
+              <a:t>）を捉えることであった。この共通基盤は、すべてのソフトウェア開発活動において普遍的な必須要素のカーネル（核</a:t>
+            </a:r>
+            <a:r>
+              <a:rPr lang="en-US" altLang="ja-JP" sz="900" dirty="0">
+                <a:latin typeface="ヒラギノ角ゴ Pro W3"/>
+                <a:ea typeface="ヒラギノ角ゴ Pro W3"/>
+                <a:cs typeface="ヒラギノ角ゴ Pro W3"/>
+              </a:rPr>
+              <a:t>; kernel</a:t>
+            </a:r>
+            <a:r>
+              <a:rPr lang="ja-JP" altLang="en-US" sz="900" dirty="0">
+                <a:latin typeface="ヒラギノ角ゴ Pro W3"/>
+                <a:ea typeface="ヒラギノ角ゴ Pro W3"/>
+                <a:cs typeface="ヒラギノ角ゴ Pro W3"/>
+              </a:rPr>
+              <a:t>）、および、手法やプラクティスを記述するためのシンプルな言語として示される。</a:t>
             </a:r>
             <a:r>
               <a:rPr lang="en-US" altLang="ja-JP" sz="900" dirty="0" smtClean="0">
@@ -5365,20 +5349,12 @@
               </a:rPr>
             </a:br>
             <a:r>
-              <a:rPr lang="ja-JP" altLang="en-US" sz="900" dirty="0" smtClean="0">
-                <a:latin typeface="ヒラギノ角ゴ Pro W3"/>
-                <a:ea typeface="ヒラギノ角ゴ Pro W3"/>
-                <a:cs typeface="ヒラギノ角ゴ Pro W3"/>
-              </a:rPr>
-              <a:t>カーネル</a:t>
-            </a:r>
-            <a:r>
-              <a:rPr lang="ja-JP" altLang="en-US" sz="900" dirty="0">
-                <a:latin typeface="ヒラギノ角ゴ Pro W3"/>
-                <a:ea typeface="ヒラギノ角ゴ Pro W3"/>
-                <a:cs typeface="ヒラギノ角ゴ Pro W3"/>
-              </a:rPr>
-              <a:t>は、</a:t>
+              <a:rPr lang="ja-JP" altLang="en-US" sz="900" dirty="0">
+                <a:latin typeface="ヒラギノ角ゴ Pro W3"/>
+                <a:ea typeface="ヒラギノ角ゴ Pro W3"/>
+                <a:cs typeface="ヒラギノ角ゴ Pro W3"/>
+              </a:rPr>
+              <a:t>カーネルは、</a:t>
             </a:r>
             <a:r>
               <a:rPr lang="en-US" altLang="ja-JP" sz="900" dirty="0" smtClean="0">
@@ -5386,7 +5362,31 @@
                 <a:ea typeface="ヒラギノ角ゴ Pro W3"/>
                 <a:cs typeface="ヒラギノ角ゴ Pro W3"/>
               </a:rPr>
-              <a:t>SEMAT OMG</a:t>
+              <a:t>SEMAT </a:t>
+            </a:r>
+            <a:r>
+              <a:rPr lang="ja-JP" altLang="en-US" sz="900" dirty="0" smtClean="0">
+                <a:latin typeface="ヒラギノ角ゴ Pro W3"/>
+                <a:ea typeface="ヒラギノ角ゴ Pro W3"/>
+                <a:cs typeface="ヒラギノ角ゴ Pro W3"/>
+              </a:rPr>
+              <a:t>の</a:t>
+            </a:r>
+            <a:r>
+              <a:rPr lang="en-US" altLang="ja-JP" sz="900" dirty="0" smtClean="0">
+                <a:latin typeface="ヒラギノ角ゴ Pro W3"/>
+                <a:ea typeface="ヒラギノ角ゴ Pro W3"/>
+                <a:cs typeface="ヒラギノ角ゴ Pro W3"/>
+              </a:rPr>
+              <a:t> </a:t>
+            </a:r>
+            <a:r>
+              <a:rPr lang="en-US" altLang="ja-JP" sz="900" dirty="0" smtClean="0">
+                <a:latin typeface="ヒラギノ角ゴ Pro W3"/>
+                <a:ea typeface="ヒラギノ角ゴ Pro W3"/>
+                <a:cs typeface="ヒラギノ角ゴ Pro W3"/>
+              </a:rPr>
+              <a:t>OMG</a:t>
             </a:r>
             <a:r>
               <a:rPr lang="ja-JP" altLang="en-US" sz="900" dirty="0">
@@ -5410,15 +5410,7 @@
                 <a:ea typeface="ヒラギノ角ゴ Pro W3"/>
                 <a:cs typeface="ヒラギノ角ゴ Pro W3"/>
               </a:rPr>
-              <a:t>）提案で初めて公開された</a:t>
-            </a:r>
-            <a:r>
-              <a:rPr lang="ja-JP" altLang="en-US" sz="900" dirty="0" smtClean="0">
-                <a:latin typeface="ヒラギノ角ゴ Pro W3"/>
-                <a:ea typeface="ヒラギノ角ゴ Pro W3"/>
-                <a:cs typeface="ヒラギノ角ゴ Pro W3"/>
-              </a:rPr>
-              <a:t>。図</a:t>
+              <a:t>）に対する提案の中で初めて公開された。図</a:t>
             </a:r>
             <a:r>
               <a:rPr lang="en-US" altLang="ja-JP" sz="900" dirty="0">
@@ -5450,23 +5442,7 @@
                 <a:ea typeface="ヒラギノ角ゴ Pro W3"/>
                 <a:cs typeface="ヒラギノ角ゴ Pro W3"/>
               </a:rPr>
-              <a:t>で示すように、カーネルはソフトウェアシステムを開発するとき</a:t>
-            </a:r>
-            <a:r>
-              <a:rPr lang="ja-JP" altLang="en-US" sz="900" dirty="0" smtClean="0">
-                <a:latin typeface="ヒラギノ角ゴ Pro W3"/>
-                <a:ea typeface="ヒラギノ角ゴ Pro W3"/>
-                <a:cs typeface="ヒラギノ角ゴ Pro W3"/>
-              </a:rPr>
-              <a:t>に「</a:t>
-            </a:r>
-            <a:r>
-              <a:rPr lang="ja-JP" altLang="en-US" sz="900" dirty="0">
-                <a:latin typeface="ヒラギノ角ゴ Pro W3"/>
-                <a:ea typeface="ヒラギノ角ゴ Pro W3"/>
-                <a:cs typeface="ヒラギノ角ゴ Pro W3"/>
-              </a:rPr>
-              <a:t>我々が常に仕事で扱うこと</a:t>
+              <a:t>に示すように、カーネルはソフトウェアシステムを開発するときに「我々が常に仕事で扱うこと（</a:t>
             </a:r>
             <a:r>
               <a:rPr lang="en-US" altLang="ja-JP" sz="900" dirty="0">
@@ -5474,31 +5450,15 @@
                 <a:ea typeface="ヒラギノ角ゴ Pro W3"/>
                 <a:cs typeface="ヒラギノ角ゴ Pro W3"/>
               </a:rPr>
-              <a:t>(things we always work with)</a:t>
-            </a:r>
-            <a:r>
-              <a:rPr lang="ja-JP" altLang="en-US" sz="900" dirty="0">
-                <a:latin typeface="ヒラギノ角ゴ Pro W3"/>
-                <a:ea typeface="ヒラギノ角ゴ Pro W3"/>
-                <a:cs typeface="ヒラギノ角ゴ Pro W3"/>
-              </a:rPr>
-              <a:t>」と「我々が</a:t>
-            </a:r>
-            <a:r>
-              <a:rPr lang="ja-JP" altLang="en-US" sz="900" dirty="0" smtClean="0">
-                <a:latin typeface="ヒラギノ角ゴ Pro W3"/>
-                <a:ea typeface="ヒラギノ角ゴ Pro W3"/>
-                <a:cs typeface="ヒラギノ角ゴ Pro W3"/>
-              </a:rPr>
-              <a:t>常に行う</a:t>
-            </a:r>
-            <a:r>
-              <a:rPr lang="ja-JP" altLang="en-US" sz="900" dirty="0">
-                <a:latin typeface="ヒラギノ角ゴ Pro W3"/>
-                <a:ea typeface="ヒラギノ角ゴ Pro W3"/>
-                <a:cs typeface="ヒラギノ角ゴ Pro W3"/>
-              </a:rPr>
-              <a:t>こと</a:t>
+              <a:t>things we always work with</a:t>
+            </a:r>
+            <a:r>
+              <a:rPr lang="ja-JP" altLang="en-US" sz="900" dirty="0">
+                <a:latin typeface="ヒラギノ角ゴ Pro W3"/>
+                <a:ea typeface="ヒラギノ角ゴ Pro W3"/>
+                <a:cs typeface="ヒラギノ角ゴ Pro W3"/>
+              </a:rPr>
+              <a:t>）」と「我々が常に行うこと</a:t>
             </a:r>
             <a:r>
               <a:rPr lang="en-US" altLang="ja-JP" sz="900" dirty="0">
@@ -5514,7 +5474,7 @@
                 <a:ea typeface="ヒラギノ角ゴ Pro W3"/>
                 <a:cs typeface="ヒラギノ角ゴ Pro W3"/>
               </a:rPr>
-              <a:t>」とを、それぞれ少数含んでいる</a:t>
+              <a:t>」に関する厳選された少数の概念からなる</a:t>
             </a:r>
             <a:r>
               <a:rPr lang="ja-JP" altLang="en-US" sz="900" dirty="0" smtClean="0">
@@ -5537,31 +5497,23 @@
                 <a:ea typeface="ヒラギノ角ゴ Pro W3"/>
                 <a:cs typeface="ヒラギノ角ゴ Pro W3"/>
               </a:rPr>
-              <a:t>「我々が常に保有しているべき技術」を定義する活動も進行中である。しかし</a:t>
-            </a:r>
-            <a:r>
-              <a:rPr lang="ja-JP" altLang="en-US" sz="900" dirty="0" smtClean="0">
-                <a:latin typeface="ヒラギノ角ゴ Pro W3"/>
-                <a:ea typeface="ヒラギノ角ゴ Pro W3"/>
-                <a:cs typeface="ヒラギノ角ゴ Pro W3"/>
-              </a:rPr>
-              <a:t>、これ</a:t>
-            </a:r>
-            <a:r>
-              <a:rPr lang="ja-JP" altLang="en-US" sz="900" dirty="0">
-                <a:latin typeface="ヒラギノ角ゴ Pro W3"/>
-                <a:ea typeface="ヒラギノ角ゴ Pro W3"/>
-                <a:cs typeface="ヒラギノ角ゴ Pro W3"/>
-              </a:rPr>
-              <a:t>はカーネルの将来のバージョンまで待たなければならない</a:t>
-            </a:r>
-            <a:r>
-              <a:rPr lang="ja-JP" altLang="en-US" sz="900" dirty="0" smtClean="0">
-                <a:latin typeface="ヒラギノ角ゴ Pro W3"/>
-                <a:ea typeface="ヒラギノ角ゴ Pro W3"/>
-                <a:cs typeface="ヒラギノ角ゴ Pro W3"/>
-              </a:rPr>
-              <a:t>。</a:t>
+              <a:t>「我々が常に持つべきスキル（</a:t>
+            </a:r>
+            <a:r>
+              <a:rPr lang="en-US" altLang="ja-JP" sz="900" dirty="0">
+                <a:latin typeface="ヒラギノ角ゴ Pro W3"/>
+                <a:ea typeface="ヒラギノ角ゴ Pro W3"/>
+                <a:cs typeface="ヒラギノ角ゴ Pro W3"/>
+              </a:rPr>
+              <a:t>skills we always need to have</a:t>
+            </a:r>
+            <a:r>
+              <a:rPr lang="ja-JP" altLang="en-US" sz="900" dirty="0">
+                <a:latin typeface="ヒラギノ角ゴ Pro W3"/>
+                <a:ea typeface="ヒラギノ角ゴ Pro W3"/>
+                <a:cs typeface="ヒラギノ角ゴ Pro W3"/>
+              </a:rPr>
+              <a:t>）」を定義する活動も進行中である。しかし、これはカーネルの将来のバージョンまで待たなければならない。</a:t>
             </a:r>
             <a:r>
               <a:rPr lang="en-US" altLang="ja-JP" sz="900" dirty="0" smtClean="0">
@@ -5591,15 +5543,7 @@
                 <a:ea typeface="ヒラギノ角ゴ Pro W3"/>
                 <a:cs typeface="ヒラギノ角ゴ Pro W3"/>
               </a:rPr>
-              <a:t>カーネルは概念モデルである以上に、次のものを提供</a:t>
-            </a:r>
-            <a:r>
-              <a:rPr lang="ja-JP" altLang="en-US" sz="900" dirty="0" smtClean="0">
-                <a:latin typeface="ヒラギノ角ゴ Pro W3"/>
-                <a:ea typeface="ヒラギノ角ゴ Pro W3"/>
-                <a:cs typeface="ヒラギノ角ゴ Pro W3"/>
-              </a:rPr>
-              <a:t>する。</a:t>
+              <a:t>カーネルは単なる概念モデルではなく、以下を提供する。</a:t>
             </a:r>
             <a:r>
               <a:rPr lang="en-US" altLang="ja-JP" sz="900" dirty="0" smtClean="0">
@@ -5617,28 +5561,12 @@
               </a:rPr>
             </a:br>
             <a:r>
-              <a:rPr lang="en-US" sz="900" dirty="0">
-                <a:latin typeface="ヒラギノ角ゴ Pro W3"/>
-                <a:ea typeface="ヒラギノ角ゴ Pro W3"/>
-                <a:cs typeface="ヒラギノ角ゴ Pro W3"/>
-              </a:rPr>
-              <a:t>˲</a:t>
-            </a:r>
-            <a:r>
-              <a:rPr lang="ja-JP" altLang="en-US" sz="900" dirty="0" smtClean="0">
-                <a:latin typeface="ヒラギノ角ゴ Pro W3"/>
-                <a:ea typeface="ヒラギノ角ゴ Pro W3"/>
-                <a:cs typeface="ヒラギノ角ゴ Pro W3"/>
-              </a:rPr>
-              <a:t>チーム</a:t>
-            </a:r>
-            <a:r>
-              <a:rPr lang="ja-JP" altLang="en-US" sz="900" dirty="0">
-                <a:latin typeface="ヒラギノ角ゴ Pro W3"/>
-                <a:ea typeface="ヒラギノ角ゴ Pro W3"/>
-                <a:cs typeface="ヒラギノ角ゴ Pro W3"/>
-              </a:rPr>
-              <a:t>において、開発の進捗および努力</a:t>
+              <a:rPr lang="ja-JP" altLang="en-US" sz="900" dirty="0">
+                <a:latin typeface="ヒラギノ角ゴ Pro W3"/>
+                <a:ea typeface="ヒラギノ角ゴ Pro W3"/>
+                <a:cs typeface="ヒラギノ角ゴ Pro W3"/>
+              </a:rPr>
+              <a:t>* チームにおいて、開発の進捗や取り組みの健全性（</a:t>
             </a:r>
             <a:r>
               <a:rPr lang="en-US" altLang="ja-JP" sz="900" dirty="0">
@@ -5646,159 +5574,45 @@
                 <a:ea typeface="ヒラギノ角ゴ Pro W3"/>
                 <a:cs typeface="ヒラギノ角ゴ Pro W3"/>
               </a:rPr>
-              <a:t>(endeavors)</a:t>
-            </a:r>
-            <a:r>
-              <a:rPr lang="ja-JP" altLang="en-US" sz="900" dirty="0">
-                <a:latin typeface="ヒラギノ角ゴ Pro W3"/>
-                <a:ea typeface="ヒラギノ角ゴ Pro W3"/>
-                <a:cs typeface="ヒラギノ角ゴ Pro W3"/>
-              </a:rPr>
-              <a:t>の健全性を論じるため</a:t>
-            </a:r>
-            <a:r>
-              <a:rPr lang="ja-JP" altLang="en-US" sz="900" dirty="0" smtClean="0">
-                <a:latin typeface="ヒラギノ角ゴ Pro W3"/>
-                <a:ea typeface="ヒラギノ角ゴ Pro W3"/>
-                <a:cs typeface="ヒラギノ角ゴ Pro W3"/>
-              </a:rPr>
-              <a:t>の思考</a:t>
-            </a:r>
-            <a:r>
-              <a:rPr lang="ja-JP" altLang="en-US" sz="900" dirty="0">
-                <a:latin typeface="ヒラギノ角ゴ Pro W3"/>
-                <a:ea typeface="ヒラギノ角ゴ Pro W3"/>
-                <a:cs typeface="ヒラギノ角ゴ Pro W3"/>
-              </a:rPr>
-              <a:t>フレームワーク</a:t>
-            </a:r>
-          </a:p>
-          <a:p>
-            <a:r>
-              <a:rPr lang="en-US" sz="900" dirty="0" smtClean="0">
-                <a:latin typeface="ヒラギノ角ゴ Pro W3"/>
-                <a:ea typeface="ヒラギノ角ゴ Pro W3"/>
-                <a:cs typeface="ヒラギノ角ゴ Pro W3"/>
-              </a:rPr>
-              <a:t>˲ </a:t>
-            </a:r>
-            <a:r>
-              <a:rPr lang="ja-JP" altLang="en-US" sz="900" dirty="0">
-                <a:latin typeface="ヒラギノ角ゴ Pro W3"/>
-                <a:ea typeface="ヒラギノ角ゴ Pro W3"/>
-                <a:cs typeface="ヒラギノ角ゴ Pro W3"/>
-              </a:rPr>
-              <a:t>ソフトウェア開発の方法論と実践に関する議論、改善、比較および共有</a:t>
-            </a:r>
-            <a:r>
-              <a:rPr lang="ja-JP" altLang="en-US" sz="900" dirty="0" smtClean="0">
-                <a:latin typeface="ヒラギノ角ゴ Pro W3"/>
-                <a:ea typeface="ヒラギノ角ゴ Pro W3"/>
-                <a:cs typeface="ヒラギノ角ゴ Pro W3"/>
-              </a:rPr>
-              <a:t>のため</a:t>
-            </a:r>
-            <a:r>
-              <a:rPr lang="ja-JP" altLang="en-US" sz="900" dirty="0">
-                <a:latin typeface="ヒラギノ角ゴ Pro W3"/>
-                <a:ea typeface="ヒラギノ角ゴ Pro W3"/>
-                <a:cs typeface="ヒラギノ角ゴ Pro W3"/>
-              </a:rPr>
-              <a:t>の共通</a:t>
-            </a:r>
-            <a:r>
-              <a:rPr lang="ja-JP" altLang="en-US" sz="900" dirty="0" smtClean="0">
-                <a:latin typeface="ヒラギノ角ゴ Pro W3"/>
-                <a:ea typeface="ヒラギノ角ゴ Pro W3"/>
-                <a:cs typeface="ヒラギノ角ゴ Pro W3"/>
-              </a:rPr>
-              <a:t>基盤</a:t>
-            </a:r>
-            <a:endParaRPr lang="en-US" altLang="ja-JP" sz="900" dirty="0" smtClean="0">
-              <a:latin typeface="ヒラギノ角ゴ Pro W3"/>
-              <a:ea typeface="ヒラギノ角ゴ Pro W3"/>
-              <a:cs typeface="ヒラギノ角ゴ Pro W3"/>
-            </a:endParaRPr>
-          </a:p>
-          <a:p>
-            <a:r>
-              <a:rPr lang="en-US" sz="900" dirty="0" smtClean="0">
-                <a:latin typeface="ヒラギノ角ゴ Pro W3"/>
-                <a:ea typeface="ヒラギノ角ゴ Pro W3"/>
-                <a:cs typeface="ヒラギノ角ゴ Pro W3"/>
-              </a:rPr>
-              <a:t>˲ </a:t>
-            </a:r>
-            <a:r>
-              <a:rPr lang="ja-JP" altLang="en-US" sz="900" dirty="0">
-                <a:latin typeface="ヒラギノ角ゴ Pro W3"/>
-                <a:ea typeface="ヒラギノ角ゴ Pro W3"/>
-                <a:cs typeface="ヒラギノ角ゴ Pro W3"/>
-              </a:rPr>
-              <a:t>チームが、別々に定義されたり由来が違うプラクティスを集めることによって</a:t>
-            </a:r>
-            <a:r>
-              <a:rPr lang="ja-JP" altLang="en-US" sz="900" dirty="0" smtClean="0">
-                <a:latin typeface="ヒラギノ角ゴ Pro W3"/>
-                <a:ea typeface="ヒラギノ角ゴ Pro W3"/>
-                <a:cs typeface="ヒラギノ角ゴ Pro W3"/>
-              </a:rPr>
-              <a:t>、チーム</a:t>
-            </a:r>
-            <a:r>
-              <a:rPr lang="ja-JP" altLang="en-US" sz="900" dirty="0">
-                <a:latin typeface="ヒラギノ角ゴ Pro W3"/>
-                <a:ea typeface="ヒラギノ角ゴ Pro W3"/>
-                <a:cs typeface="ヒラギノ角ゴ Pro W3"/>
-              </a:rPr>
-              <a:t>独自の仕事の仕方を組み立て、継続的に改善するための</a:t>
-            </a:r>
-            <a:r>
-              <a:rPr lang="ja-JP" altLang="en-US" sz="900" dirty="0" smtClean="0">
-                <a:latin typeface="ヒラギノ角ゴ Pro W3"/>
-                <a:ea typeface="ヒラギノ角ゴ Pro W3"/>
-                <a:cs typeface="ヒラギノ角ゴ Pro W3"/>
-              </a:rPr>
-              <a:t>フレームワーク</a:t>
-            </a:r>
-            <a:endParaRPr lang="en-US" altLang="ja-JP" sz="900" dirty="0" smtClean="0">
-              <a:latin typeface="ヒラギノ角ゴ Pro W3"/>
-              <a:ea typeface="ヒラギノ角ゴ Pro W3"/>
-              <a:cs typeface="ヒラギノ角ゴ Pro W3"/>
-            </a:endParaRPr>
-          </a:p>
-          <a:p>
-            <a:r>
-              <a:rPr lang="en-US" sz="900" dirty="0" smtClean="0">
-                <a:latin typeface="ヒラギノ角ゴ Pro W3"/>
-                <a:ea typeface="ヒラギノ角ゴ Pro W3"/>
-                <a:cs typeface="ヒラギノ角ゴ Pro W3"/>
-              </a:rPr>
-              <a:t>˲ </a:t>
-            </a:r>
-            <a:r>
-              <a:rPr lang="ja-JP" altLang="en-US" sz="900" dirty="0">
-                <a:latin typeface="ヒラギノ角ゴ Pro W3"/>
-                <a:ea typeface="ヒラギノ角ゴ Pro W3"/>
-                <a:cs typeface="ヒラギノ角ゴ Pro W3"/>
-              </a:rPr>
-              <a:t>開発されたソフトウェアならびに開発に用いられた方法論の品質を評価</a:t>
-            </a:r>
-            <a:r>
-              <a:rPr lang="ja-JP" altLang="en-US" sz="900" dirty="0" smtClean="0">
-                <a:latin typeface="ヒラギノ角ゴ Pro W3"/>
-                <a:ea typeface="ヒラギノ角ゴ Pro W3"/>
-                <a:cs typeface="ヒラギノ角ゴ Pro W3"/>
-              </a:rPr>
-              <a:t>するため</a:t>
-            </a:r>
-            <a:r>
-              <a:rPr lang="ja-JP" altLang="en-US" sz="900" dirty="0">
-                <a:latin typeface="ヒラギノ角ゴ Pro W3"/>
-                <a:ea typeface="ヒラギノ角ゴ Pro W3"/>
-                <a:cs typeface="ヒラギノ角ゴ Pro W3"/>
-              </a:rPr>
-              <a:t>の、事例非依存な計測指標を定義する基礎</a:t>
+              <a:t>health of endeavors</a:t>
+            </a:r>
+            <a:r>
+              <a:rPr lang="ja-JP" altLang="en-US" sz="900" dirty="0">
+                <a:latin typeface="ヒラギノ角ゴ Pro W3"/>
+                <a:ea typeface="ヒラギノ角ゴ Pro W3"/>
+                <a:cs typeface="ヒラギノ角ゴ Pro W3"/>
+              </a:rPr>
+              <a:t>）を推論し判断するための思考フレームワーク</a:t>
+            </a:r>
+          </a:p>
+          <a:p>
+            <a:r>
+              <a:rPr lang="ja-JP" altLang="en-US" sz="900" dirty="0">
+                <a:latin typeface="ヒラギノ角ゴ Pro W3"/>
+                <a:ea typeface="ヒラギノ角ゴ Pro W3"/>
+                <a:cs typeface="ヒラギノ角ゴ Pro W3"/>
+              </a:rPr>
+              <a:t>* ソフトウェア開発の手法とプラクティスについて議論、改善、比較および共有するための共通基盤</a:t>
+            </a:r>
+          </a:p>
+          <a:p>
+            <a:r>
+              <a:rPr lang="ja-JP" altLang="en-US" sz="900" dirty="0">
+                <a:latin typeface="ヒラギノ角ゴ Pro W3"/>
+                <a:ea typeface="ヒラギノ角ゴ Pro W3"/>
+                <a:cs typeface="ヒラギノ角ゴ Pro W3"/>
+              </a:rPr>
+              <a:t>* チームが、別々に定義され由来の異なるプラクティスを集めてチーム独自の仕事の仕方を組み立てて、継続的に改善するためのフレームワーク</a:t>
+            </a:r>
+          </a:p>
+          <a:p>
+            <a:r>
+              <a:rPr lang="ja-JP" altLang="en-US" sz="900" dirty="0">
+                <a:latin typeface="ヒラギノ角ゴ Pro W3"/>
+                <a:ea typeface="ヒラギノ角ゴ Pro W3"/>
+                <a:cs typeface="ヒラギノ角ゴ Pro W3"/>
+              </a:rPr>
+              <a:t>* 開発されたソフトウェアならびに開発に用いられた方法論の品質を評価するための、事例非依存な計測指標を定義する基礎</a:t>
             </a:r>
             <a:r>
               <a:rPr lang="en-US" altLang="ja-JP" sz="900" dirty="0">
@@ -5806,63 +5620,36 @@
                 <a:ea typeface="ヒラギノ角ゴ Pro W3"/>
                 <a:cs typeface="ヒラギノ角ゴ Pro W3"/>
               </a:rPr>
-              <a:t>(foundation</a:t>
-            </a:r>
-            <a:r>
-              <a:rPr lang="en-US" altLang="ja-JP" sz="900" dirty="0" smtClean="0">
-                <a:latin typeface="ヒラギノ角ゴ Pro W3"/>
-                <a:ea typeface="ヒラギノ角ゴ Pro W3"/>
-                <a:cs typeface="ヒラギノ角ゴ Pro W3"/>
-              </a:rPr>
-              <a:t>)</a:t>
-            </a:r>
-          </a:p>
-          <a:p>
-            <a:r>
-              <a:rPr lang="en-US" sz="900" dirty="0" smtClean="0">
-                <a:latin typeface="ヒラギノ角ゴ Pro W3"/>
-                <a:ea typeface="ヒラギノ角ゴ Pro W3"/>
-                <a:cs typeface="ヒラギノ角ゴ Pro W3"/>
-              </a:rPr>
-              <a:t>˲ </a:t>
-            </a:r>
-            <a:r>
-              <a:rPr lang="ja-JP" altLang="en-US" sz="900" dirty="0">
-                <a:latin typeface="ヒラギノ角ゴ Pro W3"/>
-                <a:ea typeface="ヒラギノ角ゴ Pro W3"/>
-                <a:cs typeface="ヒラギノ角ゴ Pro W3"/>
-              </a:rPr>
-              <a:t>最も重要なこととして、どこにいるのか、次に何をすべきなのか、</a:t>
-            </a:r>
-            <a:r>
-              <a:rPr lang="ja-JP" altLang="en-US" sz="900" dirty="0" smtClean="0">
-                <a:latin typeface="ヒラギノ角ゴ Pro W3"/>
-                <a:ea typeface="ヒラギノ角ゴ Pro W3"/>
-                <a:cs typeface="ヒラギノ角ゴ Pro W3"/>
-              </a:rPr>
-              <a:t>そしてどこ</a:t>
-            </a:r>
-            <a:r>
-              <a:rPr lang="ja-JP" altLang="en-US" sz="900" dirty="0">
-                <a:latin typeface="ヒラギノ角ゴ Pro W3"/>
-                <a:ea typeface="ヒラギノ角ゴ Pro W3"/>
-                <a:cs typeface="ヒラギノ角ゴ Pro W3"/>
-              </a:rPr>
-              <a:t>を改善すべきなのかを、チームが理解することを支援する</a:t>
-            </a:r>
-            <a:r>
-              <a:rPr lang="ja-JP" altLang="en-US" sz="900" dirty="0" smtClean="0">
-                <a:latin typeface="ヒラギノ角ゴ Pro W3"/>
-                <a:ea typeface="ヒラギノ角ゴ Pro W3"/>
-                <a:cs typeface="ヒラギノ角ゴ Pro W3"/>
-              </a:rPr>
-              <a:t>方法</a:t>
-            </a:r>
-            <a:endParaRPr lang="en-US" altLang="ja-JP" sz="900" dirty="0" smtClean="0">
-              <a:latin typeface="ヒラギノ角ゴ Pro W3"/>
-              <a:ea typeface="ヒラギノ角ゴ Pro W3"/>
-              <a:cs typeface="ヒラギノ角ゴ Pro W3"/>
-            </a:endParaRPr>
+              <a:t>(foundation)</a:t>
+            </a:r>
+          </a:p>
+          <a:p>
+            <a:r>
+              <a:rPr lang="en-US" altLang="ja-JP" sz="900" dirty="0">
+                <a:latin typeface="ヒラギノ角ゴ Pro W3"/>
+                <a:ea typeface="ヒラギノ角ゴ Pro W3"/>
+                <a:cs typeface="ヒラギノ角ゴ Pro W3"/>
+              </a:rPr>
+              <a:t>* </a:t>
+            </a:r>
+            <a:r>
+              <a:rPr lang="ja-JP" altLang="en-US" sz="900" dirty="0">
+                <a:latin typeface="ヒラギノ角ゴ Pro W3"/>
+                <a:ea typeface="ヒラギノ角ゴ Pro W3"/>
+                <a:cs typeface="ヒラギノ角ゴ Pro W3"/>
+              </a:rPr>
+              <a:t>最も重要なこととして、どこにいるのか、次に何をすべきなのか、そして</a:t>
+            </a:r>
+          </a:p>
+          <a:p>
+            <a:r>
+              <a:rPr lang="ja-JP" altLang="en-US" sz="900" dirty="0">
+                <a:latin typeface="ヒラギノ角ゴ Pro W3"/>
+                <a:ea typeface="ヒラギノ角ゴ Pro W3"/>
+                <a:cs typeface="ヒラギノ角ゴ Pro W3"/>
+              </a:rPr>
+              <a:t>どこを改善すべきなのかを、チームが理解することを支援する方法</a:t>
+            </a:r>
           </a:p>
           <a:p>
             <a:endParaRPr lang="en-US" altLang="ja-JP" sz="900" dirty="0" smtClean="0">

</xml_diff>